<commit_message>
Video topic pptx updated
</commit_message>
<xml_diff>
--- a/05_frontend/Frontend_VideoTopics.pptx
+++ b/05_frontend/Frontend_VideoTopics.pptx
@@ -7693,18 +7693,18 @@
           <a:lstStyle/>
           <a:p>
             <a:r>
-              <a:rPr lang="en-US"/>
+              <a:rPr lang="en-US" dirty="0"/>
               <a:t>9. The </a:t>
             </a:r>
             <a:r>
-              <a:rPr lang="en-US" err="1"/>
+              <a:rPr lang="en-US" dirty="0" err="1"/>
               <a:t>useEffect</a:t>
             </a:r>
             <a:r>
-              <a:rPr lang="en-US"/>
+              <a:rPr lang="en-US" dirty="0"/>
               <a:t> hook</a:t>
             </a:r>
-            <a:endParaRPr lang="fi-FI"/>
+            <a:endParaRPr lang="fi-FI" dirty="0"/>
           </a:p>
         </p:txBody>
       </p:sp>
@@ -11849,9 +11849,26 @@
               </a:lnSpc>
             </a:pPr>
             <a:r>
-              <a:rPr lang="en-US" sz="2800"/>
-              <a:t>Special case: Passing ‘event handler function’ (parent state’s set function) to the child component(s) in props so that child/children can execute it and thus e.g. write back to parent's state.</a:t>
-            </a:r>
+              <a:rPr lang="en-US" sz="2800" dirty="0"/>
+              <a:t>(Normal case was: Parent passes </a:t>
+            </a:r>
+            <a:r>
+              <a:rPr lang="en-US" sz="2800" b="1" dirty="0"/>
+              <a:t>data</a:t>
+            </a:r>
+            <a:r>
+              <a:rPr lang="en-US" sz="2800" dirty="0"/>
+              <a:t> to the children in props, and children only show it)</a:t>
+            </a:r>
+          </a:p>
+          <a:p>
+            <a:pPr marL="0" indent="0">
+              <a:lnSpc>
+                <a:spcPct val="100000"/>
+              </a:lnSpc>
+              <a:buNone/>
+            </a:pPr>
+            <a:endParaRPr lang="en-US" sz="2800" dirty="0"/>
           </a:p>
           <a:p>
             <a:pPr>
@@ -11860,16 +11877,8 @@
               </a:lnSpc>
             </a:pPr>
             <a:r>
-              <a:rPr lang="en-US" sz="2800"/>
-              <a:t>(Normal case: Parent passes </a:t>
-            </a:r>
-            <a:r>
-              <a:rPr lang="en-US" sz="2800" b="1"/>
-              <a:t>data</a:t>
-            </a:r>
-            <a:r>
-              <a:rPr lang="en-US" sz="2800"/>
-              <a:t> to the children in props, and children only show it)</a:t>
+              <a:rPr lang="en-US" sz="2800" dirty="0"/>
+              <a:t>Special case: Parent will pass ‘event handler function’ (parent state’s set function) to the child component(s) in props so that child/children can execute it and thus e.g. write back to parent's state.</a:t>
             </a:r>
           </a:p>
         </p:txBody>
@@ -12550,15 +12559,6 @@
 </file>
 
 <file path=customXml/item2.xml><?xml version="1.0" encoding="utf-8"?>
-<?mso-contentType ?>
-<FormTemplates xmlns="http://schemas.microsoft.com/sharepoint/v3/contenttype/forms">
-  <Display>DocumentLibraryForm</Display>
-  <Edit>DocumentLibraryForm</Edit>
-  <New>DocumentLibraryForm</New>
-</FormTemplates>
-</file>
-
-<file path=customXml/item3.xml><?xml version="1.0" encoding="utf-8"?>
 <ct:contentTypeSchema xmlns:ct="http://schemas.microsoft.com/office/2006/metadata/contentType" xmlns:ma="http://schemas.microsoft.com/office/2006/metadata/properties/metaAttributes" ct:_="" ma:_="" ma:contentTypeName="Asiakirja" ma:contentTypeID="0x0101000ADF884DD0861243B829456B91D71C32" ma:contentTypeVersion="13" ma:contentTypeDescription="Luo uusi asiakirja." ma:contentTypeScope="" ma:versionID="314522af3e545be07820a3e09ada0045">
   <xsd:schema xmlns:xsd="http://www.w3.org/2001/XMLSchema" xmlns:xs="http://www.w3.org/2001/XMLSchema" xmlns:p="http://schemas.microsoft.com/office/2006/metadata/properties" xmlns:ns2="8438dade-b61d-47d7-ab56-0bbf57e3795f" xmlns:ns3="0b3f8f6d-dc8d-4076-ae37-9bbd8f8c2dbf" targetNamespace="http://schemas.microsoft.com/office/2006/metadata/properties" ma:root="true" ma:fieldsID="1bc2462d560d8dfa6d4fd7061c558562" ns2:_="" ns3:_="">
     <xsd:import namespace="8438dade-b61d-47d7-ab56-0bbf57e3795f"/>
@@ -12781,6 +12781,15 @@
 </ct:contentTypeSchema>
 </file>
 
+<file path=customXml/item3.xml><?xml version="1.0" encoding="utf-8"?>
+<?mso-contentType ?>
+<FormTemplates xmlns="http://schemas.microsoft.com/sharepoint/v3/contenttype/forms">
+  <Display>DocumentLibraryForm</Display>
+  <Edit>DocumentLibraryForm</Edit>
+  <New>DocumentLibraryForm</New>
+</FormTemplates>
+</file>
+
 <file path=customXml/itemProps1.xml><?xml version="1.0" encoding="utf-8"?>
 <ds:datastoreItem xmlns:ds="http://schemas.openxmlformats.org/officeDocument/2006/customXml" ds:itemID="{DED4E12E-7268-4B03-A47B-0755D62B5E31}">
   <ds:schemaRefs>
@@ -12799,14 +12808,6 @@
 </file>
 
 <file path=customXml/itemProps2.xml><?xml version="1.0" encoding="utf-8"?>
-<ds:datastoreItem xmlns:ds="http://schemas.openxmlformats.org/officeDocument/2006/customXml" ds:itemID="{D546C03B-CD3A-4EA0-AAA4-0E00E896454E}">
-  <ds:schemaRefs>
-    <ds:schemaRef ds:uri="http://schemas.microsoft.com/sharepoint/v3/contenttype/forms"/>
-  </ds:schemaRefs>
-</ds:datastoreItem>
-</file>
-
-<file path=customXml/itemProps3.xml><?xml version="1.0" encoding="utf-8"?>
 <ds:datastoreItem xmlns:ds="http://schemas.openxmlformats.org/officeDocument/2006/customXml" ds:itemID="{3D8B6CA5-4463-44E3-A138-AB79431CCE9A}">
   <ds:schemaRefs>
     <ds:schemaRef ds:uri="http://schemas.microsoft.com/office/2006/metadata/contentType"/>
@@ -12823,4 +12824,12 @@
     <ds:schemaRef ds:uri="http://schemas.microsoft.com/internal/obd"/>
   </ds:schemaRefs>
 </ds:datastoreItem>
+</file>
+
+<file path=customXml/itemProps3.xml><?xml version="1.0" encoding="utf-8"?>
+<ds:datastoreItem xmlns:ds="http://schemas.openxmlformats.org/officeDocument/2006/customXml" ds:itemID="{D546C03B-CD3A-4EA0-AAA4-0E00E896454E}">
+  <ds:schemaRefs>
+    <ds:schemaRef ds:uri="http://schemas.microsoft.com/sharepoint/v3/contenttype/forms"/>
+  </ds:schemaRefs>
+</ds:datastoreItem>
 </file>
</xml_diff>

<commit_message>
Updates to Frontend materials
</commit_message>
<xml_diff>
--- a/05_frontend/Frontend_VideoTopics.pptx
+++ b/05_frontend/Frontend_VideoTopics.pptx
@@ -5,7 +5,7 @@
     <p:sldMasterId id="2147483648" r:id="rId4"/>
   </p:sldMasterIdLst>
   <p:notesMasterIdLst>
-    <p:notesMasterId r:id="rId22"/>
+    <p:notesMasterId r:id="rId21"/>
   </p:notesMasterIdLst>
   <p:sldIdLst>
     <p:sldId id="259" r:id="rId5"/>
@@ -21,10 +21,9 @@
     <p:sldId id="266" r:id="rId15"/>
     <p:sldId id="268" r:id="rId16"/>
     <p:sldId id="269" r:id="rId17"/>
-    <p:sldId id="271" r:id="rId18"/>
-    <p:sldId id="272" r:id="rId19"/>
-    <p:sldId id="270" r:id="rId20"/>
-    <p:sldId id="258" r:id="rId21"/>
+    <p:sldId id="272" r:id="rId18"/>
+    <p:sldId id="270" r:id="rId19"/>
+    <p:sldId id="258" r:id="rId20"/>
   </p:sldIdLst>
   <p:sldSz cx="12192000" cy="6858000"/>
   <p:notesSz cx="6858000" cy="9144000"/>
@@ -1374,7 +1373,7 @@
           <a:p>
             <a:fld id="{5645C365-1C26-6946-87AF-75D6A7DF4277}" type="datetimeFigureOut">
               <a:rPr lang="en-GB" smtClean="0"/>
-              <a:t>27/03/2023</a:t>
+              <a:t>14/11/2023</a:t>
             </a:fld>
             <a:endParaRPr lang="en-GB"/>
           </a:p>
@@ -1873,7 +1872,7 @@
           <a:p>
             <a:fld id="{35B864B8-8D08-7B43-B4FB-B2FB41A5D9E3}" type="datetime1">
               <a:rPr lang="fi-FI" smtClean="0"/>
-              <a:t>27.3.2023</a:t>
+              <a:t>14.11.2023</a:t>
             </a:fld>
             <a:endParaRPr lang="en-GB"/>
           </a:p>
@@ -2199,7 +2198,7 @@
           <a:p>
             <a:fld id="{D5AEA85A-FC56-D34C-9AA6-ECC3D2586F37}" type="datetime1">
               <a:rPr lang="fi-FI" smtClean="0"/>
-              <a:t>27.3.2023</a:t>
+              <a:t>14.11.2023</a:t>
             </a:fld>
             <a:endParaRPr lang="en-GB"/>
           </a:p>
@@ -2409,7 +2408,7 @@
           <a:p>
             <a:fld id="{E6BC6EEF-E660-7844-8930-418AFF95EA40}" type="datetime1">
               <a:rPr lang="fi-FI" smtClean="0"/>
-              <a:t>27.3.2023</a:t>
+              <a:t>14.11.2023</a:t>
             </a:fld>
             <a:endParaRPr lang="en-GB"/>
           </a:p>
@@ -2718,7 +2717,7 @@
           <a:p>
             <a:fld id="{4E10C7EC-C1C1-9849-A573-7692478FCD52}" type="datetime1">
               <a:rPr lang="fi-FI" smtClean="0"/>
-              <a:t>27.3.2023</a:t>
+              <a:t>14.11.2023</a:t>
             </a:fld>
             <a:endParaRPr lang="en-GB"/>
           </a:p>
@@ -2991,7 +2990,7 @@
           <a:p>
             <a:fld id="{844FF3FE-30BE-2040-9151-6FBC4992BF4F}" type="datetime1">
               <a:rPr lang="fi-FI" smtClean="0"/>
-              <a:t>27.3.2023</a:t>
+              <a:t>14.11.2023</a:t>
             </a:fld>
             <a:endParaRPr lang="en-GB"/>
           </a:p>
@@ -3231,7 +3230,7 @@
           <a:p>
             <a:fld id="{11EDCD7B-6966-E249-89F2-D46BDFBF56BE}" type="datetime1">
               <a:rPr lang="fi-FI" smtClean="0"/>
-              <a:t>27.3.2023</a:t>
+              <a:t>14.11.2023</a:t>
             </a:fld>
             <a:endParaRPr lang="en-GB"/>
           </a:p>
@@ -3524,7 +3523,7 @@
           <a:p>
             <a:fld id="{11EDCD7B-6966-E249-89F2-D46BDFBF56BE}" type="datetime1">
               <a:rPr lang="fi-FI" smtClean="0"/>
-              <a:t>27.3.2023</a:t>
+              <a:t>14.11.2023</a:t>
             </a:fld>
             <a:endParaRPr lang="en-GB"/>
           </a:p>
@@ -3963,7 +3962,7 @@
           <a:p>
             <a:fld id="{844FF3FE-30BE-2040-9151-6FBC4992BF4F}" type="datetime1">
               <a:rPr lang="fi-FI" smtClean="0"/>
-              <a:t>27.3.2023</a:t>
+              <a:t>14.11.2023</a:t>
             </a:fld>
             <a:endParaRPr lang="en-GB"/>
           </a:p>
@@ -4191,7 +4190,7 @@
           <a:p>
             <a:fld id="{11EDCD7B-6966-E249-89F2-D46BDFBF56BE}" type="datetime1">
               <a:rPr lang="fi-FI" smtClean="0"/>
-              <a:t>27.3.2023</a:t>
+              <a:t>14.11.2023</a:t>
             </a:fld>
             <a:endParaRPr lang="en-GB"/>
           </a:p>
@@ -4606,7 +4605,7 @@
           <a:p>
             <a:fld id="{B62E192A-D52B-F541-B2AA-4AEB9388F1F7}" type="datetime1">
               <a:rPr lang="fi-FI" smtClean="0"/>
-              <a:t>27.3.2023</a:t>
+              <a:t>14.11.2023</a:t>
             </a:fld>
             <a:endParaRPr lang="en-GB"/>
           </a:p>
@@ -4906,7 +4905,7 @@
           <a:p>
             <a:fld id="{EEA4FAA2-2B3E-264C-A42F-2D6D3EF33A3C}" type="datetime1">
               <a:rPr lang="fi-FI" smtClean="0"/>
-              <a:t>27.3.2023</a:t>
+              <a:t>14.11.2023</a:t>
             </a:fld>
             <a:endParaRPr lang="en-GB"/>
           </a:p>
@@ -5805,7 +5804,7 @@
           <a:p>
             <a:fld id="{B3114A65-8017-1743-A85A-B2A4BB835AE9}" type="datetime1">
               <a:rPr lang="fi-FI" smtClean="0"/>
-              <a:t>27.3.2023</a:t>
+              <a:t>14.11.2023</a:t>
             </a:fld>
             <a:endParaRPr lang="en-GB"/>
           </a:p>
@@ -6033,7 +6032,7 @@
           <a:p>
             <a:fld id="{11EDCD7B-6966-E249-89F2-D46BDFBF56BE}" type="datetime1">
               <a:rPr lang="fi-FI" smtClean="0"/>
-              <a:t>27.3.2023</a:t>
+              <a:t>14.11.2023</a:t>
             </a:fld>
             <a:endParaRPr lang="en-GB"/>
           </a:p>
@@ -6325,7 +6324,7 @@
           <a:p>
             <a:fld id="{45F98643-D206-614D-B596-3C8548138211}" type="datetime1">
               <a:rPr lang="fi-FI" smtClean="0"/>
-              <a:t>27.3.2023</a:t>
+              <a:t>14.11.2023</a:t>
             </a:fld>
             <a:endParaRPr lang="en-GB"/>
           </a:p>
@@ -6955,9 +6954,13 @@
             </a:pPr>
             <a:r>
               <a:rPr lang="en-US" sz="2800" dirty="0"/>
-              <a:t>Finally, the output to browser DOM will be ‘HTML’ with JavaScript</a:t>
-            </a:r>
-            <a:endParaRPr lang="fi-FI" sz="2800" dirty="0"/>
+              <a:t>Finally output to browser DOM will be </a:t>
+            </a:r>
+            <a:r>
+              <a:rPr lang="en-US" sz="2800" b="1" dirty="0"/>
+              <a:t>HTML with DOM JavaScript</a:t>
+            </a:r>
+            <a:endParaRPr lang="fi-FI" sz="2800" b="1" dirty="0"/>
           </a:p>
           <a:p>
             <a:pPr marL="719455" lvl="1" indent="-215900">
@@ -7094,7 +7097,15 @@
             </a:pPr>
             <a:r>
               <a:rPr lang="en-US" sz="2800" dirty="0"/>
-              <a:t>Before that React components (Possibly w. Mui-React components)</a:t>
+              <a:t>Before that, </a:t>
+            </a:r>
+            <a:r>
+              <a:rPr lang="en-US" sz="2800" b="1" dirty="0"/>
+              <a:t>React components </a:t>
+            </a:r>
+            <a:r>
+              <a:rPr lang="en-US" sz="2800" dirty="0"/>
+              <a:t>to be rendered (Possibly w. Mui-React components)</a:t>
             </a:r>
             <a:endParaRPr lang="fi-FI" sz="2800" dirty="0">
               <a:cs typeface="Arial" panose="020B0604020202020204"/>
@@ -7187,7 +7198,15 @@
             </a:pPr>
             <a:r>
               <a:rPr lang="en-US" sz="2800" dirty="0"/>
-              <a:t>Before that we might have JavaScript run so that dynamic values are evaluated, e.g. {item.id}.</a:t>
+              <a:t>Before that we might have </a:t>
+            </a:r>
+            <a:r>
+              <a:rPr lang="en-US" sz="2800" b="1" dirty="0"/>
+              <a:t>JavaScript run </a:t>
+            </a:r>
+            <a:r>
+              <a:rPr lang="en-US" sz="2800" dirty="0"/>
+              <a:t>so that dynamic values are evaluated, e.g. {item.id}.</a:t>
             </a:r>
             <a:endParaRPr lang="fi-FI" sz="2800" dirty="0">
               <a:cs typeface="Arial" panose="020B0604020202020204"/>
@@ -7337,7 +7356,7 @@
           <a:p>
             <a:fld id="{11EDCD7B-6966-E249-89F2-D46BDFBF56BE}" type="datetime1">
               <a:rPr lang="fi-FI" smtClean="0"/>
-              <a:t>27.3.2023</a:t>
+              <a:t>14.11.2023</a:t>
             </a:fld>
             <a:endParaRPr lang="en-GB"/>
           </a:p>
@@ -7487,16 +7506,39 @@
               </a:lnSpc>
             </a:pPr>
             <a:r>
-              <a:rPr lang="en-US" sz="2800"/>
-              <a:t>Creating the context – </a:t>
-            </a:r>
-            <a:r>
-              <a:rPr lang="en-US" sz="2800" err="1"/>
+              <a:rPr lang="en-US" sz="2800" dirty="0"/>
+              <a:t>Creating the context</a:t>
+            </a:r>
+          </a:p>
+          <a:p>
+            <a:pPr lvl="1">
+              <a:lnSpc>
+                <a:spcPct val="100000"/>
+              </a:lnSpc>
+            </a:pPr>
+            <a:r>
+              <a:rPr lang="en-US" sz="2600" dirty="0" err="1">
+                <a:latin typeface="Consolas" panose="020B0609020204030204" pitchFamily="49" charset="0"/>
+              </a:rPr>
               <a:t>createContext</a:t>
             </a:r>
             <a:r>
-              <a:rPr lang="en-US" sz="2800"/>
-              <a:t> </a:t>
+              <a:rPr lang="en-US" sz="2600" dirty="0">
+                <a:latin typeface="Consolas" panose="020B0609020204030204" pitchFamily="49" charset="0"/>
+              </a:rPr>
+              <a:t>({thing: 22, thang: ”</a:t>
+            </a:r>
+            <a:r>
+              <a:rPr lang="en-US" sz="2600" dirty="0" err="1">
+                <a:latin typeface="Consolas" panose="020B0609020204030204" pitchFamily="49" charset="0"/>
+              </a:rPr>
+              <a:t>abc</a:t>
+            </a:r>
+            <a:r>
+              <a:rPr lang="en-US" sz="2600" dirty="0">
+                <a:latin typeface="Consolas" panose="020B0609020204030204" pitchFamily="49" charset="0"/>
+              </a:rPr>
+              <a:t>” …}) </a:t>
             </a:r>
           </a:p>
           <a:p>
@@ -7506,23 +7548,61 @@
               </a:lnSpc>
             </a:pPr>
             <a:r>
-              <a:rPr lang="en-US" sz="2800"/>
-              <a:t>Accessing the context – </a:t>
-            </a:r>
-            <a:r>
-              <a:rPr lang="en-US" sz="2800" err="1"/>
+              <a:rPr lang="en-US" sz="2800" dirty="0"/>
+              <a:t>Accessing the context values</a:t>
+            </a:r>
+          </a:p>
+          <a:p>
+            <a:pPr lvl="1">
+              <a:lnSpc>
+                <a:spcPct val="100000"/>
+              </a:lnSpc>
+            </a:pPr>
+            <a:r>
+              <a:rPr lang="en-US" sz="2600" dirty="0" err="1">
+                <a:latin typeface="Consolas" panose="020B0609020204030204" pitchFamily="49" charset="0"/>
+              </a:rPr>
               <a:t>useContext</a:t>
             </a:r>
             <a:r>
-              <a:rPr lang="en-US" sz="2800"/>
-              <a:t> hook   +   {</a:t>
-            </a:r>
-            <a:r>
-              <a:rPr lang="en-US" sz="2800" err="1"/>
+              <a:rPr lang="en-US" sz="2600" dirty="0">
+                <a:latin typeface="Consolas" panose="020B0609020204030204" pitchFamily="49" charset="0"/>
+              </a:rPr>
+              <a:t>() </a:t>
+            </a:r>
+            <a:r>
+              <a:rPr lang="en-US" sz="2800" dirty="0"/>
+              <a:t>hook  to create local reference to the context </a:t>
+            </a:r>
+          </a:p>
+          <a:p>
+            <a:pPr lvl="1">
+              <a:lnSpc>
+                <a:spcPct val="100000"/>
+              </a:lnSpc>
+            </a:pPr>
+            <a:r>
+              <a:rPr lang="en-US" sz="2800" dirty="0">
+                <a:latin typeface="Consolas" panose="020B0609020204030204" pitchFamily="49" charset="0"/>
+              </a:rPr>
+              <a:t>+</a:t>
+            </a:r>
+            <a:r>
+              <a:rPr lang="en-US" sz="2600" dirty="0">
+                <a:latin typeface="Consolas" panose="020B0609020204030204" pitchFamily="49" charset="0"/>
+              </a:rPr>
+              <a:t>  {</a:t>
+            </a:r>
+            <a:r>
+              <a:rPr lang="en-US" sz="2600" dirty="0" err="1">
+                <a:latin typeface="Consolas" panose="020B0609020204030204" pitchFamily="49" charset="0"/>
+              </a:rPr>
               <a:t>myContext.thing</a:t>
             </a:r>
             <a:r>
-              <a:rPr lang="en-US" sz="2800"/>
+              <a:rPr lang="en-US" sz="2600" dirty="0">
+                <a:latin typeface="Consolas" panose="020B0609020204030204" pitchFamily="49" charset="0"/>
+              </a:rPr>
               <a:t>}</a:t>
             </a:r>
           </a:p>
@@ -7533,15 +7613,53 @@
               </a:lnSpc>
             </a:pPr>
             <a:r>
-              <a:rPr lang="en-US" sz="2800"/>
-              <a:t>Updating the values in the context – </a:t>
-            </a:r>
-            <a:r>
-              <a:rPr lang="en-US" sz="2800" err="1"/>
+              <a:rPr lang="en-US" sz="2800" dirty="0"/>
+              <a:t>Updating the values in the context</a:t>
+            </a:r>
+          </a:p>
+          <a:p>
+            <a:pPr lvl="1">
+              <a:lnSpc>
+                <a:spcPct val="100000"/>
+              </a:lnSpc>
+            </a:pPr>
+            <a:r>
+              <a:rPr lang="en-US" sz="2600" dirty="0" err="1">
+                <a:latin typeface="Consolas" panose="020B0609020204030204" pitchFamily="49" charset="0"/>
+              </a:rPr>
+              <a:t>useContext</a:t>
+            </a:r>
+            <a:r>
+              <a:rPr lang="en-US" sz="2600" dirty="0">
+                <a:latin typeface="Consolas" panose="020B0609020204030204" pitchFamily="49" charset="0"/>
+              </a:rPr>
+              <a:t>() </a:t>
+            </a:r>
+            <a:r>
+              <a:rPr lang="en-US" sz="2800" dirty="0"/>
+              <a:t>hook   </a:t>
+            </a:r>
+          </a:p>
+          <a:p>
+            <a:pPr lvl="1">
+              <a:lnSpc>
+                <a:spcPct val="100000"/>
+              </a:lnSpc>
+            </a:pPr>
+            <a:r>
+              <a:rPr lang="en-US" sz="2600" dirty="0"/>
+              <a:t>+    </a:t>
+            </a:r>
+            <a:r>
+              <a:rPr lang="en-US" sz="2600" dirty="0" err="1">
+                <a:latin typeface="Consolas" panose="020B0609020204030204" pitchFamily="49" charset="0"/>
+              </a:rPr>
               <a:t>myContext.thing</a:t>
             </a:r>
             <a:r>
-              <a:rPr lang="en-US" sz="2800"/>
+              <a:rPr lang="en-US" sz="2600" dirty="0">
+                <a:latin typeface="Consolas" panose="020B0609020204030204" pitchFamily="49" charset="0"/>
+              </a:rPr>
               <a:t> = 33;</a:t>
             </a:r>
           </a:p>
@@ -7552,7 +7670,7 @@
               </a:lnSpc>
               <a:buNone/>
             </a:pPr>
-            <a:endParaRPr lang="en-US" sz="2800"/>
+            <a:endParaRPr lang="en-US" sz="2800" dirty="0"/>
           </a:p>
         </p:txBody>
       </p:sp>
@@ -7579,7 +7697,7 @@
           <a:p>
             <a:fld id="{11EDCD7B-6966-E249-89F2-D46BDFBF56BE}" type="datetime1">
               <a:rPr lang="fi-FI" smtClean="0"/>
-              <a:t>27.3.2023</a:t>
+              <a:t>14.11.2023</a:t>
             </a:fld>
             <a:endParaRPr lang="en-GB"/>
           </a:p>
@@ -7727,7 +7845,7 @@
         <p:spPr/>
         <p:txBody>
           <a:bodyPr vert="horz" lIns="0" tIns="0" rIns="0" bIns="36000" numCol="1" spcCol="360000" rtlCol="0" anchor="t">
-            <a:normAutofit fontScale="92500"/>
+            <a:normAutofit fontScale="77500" lnSpcReduction="20000"/>
           </a:bodyPr>
           <a:lstStyle/>
           <a:p>
@@ -7821,9 +7939,46 @@
               <a:rPr lang="en-US" sz="2600" b="1" dirty="0"/>
               <a:t>Dependency array</a:t>
             </a:r>
+          </a:p>
+          <a:p>
+            <a:pPr lvl="2">
+              <a:lnSpc>
+                <a:spcPct val="100000"/>
+              </a:lnSpc>
+            </a:pPr>
             <a:r>
               <a:rPr lang="en-US" sz="2600" dirty="0"/>
-              <a:t>, if items given, then action run only if changes in these</a:t>
+              <a:t>if items given [user.id, </a:t>
+            </a:r>
+            <a:r>
+              <a:rPr lang="en-US" sz="2600" dirty="0" err="1"/>
+              <a:t>project.count</a:t>
+            </a:r>
+            <a:r>
+              <a:rPr lang="en-US" sz="2600" dirty="0"/>
+              <a:t>], then action runs at mount + if changes in these. </a:t>
+            </a:r>
+          </a:p>
+          <a:p>
+            <a:pPr lvl="2">
+              <a:lnSpc>
+                <a:spcPct val="100000"/>
+              </a:lnSpc>
+            </a:pPr>
+            <a:r>
+              <a:rPr lang="en-US" sz="2600" dirty="0"/>
+              <a:t>Empty [], dependency array =&gt; runs only once </a:t>
+            </a:r>
+          </a:p>
+          <a:p>
+            <a:pPr lvl="2">
+              <a:lnSpc>
+                <a:spcPct val="100000"/>
+              </a:lnSpc>
+            </a:pPr>
+            <a:r>
+              <a:rPr lang="en-US" sz="2600" dirty="0"/>
+              <a:t>If missing dependency array =&gt; runs at mount/first render + for any update/re-render.</a:t>
             </a:r>
           </a:p>
           <a:p>
@@ -7834,7 +7989,7 @@
             </a:pPr>
             <a:r>
               <a:rPr lang="en-US" sz="2600" dirty="0"/>
-              <a:t>(possibly returning) the </a:t>
+              <a:t>(Action function is possibly returning) the </a:t>
             </a:r>
             <a:r>
               <a:rPr lang="en-US" sz="2600" b="1" dirty="0"/>
@@ -7875,7 +8030,7 @@
           <a:p>
             <a:fld id="{11EDCD7B-6966-E249-89F2-D46BDFBF56BE}" type="datetime1">
               <a:rPr lang="fi-FI" smtClean="0"/>
-              <a:t>27.3.2023</a:t>
+              <a:t>14.11.2023</a:t>
             </a:fld>
             <a:endParaRPr lang="en-GB"/>
           </a:p>
@@ -8025,15 +8180,15 @@
               </a:lnSpc>
             </a:pPr>
             <a:r>
-              <a:rPr lang="en-US" sz="2800"/>
+              <a:rPr lang="en-US" sz="2800" dirty="0"/>
               <a:t>Look at the given pictures for routing. </a:t>
             </a:r>
             <a:r>
-              <a:rPr lang="en-US" sz="2800" b="1"/>
+              <a:rPr lang="en-US" sz="2800" b="1" dirty="0"/>
               <a:t>Basic routing </a:t>
             </a:r>
             <a:r>
-              <a:rPr lang="en-US" sz="2800"/>
+              <a:rPr lang="en-US" sz="2800" dirty="0"/>
               <a:t>includes:</a:t>
             </a:r>
           </a:p>
@@ -8044,8 +8199,32 @@
               </a:lnSpc>
             </a:pPr>
             <a:r>
-              <a:rPr lang="en-US" sz="2600"/>
-              <a:t>Defining the Routes. They are our mappings between a Path and a View component that renders that path.</a:t>
+              <a:rPr lang="en-US" sz="2600" dirty="0"/>
+              <a:t>The </a:t>
+            </a:r>
+            <a:r>
+              <a:rPr lang="en-US" sz="2600" b="1" dirty="0"/>
+              <a:t>Route definitions</a:t>
+            </a:r>
+            <a:r>
+              <a:rPr lang="en-US" sz="2600" dirty="0"/>
+              <a:t>. They are our mappings between a </a:t>
+            </a:r>
+            <a:r>
+              <a:rPr lang="en-US" sz="2600" b="1" dirty="0"/>
+              <a:t>Path</a:t>
+            </a:r>
+            <a:r>
+              <a:rPr lang="en-US" sz="2600" dirty="0"/>
+              <a:t> and a View </a:t>
+            </a:r>
+            <a:r>
+              <a:rPr lang="en-US" sz="2600" b="1" dirty="0"/>
+              <a:t>React component </a:t>
+            </a:r>
+            <a:r>
+              <a:rPr lang="en-US" sz="2600" dirty="0"/>
+              <a:t>that renders that path.</a:t>
             </a:r>
           </a:p>
           <a:p>
@@ -8055,8 +8234,39 @@
               </a:lnSpc>
             </a:pPr>
             <a:r>
-              <a:rPr lang="en-US" sz="2800"/>
-              <a:t>Defining Links or Buttons that trigger navigation to the Routes</a:t>
+              <a:rPr lang="en-US" sz="2800" dirty="0"/>
+              <a:t>Defining </a:t>
+            </a:r>
+            <a:r>
+              <a:rPr lang="en-US" sz="2800" b="1" dirty="0"/>
+              <a:t>Links</a:t>
+            </a:r>
+            <a:r>
+              <a:rPr lang="en-US" sz="2800" dirty="0"/>
+              <a:t> or </a:t>
+            </a:r>
+            <a:r>
+              <a:rPr lang="en-US" sz="2800" b="1" dirty="0"/>
+              <a:t>Buttons</a:t>
+            </a:r>
+            <a:r>
+              <a:rPr lang="en-US" sz="2800" dirty="0"/>
+              <a:t> that trigger navigation to the Routes</a:t>
+            </a:r>
+          </a:p>
+          <a:p>
+            <a:pPr lvl="1">
+              <a:lnSpc>
+                <a:spcPct val="100000"/>
+              </a:lnSpc>
+            </a:pPr>
+            <a:r>
+              <a:rPr lang="en-US" sz="2800" b="1" dirty="0"/>
+              <a:t>Switch</a:t>
+            </a:r>
+            <a:r>
+              <a:rPr lang="en-US" sz="2800" dirty="0"/>
+              <a:t> or other component that marks the place (div) on the page that will be replaced/filled with the “current page”</a:t>
             </a:r>
           </a:p>
           <a:p>
@@ -8066,7 +8276,7 @@
               </a:lnSpc>
               <a:buNone/>
             </a:pPr>
-            <a:endParaRPr lang="en-US" sz="2800">
+            <a:endParaRPr lang="en-US" sz="2800" dirty="0">
               <a:cs typeface="Arial" panose="020B0604020202020204"/>
             </a:endParaRPr>
           </a:p>
@@ -8077,7 +8287,7 @@
               </a:lnSpc>
               <a:buNone/>
             </a:pPr>
-            <a:endParaRPr lang="en-US" sz="2800">
+            <a:endParaRPr lang="en-US" sz="2800" dirty="0">
               <a:cs typeface="Arial" panose="020B0604020202020204"/>
             </a:endParaRPr>
           </a:p>
@@ -8106,7 +8316,7 @@
           <a:p>
             <a:fld id="{11EDCD7B-6966-E249-89F2-D46BDFBF56BE}" type="datetime1">
               <a:rPr lang="fi-FI" smtClean="0"/>
-              <a:t>27.3.2023</a:t>
+              <a:t>14.11.2023</a:t>
             </a:fld>
             <a:endParaRPr lang="en-GB"/>
           </a:p>
@@ -8357,7 +8567,7 @@
           <a:p>
             <a:fld id="{11EDCD7B-6966-E249-89F2-D46BDFBF56BE}" type="datetime1">
               <a:rPr lang="fi-FI" smtClean="0"/>
-              <a:t>27.3.2023</a:t>
+              <a:t>14.11.2023</a:t>
             </a:fld>
             <a:endParaRPr lang="en-GB"/>
           </a:p>
@@ -8472,7 +8682,7 @@
           <a:p>
             <a:r>
               <a:rPr lang="en-US"/>
-              <a:t>11. Nested Routing</a:t>
+              <a:t>+ Programmatic Routing</a:t>
             </a:r>
             <a:endParaRPr lang="fi-FI"/>
           </a:p>
@@ -8496,91 +8706,36 @@
         </p:nvSpPr>
         <p:spPr/>
         <p:txBody>
-          <a:bodyPr>
+          <a:bodyPr vert="horz" lIns="0" tIns="0" rIns="0" bIns="36000" numCol="1" spcCol="360000" rtlCol="0" anchor="t">
             <a:normAutofit/>
           </a:bodyPr>
           <a:lstStyle/>
           <a:p>
-            <a:pPr>
+            <a:pPr marL="215900" indent="-215900">
               <a:lnSpc>
                 <a:spcPct val="100000"/>
               </a:lnSpc>
             </a:pPr>
             <a:r>
-              <a:rPr lang="en-US" sz="2800"/>
-              <a:t>Look at the given pictures for routing. Nested Routing includes:</a:t>
-            </a:r>
-          </a:p>
-          <a:p>
-            <a:pPr lvl="1">
-              <a:lnSpc>
-                <a:spcPct val="100000"/>
-              </a:lnSpc>
-            </a:pPr>
-            <a:r>
-              <a:rPr lang="en-US" sz="2600" b="1"/>
-              <a:t>Relative paths </a:t>
-            </a:r>
-            <a:r>
-              <a:rPr lang="en-US" sz="2600"/>
-              <a:t>for children</a:t>
-            </a:r>
-          </a:p>
-          <a:p>
-            <a:pPr lvl="1">
-              <a:lnSpc>
-                <a:spcPct val="100000"/>
-              </a:lnSpc>
-            </a:pPr>
-            <a:r>
-              <a:rPr lang="en-US" sz="2600"/>
-              <a:t>Possible </a:t>
-            </a:r>
-            <a:r>
-              <a:rPr lang="en-US" sz="2600" b="1"/>
-              <a:t>index route</a:t>
-            </a:r>
-            <a:r>
-              <a:rPr lang="en-US" sz="2600"/>
-              <a:t>, rendering the index path.</a:t>
-            </a:r>
-          </a:p>
-          <a:p>
-            <a:pPr lvl="1">
-              <a:lnSpc>
-                <a:spcPct val="100000"/>
-              </a:lnSpc>
-            </a:pPr>
-            <a:r>
-              <a:rPr lang="en-US" sz="2600"/>
-              <a:t>Possibly </a:t>
-            </a:r>
-            <a:r>
-              <a:rPr lang="en-US" sz="2600" b="1"/>
-              <a:t>shared layout </a:t>
-            </a:r>
-            <a:r>
-              <a:rPr lang="en-US" sz="2600"/>
-              <a:t>component.</a:t>
-            </a:r>
-          </a:p>
-          <a:p>
-            <a:pPr lvl="1">
-              <a:lnSpc>
-                <a:spcPct val="100000"/>
-              </a:lnSpc>
-            </a:pPr>
-            <a:r>
-              <a:rPr lang="en-US" sz="2600"/>
-              <a:t>Possibly with </a:t>
-            </a:r>
-            <a:r>
-              <a:rPr lang="en-US" sz="2600" b="1"/>
-              <a:t>shared context</a:t>
-            </a:r>
-            <a:r>
-              <a:rPr lang="en-US" sz="2600"/>
-              <a:t>?</a:t>
+              <a:rPr lang="en-US" sz="2800">
+                <a:ea typeface="+mn-lt"/>
+                <a:cs typeface="+mn-lt"/>
+              </a:rPr>
+              <a:t>You can also programmatically </a:t>
+            </a:r>
+            <a:r>
+              <a:rPr lang="en-US" sz="2800" b="1">
+                <a:ea typeface="+mn-lt"/>
+                <a:cs typeface="+mn-lt"/>
+              </a:rPr>
+              <a:t>manipulate the Routing history stack: </a:t>
+            </a:r>
+            <a:r>
+              <a:rPr lang="en-US" sz="2800">
+                <a:ea typeface="+mn-lt"/>
+                <a:cs typeface="+mn-lt"/>
+              </a:rPr>
+              <a:t>pop, push, replace.</a:t>
             </a:r>
           </a:p>
         </p:txBody>
@@ -8608,7 +8763,7 @@
           <a:p>
             <a:fld id="{11EDCD7B-6966-E249-89F2-D46BDFBF56BE}" type="datetime1">
               <a:rPr lang="fi-FI" smtClean="0"/>
-              <a:t>27.3.2023</a:t>
+              <a:t>14.11.2023</a:t>
             </a:fld>
             <a:endParaRPr lang="en-GB"/>
           </a:p>
@@ -8671,7 +8826,7 @@
     </p:spTree>
     <p:extLst>
       <p:ext uri="{BB962C8B-B14F-4D97-AF65-F5344CB8AC3E}">
-        <p14:creationId xmlns:p14="http://schemas.microsoft.com/office/powerpoint/2010/main" val="4110852248"/>
+        <p14:creationId xmlns:p14="http://schemas.microsoft.com/office/powerpoint/2010/main" val="1452549001"/>
       </p:ext>
     </p:extLst>
   </p:cSld>
@@ -8723,7 +8878,7 @@
           <a:p>
             <a:r>
               <a:rPr lang="en-US"/>
-              <a:t>+ Programmatic Routing</a:t>
+              <a:t>12. Typical List component composition</a:t>
             </a:r>
             <a:endParaRPr lang="fi-FI"/>
           </a:p>
@@ -8748,7 +8903,7 @@
         <p:spPr/>
         <p:txBody>
           <a:bodyPr vert="horz" lIns="0" tIns="0" rIns="0" bIns="36000" numCol="1" spcCol="360000" rtlCol="0" anchor="t">
-            <a:normAutofit/>
+            <a:normAutofit fontScale="92500"/>
           </a:bodyPr>
           <a:lstStyle/>
           <a:p>
@@ -8758,26 +8913,185 @@
               </a:lnSpc>
             </a:pPr>
             <a:r>
-              <a:rPr lang="en-US" sz="2800">
+              <a:rPr lang="en-US" sz="2800" dirty="0"/>
+              <a:t>(See random example on the next slide. Idea important, </a:t>
+            </a:r>
+            <a:r>
+              <a:rPr lang="en-US" sz="2800"/>
+              <a:t>not exact match)</a:t>
+            </a:r>
+            <a:endParaRPr lang="en-US" sz="2800" dirty="0">
+              <a:cs typeface="Arial"/>
+            </a:endParaRPr>
+          </a:p>
+          <a:p>
+            <a:pPr marL="215900" indent="-215900">
+              <a:lnSpc>
+                <a:spcPct val="100000"/>
+              </a:lnSpc>
+            </a:pPr>
+            <a:r>
+              <a:rPr lang="en-US" sz="2800" dirty="0"/>
+              <a:t>The example is about Buildings, e.g. three </a:t>
+            </a:r>
+            <a:r>
+              <a:rPr lang="en-US" sz="2800" dirty="0" err="1"/>
+              <a:t>buldings</a:t>
+            </a:r>
+            <a:r>
+              <a:rPr lang="en-US" sz="2800" dirty="0"/>
+              <a:t> on one campus, two on other.</a:t>
+            </a:r>
+            <a:endParaRPr lang="en-US" sz="2800" dirty="0">
+              <a:cs typeface="Arial"/>
+            </a:endParaRPr>
+          </a:p>
+          <a:p>
+            <a:pPr marL="215900" indent="-215900">
+              <a:lnSpc>
+                <a:spcPct val="100000"/>
+              </a:lnSpc>
+            </a:pPr>
+            <a:r>
+              <a:rPr lang="en-US" sz="2800" dirty="0"/>
+              <a:t>SRP = Single Responsibility Principle. Each component doing usually only one thing in the app:</a:t>
+            </a:r>
+            <a:endParaRPr lang="en-US" sz="2800" dirty="0">
+              <a:cs typeface="Arial"/>
+            </a:endParaRPr>
+          </a:p>
+          <a:p>
+            <a:pPr marL="719455" lvl="1" indent="-215900">
+              <a:lnSpc>
+                <a:spcPct val="100000"/>
+              </a:lnSpc>
+            </a:pPr>
+            <a:r>
+              <a:rPr lang="en-US" sz="2600" dirty="0"/>
+              <a:t>Providing navigable view:   </a:t>
+            </a:r>
+            <a:r>
+              <a:rPr lang="en-US" sz="2600" dirty="0" err="1"/>
+              <a:t>BuildingList</a:t>
+            </a:r>
+            <a:r>
+              <a:rPr lang="en-US" sz="2600" b="1" dirty="0" err="1"/>
+              <a:t>View</a:t>
+            </a:r>
+            <a:endParaRPr lang="en-US" sz="2600" b="1" dirty="0">
+              <a:cs typeface="Arial" panose="020B0604020202020204"/>
+            </a:endParaRPr>
+          </a:p>
+          <a:p>
+            <a:pPr marL="719455" lvl="1" indent="-215900">
+              <a:lnSpc>
+                <a:spcPct val="100000"/>
+              </a:lnSpc>
+            </a:pPr>
+            <a:r>
+              <a:rPr lang="en-US" sz="2600" dirty="0"/>
+              <a:t>Holding and refreshing data list state, maps w. </a:t>
+            </a:r>
+            <a:r>
+              <a:rPr lang="en-US" sz="2600" dirty="0" err="1"/>
+              <a:t>ListItems</a:t>
+            </a:r>
+            <a:r>
+              <a:rPr lang="en-US" sz="2600" dirty="0"/>
+              <a:t>:   </a:t>
+            </a:r>
+            <a:r>
+              <a:rPr lang="en-US" sz="2600" dirty="0" err="1"/>
+              <a:t>Building</a:t>
+            </a:r>
+            <a:r>
+              <a:rPr lang="en-US" sz="2600" b="1" dirty="0" err="1"/>
+              <a:t>List</a:t>
+            </a:r>
+            <a:r>
+              <a:rPr lang="en-US" sz="2600" dirty="0"/>
+              <a:t> </a:t>
+            </a:r>
+            <a:endParaRPr lang="en-US" sz="2600" dirty="0">
+              <a:cs typeface="Arial"/>
+            </a:endParaRPr>
+          </a:p>
+          <a:p>
+            <a:pPr marL="719455" lvl="1" indent="-215900">
+              <a:lnSpc>
+                <a:spcPct val="100000"/>
+              </a:lnSpc>
+            </a:pPr>
+            <a:r>
+              <a:rPr lang="en-US" sz="2600" dirty="0"/>
+              <a:t>Providing actions for one item:   </a:t>
+            </a:r>
+            <a:r>
+              <a:rPr lang="en-US" sz="2600" dirty="0" err="1"/>
+              <a:t>Building</a:t>
+            </a:r>
+            <a:r>
+              <a:rPr lang="en-US" sz="2600" b="1" dirty="0" err="1"/>
+              <a:t>ListItem</a:t>
+            </a:r>
+            <a:r>
+              <a:rPr lang="en-US" sz="2600" b="1" dirty="0"/>
+              <a:t> </a:t>
+            </a:r>
+            <a:r>
+              <a:rPr lang="en-US" sz="2600" dirty="0">
                 <a:ea typeface="+mn-lt"/>
                 <a:cs typeface="+mn-lt"/>
               </a:rPr>
-              <a:t>You can also programmatically </a:t>
-            </a:r>
-            <a:r>
-              <a:rPr lang="en-US" sz="2800" b="1">
+              <a:t>(clickable, x = delete)</a:t>
+            </a:r>
+            <a:endParaRPr lang="en-US" sz="2600" b="1" dirty="0">
+              <a:cs typeface="Arial" panose="020B0604020202020204"/>
+            </a:endParaRPr>
+          </a:p>
+          <a:p>
+            <a:pPr marL="719455" lvl="1" indent="-215900">
+              <a:lnSpc>
+                <a:spcPct val="100000"/>
+              </a:lnSpc>
+            </a:pPr>
+            <a:r>
+              <a:rPr lang="en-US" sz="2600" dirty="0"/>
+              <a:t>Just shows data for one item:   </a:t>
+            </a:r>
+            <a:r>
+              <a:rPr lang="en-US" sz="2600" dirty="0" err="1"/>
+              <a:t>Building</a:t>
+            </a:r>
+            <a:r>
+              <a:rPr lang="en-US" sz="2600" b="1" dirty="0" err="1"/>
+              <a:t>Display</a:t>
+            </a:r>
+            <a:r>
+              <a:rPr lang="en-US" sz="2600" dirty="0"/>
+              <a:t> / </a:t>
+            </a:r>
+            <a:r>
+              <a:rPr lang="en-US" sz="2600" dirty="0" err="1">
                 <a:ea typeface="+mn-lt"/>
                 <a:cs typeface="+mn-lt"/>
               </a:rPr>
-              <a:t>manipulate the Routing history stack: </a:t>
-            </a:r>
-            <a:r>
-              <a:rPr lang="en-US" sz="2800">
+              <a:t>BuildingInfo</a:t>
+            </a:r>
+            <a:r>
+              <a:rPr lang="en-US" sz="2600" dirty="0">
                 <a:ea typeface="+mn-lt"/>
                 <a:cs typeface="+mn-lt"/>
               </a:rPr>
-              <a:t>pop, push, replace.</a:t>
-            </a:r>
+              <a:t> / </a:t>
+            </a:r>
+            <a:r>
+              <a:rPr lang="en-US" sz="2600" dirty="0"/>
+              <a:t>B…Details</a:t>
+            </a:r>
+            <a:endParaRPr lang="en-US" sz="2600" dirty="0">
+              <a:cs typeface="Arial"/>
+            </a:endParaRPr>
           </a:p>
         </p:txBody>
       </p:sp>
@@ -8804,7 +9118,7 @@
           <a:p>
             <a:fld id="{11EDCD7B-6966-E249-89F2-D46BDFBF56BE}" type="datetime1">
               <a:rPr lang="fi-FI" smtClean="0"/>
-              <a:t>27.3.2023</a:t>
+              <a:t>14.11.2023</a:t>
             </a:fld>
             <a:endParaRPr lang="en-GB"/>
           </a:p>
@@ -8867,7 +9181,7 @@
     </p:spTree>
     <p:extLst>
       <p:ext uri="{BB962C8B-B14F-4D97-AF65-F5344CB8AC3E}">
-        <p14:creationId xmlns:p14="http://schemas.microsoft.com/office/powerpoint/2010/main" val="1452549001"/>
+        <p14:creationId xmlns:p14="http://schemas.microsoft.com/office/powerpoint/2010/main" val="553651584"/>
       </p:ext>
     </p:extLst>
   </p:cSld>
@@ -8896,266 +9210,28 @@
       </p:grpSpPr>
       <p:sp>
         <p:nvSpPr>
-          <p:cNvPr id="2" name="Title 1">
-            <a:extLst>
-              <a:ext uri="{FF2B5EF4-FFF2-40B4-BE49-F238E27FC236}">
-                <a16:creationId xmlns:a16="http://schemas.microsoft.com/office/drawing/2014/main" id="{F9662D29-990E-426E-BC0E-093CB48EE792}"/>
-              </a:ext>
-            </a:extLst>
-          </p:cNvPr>
-          <p:cNvSpPr>
-            <a:spLocks noGrp="1"/>
-          </p:cNvSpPr>
-          <p:nvPr>
-            <p:ph type="title"/>
+          <p:cNvPr id="5" name="Date Placeholder 4">
+            <a:extLst>
+              <a:ext uri="{FF2B5EF4-FFF2-40B4-BE49-F238E27FC236}">
+                <a16:creationId xmlns:a16="http://schemas.microsoft.com/office/drawing/2014/main" id="{976244E2-AA76-2742-B2EC-FEC79276155C}"/>
+              </a:ext>
+            </a:extLst>
+          </p:cNvPr>
+          <p:cNvSpPr>
+            <a:spLocks noGrp="1"/>
+          </p:cNvSpPr>
+          <p:nvPr>
+            <p:ph type="dt" sz="half" idx="10"/>
           </p:nvPr>
         </p:nvSpPr>
         <p:spPr/>
         <p:txBody>
-          <a:bodyPr anchor="ctr">
-            <a:normAutofit/>
-          </a:bodyPr>
-          <a:lstStyle/>
-          <a:p>
-            <a:r>
-              <a:rPr lang="en-US"/>
-              <a:t>12. Typical List component composition</a:t>
-            </a:r>
-            <a:endParaRPr lang="fi-FI"/>
-          </a:p>
-        </p:txBody>
-      </p:sp>
-      <p:sp>
-        <p:nvSpPr>
-          <p:cNvPr id="3" name="Content Placeholder 2">
-            <a:extLst>
-              <a:ext uri="{FF2B5EF4-FFF2-40B4-BE49-F238E27FC236}">
-                <a16:creationId xmlns:a16="http://schemas.microsoft.com/office/drawing/2014/main" id="{001C1C76-B4E0-405B-8F87-AC2E22AA7225}"/>
-              </a:ext>
-            </a:extLst>
-          </p:cNvPr>
-          <p:cNvSpPr>
-            <a:spLocks noGrp="1"/>
-          </p:cNvSpPr>
-          <p:nvPr>
-            <p:ph sz="half" idx="2"/>
-          </p:nvPr>
-        </p:nvSpPr>
-        <p:spPr/>
-        <p:txBody>
-          <a:bodyPr vert="horz" lIns="0" tIns="0" rIns="0" bIns="36000" numCol="1" spcCol="360000" rtlCol="0" anchor="t">
-            <a:normAutofit fontScale="92500"/>
-          </a:bodyPr>
-          <a:lstStyle/>
-          <a:p>
-            <a:pPr marL="215900" indent="-215900">
-              <a:lnSpc>
-                <a:spcPct val="100000"/>
-              </a:lnSpc>
-            </a:pPr>
-            <a:r>
-              <a:rPr lang="en-US" sz="2800" dirty="0"/>
-              <a:t>(See example on the next slide)</a:t>
-            </a:r>
-            <a:endParaRPr lang="en-US" sz="2800" dirty="0">
-              <a:cs typeface="Arial"/>
-            </a:endParaRPr>
-          </a:p>
-          <a:p>
-            <a:pPr marL="215900" indent="-215900">
-              <a:lnSpc>
-                <a:spcPct val="100000"/>
-              </a:lnSpc>
-            </a:pPr>
-            <a:r>
-              <a:rPr lang="en-US" sz="2800" dirty="0"/>
-              <a:t>The example is about Buildings, e.g. three </a:t>
-            </a:r>
-            <a:r>
-              <a:rPr lang="en-US" sz="2800" dirty="0" err="1"/>
-              <a:t>buldings</a:t>
-            </a:r>
-            <a:r>
-              <a:rPr lang="en-US" sz="2800" dirty="0"/>
-              <a:t> on one campus, two on other.</a:t>
-            </a:r>
-            <a:endParaRPr lang="en-US" sz="2800" dirty="0">
-              <a:cs typeface="Arial"/>
-            </a:endParaRPr>
-          </a:p>
-          <a:p>
-            <a:pPr marL="215900" indent="-215900">
-              <a:lnSpc>
-                <a:spcPct val="100000"/>
-              </a:lnSpc>
-            </a:pPr>
-            <a:r>
-              <a:rPr lang="en-US" sz="2800" dirty="0"/>
-              <a:t>SRP = Single Responsibility Principle. Each component doing usually only one thing in the app:</a:t>
-            </a:r>
-            <a:endParaRPr lang="en-US" sz="2800" dirty="0">
-              <a:cs typeface="Arial"/>
-            </a:endParaRPr>
-          </a:p>
-          <a:p>
-            <a:pPr marL="719455" lvl="1" indent="-215900">
-              <a:lnSpc>
-                <a:spcPct val="100000"/>
-              </a:lnSpc>
-            </a:pPr>
-            <a:r>
-              <a:rPr lang="en-US" sz="2600" dirty="0"/>
-              <a:t>Providing navigable view:   </a:t>
-            </a:r>
-            <a:r>
-              <a:rPr lang="en-US" sz="2600" dirty="0" err="1"/>
-              <a:t>BuildingList</a:t>
-            </a:r>
-            <a:r>
-              <a:rPr lang="en-US" sz="2600" b="1" dirty="0" err="1"/>
-              <a:t>View</a:t>
-            </a:r>
-            <a:endParaRPr lang="en-US" sz="2600" b="1" dirty="0">
-              <a:cs typeface="Arial" panose="020B0604020202020204"/>
-            </a:endParaRPr>
-          </a:p>
-          <a:p>
-            <a:pPr marL="719455" lvl="1" indent="-215900">
-              <a:lnSpc>
-                <a:spcPct val="100000"/>
-              </a:lnSpc>
-            </a:pPr>
-            <a:r>
-              <a:rPr lang="en-US" sz="2600" dirty="0"/>
-              <a:t>Holding and refreshing data list state, maps w. </a:t>
-            </a:r>
-            <a:r>
-              <a:rPr lang="en-US" sz="2600" dirty="0" err="1"/>
-              <a:t>ListItems</a:t>
-            </a:r>
-            <a:r>
-              <a:rPr lang="en-US" sz="2600" dirty="0"/>
-              <a:t>:   </a:t>
-            </a:r>
-            <a:r>
-              <a:rPr lang="en-US" sz="2600" dirty="0" err="1"/>
-              <a:t>Building</a:t>
-            </a:r>
-            <a:r>
-              <a:rPr lang="en-US" sz="2600" b="1" dirty="0" err="1"/>
-              <a:t>List</a:t>
-            </a:r>
-            <a:r>
-              <a:rPr lang="en-US" sz="2600" dirty="0"/>
-              <a:t> </a:t>
-            </a:r>
-            <a:endParaRPr lang="en-US" sz="2600" dirty="0">
-              <a:cs typeface="Arial"/>
-            </a:endParaRPr>
-          </a:p>
-          <a:p>
-            <a:pPr marL="719455" lvl="1" indent="-215900">
-              <a:lnSpc>
-                <a:spcPct val="100000"/>
-              </a:lnSpc>
-            </a:pPr>
-            <a:r>
-              <a:rPr lang="en-US" sz="2600" dirty="0"/>
-              <a:t>Providing actions for one item:   </a:t>
-            </a:r>
-            <a:r>
-              <a:rPr lang="en-US" sz="2600" dirty="0" err="1"/>
-              <a:t>Building</a:t>
-            </a:r>
-            <a:r>
-              <a:rPr lang="en-US" sz="2600" b="1" dirty="0" err="1"/>
-              <a:t>ListItem</a:t>
-            </a:r>
-            <a:r>
-              <a:rPr lang="en-US" sz="2600" b="1" dirty="0"/>
-              <a:t> </a:t>
-            </a:r>
-            <a:r>
-              <a:rPr lang="en-US" sz="2600" dirty="0">
-                <a:ea typeface="+mn-lt"/>
-                <a:cs typeface="+mn-lt"/>
-              </a:rPr>
-              <a:t>(clickable, x = delete)</a:t>
-            </a:r>
-            <a:endParaRPr lang="en-US" sz="2600" b="1" dirty="0">
-              <a:cs typeface="Arial" panose="020B0604020202020204"/>
-            </a:endParaRPr>
-          </a:p>
-          <a:p>
-            <a:pPr marL="719455" lvl="1" indent="-215900">
-              <a:lnSpc>
-                <a:spcPct val="100000"/>
-              </a:lnSpc>
-            </a:pPr>
-            <a:r>
-              <a:rPr lang="en-US" sz="2600" dirty="0"/>
-              <a:t>Just shows data for one item:   </a:t>
-            </a:r>
-            <a:r>
-              <a:rPr lang="en-US" sz="2600" dirty="0" err="1"/>
-              <a:t>Building</a:t>
-            </a:r>
-            <a:r>
-              <a:rPr lang="en-US" sz="2600" b="1" dirty="0" err="1"/>
-              <a:t>Display</a:t>
-            </a:r>
-            <a:r>
-              <a:rPr lang="en-US" sz="2600" dirty="0"/>
-              <a:t> / </a:t>
-            </a:r>
-            <a:r>
-              <a:rPr lang="en-US" sz="2600" dirty="0" err="1">
-                <a:ea typeface="+mn-lt"/>
-                <a:cs typeface="+mn-lt"/>
-              </a:rPr>
-              <a:t>BuildingInfo</a:t>
-            </a:r>
-            <a:r>
-              <a:rPr lang="en-US" sz="2600" dirty="0">
-                <a:ea typeface="+mn-lt"/>
-                <a:cs typeface="+mn-lt"/>
-              </a:rPr>
-              <a:t> / </a:t>
-            </a:r>
-            <a:r>
-              <a:rPr lang="en-US" sz="2600" dirty="0"/>
-              <a:t>B…Details</a:t>
-            </a:r>
-            <a:endParaRPr lang="en-US" sz="2600" dirty="0">
-              <a:cs typeface="Arial"/>
-            </a:endParaRPr>
-          </a:p>
-        </p:txBody>
-      </p:sp>
-      <p:sp>
-        <p:nvSpPr>
-          <p:cNvPr id="4" name="Date Placeholder 3">
-            <a:extLst>
-              <a:ext uri="{FF2B5EF4-FFF2-40B4-BE49-F238E27FC236}">
-                <a16:creationId xmlns:a16="http://schemas.microsoft.com/office/drawing/2014/main" id="{FDEC7F5E-C1B0-42AC-950B-DE3029CAED1B}"/>
-              </a:ext>
-            </a:extLst>
-          </p:cNvPr>
-          <p:cNvSpPr>
-            <a:spLocks noGrp="1"/>
-          </p:cNvSpPr>
-          <p:nvPr>
-            <p:ph type="dt" sz="half" idx="10"/>
-          </p:nvPr>
-        </p:nvSpPr>
-        <p:spPr/>
-        <p:txBody>
           <a:bodyPr/>
           <a:lstStyle/>
           <a:p>
-            <a:fld id="{11EDCD7B-6966-E249-89F2-D46BDFBF56BE}" type="datetime1">
+            <a:fld id="{202E1EC2-47B8-044B-A09E-6A63B4D80C87}" type="datetime1">
               <a:rPr lang="fi-FI" smtClean="0"/>
-              <a:t>27.3.2023</a:t>
+              <a:t>14.11.2023</a:t>
             </a:fld>
             <a:endParaRPr lang="en-GB"/>
           </a:p>
@@ -9163,10 +9239,10 @@
       </p:sp>
       <p:sp>
         <p:nvSpPr>
-          <p:cNvPr id="5" name="Footer Placeholder 4">
-            <a:extLst>
-              <a:ext uri="{FF2B5EF4-FFF2-40B4-BE49-F238E27FC236}">
-                <a16:creationId xmlns:a16="http://schemas.microsoft.com/office/drawing/2014/main" id="{72FA43EE-B2B3-49D5-872B-4D987D842984}"/>
+          <p:cNvPr id="6" name="Footer Placeholder 5">
+            <a:extLst>
+              <a:ext uri="{FF2B5EF4-FFF2-40B4-BE49-F238E27FC236}">
+                <a16:creationId xmlns:a16="http://schemas.microsoft.com/office/drawing/2014/main" id="{588CE607-4137-8840-8FEA-42EAC857E3A3}"/>
               </a:ext>
             </a:extLst>
           </p:cNvPr>
@@ -9188,10 +9264,10 @@
       </p:sp>
       <p:sp>
         <p:nvSpPr>
-          <p:cNvPr id="6" name="Slide Number Placeholder 5">
-            <a:extLst>
-              <a:ext uri="{FF2B5EF4-FFF2-40B4-BE49-F238E27FC236}">
-                <a16:creationId xmlns:a16="http://schemas.microsoft.com/office/drawing/2014/main" id="{36A82290-8C98-42D6-A040-74AE3ECFEC15}"/>
+          <p:cNvPr id="7" name="Slide Number Placeholder 6">
+            <a:extLst>
+              <a:ext uri="{FF2B5EF4-FFF2-40B4-BE49-F238E27FC236}">
+                <a16:creationId xmlns:a16="http://schemas.microsoft.com/office/drawing/2014/main" id="{2E133A96-6C73-0844-B8CB-27C2B5F4CFB1}"/>
               </a:ext>
             </a:extLst>
           </p:cNvPr>
@@ -9210,119 +9286,6 @@
             <a:fld id="{76BAB7ED-EDE9-4D4B-9A2D-30E18C47C16E}" type="slidenum">
               <a:rPr lang="en-GB" smtClean="0"/>
               <a:t>16</a:t>
-            </a:fld>
-            <a:endParaRPr lang="en-GB"/>
-          </a:p>
-        </p:txBody>
-      </p:sp>
-    </p:spTree>
-    <p:extLst>
-      <p:ext uri="{BB962C8B-B14F-4D97-AF65-F5344CB8AC3E}">
-        <p14:creationId xmlns:p14="http://schemas.microsoft.com/office/powerpoint/2010/main" val="553651584"/>
-      </p:ext>
-    </p:extLst>
-  </p:cSld>
-  <p:clrMapOvr>
-    <a:masterClrMapping/>
-  </p:clrMapOvr>
-</p:sld>
-</file>
-
-<file path=ppt/slides/slide17.xml><?xml version="1.0" encoding="utf-8"?>
-<p:sld xmlns:a="http://schemas.openxmlformats.org/drawingml/2006/main" xmlns:r="http://schemas.openxmlformats.org/officeDocument/2006/relationships" xmlns:p="http://schemas.openxmlformats.org/presentationml/2006/main">
-  <p:cSld>
-    <p:spTree>
-      <p:nvGrpSpPr>
-        <p:cNvPr id="1" name=""/>
-        <p:cNvGrpSpPr/>
-        <p:nvPr/>
-      </p:nvGrpSpPr>
-      <p:grpSpPr>
-        <a:xfrm>
-          <a:off x="0" y="0"/>
-          <a:ext cx="0" cy="0"/>
-          <a:chOff x="0" y="0"/>
-          <a:chExt cx="0" cy="0"/>
-        </a:xfrm>
-      </p:grpSpPr>
-      <p:sp>
-        <p:nvSpPr>
-          <p:cNvPr id="5" name="Date Placeholder 4">
-            <a:extLst>
-              <a:ext uri="{FF2B5EF4-FFF2-40B4-BE49-F238E27FC236}">
-                <a16:creationId xmlns:a16="http://schemas.microsoft.com/office/drawing/2014/main" id="{976244E2-AA76-2742-B2EC-FEC79276155C}"/>
-              </a:ext>
-            </a:extLst>
-          </p:cNvPr>
-          <p:cNvSpPr>
-            <a:spLocks noGrp="1"/>
-          </p:cNvSpPr>
-          <p:nvPr>
-            <p:ph type="dt" sz="half" idx="10"/>
-          </p:nvPr>
-        </p:nvSpPr>
-        <p:spPr/>
-        <p:txBody>
-          <a:bodyPr/>
-          <a:lstStyle/>
-          <a:p>
-            <a:fld id="{202E1EC2-47B8-044B-A09E-6A63B4D80C87}" type="datetime1">
-              <a:rPr lang="fi-FI" smtClean="0"/>
-              <a:t>27.3.2023</a:t>
-            </a:fld>
-            <a:endParaRPr lang="en-GB"/>
-          </a:p>
-        </p:txBody>
-      </p:sp>
-      <p:sp>
-        <p:nvSpPr>
-          <p:cNvPr id="6" name="Footer Placeholder 5">
-            <a:extLst>
-              <a:ext uri="{FF2B5EF4-FFF2-40B4-BE49-F238E27FC236}">
-                <a16:creationId xmlns:a16="http://schemas.microsoft.com/office/drawing/2014/main" id="{588CE607-4137-8840-8FEA-42EAC857E3A3}"/>
-              </a:ext>
-            </a:extLst>
-          </p:cNvPr>
-          <p:cNvSpPr>
-            <a:spLocks noGrp="1"/>
-          </p:cNvSpPr>
-          <p:nvPr>
-            <p:ph type="ftr" sz="quarter" idx="11"/>
-          </p:nvPr>
-        </p:nvSpPr>
-        <p:spPr/>
-        <p:txBody>
-          <a:bodyPr/>
-          <a:lstStyle/>
-          <a:p>
-            <a:endParaRPr lang="en-GB"/>
-          </a:p>
-        </p:txBody>
-      </p:sp>
-      <p:sp>
-        <p:nvSpPr>
-          <p:cNvPr id="7" name="Slide Number Placeholder 6">
-            <a:extLst>
-              <a:ext uri="{FF2B5EF4-FFF2-40B4-BE49-F238E27FC236}">
-                <a16:creationId xmlns:a16="http://schemas.microsoft.com/office/drawing/2014/main" id="{2E133A96-6C73-0844-B8CB-27C2B5F4CFB1}"/>
-              </a:ext>
-            </a:extLst>
-          </p:cNvPr>
-          <p:cNvSpPr>
-            <a:spLocks noGrp="1"/>
-          </p:cNvSpPr>
-          <p:nvPr>
-            <p:ph type="sldNum" sz="quarter" idx="12"/>
-          </p:nvPr>
-        </p:nvSpPr>
-        <p:spPr/>
-        <p:txBody>
-          <a:bodyPr/>
-          <a:lstStyle/>
-          <a:p>
-            <a:fld id="{76BAB7ED-EDE9-4D4B-9A2D-30E18C47C16E}" type="slidenum">
-              <a:rPr lang="en-GB" smtClean="0"/>
-              <a:t>17</a:t>
             </a:fld>
             <a:endParaRPr lang="en-GB"/>
           </a:p>
@@ -10227,7 +10190,7 @@
           <a:p>
             <a:fld id="{11EDCD7B-6966-E249-89F2-D46BDFBF56BE}" type="datetime1">
               <a:rPr lang="fi-FI" smtClean="0"/>
-              <a:t>27.3.2023</a:t>
+              <a:t>14.11.2023</a:t>
             </a:fld>
             <a:endParaRPr lang="en-GB"/>
           </a:p>
@@ -10387,7 +10350,7 @@
             </a:r>
             <a:r>
               <a:rPr lang="en-US" sz="2800" dirty="0"/>
-              <a:t> hook.</a:t>
+              <a:t> hook(s).</a:t>
             </a:r>
             <a:endParaRPr lang="en-US" dirty="0"/>
           </a:p>
@@ -10492,7 +10455,7 @@
           <a:p>
             <a:fld id="{11EDCD7B-6966-E249-89F2-D46BDFBF56BE}" type="datetime1">
               <a:rPr lang="fi-FI" smtClean="0"/>
-              <a:t>27.3.2023</a:t>
+              <a:t>14.11.2023</a:t>
             </a:fld>
             <a:endParaRPr lang="en-GB"/>
           </a:p>
@@ -10669,7 +10632,7 @@
             </a:pPr>
             <a:r>
               <a:rPr lang="en-US" sz="2800" dirty="0"/>
-              <a:t>With multiple components (map etc.) remember to give the unique </a:t>
+              <a:t>With multiple components (map etc. list creation) remember to give the unique </a:t>
             </a:r>
             <a:r>
               <a:rPr lang="en-US" sz="2800" b="1" dirty="0"/>
@@ -10717,7 +10680,7 @@
           <a:p>
             <a:fld id="{11EDCD7B-6966-E249-89F2-D46BDFBF56BE}" type="datetime1">
               <a:rPr lang="fi-FI" smtClean="0"/>
-              <a:t>27.3.2023</a:t>
+              <a:t>14.11.2023</a:t>
             </a:fld>
             <a:endParaRPr lang="en-GB"/>
           </a:p>
@@ -10867,10 +10830,10 @@
               </a:lnSpc>
             </a:pPr>
             <a:r>
-              <a:rPr lang="en-US" sz="2800"/>
+              <a:rPr lang="en-US" sz="2800" dirty="0"/>
               <a:t>use only Material UI components to get the styles defined in the Theme. (=&gt; no HTML elements, p, span, if possible)</a:t>
             </a:r>
-            <a:endParaRPr lang="en-US" sz="2800">
+            <a:endParaRPr lang="en-US" sz="2800" dirty="0">
               <a:cs typeface="Arial"/>
             </a:endParaRPr>
           </a:p>
@@ -10881,10 +10844,10 @@
               </a:lnSpc>
             </a:pPr>
             <a:r>
-              <a:rPr lang="en-US" sz="2800"/>
-              <a:t>think what HTML elements they return. e.g. so we won't get &lt;p&gt; inside of a &lt;p&gt; which is against HTML standard.</a:t>
-            </a:r>
-            <a:endParaRPr lang="en-US" sz="2800">
+              <a:rPr lang="en-US" sz="2800" dirty="0"/>
+              <a:t>think what HTML elements they return. e.g. so we won't get &lt;p&gt; inside of a &lt;p&gt; which is against HTML standard. Or &lt;div&gt; as direct child of &lt;table&gt; or so on.</a:t>
+            </a:r>
+            <a:endParaRPr lang="en-US" sz="2800" dirty="0">
               <a:cs typeface="Arial" panose="020B0604020202020204"/>
             </a:endParaRPr>
           </a:p>
@@ -10895,7 +10858,7 @@
               </a:lnSpc>
             </a:pPr>
             <a:r>
-              <a:rPr lang="en-US" sz="2600">
+              <a:rPr lang="en-US" sz="2600" dirty="0">
                 <a:cs typeface="Arial"/>
               </a:rPr>
               <a:t>For some components you can specify which HTML element rendered</a:t>
@@ -10908,10 +10871,10 @@
               </a:lnSpc>
             </a:pPr>
             <a:r>
-              <a:rPr lang="en-US" sz="2800"/>
+              <a:rPr lang="en-US" sz="2800" dirty="0"/>
               <a:t>(Start learning Mui React components from very simple examples of yours. Build gradually bigger.)</a:t>
             </a:r>
-            <a:endParaRPr lang="en-US" sz="2800">
+            <a:endParaRPr lang="en-US" sz="2800" dirty="0">
               <a:cs typeface="Arial"/>
             </a:endParaRPr>
           </a:p>
@@ -10940,7 +10903,7 @@
           <a:p>
             <a:fld id="{11EDCD7B-6966-E249-89F2-D46BDFBF56BE}" type="datetime1">
               <a:rPr lang="fi-FI" smtClean="0"/>
-              <a:t>27.3.2023</a:t>
+              <a:t>14.11.2023</a:t>
             </a:fld>
             <a:endParaRPr lang="en-GB"/>
           </a:p>
@@ -11095,18 +11058,18 @@
               </a:lnSpc>
             </a:pPr>
             <a:r>
-              <a:rPr lang="en-US" sz="2800"/>
+              <a:rPr lang="en-US" sz="2800" dirty="0"/>
               <a:t>Define the Theme in a different file with the </a:t>
             </a:r>
             <a:r>
-              <a:rPr lang="en-US" sz="2800" b="1" err="1"/>
+              <a:rPr lang="en-US" sz="2800" b="1" dirty="0" err="1"/>
               <a:t>createTheme</a:t>
             </a:r>
             <a:r>
-              <a:rPr lang="en-US" sz="2800"/>
+              <a:rPr lang="en-US" sz="2800" dirty="0"/>
               <a:t> function. You can define Palettes, give components special custom styles.</a:t>
             </a:r>
-            <a:endParaRPr lang="en-US"/>
+            <a:endParaRPr lang="en-US" dirty="0"/>
           </a:p>
           <a:p>
             <a:pPr marL="215900" indent="-215900">
@@ -11115,18 +11078,18 @@
               </a:lnSpc>
             </a:pPr>
             <a:r>
-              <a:rPr lang="en-US" sz="2800"/>
+              <a:rPr lang="en-US" sz="2800" dirty="0"/>
               <a:t>Wrap the whole application inside </a:t>
             </a:r>
             <a:r>
-              <a:rPr lang="en-US" sz="2800" b="1" err="1"/>
+              <a:rPr lang="en-US" sz="2800" b="1" dirty="0" err="1"/>
               <a:t>ThemeProvider</a:t>
             </a:r>
             <a:r>
-              <a:rPr lang="en-US" sz="2800"/>
+              <a:rPr lang="en-US" sz="2800" dirty="0"/>
               <a:t>. That already gives Material UI components their styles.</a:t>
             </a:r>
-            <a:endParaRPr lang="en-US" sz="2800">
+            <a:endParaRPr lang="en-US" sz="2800" dirty="0">
               <a:cs typeface="Arial"/>
             </a:endParaRPr>
           </a:p>
@@ -11137,18 +11100,18 @@
               </a:lnSpc>
             </a:pPr>
             <a:r>
-              <a:rPr lang="en-US" sz="2800"/>
+              <a:rPr lang="en-US" sz="2800" dirty="0"/>
               <a:t>If you </a:t>
             </a:r>
             <a:r>
-              <a:rPr lang="en-US" sz="2800" b="1"/>
+              <a:rPr lang="en-US" sz="2800" b="1" dirty="0"/>
               <a:t>only</a:t>
             </a:r>
             <a:r>
-              <a:rPr lang="en-US" sz="2800"/>
+              <a:rPr lang="en-US" sz="2800" dirty="0"/>
               <a:t> use Material UI components. Then you’ll get the theme styles automatically.</a:t>
             </a:r>
-            <a:endParaRPr lang="en-US" sz="2800">
+            <a:endParaRPr lang="en-US" sz="2800" dirty="0">
               <a:cs typeface="Arial" panose="020B0604020202020204"/>
             </a:endParaRPr>
           </a:p>
@@ -11159,7 +11122,7 @@
               </a:lnSpc>
               <a:buNone/>
             </a:pPr>
-            <a:endParaRPr lang="en-US" sz="2800">
+            <a:endParaRPr lang="en-US" sz="2800" dirty="0">
               <a:cs typeface="Arial" panose="020B0604020202020204"/>
             </a:endParaRPr>
           </a:p>
@@ -11170,26 +11133,30 @@
               </a:lnSpc>
             </a:pPr>
             <a:r>
-              <a:rPr lang="en-US" sz="2800"/>
-              <a:t>If you need to use </a:t>
-            </a:r>
-            <a:r>
-              <a:rPr lang="en-US" sz="2800" b="1"/>
-              <a:t>specific colors or styles</a:t>
-            </a:r>
-            <a:r>
-              <a:rPr lang="en-US" sz="2800"/>
-              <a:t> from the theme, you can use </a:t>
-            </a:r>
-            <a:r>
-              <a:rPr lang="en-US" sz="2800" b="1" err="1"/>
+              <a:rPr lang="en-US" sz="2800" dirty="0"/>
+              <a:t>In rare need to use </a:t>
+            </a:r>
+            <a:r>
+              <a:rPr lang="en-US" sz="2800" b="1" u="sng" dirty="0"/>
+              <a:t>specific</a:t>
+            </a:r>
+            <a:r>
+              <a:rPr lang="en-US" sz="2800" b="1" dirty="0"/>
+              <a:t> colors or styles</a:t>
+            </a:r>
+            <a:r>
+              <a:rPr lang="en-US" sz="2800" dirty="0"/>
+              <a:t> from the theme, use </a:t>
+            </a:r>
+            <a:r>
+              <a:rPr lang="en-US" sz="2800" b="1" dirty="0" err="1"/>
               <a:t>useTheme</a:t>
             </a:r>
             <a:r>
-              <a:rPr lang="en-US" sz="2800"/>
+              <a:rPr lang="en-US" sz="2800" dirty="0"/>
               <a:t> hook to get the theme object to your component</a:t>
             </a:r>
-            <a:endParaRPr lang="en-US" sz="2800">
+            <a:endParaRPr lang="en-US" sz="2800" dirty="0">
               <a:cs typeface="Arial"/>
             </a:endParaRPr>
           </a:p>
@@ -11218,7 +11185,7 @@
           <a:p>
             <a:fld id="{11EDCD7B-6966-E249-89F2-D46BDFBF56BE}" type="datetime1">
               <a:rPr lang="fi-FI" smtClean="0"/>
-              <a:t>27.3.2023</a:t>
+              <a:t>14.11.2023</a:t>
             </a:fld>
             <a:endParaRPr lang="en-GB"/>
           </a:p>
@@ -11428,17 +11395,8 @@
               <a:rPr lang="en-US" sz="2800" dirty="0">
                 <a:cs typeface="Arial"/>
               </a:rPr>
-              <a:t>Similarly you can use some funny distinctive font from the theme and what is </a:t>
-            </a:r>
-            <a:r>
-              <a:rPr lang="en-US" sz="2800">
-                <a:cs typeface="Arial"/>
-              </a:rPr>
-              <a:t>not funny, is hard-coded.</a:t>
-            </a:r>
-            <a:endParaRPr lang="en-US" sz="2800" dirty="0">
-              <a:cs typeface="Arial"/>
-            </a:endParaRPr>
+              <a:t>Similarly you can use some funny distinctive font from the theme and what is not funny, is hard-coded.</a:t>
+            </a:r>
           </a:p>
         </p:txBody>
       </p:sp>
@@ -11465,7 +11423,7 @@
           <a:p>
             <a:fld id="{11EDCD7B-6966-E249-89F2-D46BDFBF56BE}" type="datetime1">
               <a:rPr lang="fi-FI" smtClean="0"/>
-              <a:t>27.3.2023</a:t>
+              <a:t>14.11.2023</a:t>
             </a:fld>
             <a:endParaRPr lang="en-GB"/>
           </a:p>
@@ -11699,7 +11657,7 @@
           <a:p>
             <a:fld id="{11EDCD7B-6966-E249-89F2-D46BDFBF56BE}" type="datetime1">
               <a:rPr lang="fi-FI" smtClean="0"/>
-              <a:t>27.3.2023</a:t>
+              <a:t>14.11.2023</a:t>
             </a:fld>
             <a:endParaRPr lang="en-GB"/>
           </a:p>
@@ -11850,7 +11808,15 @@
             </a:pPr>
             <a:r>
               <a:rPr lang="en-US" sz="2800" dirty="0"/>
-              <a:t>(Normal case was: Parent passes </a:t>
+              <a:t>(</a:t>
+            </a:r>
+            <a:r>
+              <a:rPr lang="en-US" sz="2800" u="sng" dirty="0"/>
+              <a:t>Normal case was</a:t>
+            </a:r>
+            <a:r>
+              <a:rPr lang="en-US" sz="2800" dirty="0"/>
+              <a:t>: Parent passes </a:t>
             </a:r>
             <a:r>
               <a:rPr lang="en-US" sz="2800" b="1" dirty="0"/>
@@ -11878,7 +11844,7 @@
             </a:pPr>
             <a:r>
               <a:rPr lang="en-US" sz="2800" dirty="0"/>
-              <a:t>Special case: Parent will pass ‘event handler function’ (parent state’s set function) to the child component(s) in props so that child/children can execute it and thus e.g. write back to parent's state.</a:t>
+              <a:t>Special case: Parent will pass ‘event handler function’ (parent state’s set function) to the child component(s) in props so that child/children can execute it and thus e.g. ‘write’ to parent's state.</a:t>
             </a:r>
           </a:p>
         </p:txBody>
@@ -11906,7 +11872,7 @@
           <a:p>
             <a:fld id="{11EDCD7B-6966-E249-89F2-D46BDFBF56BE}" type="datetime1">
               <a:rPr lang="fi-FI" smtClean="0"/>
-              <a:t>27.3.2023</a:t>
+              <a:t>14.11.2023</a:t>
             </a:fld>
             <a:endParaRPr lang="en-GB"/>
           </a:p>
@@ -12536,26 +12502,12 @@
 </file>
 
 <file path=customXml/item1.xml><?xml version="1.0" encoding="utf-8"?>
-<p:properties xmlns:p="http://schemas.microsoft.com/office/2006/metadata/properties" xmlns:xsi="http://www.w3.org/2001/XMLSchema-instance" xmlns:pc="http://schemas.microsoft.com/office/infopath/2007/PartnerControls">
-  <documentManagement>
-    <TaxCatchAll xmlns="0b3f8f6d-dc8d-4076-ae37-9bbd8f8c2dbf" xsi:nil="true"/>
-    <lcf76f155ced4ddcb4097134ff3c332f xmlns="8438dade-b61d-47d7-ab56-0bbf57e3795f">
-      <Terms xmlns="http://schemas.microsoft.com/office/infopath/2007/PartnerControls"/>
-    </lcf76f155ced4ddcb4097134ff3c332f>
-    <SharedWithUsers xmlns="0b3f8f6d-dc8d-4076-ae37-9bbd8f8c2dbf">
-      <UserInfo>
-        <DisplayName>Siba23K - Jäsenet</DisplayName>
-        <AccountId>32</AccountId>
-        <AccountType/>
-      </UserInfo>
-      <UserInfo>
-        <DisplayName>Software Project 2023 H1 - Jäsenet</DisplayName>
-        <AccountId>7</AccountId>
-        <AccountType/>
-      </UserInfo>
-    </SharedWithUsers>
-  </documentManagement>
-</p:properties>
+<?mso-contentType ?>
+<FormTemplates xmlns="http://schemas.microsoft.com/sharepoint/v3/contenttype/forms">
+  <Display>DocumentLibraryForm</Display>
+  <Edit>DocumentLibraryForm</Edit>
+  <New>DocumentLibraryForm</New>
+</FormTemplates>
 </file>
 
 <file path=customXml/item2.xml><?xml version="1.0" encoding="utf-8"?>
@@ -12782,27 +12734,32 @@
 </file>
 
 <file path=customXml/item3.xml><?xml version="1.0" encoding="utf-8"?>
-<?mso-contentType ?>
-<FormTemplates xmlns="http://schemas.microsoft.com/sharepoint/v3/contenttype/forms">
-  <Display>DocumentLibraryForm</Display>
-  <Edit>DocumentLibraryForm</Edit>
-  <New>DocumentLibraryForm</New>
-</FormTemplates>
+<p:properties xmlns:p="http://schemas.microsoft.com/office/2006/metadata/properties" xmlns:xsi="http://www.w3.org/2001/XMLSchema-instance" xmlns:pc="http://schemas.microsoft.com/office/infopath/2007/PartnerControls">
+  <documentManagement>
+    <TaxCatchAll xmlns="0b3f8f6d-dc8d-4076-ae37-9bbd8f8c2dbf" xsi:nil="true"/>
+    <lcf76f155ced4ddcb4097134ff3c332f xmlns="8438dade-b61d-47d7-ab56-0bbf57e3795f">
+      <Terms xmlns="http://schemas.microsoft.com/office/infopath/2007/PartnerControls"/>
+    </lcf76f155ced4ddcb4097134ff3c332f>
+    <SharedWithUsers xmlns="0b3f8f6d-dc8d-4076-ae37-9bbd8f8c2dbf">
+      <UserInfo>
+        <DisplayName>Siba23K - Jäsenet</DisplayName>
+        <AccountId>32</AccountId>
+        <AccountType/>
+      </UserInfo>
+      <UserInfo>
+        <DisplayName>Software Project 2023 H1 - Jäsenet</DisplayName>
+        <AccountId>7</AccountId>
+        <AccountType/>
+      </UserInfo>
+    </SharedWithUsers>
+  </documentManagement>
+</p:properties>
 </file>
 
 <file path=customXml/itemProps1.xml><?xml version="1.0" encoding="utf-8"?>
-<ds:datastoreItem xmlns:ds="http://schemas.openxmlformats.org/officeDocument/2006/customXml" ds:itemID="{DED4E12E-7268-4B03-A47B-0755D62B5E31}">
+<ds:datastoreItem xmlns:ds="http://schemas.openxmlformats.org/officeDocument/2006/customXml" ds:itemID="{D546C03B-CD3A-4EA0-AAA4-0E00E896454E}">
   <ds:schemaRefs>
-    <ds:schemaRef ds:uri="http://www.w3.org/XML/1998/namespace"/>
-    <ds:schemaRef ds:uri="http://schemas.microsoft.com/office/2006/metadata/properties"/>
-    <ds:schemaRef ds:uri="http://purl.org/dc/terms/"/>
-    <ds:schemaRef ds:uri="http://schemas.microsoft.com/office/2006/documentManagement/types"/>
-    <ds:schemaRef ds:uri="8438dade-b61d-47d7-ab56-0bbf57e3795f"/>
-    <ds:schemaRef ds:uri="http://purl.org/dc/dcmitype/"/>
-    <ds:schemaRef ds:uri="http://purl.org/dc/elements/1.1/"/>
-    <ds:schemaRef ds:uri="http://schemas.microsoft.com/office/infopath/2007/PartnerControls"/>
-    <ds:schemaRef ds:uri="http://schemas.openxmlformats.org/package/2006/metadata/core-properties"/>
-    <ds:schemaRef ds:uri="0b3f8f6d-dc8d-4076-ae37-9bbd8f8c2dbf"/>
+    <ds:schemaRef ds:uri="http://schemas.microsoft.com/sharepoint/v3/contenttype/forms"/>
   </ds:schemaRefs>
 </ds:datastoreItem>
 </file>
@@ -12827,9 +12784,18 @@
 </file>
 
 <file path=customXml/itemProps3.xml><?xml version="1.0" encoding="utf-8"?>
-<ds:datastoreItem xmlns:ds="http://schemas.openxmlformats.org/officeDocument/2006/customXml" ds:itemID="{D546C03B-CD3A-4EA0-AAA4-0E00E896454E}">
+<ds:datastoreItem xmlns:ds="http://schemas.openxmlformats.org/officeDocument/2006/customXml" ds:itemID="{DED4E12E-7268-4B03-A47B-0755D62B5E31}">
   <ds:schemaRefs>
-    <ds:schemaRef ds:uri="http://schemas.microsoft.com/sharepoint/v3/contenttype/forms"/>
+    <ds:schemaRef ds:uri="http://www.w3.org/XML/1998/namespace"/>
+    <ds:schemaRef ds:uri="http://schemas.microsoft.com/office/2006/metadata/properties"/>
+    <ds:schemaRef ds:uri="http://purl.org/dc/terms/"/>
+    <ds:schemaRef ds:uri="http://schemas.microsoft.com/office/2006/documentManagement/types"/>
+    <ds:schemaRef ds:uri="8438dade-b61d-47d7-ab56-0bbf57e3795f"/>
+    <ds:schemaRef ds:uri="http://purl.org/dc/dcmitype/"/>
+    <ds:schemaRef ds:uri="http://purl.org/dc/elements/1.1/"/>
+    <ds:schemaRef ds:uri="http://schemas.microsoft.com/office/infopath/2007/PartnerControls"/>
+    <ds:schemaRef ds:uri="http://schemas.openxmlformats.org/package/2006/metadata/core-properties"/>
+    <ds:schemaRef ds:uri="0b3f8f6d-dc8d-4076-ae37-9bbd8f8c2dbf"/>
   </ds:schemaRefs>
 </ds:datastoreItem>
 </file>
</xml_diff>

<commit_message>
Frontend learning material polished more
</commit_message>
<xml_diff>
--- a/05_frontend/Frontend_VideoTopics.pptx
+++ b/05_frontend/Frontend_VideoTopics.pptx
@@ -1373,7 +1373,7 @@
           <a:p>
             <a:fld id="{5645C365-1C26-6946-87AF-75D6A7DF4277}" type="datetimeFigureOut">
               <a:rPr lang="en-GB" smtClean="0"/>
-              <a:t>14/11/2023</a:t>
+              <a:t>11/03/2024</a:t>
             </a:fld>
             <a:endParaRPr lang="en-GB"/>
           </a:p>
@@ -1872,7 +1872,7 @@
           <a:p>
             <a:fld id="{35B864B8-8D08-7B43-B4FB-B2FB41A5D9E3}" type="datetime1">
               <a:rPr lang="fi-FI" smtClean="0"/>
-              <a:t>14.11.2023</a:t>
+              <a:t>11.3.2024</a:t>
             </a:fld>
             <a:endParaRPr lang="en-GB"/>
           </a:p>
@@ -2198,7 +2198,7 @@
           <a:p>
             <a:fld id="{D5AEA85A-FC56-D34C-9AA6-ECC3D2586F37}" type="datetime1">
               <a:rPr lang="fi-FI" smtClean="0"/>
-              <a:t>14.11.2023</a:t>
+              <a:t>11.3.2024</a:t>
             </a:fld>
             <a:endParaRPr lang="en-GB"/>
           </a:p>
@@ -2408,7 +2408,7 @@
           <a:p>
             <a:fld id="{E6BC6EEF-E660-7844-8930-418AFF95EA40}" type="datetime1">
               <a:rPr lang="fi-FI" smtClean="0"/>
-              <a:t>14.11.2023</a:t>
+              <a:t>11.3.2024</a:t>
             </a:fld>
             <a:endParaRPr lang="en-GB"/>
           </a:p>
@@ -2717,7 +2717,7 @@
           <a:p>
             <a:fld id="{4E10C7EC-C1C1-9849-A573-7692478FCD52}" type="datetime1">
               <a:rPr lang="fi-FI" smtClean="0"/>
-              <a:t>14.11.2023</a:t>
+              <a:t>11.3.2024</a:t>
             </a:fld>
             <a:endParaRPr lang="en-GB"/>
           </a:p>
@@ -2990,7 +2990,7 @@
           <a:p>
             <a:fld id="{844FF3FE-30BE-2040-9151-6FBC4992BF4F}" type="datetime1">
               <a:rPr lang="fi-FI" smtClean="0"/>
-              <a:t>14.11.2023</a:t>
+              <a:t>11.3.2024</a:t>
             </a:fld>
             <a:endParaRPr lang="en-GB"/>
           </a:p>
@@ -3230,7 +3230,7 @@
           <a:p>
             <a:fld id="{11EDCD7B-6966-E249-89F2-D46BDFBF56BE}" type="datetime1">
               <a:rPr lang="fi-FI" smtClean="0"/>
-              <a:t>14.11.2023</a:t>
+              <a:t>11.3.2024</a:t>
             </a:fld>
             <a:endParaRPr lang="en-GB"/>
           </a:p>
@@ -3523,7 +3523,7 @@
           <a:p>
             <a:fld id="{11EDCD7B-6966-E249-89F2-D46BDFBF56BE}" type="datetime1">
               <a:rPr lang="fi-FI" smtClean="0"/>
-              <a:t>14.11.2023</a:t>
+              <a:t>11.3.2024</a:t>
             </a:fld>
             <a:endParaRPr lang="en-GB"/>
           </a:p>
@@ -3962,7 +3962,7 @@
           <a:p>
             <a:fld id="{844FF3FE-30BE-2040-9151-6FBC4992BF4F}" type="datetime1">
               <a:rPr lang="fi-FI" smtClean="0"/>
-              <a:t>14.11.2023</a:t>
+              <a:t>11.3.2024</a:t>
             </a:fld>
             <a:endParaRPr lang="en-GB"/>
           </a:p>
@@ -4190,7 +4190,7 @@
           <a:p>
             <a:fld id="{11EDCD7B-6966-E249-89F2-D46BDFBF56BE}" type="datetime1">
               <a:rPr lang="fi-FI" smtClean="0"/>
-              <a:t>14.11.2023</a:t>
+              <a:t>11.3.2024</a:t>
             </a:fld>
             <a:endParaRPr lang="en-GB"/>
           </a:p>
@@ -4605,7 +4605,7 @@
           <a:p>
             <a:fld id="{B62E192A-D52B-F541-B2AA-4AEB9388F1F7}" type="datetime1">
               <a:rPr lang="fi-FI" smtClean="0"/>
-              <a:t>14.11.2023</a:t>
+              <a:t>11.3.2024</a:t>
             </a:fld>
             <a:endParaRPr lang="en-GB"/>
           </a:p>
@@ -4905,7 +4905,7 @@
           <a:p>
             <a:fld id="{EEA4FAA2-2B3E-264C-A42F-2D6D3EF33A3C}" type="datetime1">
               <a:rPr lang="fi-FI" smtClean="0"/>
-              <a:t>14.11.2023</a:t>
+              <a:t>11.3.2024</a:t>
             </a:fld>
             <a:endParaRPr lang="en-GB"/>
           </a:p>
@@ -5804,7 +5804,7 @@
           <a:p>
             <a:fld id="{B3114A65-8017-1743-A85A-B2A4BB835AE9}" type="datetime1">
               <a:rPr lang="fi-FI" smtClean="0"/>
-              <a:t>14.11.2023</a:t>
+              <a:t>11.3.2024</a:t>
             </a:fld>
             <a:endParaRPr lang="en-GB"/>
           </a:p>
@@ -6032,7 +6032,7 @@
           <a:p>
             <a:fld id="{11EDCD7B-6966-E249-89F2-D46BDFBF56BE}" type="datetime1">
               <a:rPr lang="fi-FI" smtClean="0"/>
-              <a:t>14.11.2023</a:t>
+              <a:t>11.3.2024</a:t>
             </a:fld>
             <a:endParaRPr lang="en-GB"/>
           </a:p>
@@ -6324,7 +6324,7 @@
           <a:p>
             <a:fld id="{45F98643-D206-614D-B596-3C8548138211}" type="datetime1">
               <a:rPr lang="fi-FI" smtClean="0"/>
-              <a:t>14.11.2023</a:t>
+              <a:t>11.3.2024</a:t>
             </a:fld>
             <a:endParaRPr lang="en-GB"/>
           </a:p>
@@ -6910,7 +6910,7 @@
           <a:p>
             <a:r>
               <a:rPr lang="en-US" sz="4800" dirty="0"/>
-              <a:t>(1. React and JSX basic syntax)</a:t>
+              <a:t>1. React and JSX basic syntax - phase</a:t>
             </a:r>
             <a:br>
               <a:rPr lang="en-US" sz="4800" dirty="0"/>
@@ -6948,7 +6948,7 @@
         </p:spPr>
         <p:txBody>
           <a:bodyPr vert="horz" lIns="0" tIns="0" rIns="0" bIns="36000" numCol="1" spcCol="360000" rtlCol="0" anchor="t">
-            <a:normAutofit/>
+            <a:normAutofit lnSpcReduction="10000"/>
           </a:bodyPr>
           <a:lstStyle/>
           <a:p>
@@ -7116,6 +7116,10 @@
               <a:rPr lang="en-US" sz="2800" dirty="0" err="1"/>
               <a:t>etc</a:t>
             </a:r>
+            <a:r>
+              <a:rPr lang="en-US" sz="2800" dirty="0"/>
+              <a:t> based on e.g. attribute values</a:t>
+            </a:r>
             <a:endParaRPr lang="fi-FI" sz="2800" dirty="0">
               <a:cs typeface="Arial" panose="020B0604020202020204"/>
             </a:endParaRPr>
@@ -7372,7 +7376,7 @@
                 <a:ea typeface="+mn-lt"/>
                 <a:cs typeface="+mn-lt"/>
               </a:rPr>
-              <a:t> compiled to JS</a:t>
+              <a:t>-compiled to JS</a:t>
             </a:r>
             <a:endParaRPr lang="en-US" sz="2800" dirty="0">
               <a:cs typeface="Arial"/>
@@ -7414,7 +7418,7 @@
           <a:p>
             <a:fld id="{11EDCD7B-6966-E249-89F2-D46BDFBF56BE}" type="datetime1">
               <a:rPr lang="fi-FI" smtClean="0"/>
-              <a:t>14.11.2023</a:t>
+              <a:t>11.3.2024</a:t>
             </a:fld>
             <a:endParaRPr lang="en-GB"/>
           </a:p>
@@ -7584,7 +7588,7 @@
               <a:rPr lang="en-US" sz="2600" dirty="0">
                 <a:latin typeface="Consolas" panose="020B0609020204030204" pitchFamily="49" charset="0"/>
               </a:rPr>
-              <a:t>({thing: 22, thang: ”</a:t>
+              <a:t>({thing: 22, thang: “</a:t>
             </a:r>
             <a:r>
               <a:rPr lang="en-US" sz="2600" dirty="0" err="1">
@@ -7607,7 +7611,7 @@
             </a:pPr>
             <a:r>
               <a:rPr lang="en-US" sz="2800" dirty="0"/>
-              <a:t>Accessing the context values</a:t>
+              <a:t>Accessing/reading the context values</a:t>
             </a:r>
           </a:p>
           <a:p>
@@ -7630,7 +7634,7 @@
             </a:r>
             <a:r>
               <a:rPr lang="en-US" sz="2800" dirty="0"/>
-              <a:t>hook  to create local reference to the context </a:t>
+              <a:t>hook to create local reference to the context </a:t>
             </a:r>
           </a:p>
           <a:p>
@@ -7672,7 +7676,7 @@
             </a:pPr>
             <a:r>
               <a:rPr lang="en-US" sz="2800" dirty="0"/>
-              <a:t>Updating the values in the context</a:t>
+              <a:t>Updating/writing the values to the context</a:t>
             </a:r>
           </a:p>
           <a:p>
@@ -7695,7 +7699,7 @@
             </a:r>
             <a:r>
               <a:rPr lang="en-US" sz="2800" dirty="0"/>
-              <a:t>hook   </a:t>
+              <a:t>hook to create local reference to the context </a:t>
             </a:r>
           </a:p>
           <a:p>
@@ -7755,7 +7759,7 @@
           <a:p>
             <a:fld id="{11EDCD7B-6966-E249-89F2-D46BDFBF56BE}" type="datetime1">
               <a:rPr lang="fi-FI" smtClean="0"/>
-              <a:t>14.11.2023</a:t>
+              <a:t>11.3.2024</a:t>
             </a:fld>
             <a:endParaRPr lang="en-GB"/>
           </a:p>
@@ -7988,15 +7992,34 @@
             </a:pPr>
             <a:r>
               <a:rPr lang="en-US" sz="2600" dirty="0"/>
-              <a:t>if items given [user.id, </a:t>
-            </a:r>
-            <a:r>
-              <a:rPr lang="en-US" sz="2600" dirty="0" err="1"/>
+              <a:t>if items given </a:t>
+            </a:r>
+            <a:r>
+              <a:rPr lang="en-US" sz="2600" b="1" dirty="0"/>
+              <a:t>[user.id, </a:t>
+            </a:r>
+            <a:r>
+              <a:rPr lang="en-US" sz="2600" b="1" dirty="0" err="1"/>
               <a:t>project.count</a:t>
             </a:r>
             <a:r>
+              <a:rPr lang="en-US" sz="2600" b="1" dirty="0"/>
+              <a:t>]</a:t>
+            </a:r>
+            <a:r>
               <a:rPr lang="en-US" sz="2600" dirty="0"/>
-              <a:t>], then action runs at mount + if changes in these. </a:t>
+              <a:t>, then action runs at mount + if changes in these.</a:t>
+            </a:r>
+          </a:p>
+          <a:p>
+            <a:pPr lvl="3">
+              <a:lnSpc>
+                <a:spcPct val="100000"/>
+              </a:lnSpc>
+            </a:pPr>
+            <a:r>
+              <a:rPr lang="en-US" sz="2600" dirty="0"/>
+              <a:t>By far the most used and most useful. Should be your thinking starting point. </a:t>
             </a:r>
           </a:p>
           <a:p>
@@ -8007,7 +8030,15 @@
             </a:pPr>
             <a:r>
               <a:rPr lang="en-US" sz="2600" dirty="0"/>
-              <a:t>Empty [], dependency array =&gt; runs only once </a:t>
+              <a:t>Empty </a:t>
+            </a:r>
+            <a:r>
+              <a:rPr lang="en-US" sz="2600" b="1" dirty="0"/>
+              <a:t>[ ]</a:t>
+            </a:r>
+            <a:r>
+              <a:rPr lang="en-US" sz="2600" dirty="0"/>
+              <a:t>, dependency array =&gt; runs only once.   You sometimes need this. </a:t>
             </a:r>
           </a:p>
           <a:p>
@@ -8018,7 +8049,15 @@
             </a:pPr>
             <a:r>
               <a:rPr lang="en-US" sz="2600" dirty="0"/>
-              <a:t>If missing dependency array =&gt; runs at mount/first render + for any update/re-render.</a:t>
+              <a:t>If missing dependency array: </a:t>
+            </a:r>
+            <a:r>
+              <a:rPr lang="en-US" sz="2600" b="1" dirty="0"/>
+              <a:t>, }</a:t>
+            </a:r>
+            <a:r>
+              <a:rPr lang="en-US" sz="2600" dirty="0"/>
+              <a:t> =&gt; runs at mount/first render + for any update/re-render.</a:t>
             </a:r>
           </a:p>
           <a:p>
@@ -8070,7 +8109,7 @@
           <a:p>
             <a:fld id="{11EDCD7B-6966-E249-89F2-D46BDFBF56BE}" type="datetime1">
               <a:rPr lang="fi-FI" smtClean="0"/>
-              <a:t>14.11.2023</a:t>
+              <a:t>11.3.2024</a:t>
             </a:fld>
             <a:endParaRPr lang="en-GB"/>
           </a:p>
@@ -8302,7 +8341,15 @@
             </a:pPr>
             <a:r>
               <a:rPr lang="en-US" sz="2800" b="1" dirty="0"/>
-              <a:t>Routes </a:t>
+              <a:t>Route</a:t>
+            </a:r>
+            <a:r>
+              <a:rPr lang="en-US" sz="2800" b="1" u="sng" dirty="0"/>
+              <a:t>s</a:t>
+            </a:r>
+            <a:r>
+              <a:rPr lang="en-US" sz="2800" b="1" dirty="0"/>
+              <a:t> component </a:t>
             </a:r>
             <a:r>
               <a:rPr lang="en-US" sz="2800" dirty="0"/>
@@ -8314,15 +8361,23 @@
             </a:r>
             <a:r>
               <a:rPr lang="en-US" sz="2800" dirty="0"/>
-              <a:t>) that marks the place (div) on the page that will be replaced/filled with the “current page”. It also lists many Route components as content/children, </a:t>
-            </a:r>
-            <a:r>
-              <a:rPr lang="en-US" sz="2800"/>
-              <a:t>but only one Route’s View </a:t>
+              <a:t>) that marks the place (div) on the page that will be replaced/filled with the “current page”. It also lists many </a:t>
+            </a:r>
+            <a:r>
+              <a:rPr lang="en-US" sz="2800" b="1" dirty="0"/>
+              <a:t>Route</a:t>
             </a:r>
             <a:r>
               <a:rPr lang="en-US" sz="2800" dirty="0"/>
-              <a:t>switched each time to be rendered there.</a:t>
+              <a:t> </a:t>
+            </a:r>
+            <a:r>
+              <a:rPr lang="en-US" sz="2800" b="1" dirty="0"/>
+              <a:t>components</a:t>
+            </a:r>
+            <a:r>
+              <a:rPr lang="en-US" sz="2800" dirty="0"/>
+              <a:t> as content/children, but only one Route’s View switched each time to be rendered there.</a:t>
             </a:r>
           </a:p>
           <a:p>
@@ -8372,7 +8427,7 @@
           <a:p>
             <a:fld id="{11EDCD7B-6966-E249-89F2-D46BDFBF56BE}" type="datetime1">
               <a:rPr lang="fi-FI" smtClean="0"/>
-              <a:t>14.11.2023</a:t>
+              <a:t>11.3.2024</a:t>
             </a:fld>
             <a:endParaRPr lang="en-GB"/>
           </a:p>
@@ -8623,7 +8678,7 @@
           <a:p>
             <a:fld id="{11EDCD7B-6966-E249-89F2-D46BDFBF56BE}" type="datetime1">
               <a:rPr lang="fi-FI" smtClean="0"/>
-              <a:t>14.11.2023</a:t>
+              <a:t>11.3.2024</a:t>
             </a:fld>
             <a:endParaRPr lang="en-GB"/>
           </a:p>
@@ -8819,7 +8874,7 @@
           <a:p>
             <a:fld id="{11EDCD7B-6966-E249-89F2-D46BDFBF56BE}" type="datetime1">
               <a:rPr lang="fi-FI" smtClean="0"/>
-              <a:t>14.11.2023</a:t>
+              <a:t>11.3.2024</a:t>
             </a:fld>
             <a:endParaRPr lang="en-GB"/>
           </a:p>
@@ -9174,7 +9229,7 @@
           <a:p>
             <a:fld id="{11EDCD7B-6966-E249-89F2-D46BDFBF56BE}" type="datetime1">
               <a:rPr lang="fi-FI" smtClean="0"/>
-              <a:t>14.11.2023</a:t>
+              <a:t>11.3.2024</a:t>
             </a:fld>
             <a:endParaRPr lang="en-GB"/>
           </a:p>
@@ -9287,7 +9342,7 @@
           <a:p>
             <a:fld id="{202E1EC2-47B8-044B-A09E-6A63B4D80C87}" type="datetime1">
               <a:rPr lang="fi-FI" smtClean="0"/>
-              <a:t>14.11.2023</a:t>
+              <a:t>11.3.2024</a:t>
             </a:fld>
             <a:endParaRPr lang="en-GB"/>
           </a:p>
@@ -10186,8 +10241,8 @@
               </a:lnSpc>
             </a:pPr>
             <a:r>
-              <a:rPr lang="en-US" sz="2800"/>
-              <a:t>Browser fetches/loads only one version of the page from the server, In the beginning. </a:t>
+              <a:rPr lang="en-US" sz="2800" dirty="0"/>
+              <a:t>Browser fetches/loads only one version of the page from the server, in the beginning. </a:t>
             </a:r>
           </a:p>
           <a:p>
@@ -10197,8 +10252,8 @@
               </a:lnSpc>
             </a:pPr>
             <a:r>
-              <a:rPr lang="en-US" sz="2800"/>
-              <a:t>After that with JavaScript running on the browser, we update that one page and to the user it looks like we are navigating through different pages.</a:t>
+              <a:rPr lang="en-US" sz="2800" dirty="0"/>
+              <a:t>After that, with the JavaScript code running on the browser, we just update that one page DOM, but to the user it looks like we are navigating through different pages.</a:t>
             </a:r>
           </a:p>
           <a:p>
@@ -10208,8 +10263,8 @@
               </a:lnSpc>
             </a:pPr>
             <a:r>
-              <a:rPr lang="en-US" sz="2800"/>
-              <a:t>React routing is able to make it look like we are navigating.</a:t>
+              <a:rPr lang="en-US" sz="2800" dirty="0"/>
+              <a:t>React routing is able to make it look like we are navigating. And also make the routing programming logical for the programmer.</a:t>
             </a:r>
           </a:p>
           <a:p>
@@ -10219,7 +10274,7 @@
               </a:lnSpc>
               <a:buNone/>
             </a:pPr>
-            <a:endParaRPr lang="en-US" sz="2800"/>
+            <a:endParaRPr lang="en-US" sz="2800" dirty="0"/>
           </a:p>
         </p:txBody>
       </p:sp>
@@ -10246,7 +10301,7 @@
           <a:p>
             <a:fld id="{11EDCD7B-6966-E249-89F2-D46BDFBF56BE}" type="datetime1">
               <a:rPr lang="fi-FI" smtClean="0"/>
-              <a:t>14.11.2023</a:t>
+              <a:t>11.3.2024</a:t>
             </a:fld>
             <a:endParaRPr lang="en-GB"/>
           </a:p>
@@ -10361,10 +10416,10 @@
           <a:p>
             <a:pPr lvl="0"/>
             <a:r>
-              <a:rPr lang="en-US"/>
-              <a:t>3. React component state and props.</a:t>
-            </a:r>
-            <a:endParaRPr lang="fi-FI"/>
+              <a:rPr lang="en-US" dirty="0"/>
+              <a:t>3. React component state and props</a:t>
+            </a:r>
+            <a:endParaRPr lang="fi-FI" dirty="0"/>
           </a:p>
         </p:txBody>
       </p:sp>
@@ -10418,7 +10473,7 @@
             </a:pPr>
             <a:r>
               <a:rPr lang="en-US" sz="2800" dirty="0"/>
-              <a:t>Updated with the set (setter) function.</a:t>
+              <a:t>State fraction(s) updated with the set (setter) function(s).</a:t>
             </a:r>
             <a:endParaRPr lang="en-US" sz="2800" dirty="0">
               <a:cs typeface="Arial" panose="020B0604020202020204"/>
@@ -10443,7 +10498,29 @@
             </a:pPr>
             <a:r>
               <a:rPr lang="en-US" sz="2800" dirty="0"/>
-              <a:t>Props given to the Child component. Child component receiving the props and </a:t>
+              <a:t>Props given in Parent component JSX to the Child component. </a:t>
+            </a:r>
+          </a:p>
+          <a:p>
+            <a:pPr marL="215900" indent="-215900">
+              <a:lnSpc>
+                <a:spcPct val="100000"/>
+              </a:lnSpc>
+            </a:pPr>
+            <a:r>
+              <a:rPr lang="en-US" sz="2800" dirty="0"/>
+              <a:t>Child component receiving the props …</a:t>
+            </a:r>
+          </a:p>
+          <a:p>
+            <a:pPr marL="215900" indent="-215900">
+              <a:lnSpc>
+                <a:spcPct val="100000"/>
+              </a:lnSpc>
+            </a:pPr>
+            <a:r>
+              <a:rPr lang="en-US" sz="2800" dirty="0"/>
+              <a:t>… and </a:t>
             </a:r>
             <a:r>
               <a:rPr lang="en-US" sz="2800" dirty="0" err="1"/>
@@ -10459,7 +10536,7 @@
             </a:r>
             <a:r>
               <a:rPr lang="en-US" sz="2800" dirty="0"/>
-              <a:t> with the </a:t>
+              <a:t> (or straight in function parameter list) with the </a:t>
             </a:r>
             <a:r>
               <a:rPr lang="en-US" sz="2800" b="1" dirty="0" err="1"/>
@@ -10511,7 +10588,7 @@
           <a:p>
             <a:fld id="{11EDCD7B-6966-E249-89F2-D46BDFBF56BE}" type="datetime1">
               <a:rPr lang="fi-FI" smtClean="0"/>
-              <a:t>14.11.2023</a:t>
+              <a:t>11.3.2024</a:t>
             </a:fld>
             <a:endParaRPr lang="en-GB"/>
           </a:p>
@@ -10625,10 +10702,10 @@
           <a:lstStyle/>
           <a:p>
             <a:r>
-              <a:rPr lang="en-US"/>
-              <a:t>4. Rendering single and multiple components.</a:t>
-            </a:r>
-            <a:endParaRPr lang="fi-FI"/>
+              <a:rPr lang="en-US" dirty="0"/>
+              <a:t>4. Rendering single and multiple components</a:t>
+            </a:r>
+            <a:endParaRPr lang="fi-FI" dirty="0"/>
           </a:p>
         </p:txBody>
       </p:sp>
@@ -10674,7 +10751,7 @@
             </a:pPr>
             <a:r>
               <a:rPr lang="en-US" sz="2800" dirty="0"/>
-              <a:t>Return just single component, e.g. a list. If multiple components, wrap them into a React fragment, &lt;&gt; … &lt;/&gt;</a:t>
+              <a:t>Return just single component, e.g. a list. If multiple components, wrap them into a React fragment: &lt;&gt; … &lt;/&gt;</a:t>
             </a:r>
             <a:endParaRPr lang="en-US" sz="2800" dirty="0">
               <a:cs typeface="Arial" panose="020B0604020202020204"/>
@@ -10688,7 +10765,7 @@
             </a:pPr>
             <a:r>
               <a:rPr lang="en-US" sz="2800" dirty="0"/>
-              <a:t>With multiple components (map etc. list creation) remember to give the unique </a:t>
+              <a:t>With multiple components (map or other list creation) remember to give a truly unique and permanent </a:t>
             </a:r>
             <a:r>
               <a:rPr lang="en-US" sz="2800" b="1" dirty="0"/>
@@ -10696,9 +10773,20 @@
             </a:r>
             <a:r>
               <a:rPr lang="en-US" sz="2800" dirty="0"/>
-              <a:t> property, e.g. pick the id of the element as value for the key</a:t>
-            </a:r>
-            <a:endParaRPr lang="en-US" sz="2800" dirty="0">
+              <a:t> property, </a:t>
+            </a:r>
+          </a:p>
+          <a:p>
+            <a:pPr marL="719900" lvl="1" indent="-215900">
+              <a:lnSpc>
+                <a:spcPct val="100000"/>
+              </a:lnSpc>
+            </a:pPr>
+            <a:r>
+              <a:rPr lang="en-US" sz="2600" dirty="0"/>
+              <a:t>e.g. pick the id of the element as the value for the key</a:t>
+            </a:r>
+            <a:endParaRPr lang="en-US" sz="2600" dirty="0">
               <a:cs typeface="Arial"/>
             </a:endParaRPr>
           </a:p>
@@ -10736,7 +10824,7 @@
           <a:p>
             <a:fld id="{11EDCD7B-6966-E249-89F2-D46BDFBF56BE}" type="datetime1">
               <a:rPr lang="fi-FI" smtClean="0"/>
-              <a:t>14.11.2023</a:t>
+              <a:t>11.3.2024</a:t>
             </a:fld>
             <a:endParaRPr lang="en-GB"/>
           </a:p>
@@ -10887,7 +10975,7 @@
             </a:pPr>
             <a:r>
               <a:rPr lang="en-US" sz="2800" dirty="0"/>
-              <a:t>use only Material UI components to get the styles defined in the Theme. (=&gt; no HTML elements, p, span, if possible)</a:t>
+              <a:t>use only Material UI components to get the styles defined in the Theme. (=&gt; no HTML elements, p, span, if possible, in your JSX)</a:t>
             </a:r>
             <a:endParaRPr lang="en-US" sz="2800" dirty="0">
               <a:cs typeface="Arial"/>
@@ -10917,7 +11005,7 @@
               <a:rPr lang="en-US" sz="2600" dirty="0">
                 <a:cs typeface="Arial"/>
               </a:rPr>
-              <a:t>For some components you can specify which HTML element rendered</a:t>
+              <a:t>For some MUI-React components you can specify which HTML element will be rendered</a:t>
             </a:r>
           </a:p>
           <a:p>
@@ -10928,7 +11016,7 @@
             </a:pPr>
             <a:r>
               <a:rPr lang="en-US" sz="2800" dirty="0"/>
-              <a:t>(Start learning Mui React components from very simple examples of yours. Build gradually bigger.)</a:t>
+              <a:t>(Start learning Mui React components from very simple examples of yours. Build gradually bigger structures.)</a:t>
             </a:r>
             <a:endParaRPr lang="en-US" sz="2800" dirty="0">
               <a:cs typeface="Arial"/>
@@ -10959,7 +11047,7 @@
           <a:p>
             <a:fld id="{11EDCD7B-6966-E249-89F2-D46BDFBF56BE}" type="datetime1">
               <a:rPr lang="fi-FI" smtClean="0"/>
-              <a:t>14.11.2023</a:t>
+              <a:t>11.3.2024</a:t>
             </a:fld>
             <a:endParaRPr lang="en-GB"/>
           </a:p>
@@ -11073,10 +11161,10 @@
           <a:lstStyle/>
           <a:p>
             <a:r>
-              <a:rPr lang="en-US"/>
-              <a:t>6. Using the Material UI Theme.</a:t>
-            </a:r>
-            <a:endParaRPr lang="fi-FI"/>
+              <a:rPr lang="en-US" dirty="0"/>
+              <a:t>6. Using the Material UI Theme</a:t>
+            </a:r>
+            <a:endParaRPr lang="fi-FI" dirty="0"/>
           </a:p>
         </p:txBody>
       </p:sp>
@@ -11135,7 +11223,7 @@
             </a:pPr>
             <a:r>
               <a:rPr lang="en-US" sz="2800" dirty="0"/>
-              <a:t>Wrap the whole application inside </a:t>
+              <a:t>Wrap the whole application root inside </a:t>
             </a:r>
             <a:r>
               <a:rPr lang="en-US" sz="2800" b="1" dirty="0" err="1"/>
@@ -11143,7 +11231,7 @@
             </a:r>
             <a:r>
               <a:rPr lang="en-US" sz="2800" dirty="0"/>
-              <a:t>. That already gives Material UI components their styles.</a:t>
+              <a:t>. That already gives Material UI components their default styles.</a:t>
             </a:r>
             <a:endParaRPr lang="en-US" sz="2800" dirty="0">
               <a:cs typeface="Arial"/>
@@ -11165,7 +11253,7 @@
             </a:r>
             <a:r>
               <a:rPr lang="en-US" sz="2800" dirty="0"/>
-              <a:t> use Material UI components. Then you’ll get the theme styles automatically.</a:t>
+              <a:t> use Material UI components. Then you’ll get the theme styles automatically after theme defined.</a:t>
             </a:r>
             <a:endParaRPr lang="en-US" sz="2800" dirty="0">
               <a:cs typeface="Arial" panose="020B0604020202020204"/>
@@ -11198,11 +11286,11 @@
             </a:r>
             <a:r>
               <a:rPr lang="en-US" sz="2800" b="1" dirty="0"/>
-              <a:t> colors or styles</a:t>
+              <a:t> colors, sizes or styles</a:t>
             </a:r>
             <a:r>
               <a:rPr lang="en-US" sz="2800" dirty="0"/>
-              <a:t> from the theme, use </a:t>
+              <a:t> from the theme, use the </a:t>
             </a:r>
             <a:r>
               <a:rPr lang="en-US" sz="2800" b="1" dirty="0" err="1"/>
@@ -11241,7 +11329,7 @@
           <a:p>
             <a:fld id="{11EDCD7B-6966-E249-89F2-D46BDFBF56BE}" type="datetime1">
               <a:rPr lang="fi-FI" smtClean="0"/>
-              <a:t>14.11.2023</a:t>
+              <a:t>11.3.2024</a:t>
             </a:fld>
             <a:endParaRPr lang="en-GB"/>
           </a:p>
@@ -11415,7 +11503,7 @@
               <a:rPr lang="en-US" sz="2800" dirty="0">
                 <a:cs typeface="Arial"/>
               </a:rPr>
-              <a:t>Make your whole project follow the theme styles and ensure that by flipping all colors to some red tints, and then to yellow tints. </a:t>
+              <a:t>Make your whole project follow the theme styles.</a:t>
             </a:r>
           </a:p>
           <a:p>
@@ -11428,7 +11516,20 @@
               <a:rPr lang="en-US" sz="2800" dirty="0">
                 <a:cs typeface="Arial"/>
               </a:rPr>
-              <a:t>If something did not go red (later yellow) you have hard-coded parts</a:t>
+              <a:t>Ensure that by flipping all colors to some all red tint palette, to all yellow tint palette, and back to your normal color palette. </a:t>
+            </a:r>
+          </a:p>
+          <a:p>
+            <a:pPr marL="215900" indent="-215900">
+              <a:lnSpc>
+                <a:spcPct val="100000"/>
+              </a:lnSpc>
+            </a:pPr>
+            <a:r>
+              <a:rPr lang="en-US" sz="2800" dirty="0">
+                <a:cs typeface="Arial"/>
+              </a:rPr>
+              <a:t>If something did not go red (later yellow) you have hard-coded colors in your project!</a:t>
             </a:r>
           </a:p>
           <a:p>
@@ -11451,7 +11552,7 @@
               <a:rPr lang="en-US" sz="2800" dirty="0">
                 <a:cs typeface="Arial"/>
               </a:rPr>
-              <a:t>Similarly you can use some funny distinctive font from the theme and what is not funny, is hard-coded.</a:t>
+              <a:t>Similarly, you can use some funny distinctive broken font from the theme and what is not looking funny, is hard-coded.</a:t>
             </a:r>
           </a:p>
         </p:txBody>
@@ -11479,7 +11580,7 @@
           <a:p>
             <a:fld id="{11EDCD7B-6966-E249-89F2-D46BDFBF56BE}" type="datetime1">
               <a:rPr lang="fi-FI" smtClean="0"/>
-              <a:t>14.11.2023</a:t>
+              <a:t>11.3.2024</a:t>
             </a:fld>
             <a:endParaRPr lang="en-GB"/>
           </a:p>
@@ -11602,7 +11703,7 @@
             </a:r>
             <a:r>
               <a:rPr lang="en-US" dirty="0"/>
-              <a:t> /&gt; Browser styles reset to Mui’s style</a:t>
+              <a:t> /&gt; - Browser styles reset to Mui’s own basic styles</a:t>
             </a:r>
             <a:endParaRPr lang="en-US" dirty="0">
               <a:cs typeface="Arial"/>
@@ -11642,9 +11743,8 @@
               <a:rPr lang="en-US" sz="2800" dirty="0">
                 <a:cs typeface="Arial"/>
               </a:rPr>
-              <a:t>The idea is to reset all style differences between different browsers.</a:t>
-            </a:r>
-            <a:endParaRPr lang="en-US" dirty="0"/>
+              <a:t>This component is inserted to the root component of the React-Mui app as well</a:t>
+            </a:r>
           </a:p>
           <a:p>
             <a:pPr marL="215900" indent="-215900">
@@ -11656,6 +11756,20 @@
               <a:rPr lang="en-US" sz="2800" dirty="0">
                 <a:cs typeface="Arial"/>
               </a:rPr>
+              <a:t>The idea is to reset all style differences between different browsers</a:t>
+            </a:r>
+            <a:endParaRPr lang="en-US" dirty="0"/>
+          </a:p>
+          <a:p>
+            <a:pPr marL="215900" indent="-215900">
+              <a:lnSpc>
+                <a:spcPct val="100000"/>
+              </a:lnSpc>
+            </a:pPr>
+            <a:r>
+              <a:rPr lang="en-US" sz="2800" dirty="0">
+                <a:cs typeface="Arial"/>
+              </a:rPr>
               <a:t>Gives an explicit style setting for everything and thus </a:t>
             </a:r>
             <a:endParaRPr lang="en-US" dirty="0">
@@ -11713,7 +11827,7 @@
           <a:p>
             <a:fld id="{11EDCD7B-6966-E249-89F2-D46BDFBF56BE}" type="datetime1">
               <a:rPr lang="fi-FI" smtClean="0"/>
-              <a:t>14.11.2023</a:t>
+              <a:t>11.3.2024</a:t>
             </a:fld>
             <a:endParaRPr lang="en-GB"/>
           </a:p>
@@ -11900,7 +12014,7 @@
             </a:pPr>
             <a:r>
               <a:rPr lang="en-US" sz="2800" dirty="0"/>
-              <a:t>Special case: Parent will pass ‘event handler function’ (parent state’s set function) to the child component(s) in props so that child/children can execute it and thus e.g. ‘write’ to parent's state.</a:t>
+              <a:t>Special case: Parent will pass ‘event-handler function’ (parent state’s set function) to the child component(s) in props so that child/children can execute it and thus kind of ‘write’ to parent's state.</a:t>
             </a:r>
           </a:p>
         </p:txBody>
@@ -11928,7 +12042,7 @@
           <a:p>
             <a:fld id="{11EDCD7B-6966-E249-89F2-D46BDFBF56BE}" type="datetime1">
               <a:rPr lang="fi-FI" smtClean="0"/>
-              <a:t>14.11.2023</a:t>
+              <a:t>11.3.2024</a:t>
             </a:fld>
             <a:endParaRPr lang="en-GB"/>
           </a:p>
@@ -12558,15 +12672,6 @@
 </file>
 
 <file path=customXml/item1.xml><?xml version="1.0" encoding="utf-8"?>
-<?mso-contentType ?>
-<FormTemplates xmlns="http://schemas.microsoft.com/sharepoint/v3/contenttype/forms">
-  <Display>DocumentLibraryForm</Display>
-  <Edit>DocumentLibraryForm</Edit>
-  <New>DocumentLibraryForm</New>
-</FormTemplates>
-</file>
-
-<file path=customXml/item2.xml><?xml version="1.0" encoding="utf-8"?>
 <ct:contentTypeSchema xmlns:ct="http://schemas.microsoft.com/office/2006/metadata/contentType" xmlns:ma="http://schemas.microsoft.com/office/2006/metadata/properties/metaAttributes" ct:_="" ma:_="" ma:contentTypeName="Asiakirja" ma:contentTypeID="0x0101000ADF884DD0861243B829456B91D71C32" ma:contentTypeVersion="13" ma:contentTypeDescription="Luo uusi asiakirja." ma:contentTypeScope="" ma:versionID="314522af3e545be07820a3e09ada0045">
   <xsd:schema xmlns:xsd="http://www.w3.org/2001/XMLSchema" xmlns:xs="http://www.w3.org/2001/XMLSchema" xmlns:p="http://schemas.microsoft.com/office/2006/metadata/properties" xmlns:ns2="8438dade-b61d-47d7-ab56-0bbf57e3795f" xmlns:ns3="0b3f8f6d-dc8d-4076-ae37-9bbd8f8c2dbf" targetNamespace="http://schemas.microsoft.com/office/2006/metadata/properties" ma:root="true" ma:fieldsID="1bc2462d560d8dfa6d4fd7061c558562" ns2:_="" ns3:_="">
     <xsd:import namespace="8438dade-b61d-47d7-ab56-0bbf57e3795f"/>
@@ -12789,6 +12894,15 @@
 </ct:contentTypeSchema>
 </file>
 
+<file path=customXml/item2.xml><?xml version="1.0" encoding="utf-8"?>
+<?mso-contentType ?>
+<FormTemplates xmlns="http://schemas.microsoft.com/sharepoint/v3/contenttype/forms">
+  <Display>DocumentLibraryForm</Display>
+  <Edit>DocumentLibraryForm</Edit>
+  <New>DocumentLibraryForm</New>
+</FormTemplates>
+</file>
+
 <file path=customXml/item3.xml><?xml version="1.0" encoding="utf-8"?>
 <p:properties xmlns:p="http://schemas.microsoft.com/office/2006/metadata/properties" xmlns:xsi="http://www.w3.org/2001/XMLSchema-instance" xmlns:pc="http://schemas.microsoft.com/office/infopath/2007/PartnerControls">
   <documentManagement>
@@ -12813,14 +12927,6 @@
 </file>
 
 <file path=customXml/itemProps1.xml><?xml version="1.0" encoding="utf-8"?>
-<ds:datastoreItem xmlns:ds="http://schemas.openxmlformats.org/officeDocument/2006/customXml" ds:itemID="{D546C03B-CD3A-4EA0-AAA4-0E00E896454E}">
-  <ds:schemaRefs>
-    <ds:schemaRef ds:uri="http://schemas.microsoft.com/sharepoint/v3/contenttype/forms"/>
-  </ds:schemaRefs>
-</ds:datastoreItem>
-</file>
-
-<file path=customXml/itemProps2.xml><?xml version="1.0" encoding="utf-8"?>
 <ds:datastoreItem xmlns:ds="http://schemas.openxmlformats.org/officeDocument/2006/customXml" ds:itemID="{3D8B6CA5-4463-44E3-A138-AB79431CCE9A}">
   <ds:schemaRefs>
     <ds:schemaRef ds:uri="http://schemas.microsoft.com/office/2006/metadata/contentType"/>
@@ -12835,6 +12941,14 @@
     <ds:schemaRef ds:uri="http://purl.org/dc/elements/1.1/"/>
     <ds:schemaRef ds:uri="http://purl.org/dc/terms/"/>
     <ds:schemaRef ds:uri="http://schemas.microsoft.com/internal/obd"/>
+  </ds:schemaRefs>
+</ds:datastoreItem>
+</file>
+
+<file path=customXml/itemProps2.xml><?xml version="1.0" encoding="utf-8"?>
+<ds:datastoreItem xmlns:ds="http://schemas.openxmlformats.org/officeDocument/2006/customXml" ds:itemID="{D546C03B-CD3A-4EA0-AAA4-0E00E896454E}">
+  <ds:schemaRefs>
+    <ds:schemaRef ds:uri="http://schemas.microsoft.com/sharepoint/v3/contenttype/forms"/>
   </ds:schemaRefs>
 </ds:datastoreItem>
 </file>

</xml_diff>

<commit_message>
Polishing Frontend learning material even more
</commit_message>
<xml_diff>
--- a/05_frontend/Frontend_VideoTopics.pptx
+++ b/05_frontend/Frontend_VideoTopics.pptx
@@ -5,25 +5,26 @@
     <p:sldMasterId id="2147483648" r:id="rId4"/>
   </p:sldMasterIdLst>
   <p:notesMasterIdLst>
-    <p:notesMasterId r:id="rId21"/>
+    <p:notesMasterId r:id="rId22"/>
   </p:notesMasterIdLst>
   <p:sldIdLst>
-    <p:sldId id="259" r:id="rId5"/>
-    <p:sldId id="260" r:id="rId6"/>
-    <p:sldId id="261" r:id="rId7"/>
-    <p:sldId id="262" r:id="rId8"/>
-    <p:sldId id="263" r:id="rId9"/>
-    <p:sldId id="264" r:id="rId10"/>
-    <p:sldId id="274" r:id="rId11"/>
-    <p:sldId id="265" r:id="rId12"/>
-    <p:sldId id="273" r:id="rId13"/>
-    <p:sldId id="267" r:id="rId14"/>
-    <p:sldId id="266" r:id="rId15"/>
-    <p:sldId id="268" r:id="rId16"/>
-    <p:sldId id="269" r:id="rId17"/>
-    <p:sldId id="272" r:id="rId18"/>
-    <p:sldId id="270" r:id="rId19"/>
-    <p:sldId id="258" r:id="rId20"/>
+    <p:sldId id="276" r:id="rId5"/>
+    <p:sldId id="259" r:id="rId6"/>
+    <p:sldId id="260" r:id="rId7"/>
+    <p:sldId id="261" r:id="rId8"/>
+    <p:sldId id="262" r:id="rId9"/>
+    <p:sldId id="263" r:id="rId10"/>
+    <p:sldId id="264" r:id="rId11"/>
+    <p:sldId id="274" r:id="rId12"/>
+    <p:sldId id="265" r:id="rId13"/>
+    <p:sldId id="273" r:id="rId14"/>
+    <p:sldId id="267" r:id="rId15"/>
+    <p:sldId id="266" r:id="rId16"/>
+    <p:sldId id="268" r:id="rId17"/>
+    <p:sldId id="269" r:id="rId18"/>
+    <p:sldId id="272" r:id="rId19"/>
+    <p:sldId id="270" r:id="rId20"/>
+    <p:sldId id="258" r:id="rId21"/>
   </p:sldIdLst>
   <p:sldSz cx="12192000" cy="6858000"/>
   <p:notesSz cx="6858000" cy="9144000"/>
@@ -6890,7 +6891,7 @@
           <p:cNvPr id="2" name="Title 1">
             <a:extLst>
               <a:ext uri="{FF2B5EF4-FFF2-40B4-BE49-F238E27FC236}">
-                <a16:creationId xmlns:a16="http://schemas.microsoft.com/office/drawing/2014/main" id="{F9662D29-990E-426E-BC0E-093CB48EE792}"/>
+                <a16:creationId xmlns:a16="http://schemas.microsoft.com/office/drawing/2014/main" id="{B9409741-BB63-690C-2C50-013C4D7EEF17}"/>
               </a:ext>
             </a:extLst>
           </p:cNvPr>
@@ -6901,497 +6902,103 @@
             <p:ph type="title"/>
           </p:nvPr>
         </p:nvSpPr>
-        <p:spPr/>
-        <p:txBody>
-          <a:bodyPr anchor="ctr">
+        <p:spPr>
+          <a:xfrm>
+            <a:off x="1024392" y="1943100"/>
+            <a:ext cx="10397444" cy="4065813"/>
+          </a:xfrm>
+        </p:spPr>
+        <p:txBody>
+          <a:bodyPr>
             <a:normAutofit/>
           </a:bodyPr>
           <a:lstStyle/>
           <a:p>
             <a:r>
-              <a:rPr lang="en-US" sz="4800" dirty="0"/>
-              <a:t>1. React and JSX basic syntax - phase</a:t>
+              <a:rPr lang="fi-FI" sz="8800" dirty="0" err="1"/>
+              <a:t>Frontend</a:t>
+            </a:r>
+            <a:r>
+              <a:rPr lang="fi-FI" sz="8800" dirty="0"/>
+              <a:t> Learning </a:t>
             </a:r>
             <a:br>
-              <a:rPr lang="en-US" sz="4800" dirty="0"/>
+              <a:rPr lang="fi-FI" dirty="0"/>
             </a:br>
-            <a:endParaRPr lang="en-US" sz="1800" dirty="0">
-              <a:solidFill>
-                <a:srgbClr val="FF0000"/>
-              </a:solidFill>
-              <a:cs typeface="Arial"/>
-            </a:endParaRPr>
-          </a:p>
-        </p:txBody>
-      </p:sp>
-      <p:sp>
-        <p:nvSpPr>
-          <p:cNvPr id="3" name="Content Placeholder 2">
-            <a:extLst>
-              <a:ext uri="{FF2B5EF4-FFF2-40B4-BE49-F238E27FC236}">
-                <a16:creationId xmlns:a16="http://schemas.microsoft.com/office/drawing/2014/main" id="{001C1C76-B4E0-405B-8F87-AC2E22AA7225}"/>
-              </a:ext>
-            </a:extLst>
-          </p:cNvPr>
-          <p:cNvSpPr>
-            <a:spLocks noGrp="1"/>
-          </p:cNvSpPr>
-          <p:nvPr>
-            <p:ph sz="half" idx="2"/>
-          </p:nvPr>
-        </p:nvSpPr>
-        <p:spPr>
-          <a:xfrm>
-            <a:off x="550864" y="1432429"/>
-            <a:ext cx="11125198" cy="4481009"/>
-          </a:xfrm>
-        </p:spPr>
-        <p:txBody>
-          <a:bodyPr vert="horz" lIns="0" tIns="0" rIns="0" bIns="36000" numCol="1" spcCol="360000" rtlCol="0" anchor="t">
-            <a:normAutofit lnSpcReduction="10000"/>
-          </a:bodyPr>
-          <a:lstStyle/>
-          <a:p>
-            <a:pPr marL="215900" indent="-215900">
-              <a:lnSpc>
-                <a:spcPct val="100000"/>
-              </a:lnSpc>
-            </a:pPr>
-            <a:r>
-              <a:rPr lang="en-US" sz="2800" dirty="0"/>
-              <a:t>Finally output to browser DOM will be </a:t>
-            </a:r>
-            <a:r>
-              <a:rPr lang="en-US" sz="2800" b="1" dirty="0"/>
-              <a:t>HTML with DOM JavaScript</a:t>
-            </a:r>
-            <a:endParaRPr lang="fi-FI" sz="2800" b="1" dirty="0"/>
-          </a:p>
-          <a:p>
-            <a:pPr marL="719455" lvl="1" indent="-215900">
-              <a:lnSpc>
-                <a:spcPct val="100000"/>
-              </a:lnSpc>
-            </a:pPr>
-            <a:r>
-              <a:rPr lang="fi-FI" sz="2000" dirty="0" err="1">
-                <a:cs typeface="Arial" panose="020B0604020202020204"/>
-              </a:rPr>
-              <a:t>e.g</a:t>
-            </a:r>
-            <a:r>
-              <a:rPr lang="fi-FI" sz="2000" dirty="0">
-                <a:cs typeface="Arial" panose="020B0604020202020204"/>
-              </a:rPr>
-              <a:t>.   &lt;</a:t>
-            </a:r>
-            <a:r>
-              <a:rPr lang="fi-FI" sz="2000" b="1" dirty="0">
-                <a:cs typeface="Arial" panose="020B0604020202020204"/>
-              </a:rPr>
-              <a:t>i</a:t>
-            </a:r>
-            <a:r>
-              <a:rPr lang="fi-FI" sz="2000" dirty="0">
-                <a:cs typeface="Arial" panose="020B0604020202020204"/>
-              </a:rPr>
-              <a:t>nput </a:t>
-            </a:r>
-            <a:r>
-              <a:rPr lang="fi-FI" sz="2000" dirty="0" err="1">
-                <a:cs typeface="Arial" panose="020B0604020202020204"/>
-              </a:rPr>
-              <a:t>type</a:t>
-            </a:r>
-            <a:r>
-              <a:rPr lang="fi-FI" sz="2000" dirty="0">
-                <a:cs typeface="Arial" panose="020B0604020202020204"/>
-              </a:rPr>
-              <a:t>="</a:t>
-            </a:r>
-            <a:r>
-              <a:rPr lang="fi-FI" sz="2000" dirty="0" err="1">
-                <a:cs typeface="Arial" panose="020B0604020202020204"/>
-              </a:rPr>
-              <a:t>submit</a:t>
-            </a:r>
-            <a:r>
-              <a:rPr lang="fi-FI" sz="2000" dirty="0">
-                <a:cs typeface="Arial" panose="020B0604020202020204"/>
-              </a:rPr>
-              <a:t>" </a:t>
-            </a:r>
-            <a:r>
-              <a:rPr lang="fi-FI" sz="2000" dirty="0" err="1">
-                <a:cs typeface="Arial" panose="020B0604020202020204"/>
-              </a:rPr>
-              <a:t>onclick</a:t>
-            </a:r>
-            <a:r>
-              <a:rPr lang="fi-FI" sz="2000" dirty="0">
-                <a:cs typeface="Arial" panose="020B0604020202020204"/>
-              </a:rPr>
-              <a:t>="</a:t>
-            </a:r>
-            <a:r>
-              <a:rPr lang="fi-FI" sz="2000" dirty="0" err="1">
-                <a:cs typeface="Arial" panose="020B0604020202020204"/>
-              </a:rPr>
-              <a:t>myFunc</a:t>
-            </a:r>
-            <a:r>
-              <a:rPr lang="fi-FI" sz="2000" dirty="0">
-                <a:cs typeface="Arial" panose="020B0604020202020204"/>
-              </a:rPr>
-              <a:t>()</a:t>
-            </a:r>
-            <a:r>
-              <a:rPr lang="fi-FI" sz="2000" b="1" dirty="0">
-                <a:cs typeface="Arial" panose="020B0604020202020204"/>
-              </a:rPr>
-              <a:t>;</a:t>
-            </a:r>
-            <a:r>
-              <a:rPr lang="fi-FI" sz="2000" dirty="0">
-                <a:cs typeface="Arial" panose="020B0604020202020204"/>
-              </a:rPr>
-              <a:t>" </a:t>
-            </a:r>
-            <a:r>
-              <a:rPr lang="fi-FI" sz="2000" dirty="0" err="1">
-                <a:cs typeface="Arial" panose="020B0604020202020204"/>
-              </a:rPr>
-              <a:t>class</a:t>
-            </a:r>
-            <a:r>
-              <a:rPr lang="fi-FI" sz="2000" dirty="0">
-                <a:cs typeface="Arial" panose="020B0604020202020204"/>
-              </a:rPr>
-              <a:t>="style1" &gt;</a:t>
-            </a:r>
-            <a:r>
-              <a:rPr lang="fi-FI" sz="2000" dirty="0" err="1">
-                <a:cs typeface="Arial" panose="020B0604020202020204"/>
-              </a:rPr>
-              <a:t>Delete</a:t>
-            </a:r>
-            <a:r>
-              <a:rPr lang="fi-FI" sz="2000" dirty="0">
-                <a:cs typeface="Arial" panose="020B0604020202020204"/>
-              </a:rPr>
+            <a:br>
+              <a:rPr lang="fi-FI" dirty="0"/>
+            </a:br>
+            <a:r>
+              <a:rPr lang="fi-FI" dirty="0"/>
+              <a:t>	for </a:t>
+            </a:r>
+            <a:r>
+              <a:rPr lang="fi-FI" dirty="0" err="1"/>
+              <a:t>building</a:t>
+            </a:r>
+            <a:r>
+              <a:rPr lang="fi-FI" dirty="0"/>
+              <a:t> a </a:t>
+            </a:r>
+            <a:r>
+              <a:rPr lang="fi-FI" dirty="0" err="1"/>
+              <a:t>React</a:t>
+            </a:r>
+            <a:r>
+              <a:rPr lang="fi-FI" dirty="0"/>
+              <a:t> – </a:t>
+            </a:r>
+            <a:r>
+              <a:rPr lang="fi-FI" dirty="0" err="1"/>
+              <a:t>Material</a:t>
+            </a:r>
+            <a:r>
+              <a:rPr lang="fi-FI" dirty="0"/>
+              <a:t> UI </a:t>
+            </a:r>
+            <a:r>
+              <a:rPr lang="fi-FI" dirty="0" err="1"/>
+              <a:t>Frontend</a:t>
+            </a:r>
+            <a:r>
+              <a:rPr lang="fi-FI" dirty="0"/>
+              <a:t>, </a:t>
+            </a:r>
+            <a:br>
+              <a:rPr lang="fi-FI" dirty="0"/>
+            </a:br>
+            <a:r>
+              <a:rPr lang="fi-FI" dirty="0" err="1"/>
+              <a:t>or</a:t>
+            </a:r>
+            <a:br>
+              <a:rPr lang="fi-FI" dirty="0"/>
+            </a:br>
+            <a:r>
+              <a:rPr lang="fi-FI" dirty="0"/>
+              <a:t>	e.g. a </a:t>
+            </a:r>
+            <a:r>
+              <a:rPr lang="fi-FI" dirty="0" err="1"/>
+              <a:t>Frontend</a:t>
+            </a:r>
+            <a:r>
+              <a:rPr lang="fi-FI" dirty="0"/>
               <a:t> </a:t>
             </a:r>
             <a:r>
-              <a:rPr lang="fi-FI" sz="2000" dirty="0" err="1">
-                <a:cs typeface="Arial" panose="020B0604020202020204"/>
-              </a:rPr>
-              <a:t>item</a:t>
-            </a:r>
-            <a:r>
-              <a:rPr lang="fi-FI" sz="2000" dirty="0">
-                <a:cs typeface="Arial" panose="020B0604020202020204"/>
-              </a:rPr>
-              <a:t> 101&lt;/...</a:t>
-            </a:r>
-          </a:p>
-          <a:p>
-            <a:pPr marL="215900" indent="-215900">
-              <a:lnSpc>
-                <a:spcPct val="100000"/>
-              </a:lnSpc>
-            </a:pPr>
-            <a:r>
-              <a:rPr lang="en-US" sz="2800" dirty="0"/>
-              <a:t>Before that, </a:t>
-            </a:r>
-            <a:r>
-              <a:rPr lang="en-US" sz="2800" b="1" dirty="0"/>
-              <a:t>React components </a:t>
-            </a:r>
-            <a:r>
-              <a:rPr lang="en-US" sz="2800" dirty="0"/>
-              <a:t>(Possibly w. Mui-React components) to be rendered as HTML </a:t>
-            </a:r>
-            <a:r>
-              <a:rPr lang="en-US" sz="2800" dirty="0" err="1"/>
-              <a:t>etc</a:t>
-            </a:r>
-            <a:r>
-              <a:rPr lang="en-US" sz="2800" dirty="0"/>
-              <a:t> based on e.g. attribute values</a:t>
-            </a:r>
-            <a:endParaRPr lang="fi-FI" sz="2800" dirty="0">
-              <a:cs typeface="Arial" panose="020B0604020202020204"/>
-            </a:endParaRPr>
-          </a:p>
-          <a:p>
-            <a:pPr marL="719455" lvl="1" indent="-215900">
-              <a:lnSpc>
-                <a:spcPct val="100000"/>
-              </a:lnSpc>
-            </a:pPr>
-            <a:r>
-              <a:rPr lang="en-US" sz="1800" dirty="0">
-                <a:cs typeface="Arial"/>
-              </a:rPr>
-              <a:t>e.g.   &lt;</a:t>
-            </a:r>
-            <a:r>
-              <a:rPr lang="en-US" sz="1800" b="1" dirty="0">
-                <a:cs typeface="Arial"/>
-              </a:rPr>
-              <a:t>B</a:t>
-            </a:r>
-            <a:r>
-              <a:rPr lang="en-US" sz="1800" dirty="0">
-                <a:cs typeface="Arial"/>
-              </a:rPr>
-              <a:t>utton </a:t>
-            </a:r>
-            <a:r>
-              <a:rPr lang="en-US" sz="1800" dirty="0" err="1">
-                <a:cs typeface="Arial"/>
-              </a:rPr>
-              <a:t>on</a:t>
-            </a:r>
-            <a:r>
-              <a:rPr lang="en-US" sz="1800" b="1" dirty="0" err="1">
-                <a:cs typeface="Arial"/>
-              </a:rPr>
-              <a:t>C</a:t>
-            </a:r>
-            <a:r>
-              <a:rPr lang="en-US" sz="1800" dirty="0" err="1">
-                <a:cs typeface="Arial"/>
-              </a:rPr>
-              <a:t>lick</a:t>
-            </a:r>
-            <a:r>
-              <a:rPr lang="en-US" sz="1800" dirty="0">
-                <a:cs typeface="Arial"/>
-              </a:rPr>
-              <a:t>={()</a:t>
-            </a:r>
-            <a:r>
-              <a:rPr lang="en-US" sz="1800" b="1" dirty="0">
-                <a:cs typeface="Arial"/>
-              </a:rPr>
-              <a:t>=&gt;</a:t>
-            </a:r>
-            <a:r>
-              <a:rPr lang="en-US" sz="1800" dirty="0" err="1">
-                <a:cs typeface="Arial"/>
-              </a:rPr>
-              <a:t>myFunc</a:t>
-            </a:r>
-            <a:r>
-              <a:rPr lang="en-US" sz="1800" dirty="0">
-                <a:cs typeface="Arial"/>
-              </a:rPr>
-              <a:t>()} </a:t>
-            </a:r>
-            <a:r>
-              <a:rPr lang="en-US" sz="1800" dirty="0" err="1">
-                <a:cs typeface="Arial"/>
-              </a:rPr>
-              <a:t>classNames</a:t>
-            </a:r>
-            <a:r>
-              <a:rPr lang="en-US" sz="1800" dirty="0">
-                <a:cs typeface="Arial"/>
-              </a:rPr>
-              <a:t>= &gt;Delete item 101&lt;/...&gt;</a:t>
-            </a:r>
-          </a:p>
-          <a:p>
-            <a:pPr marL="215900" indent="-215900">
-              <a:lnSpc>
-                <a:spcPct val="100000"/>
-              </a:lnSpc>
-            </a:pPr>
-            <a:r>
-              <a:rPr lang="en-US" sz="2800" dirty="0"/>
-              <a:t>Before that we might have </a:t>
-            </a:r>
-            <a:r>
-              <a:rPr lang="en-US" sz="2800" b="1" dirty="0"/>
-              <a:t>JavaScript run </a:t>
-            </a:r>
-            <a:r>
-              <a:rPr lang="en-US" sz="2800" dirty="0"/>
-              <a:t>so that dynamic values are evaluated, e.g. {item.id}.</a:t>
-            </a:r>
-            <a:endParaRPr lang="fi-FI" sz="2800" dirty="0">
-              <a:cs typeface="Arial" panose="020B0604020202020204"/>
-            </a:endParaRPr>
-          </a:p>
-          <a:p>
-            <a:pPr marL="719455" lvl="1" indent="-215900">
-              <a:lnSpc>
-                <a:spcPct val="100000"/>
-              </a:lnSpc>
-            </a:pPr>
-            <a:r>
-              <a:rPr lang="en-US" sz="2600" dirty="0">
-                <a:ea typeface="+mn-lt"/>
-                <a:cs typeface="+mn-lt"/>
-              </a:rPr>
-              <a:t>e.g.   &lt;Button </a:t>
-            </a:r>
-            <a:r>
-              <a:rPr lang="en-US" sz="2600" dirty="0" err="1">
-                <a:ea typeface="+mn-lt"/>
-                <a:cs typeface="+mn-lt"/>
-              </a:rPr>
-              <a:t>onClick</a:t>
-            </a:r>
-            <a:r>
-              <a:rPr lang="en-US" sz="2600" dirty="0">
-                <a:ea typeface="+mn-lt"/>
-                <a:cs typeface="+mn-lt"/>
-              </a:rPr>
-              <a:t>=</a:t>
-            </a:r>
-            <a:r>
-              <a:rPr lang="en-US" sz="2600" b="1" dirty="0">
-                <a:ea typeface="+mn-lt"/>
-                <a:cs typeface="+mn-lt"/>
-              </a:rPr>
-              <a:t>{</a:t>
-            </a:r>
-            <a:r>
-              <a:rPr lang="en-US" sz="2600" dirty="0">
-                <a:ea typeface="+mn-lt"/>
-                <a:cs typeface="+mn-lt"/>
-              </a:rPr>
-              <a:t>()=&gt;</a:t>
-            </a:r>
-            <a:r>
-              <a:rPr lang="en-US" sz="2600" dirty="0" err="1">
-                <a:ea typeface="+mn-lt"/>
-                <a:cs typeface="+mn-lt"/>
-              </a:rPr>
-              <a:t>myFunc</a:t>
-            </a:r>
-            <a:r>
-              <a:rPr lang="en-US" sz="2600" dirty="0">
-                <a:ea typeface="+mn-lt"/>
-                <a:cs typeface="+mn-lt"/>
-              </a:rPr>
-              <a:t>()</a:t>
-            </a:r>
-            <a:r>
-              <a:rPr lang="en-US" sz="2600" b="1" dirty="0">
-                <a:ea typeface="+mn-lt"/>
-                <a:cs typeface="+mn-lt"/>
-              </a:rPr>
-              <a:t>}</a:t>
-            </a:r>
-            <a:r>
-              <a:rPr lang="en-US" sz="2600" dirty="0">
-                <a:ea typeface="+mn-lt"/>
-                <a:cs typeface="+mn-lt"/>
-              </a:rPr>
-              <a:t> &gt;Delete item </a:t>
-            </a:r>
-            <a:r>
-              <a:rPr lang="en-US" sz="2600" b="1" dirty="0">
-                <a:ea typeface="+mn-lt"/>
-                <a:cs typeface="+mn-lt"/>
-              </a:rPr>
-              <a:t>{</a:t>
-            </a:r>
-            <a:r>
-              <a:rPr lang="en-US" sz="2600" dirty="0">
-                <a:ea typeface="+mn-lt"/>
-                <a:cs typeface="+mn-lt"/>
-              </a:rPr>
-              <a:t>item.id</a:t>
-            </a:r>
-            <a:r>
-              <a:rPr lang="en-US" sz="2600" b="1" dirty="0">
-                <a:ea typeface="+mn-lt"/>
-                <a:cs typeface="+mn-lt"/>
-              </a:rPr>
-              <a:t>}</a:t>
-            </a:r>
-            <a:r>
-              <a:rPr lang="en-US" sz="2600" dirty="0">
-                <a:ea typeface="+mn-lt"/>
-                <a:cs typeface="+mn-lt"/>
-              </a:rPr>
-              <a:t>&lt;/...&gt;</a:t>
-            </a:r>
-          </a:p>
-          <a:p>
-            <a:pPr marL="215455" indent="-215900">
-              <a:lnSpc>
-                <a:spcPct val="100000"/>
-              </a:lnSpc>
-            </a:pPr>
-            <a:r>
-              <a:rPr lang="en-US" sz="2800" dirty="0">
-                <a:ea typeface="+mn-lt"/>
-                <a:cs typeface="+mn-lt"/>
-              </a:rPr>
-              <a:t>Before that we might </a:t>
-            </a:r>
-            <a:r>
-              <a:rPr lang="en-US" sz="2800" b="1" dirty="0">
-                <a:ea typeface="+mn-lt"/>
-                <a:cs typeface="+mn-lt"/>
-              </a:rPr>
-              <a:t>write</a:t>
-            </a:r>
-            <a:r>
-              <a:rPr lang="en-US" sz="2800" dirty="0">
-                <a:ea typeface="+mn-lt"/>
-                <a:cs typeface="+mn-lt"/>
-              </a:rPr>
-              <a:t> things in </a:t>
-            </a:r>
-            <a:r>
-              <a:rPr lang="en-US" sz="2800" b="1" dirty="0">
-                <a:ea typeface="+mn-lt"/>
-                <a:cs typeface="+mn-lt"/>
-              </a:rPr>
-              <a:t>TypeScript</a:t>
-            </a:r>
-            <a:r>
-              <a:rPr lang="en-US" sz="2800" dirty="0">
-                <a:ea typeface="+mn-lt"/>
-                <a:cs typeface="+mn-lt"/>
-              </a:rPr>
-              <a:t>, </a:t>
-            </a:r>
-            <a:r>
-              <a:rPr lang="en-US" sz="2800" dirty="0" err="1">
-                <a:ea typeface="+mn-lt"/>
-                <a:cs typeface="+mn-lt"/>
-              </a:rPr>
-              <a:t>tsc</a:t>
-            </a:r>
-            <a:r>
-              <a:rPr lang="en-US" sz="2800" dirty="0">
-                <a:ea typeface="+mn-lt"/>
-                <a:cs typeface="+mn-lt"/>
-              </a:rPr>
-              <a:t>-compiled to JS</a:t>
-            </a:r>
-            <a:endParaRPr lang="en-US" sz="2800" dirty="0">
-              <a:cs typeface="Arial"/>
-            </a:endParaRPr>
-          </a:p>
-          <a:p>
-            <a:pPr marL="0" indent="0">
-              <a:lnSpc>
-                <a:spcPct val="100000"/>
-              </a:lnSpc>
-              <a:buNone/>
-            </a:pPr>
-            <a:endParaRPr lang="en-US" sz="2800" dirty="0">
-              <a:cs typeface="Arial"/>
-            </a:endParaRPr>
+              <a:rPr lang="fi-FI" dirty="0" err="1"/>
+              <a:t>knowledge</a:t>
+            </a:r>
+            <a:r>
+              <a:rPr lang="fi-FI" dirty="0"/>
+              <a:t> </a:t>
+            </a:r>
+            <a:r>
+              <a:rPr lang="fi-FI" dirty="0" err="1"/>
+              <a:t>exam</a:t>
+            </a:r>
+            <a:endParaRPr lang="fi-FI" dirty="0"/>
           </a:p>
         </p:txBody>
       </p:sp>
@@ -7400,7 +7007,7 @@
           <p:cNvPr id="4" name="Date Placeholder 3">
             <a:extLst>
               <a:ext uri="{FF2B5EF4-FFF2-40B4-BE49-F238E27FC236}">
-                <a16:creationId xmlns:a16="http://schemas.microsoft.com/office/drawing/2014/main" id="{FDEC7F5E-C1B0-42AC-950B-DE3029CAED1B}"/>
+                <a16:creationId xmlns:a16="http://schemas.microsoft.com/office/drawing/2014/main" id="{1E42E27E-81E9-C504-A1B9-2F1373826E4A}"/>
               </a:ext>
             </a:extLst>
           </p:cNvPr>
@@ -7429,7 +7036,7 @@
           <p:cNvPr id="5" name="Footer Placeholder 4">
             <a:extLst>
               <a:ext uri="{FF2B5EF4-FFF2-40B4-BE49-F238E27FC236}">
-                <a16:creationId xmlns:a16="http://schemas.microsoft.com/office/drawing/2014/main" id="{72FA43EE-B2B3-49D5-872B-4D987D842984}"/>
+                <a16:creationId xmlns:a16="http://schemas.microsoft.com/office/drawing/2014/main" id="{A4A238D8-2AC7-30CC-00D1-1674F42EC298}"/>
               </a:ext>
             </a:extLst>
           </p:cNvPr>
@@ -7454,7 +7061,7 @@
           <p:cNvPr id="6" name="Slide Number Placeholder 5">
             <a:extLst>
               <a:ext uri="{FF2B5EF4-FFF2-40B4-BE49-F238E27FC236}">
-                <a16:creationId xmlns:a16="http://schemas.microsoft.com/office/drawing/2014/main" id="{36A82290-8C98-42D6-A040-74AE3ECFEC15}"/>
+                <a16:creationId xmlns:a16="http://schemas.microsoft.com/office/drawing/2014/main" id="{FDFF9443-5754-C825-43CF-1FECB1AEB752}"/>
               </a:ext>
             </a:extLst>
           </p:cNvPr>
@@ -7481,7 +7088,7 @@
     </p:spTree>
     <p:extLst>
       <p:ext uri="{BB962C8B-B14F-4D97-AF65-F5344CB8AC3E}">
-        <p14:creationId xmlns:p14="http://schemas.microsoft.com/office/powerpoint/2010/main" val="2889382427"/>
+        <p14:creationId xmlns:p14="http://schemas.microsoft.com/office/powerpoint/2010/main" val="3014822830"/>
       </p:ext>
     </p:extLst>
   </p:cSld>
@@ -7533,7 +7140,7 @@
           <a:p>
             <a:r>
               <a:rPr lang="en-US"/>
-              <a:t>8. App context</a:t>
+              <a:t>7. Child component updating parent’s state</a:t>
             </a:r>
             <a:endParaRPr lang="fi-FI"/>
           </a:p>
@@ -7569,160 +7176,23 @@
             </a:pPr>
             <a:r>
               <a:rPr lang="en-US" sz="2800" dirty="0"/>
-              <a:t>Creating the context</a:t>
-            </a:r>
-          </a:p>
-          <a:p>
-            <a:pPr lvl="1">
-              <a:lnSpc>
-                <a:spcPct val="100000"/>
-              </a:lnSpc>
-            </a:pPr>
-            <a:r>
-              <a:rPr lang="en-US" sz="2600" dirty="0" err="1">
-                <a:latin typeface="Consolas" panose="020B0609020204030204" pitchFamily="49" charset="0"/>
-              </a:rPr>
-              <a:t>createContext</a:t>
-            </a:r>
-            <a:r>
-              <a:rPr lang="en-US" sz="2600" dirty="0">
-                <a:latin typeface="Consolas" panose="020B0609020204030204" pitchFamily="49" charset="0"/>
-              </a:rPr>
-              <a:t>({thing: 22, thang: “</a:t>
-            </a:r>
-            <a:r>
-              <a:rPr lang="en-US" sz="2600" dirty="0" err="1">
-                <a:latin typeface="Consolas" panose="020B0609020204030204" pitchFamily="49" charset="0"/>
-              </a:rPr>
-              <a:t>abc</a:t>
-            </a:r>
-            <a:r>
-              <a:rPr lang="en-US" sz="2600" dirty="0">
-                <a:latin typeface="Consolas" panose="020B0609020204030204" pitchFamily="49" charset="0"/>
-              </a:rPr>
-              <a:t>” …}) </a:t>
-            </a:r>
-          </a:p>
-          <a:p>
-            <a:pPr>
-              <a:lnSpc>
-                <a:spcPct val="100000"/>
-              </a:lnSpc>
-            </a:pPr>
+              <a:t>(</a:t>
+            </a:r>
+            <a:r>
+              <a:rPr lang="en-US" sz="2800" u="sng" dirty="0"/>
+              <a:t>Normal case was</a:t>
+            </a:r>
             <a:r>
               <a:rPr lang="en-US" sz="2800" dirty="0"/>
-              <a:t>Accessing/reading the context values</a:t>
-            </a:r>
-          </a:p>
-          <a:p>
-            <a:pPr lvl="1">
-              <a:lnSpc>
-                <a:spcPct val="100000"/>
-              </a:lnSpc>
-            </a:pPr>
-            <a:r>
-              <a:rPr lang="en-US" sz="2600" dirty="0" err="1">
-                <a:latin typeface="Consolas" panose="020B0609020204030204" pitchFamily="49" charset="0"/>
-              </a:rPr>
-              <a:t>useContext</a:t>
-            </a:r>
-            <a:r>
-              <a:rPr lang="en-US" sz="2600" dirty="0">
-                <a:latin typeface="Consolas" panose="020B0609020204030204" pitchFamily="49" charset="0"/>
-              </a:rPr>
-              <a:t>() </a:t>
+              <a:t>: Parent passes </a:t>
+            </a:r>
+            <a:r>
+              <a:rPr lang="en-US" sz="2800" b="1" dirty="0"/>
+              <a:t>data</a:t>
             </a:r>
             <a:r>
               <a:rPr lang="en-US" sz="2800" dirty="0"/>
-              <a:t>hook to create local reference to the context </a:t>
-            </a:r>
-          </a:p>
-          <a:p>
-            <a:pPr lvl="1">
-              <a:lnSpc>
-                <a:spcPct val="100000"/>
-              </a:lnSpc>
-            </a:pPr>
-            <a:r>
-              <a:rPr lang="en-US" sz="2800" dirty="0">
-                <a:latin typeface="Consolas" panose="020B0609020204030204" pitchFamily="49" charset="0"/>
-              </a:rPr>
-              <a:t>+</a:t>
-            </a:r>
-            <a:r>
-              <a:rPr lang="en-US" sz="2600" dirty="0">
-                <a:latin typeface="Consolas" panose="020B0609020204030204" pitchFamily="49" charset="0"/>
-              </a:rPr>
-              <a:t>  {</a:t>
-            </a:r>
-            <a:r>
-              <a:rPr lang="en-US" sz="2600" dirty="0" err="1">
-                <a:latin typeface="Consolas" panose="020B0609020204030204" pitchFamily="49" charset="0"/>
-              </a:rPr>
-              <a:t>myContext.thing</a:t>
-            </a:r>
-            <a:r>
-              <a:rPr lang="en-US" sz="2600" dirty="0">
-                <a:latin typeface="Consolas" panose="020B0609020204030204" pitchFamily="49" charset="0"/>
-              </a:rPr>
-              <a:t>}</a:t>
-            </a:r>
-          </a:p>
-          <a:p>
-            <a:pPr>
-              <a:lnSpc>
-                <a:spcPct val="100000"/>
-              </a:lnSpc>
-            </a:pPr>
-            <a:r>
-              <a:rPr lang="en-US" sz="2800" dirty="0"/>
-              <a:t>Updating/writing the values to the context</a:t>
-            </a:r>
-          </a:p>
-          <a:p>
-            <a:pPr lvl="1">
-              <a:lnSpc>
-                <a:spcPct val="100000"/>
-              </a:lnSpc>
-            </a:pPr>
-            <a:r>
-              <a:rPr lang="en-US" sz="2600" dirty="0" err="1">
-                <a:latin typeface="Consolas" panose="020B0609020204030204" pitchFamily="49" charset="0"/>
-              </a:rPr>
-              <a:t>useContext</a:t>
-            </a:r>
-            <a:r>
-              <a:rPr lang="en-US" sz="2600" dirty="0">
-                <a:latin typeface="Consolas" panose="020B0609020204030204" pitchFamily="49" charset="0"/>
-              </a:rPr>
-              <a:t>() </a:t>
-            </a:r>
-            <a:r>
-              <a:rPr lang="en-US" sz="2800" dirty="0"/>
-              <a:t>hook to create local reference to the context </a:t>
-            </a:r>
-          </a:p>
-          <a:p>
-            <a:pPr lvl="1">
-              <a:lnSpc>
-                <a:spcPct val="100000"/>
-              </a:lnSpc>
-            </a:pPr>
-            <a:r>
-              <a:rPr lang="en-US" sz="2600" dirty="0"/>
-              <a:t>+    </a:t>
-            </a:r>
-            <a:r>
-              <a:rPr lang="en-US" sz="2600" dirty="0" err="1">
-                <a:latin typeface="Consolas" panose="020B0609020204030204" pitchFamily="49" charset="0"/>
-              </a:rPr>
-              <a:t>myContext.thing</a:t>
-            </a:r>
-            <a:r>
-              <a:rPr lang="en-US" sz="2600" dirty="0">
-                <a:latin typeface="Consolas" panose="020B0609020204030204" pitchFamily="49" charset="0"/>
-              </a:rPr>
-              <a:t> = 33;</a:t>
+              <a:t> to the children in props, and children only show it)</a:t>
             </a:r>
           </a:p>
           <a:p>
@@ -7734,6 +7204,17 @@
             </a:pPr>
             <a:endParaRPr lang="en-US" sz="2800" dirty="0"/>
           </a:p>
+          <a:p>
+            <a:pPr>
+              <a:lnSpc>
+                <a:spcPct val="100000"/>
+              </a:lnSpc>
+            </a:pPr>
+            <a:r>
+              <a:rPr lang="en-US" sz="2800" dirty="0"/>
+              <a:t>Special case: Parent will pass ‘event-handler function’ (parent state’s set function) to the child component(s) in props so that child/children can execute it and thus kind of ‘write’ to parent's state.</a:t>
+            </a:r>
+          </a:p>
         </p:txBody>
       </p:sp>
       <p:sp>
@@ -7822,7 +7303,7 @@
     </p:spTree>
     <p:extLst>
       <p:ext uri="{BB962C8B-B14F-4D97-AF65-F5344CB8AC3E}">
-        <p14:creationId xmlns:p14="http://schemas.microsoft.com/office/powerpoint/2010/main" val="986459541"/>
+        <p14:creationId xmlns:p14="http://schemas.microsoft.com/office/powerpoint/2010/main" val="198963962"/>
       </p:ext>
     </p:extLst>
   </p:cSld>
@@ -7873,18 +7354,10 @@
           <a:lstStyle/>
           <a:p>
             <a:r>
-              <a:rPr lang="en-US" dirty="0"/>
-              <a:t>9. The </a:t>
-            </a:r>
-            <a:r>
-              <a:rPr lang="en-US" dirty="0" err="1"/>
-              <a:t>useEffect</a:t>
-            </a:r>
-            <a:r>
-              <a:rPr lang="en-US" dirty="0"/>
-              <a:t> hook</a:t>
-            </a:r>
-            <a:endParaRPr lang="fi-FI" dirty="0"/>
+              <a:rPr lang="en-US"/>
+              <a:t>8. App context</a:t>
+            </a:r>
+            <a:endParaRPr lang="fi-FI"/>
           </a:p>
         </p:txBody>
       </p:sp>
@@ -7906,8 +7379,8 @@
         </p:nvSpPr>
         <p:spPr/>
         <p:txBody>
-          <a:bodyPr vert="horz" lIns="0" tIns="0" rIns="0" bIns="36000" numCol="1" spcCol="360000" rtlCol="0" anchor="t">
-            <a:normAutofit fontScale="77500" lnSpcReduction="20000"/>
+          <a:bodyPr>
+            <a:normAutofit/>
           </a:bodyPr>
           <a:lstStyle/>
           <a:p>
@@ -7918,15 +7391,7 @@
             </a:pPr>
             <a:r>
               <a:rPr lang="en-US" sz="2800" dirty="0"/>
-              <a:t>For “</a:t>
-            </a:r>
-            <a:r>
-              <a:rPr lang="en-US" sz="2800" i="1" dirty="0"/>
-              <a:t>side effects</a:t>
-            </a:r>
-            <a:r>
-              <a:rPr lang="en-US" sz="2800" dirty="0"/>
-              <a:t>” which means something happening outside the normal “state/prop changes =&gt; render happens” -cycle.</a:t>
+              <a:t>Creating the context</a:t>
             </a:r>
           </a:p>
           <a:p>
@@ -7936,27 +7401,40 @@
               </a:lnSpc>
             </a:pPr>
             <a:r>
-              <a:rPr lang="en-US" sz="2600" dirty="0"/>
-              <a:t>Usually still essential activity for the app, like fetching data from DB</a:t>
-            </a:r>
-          </a:p>
-          <a:p>
-            <a:pPr marL="215900" indent="-215900">
+              <a:rPr lang="en-US" sz="2600" dirty="0" err="1">
+                <a:latin typeface="Consolas" panose="020B0609020204030204" pitchFamily="49" charset="0"/>
+              </a:rPr>
+              <a:t>createContext</a:t>
+            </a:r>
+            <a:r>
+              <a:rPr lang="en-US" sz="2600" dirty="0">
+                <a:latin typeface="Consolas" panose="020B0609020204030204" pitchFamily="49" charset="0"/>
+              </a:rPr>
+              <a:t>({thing: 22, thang: “</a:t>
+            </a:r>
+            <a:r>
+              <a:rPr lang="en-US" sz="2600" dirty="0" err="1">
+                <a:latin typeface="Consolas" panose="020B0609020204030204" pitchFamily="49" charset="0"/>
+              </a:rPr>
+              <a:t>abc</a:t>
+            </a:r>
+            <a:r>
+              <a:rPr lang="en-US" sz="2600" dirty="0">
+                <a:latin typeface="Consolas" panose="020B0609020204030204" pitchFamily="49" charset="0"/>
+              </a:rPr>
+              <a:t>” …}) </a:t>
+            </a:r>
+          </a:p>
+          <a:p>
+            <a:pPr>
               <a:lnSpc>
                 <a:spcPct val="100000"/>
               </a:lnSpc>
             </a:pPr>
             <a:r>
-              <a:rPr lang="en-US" sz="2800" dirty="0" err="1"/>
-              <a:t>useEffect</a:t>
-            </a:r>
-            <a:r>
               <a:rPr lang="en-US" sz="2800" dirty="0"/>
-              <a:t> defines three parts: </a:t>
-            </a:r>
-            <a:endParaRPr lang="en-US" sz="2800" dirty="0">
-              <a:cs typeface="Arial" panose="020B0604020202020204"/>
-            </a:endParaRPr>
+              <a:t>Accessing/reading the context values</a:t>
+            </a:r>
           </a:p>
           <a:p>
             <a:pPr lvl="1">
@@ -7965,12 +7443,20 @@
               </a:lnSpc>
             </a:pPr>
             <a:r>
-              <a:rPr lang="en-US" sz="2600" b="1" dirty="0"/>
-              <a:t>Action</a:t>
-            </a:r>
-            <a:r>
-              <a:rPr lang="en-US" sz="2600" dirty="0"/>
-              <a:t>, function to be run (cannot be awaited, but you can call another function that will wait)</a:t>
+              <a:rPr lang="en-US" sz="2600" dirty="0" err="1">
+                <a:latin typeface="Consolas" panose="020B0609020204030204" pitchFamily="49" charset="0"/>
+              </a:rPr>
+              <a:t>useContext</a:t>
+            </a:r>
+            <a:r>
+              <a:rPr lang="en-US" sz="2600" dirty="0">
+                <a:latin typeface="Consolas" panose="020B0609020204030204" pitchFamily="49" charset="0"/>
+              </a:rPr>
+              <a:t>() </a:t>
+            </a:r>
+            <a:r>
+              <a:rPr lang="en-US" sz="2800" dirty="0"/>
+              <a:t>hook to create local reference to the context </a:t>
             </a:r>
           </a:p>
           <a:p>
@@ -7980,84 +7466,39 @@
               </a:lnSpc>
             </a:pPr>
             <a:r>
-              <a:rPr lang="en-US" sz="2600" b="1" dirty="0"/>
-              <a:t>Dependency array</a:t>
-            </a:r>
-          </a:p>
-          <a:p>
-            <a:pPr lvl="2">
+              <a:rPr lang="en-US" sz="2800" dirty="0">
+                <a:latin typeface="Consolas" panose="020B0609020204030204" pitchFamily="49" charset="0"/>
+              </a:rPr>
+              <a:t>+</a:t>
+            </a:r>
+            <a:r>
+              <a:rPr lang="en-US" sz="2600" dirty="0">
+                <a:latin typeface="Consolas" panose="020B0609020204030204" pitchFamily="49" charset="0"/>
+              </a:rPr>
+              <a:t>  {</a:t>
+            </a:r>
+            <a:r>
+              <a:rPr lang="en-US" sz="2600" dirty="0" err="1">
+                <a:latin typeface="Consolas" panose="020B0609020204030204" pitchFamily="49" charset="0"/>
+              </a:rPr>
+              <a:t>myContext.thing</a:t>
+            </a:r>
+            <a:r>
+              <a:rPr lang="en-US" sz="2600" dirty="0">
+                <a:latin typeface="Consolas" panose="020B0609020204030204" pitchFamily="49" charset="0"/>
+              </a:rPr>
+              <a:t>}</a:t>
+            </a:r>
+          </a:p>
+          <a:p>
+            <a:pPr>
               <a:lnSpc>
                 <a:spcPct val="100000"/>
               </a:lnSpc>
             </a:pPr>
             <a:r>
-              <a:rPr lang="en-US" sz="2600" dirty="0"/>
-              <a:t>if items given </a:t>
-            </a:r>
-            <a:r>
-              <a:rPr lang="en-US" sz="2600" b="1" dirty="0"/>
-              <a:t>[user.id, </a:t>
-            </a:r>
-            <a:r>
-              <a:rPr lang="en-US" sz="2600" b="1" dirty="0" err="1"/>
-              <a:t>project.count</a:t>
-            </a:r>
-            <a:r>
-              <a:rPr lang="en-US" sz="2600" b="1" dirty="0"/>
-              <a:t>]</a:t>
-            </a:r>
-            <a:r>
-              <a:rPr lang="en-US" sz="2600" dirty="0"/>
-              <a:t>, then action runs at mount + if changes in these.</a:t>
-            </a:r>
-          </a:p>
-          <a:p>
-            <a:pPr lvl="3">
-              <a:lnSpc>
-                <a:spcPct val="100000"/>
-              </a:lnSpc>
-            </a:pPr>
-            <a:r>
-              <a:rPr lang="en-US" sz="2600" dirty="0"/>
-              <a:t>By far the most used and most useful. Should be your thinking starting point. </a:t>
-            </a:r>
-          </a:p>
-          <a:p>
-            <a:pPr lvl="2">
-              <a:lnSpc>
-                <a:spcPct val="100000"/>
-              </a:lnSpc>
-            </a:pPr>
-            <a:r>
-              <a:rPr lang="en-US" sz="2600" dirty="0"/>
-              <a:t>Empty </a:t>
-            </a:r>
-            <a:r>
-              <a:rPr lang="en-US" sz="2600" b="1" dirty="0"/>
-              <a:t>[ ]</a:t>
-            </a:r>
-            <a:r>
-              <a:rPr lang="en-US" sz="2600" dirty="0"/>
-              <a:t>, dependency array =&gt; runs only once.   You sometimes need this. </a:t>
-            </a:r>
-          </a:p>
-          <a:p>
-            <a:pPr lvl="2">
-              <a:lnSpc>
-                <a:spcPct val="100000"/>
-              </a:lnSpc>
-            </a:pPr>
-            <a:r>
-              <a:rPr lang="en-US" sz="2600" dirty="0"/>
-              <a:t>If missing dependency array: </a:t>
-            </a:r>
-            <a:r>
-              <a:rPr lang="en-US" sz="2600" b="1" dirty="0"/>
-              <a:t>, }</a:t>
-            </a:r>
-            <a:r>
-              <a:rPr lang="en-US" sz="2600" dirty="0"/>
-              <a:t> =&gt; runs at mount/first render + for any update/re-render.</a:t>
+              <a:rPr lang="en-US" sz="2800" dirty="0"/>
+              <a:t>Updating/writing the values to the context</a:t>
             </a:r>
           </a:p>
           <a:p>
@@ -8067,12 +7508,43 @@
               </a:lnSpc>
             </a:pPr>
             <a:r>
+              <a:rPr lang="en-US" sz="2600" dirty="0" err="1">
+                <a:latin typeface="Consolas" panose="020B0609020204030204" pitchFamily="49" charset="0"/>
+              </a:rPr>
+              <a:t>useContext</a:t>
+            </a:r>
+            <a:r>
+              <a:rPr lang="en-US" sz="2600" dirty="0">
+                <a:latin typeface="Consolas" panose="020B0609020204030204" pitchFamily="49" charset="0"/>
+              </a:rPr>
+              <a:t>() </a:t>
+            </a:r>
+            <a:r>
+              <a:rPr lang="en-US" sz="2800" dirty="0"/>
+              <a:t>hook to create local reference to the context </a:t>
+            </a:r>
+          </a:p>
+          <a:p>
+            <a:pPr lvl="1">
+              <a:lnSpc>
+                <a:spcPct val="100000"/>
+              </a:lnSpc>
+            </a:pPr>
+            <a:r>
               <a:rPr lang="en-US" sz="2600" dirty="0"/>
-              <a:t>(Action function is possibly returning) the </a:t>
-            </a:r>
-            <a:r>
-              <a:rPr lang="en-US" sz="2600" b="1" dirty="0"/>
-              <a:t>Cleanup function</a:t>
+              <a:t>+    </a:t>
+            </a:r>
+            <a:r>
+              <a:rPr lang="en-US" sz="2600" dirty="0" err="1">
+                <a:latin typeface="Consolas" panose="020B0609020204030204" pitchFamily="49" charset="0"/>
+              </a:rPr>
+              <a:t>myContext.thing</a:t>
+            </a:r>
+            <a:r>
+              <a:rPr lang="en-US" sz="2600" dirty="0">
+                <a:latin typeface="Consolas" panose="020B0609020204030204" pitchFamily="49" charset="0"/>
+              </a:rPr>
+              <a:t> = 33;</a:t>
             </a:r>
           </a:p>
           <a:p>
@@ -8172,7 +7644,7 @@
     </p:spTree>
     <p:extLst>
       <p:ext uri="{BB962C8B-B14F-4D97-AF65-F5344CB8AC3E}">
-        <p14:creationId xmlns:p14="http://schemas.microsoft.com/office/powerpoint/2010/main" val="2228967696"/>
+        <p14:creationId xmlns:p14="http://schemas.microsoft.com/office/powerpoint/2010/main" val="986459541"/>
       </p:ext>
     </p:extLst>
   </p:cSld>
@@ -8223,10 +7695,18 @@
           <a:lstStyle/>
           <a:p>
             <a:r>
-              <a:rPr lang="en-US"/>
-              <a:t>10. Routing</a:t>
-            </a:r>
-            <a:endParaRPr lang="fi-FI"/>
+              <a:rPr lang="en-US" dirty="0"/>
+              <a:t>9. The </a:t>
+            </a:r>
+            <a:r>
+              <a:rPr lang="en-US" dirty="0" err="1"/>
+              <a:t>useEffect</a:t>
+            </a:r>
+            <a:r>
+              <a:rPr lang="en-US" dirty="0"/>
+              <a:t> hook</a:t>
+            </a:r>
+            <a:endParaRPr lang="fi-FI" dirty="0"/>
           </a:p>
         </p:txBody>
       </p:sp>
@@ -8249,7 +7729,7 @@
         <p:spPr/>
         <p:txBody>
           <a:bodyPr vert="horz" lIns="0" tIns="0" rIns="0" bIns="36000" numCol="1" spcCol="360000" rtlCol="0" anchor="t">
-            <a:normAutofit/>
+            <a:normAutofit fontScale="77500" lnSpcReduction="20000"/>
           </a:bodyPr>
           <a:lstStyle/>
           <a:p>
@@ -8260,15 +7740,15 @@
             </a:pPr>
             <a:r>
               <a:rPr lang="en-US" sz="2800" dirty="0"/>
-              <a:t>Look at the given pictures for routing. </a:t>
-            </a:r>
-            <a:r>
-              <a:rPr lang="en-US" sz="2800" b="1" dirty="0"/>
-              <a:t>Basic routing </a:t>
+              <a:t>For “</a:t>
+            </a:r>
+            <a:r>
+              <a:rPr lang="en-US" sz="2800" i="1" dirty="0"/>
+              <a:t>side effects</a:t>
             </a:r>
             <a:r>
               <a:rPr lang="en-US" sz="2800" dirty="0"/>
-              <a:t>includes:</a:t>
+              <a:t>” which means something happening outside the normal “state/prop changes =&gt; render happens” -cycle.</a:t>
             </a:r>
           </a:p>
           <a:p>
@@ -8279,32 +7759,26 @@
             </a:pPr>
             <a:r>
               <a:rPr lang="en-US" sz="2600" dirty="0"/>
-              <a:t>The </a:t>
-            </a:r>
-            <a:r>
-              <a:rPr lang="en-US" sz="2600" b="1" dirty="0"/>
-              <a:t>Route definitions</a:t>
-            </a:r>
-            <a:r>
-              <a:rPr lang="en-US" sz="2600" dirty="0"/>
-              <a:t>. They are our mappings between a </a:t>
-            </a:r>
-            <a:r>
-              <a:rPr lang="en-US" sz="2600" b="1" dirty="0"/>
-              <a:t>Path</a:t>
-            </a:r>
-            <a:r>
-              <a:rPr lang="en-US" sz="2600" dirty="0"/>
-              <a:t> and a View </a:t>
-            </a:r>
-            <a:r>
-              <a:rPr lang="en-US" sz="2600" b="1" dirty="0"/>
-              <a:t>React component </a:t>
-            </a:r>
-            <a:r>
-              <a:rPr lang="en-US" sz="2600" dirty="0"/>
-              <a:t>that renders that path.</a:t>
-            </a:r>
+              <a:t>Usually still essential activity for the app, like fetching data from DB</a:t>
+            </a:r>
+          </a:p>
+          <a:p>
+            <a:pPr marL="215900" indent="-215900">
+              <a:lnSpc>
+                <a:spcPct val="100000"/>
+              </a:lnSpc>
+            </a:pPr>
+            <a:r>
+              <a:rPr lang="en-US" sz="2800" dirty="0" err="1"/>
+              <a:t>useEffect</a:t>
+            </a:r>
+            <a:r>
+              <a:rPr lang="en-US" sz="2800" dirty="0"/>
+              <a:t> defines three parts: </a:t>
+            </a:r>
+            <a:endParaRPr lang="en-US" sz="2800" dirty="0">
+              <a:cs typeface="Arial" panose="020B0604020202020204"/>
+            </a:endParaRPr>
           </a:p>
           <a:p>
             <a:pPr lvl="1">
@@ -8313,24 +7787,12 @@
               </a:lnSpc>
             </a:pPr>
             <a:r>
-              <a:rPr lang="en-US" sz="2800" dirty="0"/>
-              <a:t>Defining </a:t>
-            </a:r>
-            <a:r>
-              <a:rPr lang="en-US" sz="2800" b="1" dirty="0"/>
-              <a:t>Links</a:t>
-            </a:r>
-            <a:r>
-              <a:rPr lang="en-US" sz="2800" dirty="0"/>
-              <a:t> or </a:t>
-            </a:r>
-            <a:r>
-              <a:rPr lang="en-US" sz="2800" b="1" dirty="0"/>
-              <a:t>Buttons</a:t>
-            </a:r>
-            <a:r>
-              <a:rPr lang="en-US" sz="2800" dirty="0"/>
-              <a:t> that trigger navigation to the Routes</a:t>
+              <a:rPr lang="en-US" sz="2600" b="1" dirty="0"/>
+              <a:t>Action</a:t>
+            </a:r>
+            <a:r>
+              <a:rPr lang="en-US" sz="2600" dirty="0"/>
+              <a:t>, function to be run (cannot be awaited, but you can call another function that will wait)</a:t>
             </a:r>
           </a:p>
           <a:p>
@@ -8340,44 +7802,99 @@
               </a:lnSpc>
             </a:pPr>
             <a:r>
-              <a:rPr lang="en-US" sz="2800" b="1" dirty="0"/>
-              <a:t>Route</a:t>
-            </a:r>
-            <a:r>
-              <a:rPr lang="en-US" sz="2800" b="1" u="sng" dirty="0"/>
-              <a:t>s</a:t>
-            </a:r>
-            <a:r>
-              <a:rPr lang="en-US" sz="2800" b="1" dirty="0"/>
-              <a:t> component </a:t>
-            </a:r>
-            <a:r>
-              <a:rPr lang="en-US" sz="2800" dirty="0"/>
-              <a:t>(older component was called</a:t>
-            </a:r>
-            <a:r>
-              <a:rPr lang="en-US" sz="2800" b="1" dirty="0"/>
-              <a:t> Switch</a:t>
-            </a:r>
-            <a:r>
-              <a:rPr lang="en-US" sz="2800" dirty="0"/>
-              <a:t>) that marks the place (div) on the page that will be replaced/filled with the “current page”. It also lists many </a:t>
-            </a:r>
-            <a:r>
-              <a:rPr lang="en-US" sz="2800" b="1" dirty="0"/>
-              <a:t>Route</a:t>
-            </a:r>
-            <a:r>
-              <a:rPr lang="en-US" sz="2800" dirty="0"/>
-              <a:t> </a:t>
-            </a:r>
-            <a:r>
-              <a:rPr lang="en-US" sz="2800" b="1" dirty="0"/>
-              <a:t>components</a:t>
-            </a:r>
-            <a:r>
-              <a:rPr lang="en-US" sz="2800" dirty="0"/>
-              <a:t> as content/children, but only one Route’s View switched each time to be rendered there.</a:t>
+              <a:rPr lang="en-US" sz="2600" b="1" dirty="0"/>
+              <a:t>Dependency array</a:t>
+            </a:r>
+          </a:p>
+          <a:p>
+            <a:pPr lvl="2">
+              <a:lnSpc>
+                <a:spcPct val="100000"/>
+              </a:lnSpc>
+            </a:pPr>
+            <a:r>
+              <a:rPr lang="en-US" sz="2600" dirty="0"/>
+              <a:t>if items given </a:t>
+            </a:r>
+            <a:r>
+              <a:rPr lang="en-US" sz="2600" b="1" dirty="0"/>
+              <a:t>[user.id, </a:t>
+            </a:r>
+            <a:r>
+              <a:rPr lang="en-US" sz="2600" b="1" dirty="0" err="1"/>
+              <a:t>project.count</a:t>
+            </a:r>
+            <a:r>
+              <a:rPr lang="en-US" sz="2600" b="1" dirty="0"/>
+              <a:t>]</a:t>
+            </a:r>
+            <a:r>
+              <a:rPr lang="en-US" sz="2600" dirty="0"/>
+              <a:t>, then action runs at mount + if changes in these.</a:t>
+            </a:r>
+          </a:p>
+          <a:p>
+            <a:pPr lvl="3">
+              <a:lnSpc>
+                <a:spcPct val="100000"/>
+              </a:lnSpc>
+            </a:pPr>
+            <a:r>
+              <a:rPr lang="en-US" sz="2600" dirty="0"/>
+              <a:t>By far the most used and most useful. Should be your thinking starting point. </a:t>
+            </a:r>
+          </a:p>
+          <a:p>
+            <a:pPr lvl="2">
+              <a:lnSpc>
+                <a:spcPct val="100000"/>
+              </a:lnSpc>
+            </a:pPr>
+            <a:r>
+              <a:rPr lang="en-US" sz="2600" dirty="0"/>
+              <a:t>Empty </a:t>
+            </a:r>
+            <a:r>
+              <a:rPr lang="en-US" sz="2600" b="1" dirty="0"/>
+              <a:t>[ ]</a:t>
+            </a:r>
+            <a:r>
+              <a:rPr lang="en-US" sz="2600" dirty="0"/>
+              <a:t>, dependency array =&gt; runs only once.   You sometimes need this. </a:t>
+            </a:r>
+          </a:p>
+          <a:p>
+            <a:pPr lvl="2">
+              <a:lnSpc>
+                <a:spcPct val="100000"/>
+              </a:lnSpc>
+            </a:pPr>
+            <a:r>
+              <a:rPr lang="en-US" sz="2600" dirty="0"/>
+              <a:t>If missing dependency array: </a:t>
+            </a:r>
+            <a:r>
+              <a:rPr lang="en-US" sz="2600" b="1" dirty="0"/>
+              <a:t>, }</a:t>
+            </a:r>
+            <a:r>
+              <a:rPr lang="en-US" sz="2600" dirty="0"/>
+              <a:t> =&gt; runs at mount/first render + for any update/re-render.</a:t>
+            </a:r>
+          </a:p>
+          <a:p>
+            <a:pPr lvl="1">
+              <a:lnSpc>
+                <a:spcPct val="100000"/>
+              </a:lnSpc>
+            </a:pPr>
+            <a:r>
+              <a:rPr lang="en-US" sz="2600" dirty="0"/>
+              <a:t>(Action function is possibly returning) the </a:t>
+            </a:r>
+            <a:r>
+              <a:rPr lang="en-US" sz="2600" b="1" dirty="0"/>
+              <a:t>Cleanup function</a:t>
             </a:r>
           </a:p>
           <a:p>
@@ -8387,20 +7904,7 @@
               </a:lnSpc>
               <a:buNone/>
             </a:pPr>
-            <a:endParaRPr lang="en-US" sz="2800" dirty="0">
-              <a:cs typeface="Arial" panose="020B0604020202020204"/>
-            </a:endParaRPr>
-          </a:p>
-          <a:p>
-            <a:pPr marL="0" indent="0">
-              <a:lnSpc>
-                <a:spcPct val="100000"/>
-              </a:lnSpc>
-              <a:buNone/>
-            </a:pPr>
-            <a:endParaRPr lang="en-US" sz="2800" dirty="0">
-              <a:cs typeface="Arial" panose="020B0604020202020204"/>
-            </a:endParaRPr>
+            <a:endParaRPr lang="en-US" sz="2800" dirty="0"/>
           </a:p>
         </p:txBody>
       </p:sp>
@@ -8490,7 +7994,7 @@
     </p:spTree>
     <p:extLst>
       <p:ext uri="{BB962C8B-B14F-4D97-AF65-F5344CB8AC3E}">
-        <p14:creationId xmlns:p14="http://schemas.microsoft.com/office/powerpoint/2010/main" val="1359571161"/>
+        <p14:creationId xmlns:p14="http://schemas.microsoft.com/office/powerpoint/2010/main" val="2228967696"/>
       </p:ext>
     </p:extLst>
   </p:cSld>
@@ -8542,7 +8046,7 @@
           <a:p>
             <a:r>
               <a:rPr lang="en-US"/>
-              <a:t>11. Nested Routing</a:t>
+              <a:t>10. Routing</a:t>
             </a:r>
             <a:endParaRPr lang="fi-FI"/>
           </a:p>
@@ -8566,7 +8070,7 @@
         </p:nvSpPr>
         <p:spPr/>
         <p:txBody>
-          <a:bodyPr>
+          <a:bodyPr vert="horz" lIns="0" tIns="0" rIns="0" bIns="36000" numCol="1" spcCol="360000" rtlCol="0" anchor="t">
             <a:normAutofit/>
           </a:bodyPr>
           <a:lstStyle/>
@@ -8577,8 +8081,16 @@
               </a:lnSpc>
             </a:pPr>
             <a:r>
-              <a:rPr lang="en-US" sz="2800"/>
-              <a:t>Look at the given pictures for routing. Nested Routing includes:</a:t>
+              <a:rPr lang="en-US" sz="2800" dirty="0"/>
+              <a:t>Look at the given pictures for routing. </a:t>
+            </a:r>
+            <a:r>
+              <a:rPr lang="en-US" sz="2800" b="1" dirty="0"/>
+              <a:t>Basic routing </a:t>
+            </a:r>
+            <a:r>
+              <a:rPr lang="en-US" sz="2800" dirty="0"/>
+              <a:t>includes:</a:t>
             </a:r>
           </a:p>
           <a:p>
@@ -8588,12 +8100,32 @@
               </a:lnSpc>
             </a:pPr>
             <a:r>
-              <a:rPr lang="en-US" sz="2600" b="1"/>
-              <a:t>Relative paths </a:t>
-            </a:r>
-            <a:r>
-              <a:rPr lang="en-US" sz="2600"/>
-              <a:t>for children</a:t>
+              <a:rPr lang="en-US" sz="2600" dirty="0"/>
+              <a:t>The </a:t>
+            </a:r>
+            <a:r>
+              <a:rPr lang="en-US" sz="2600" b="1" dirty="0"/>
+              <a:t>Route definitions</a:t>
+            </a:r>
+            <a:r>
+              <a:rPr lang="en-US" sz="2600" dirty="0"/>
+              <a:t>. They are our mappings between a </a:t>
+            </a:r>
+            <a:r>
+              <a:rPr lang="en-US" sz="2600" b="1" dirty="0"/>
+              <a:t>Path</a:t>
+            </a:r>
+            <a:r>
+              <a:rPr lang="en-US" sz="2600" dirty="0"/>
+              <a:t> and a View </a:t>
+            </a:r>
+            <a:r>
+              <a:rPr lang="en-US" sz="2600" b="1" dirty="0"/>
+              <a:t>React component </a:t>
+            </a:r>
+            <a:r>
+              <a:rPr lang="en-US" sz="2600" dirty="0"/>
+              <a:t>that renders that path.</a:t>
             </a:r>
           </a:p>
           <a:p>
@@ -8603,16 +8135,24 @@
               </a:lnSpc>
             </a:pPr>
             <a:r>
-              <a:rPr lang="en-US" sz="2600"/>
-              <a:t>Possible </a:t>
-            </a:r>
-            <a:r>
-              <a:rPr lang="en-US" sz="2600" b="1"/>
-              <a:t>index route</a:t>
-            </a:r>
-            <a:r>
-              <a:rPr lang="en-US" sz="2600"/>
-              <a:t>, rendering the index path.</a:t>
+              <a:rPr lang="en-US" sz="2800" dirty="0"/>
+              <a:t>Defining </a:t>
+            </a:r>
+            <a:r>
+              <a:rPr lang="en-US" sz="2800" b="1" dirty="0"/>
+              <a:t>Links</a:t>
+            </a:r>
+            <a:r>
+              <a:rPr lang="en-US" sz="2800" dirty="0"/>
+              <a:t> or </a:t>
+            </a:r>
+            <a:r>
+              <a:rPr lang="en-US" sz="2800" b="1" dirty="0"/>
+              <a:t>Buttons</a:t>
+            </a:r>
+            <a:r>
+              <a:rPr lang="en-US" sz="2800" dirty="0"/>
+              <a:t> that trigger navigation to the Routes</a:t>
             </a:r>
           </a:p>
           <a:p>
@@ -8622,36 +8162,67 @@
               </a:lnSpc>
             </a:pPr>
             <a:r>
-              <a:rPr lang="en-US" sz="2600"/>
-              <a:t>Possibly </a:t>
-            </a:r>
-            <a:r>
-              <a:rPr lang="en-US" sz="2600" b="1"/>
-              <a:t>shared layout </a:t>
-            </a:r>
-            <a:r>
-              <a:rPr lang="en-US" sz="2600"/>
-              <a:t>component.</a:t>
-            </a:r>
-          </a:p>
-          <a:p>
-            <a:pPr lvl="1">
+              <a:rPr lang="en-US" sz="2800" b="1" dirty="0"/>
+              <a:t>Route</a:t>
+            </a:r>
+            <a:r>
+              <a:rPr lang="en-US" sz="2800" b="1" u="sng" dirty="0"/>
+              <a:t>s</a:t>
+            </a:r>
+            <a:r>
+              <a:rPr lang="en-US" sz="2800" b="1" dirty="0"/>
+              <a:t> component </a:t>
+            </a:r>
+            <a:r>
+              <a:rPr lang="en-US" sz="2800" dirty="0"/>
+              <a:t>(older component was called</a:t>
+            </a:r>
+            <a:r>
+              <a:rPr lang="en-US" sz="2800" b="1" dirty="0"/>
+              <a:t> Switch</a:t>
+            </a:r>
+            <a:r>
+              <a:rPr lang="en-US" sz="2800" dirty="0"/>
+              <a:t>) that marks the place (div) on the page that will be replaced/filled with the “current page”. It also lists many </a:t>
+            </a:r>
+            <a:r>
+              <a:rPr lang="en-US" sz="2800" b="1" dirty="0"/>
+              <a:t>Route</a:t>
+            </a:r>
+            <a:r>
+              <a:rPr lang="en-US" sz="2800" dirty="0"/>
+              <a:t> </a:t>
+            </a:r>
+            <a:r>
+              <a:rPr lang="en-US" sz="2800" b="1" dirty="0"/>
+              <a:t>components</a:t>
+            </a:r>
+            <a:r>
+              <a:rPr lang="en-US" sz="2800" dirty="0"/>
+              <a:t> as content/children, but only one Route’s View switched each time to be rendered there.</a:t>
+            </a:r>
+          </a:p>
+          <a:p>
+            <a:pPr marL="0" indent="0">
               <a:lnSpc>
                 <a:spcPct val="100000"/>
               </a:lnSpc>
+              <a:buNone/>
             </a:pPr>
-            <a:r>
-              <a:rPr lang="en-US" sz="2600"/>
-              <a:t>Possibly with </a:t>
-            </a:r>
-            <a:r>
-              <a:rPr lang="en-US" sz="2600" b="1"/>
-              <a:t>shared context</a:t>
-            </a:r>
-            <a:r>
-              <a:rPr lang="en-US" sz="2600"/>
-              <a:t>?</a:t>
-            </a:r>
+            <a:endParaRPr lang="en-US" sz="2800" dirty="0">
+              <a:cs typeface="Arial" panose="020B0604020202020204"/>
+            </a:endParaRPr>
+          </a:p>
+          <a:p>
+            <a:pPr marL="0" indent="0">
+              <a:lnSpc>
+                <a:spcPct val="100000"/>
+              </a:lnSpc>
+              <a:buNone/>
+            </a:pPr>
+            <a:endParaRPr lang="en-US" sz="2800" dirty="0">
+              <a:cs typeface="Arial" panose="020B0604020202020204"/>
+            </a:endParaRPr>
           </a:p>
         </p:txBody>
       </p:sp>
@@ -8741,7 +8312,7 @@
     </p:spTree>
     <p:extLst>
       <p:ext uri="{BB962C8B-B14F-4D97-AF65-F5344CB8AC3E}">
-        <p14:creationId xmlns:p14="http://schemas.microsoft.com/office/powerpoint/2010/main" val="2361742466"/>
+        <p14:creationId xmlns:p14="http://schemas.microsoft.com/office/powerpoint/2010/main" val="1359571161"/>
       </p:ext>
     </p:extLst>
   </p:cSld>
@@ -8793,7 +8364,7 @@
           <a:p>
             <a:r>
               <a:rPr lang="en-US"/>
-              <a:t>+ Programmatic Routing</a:t>
+              <a:t>11. Nested Routing</a:t>
             </a:r>
             <a:endParaRPr lang="fi-FI"/>
           </a:p>
@@ -8817,36 +8388,91 @@
         </p:nvSpPr>
         <p:spPr/>
         <p:txBody>
-          <a:bodyPr vert="horz" lIns="0" tIns="0" rIns="0" bIns="36000" numCol="1" spcCol="360000" rtlCol="0" anchor="t">
+          <a:bodyPr>
             <a:normAutofit/>
           </a:bodyPr>
           <a:lstStyle/>
           <a:p>
-            <a:pPr marL="215900" indent="-215900">
+            <a:pPr>
               <a:lnSpc>
                 <a:spcPct val="100000"/>
               </a:lnSpc>
             </a:pPr>
             <a:r>
-              <a:rPr lang="en-US" sz="2800">
-                <a:ea typeface="+mn-lt"/>
-                <a:cs typeface="+mn-lt"/>
-              </a:rPr>
-              <a:t>You can also programmatically </a:t>
-            </a:r>
-            <a:r>
-              <a:rPr lang="en-US" sz="2800" b="1">
-                <a:ea typeface="+mn-lt"/>
-                <a:cs typeface="+mn-lt"/>
-              </a:rPr>
-              <a:t>manipulate the Routing history stack: </a:t>
-            </a:r>
-            <a:r>
-              <a:rPr lang="en-US" sz="2800">
-                <a:ea typeface="+mn-lt"/>
-                <a:cs typeface="+mn-lt"/>
-              </a:rPr>
-              <a:t>pop, push, replace.</a:t>
+              <a:rPr lang="en-US" sz="2800"/>
+              <a:t>Look at the given pictures for routing. Nested Routing includes:</a:t>
+            </a:r>
+          </a:p>
+          <a:p>
+            <a:pPr lvl="1">
+              <a:lnSpc>
+                <a:spcPct val="100000"/>
+              </a:lnSpc>
+            </a:pPr>
+            <a:r>
+              <a:rPr lang="en-US" sz="2600" b="1"/>
+              <a:t>Relative paths </a:t>
+            </a:r>
+            <a:r>
+              <a:rPr lang="en-US" sz="2600"/>
+              <a:t>for children</a:t>
+            </a:r>
+          </a:p>
+          <a:p>
+            <a:pPr lvl="1">
+              <a:lnSpc>
+                <a:spcPct val="100000"/>
+              </a:lnSpc>
+            </a:pPr>
+            <a:r>
+              <a:rPr lang="en-US" sz="2600"/>
+              <a:t>Possible </a:t>
+            </a:r>
+            <a:r>
+              <a:rPr lang="en-US" sz="2600" b="1"/>
+              <a:t>index route</a:t>
+            </a:r>
+            <a:r>
+              <a:rPr lang="en-US" sz="2600"/>
+              <a:t>, rendering the index path.</a:t>
+            </a:r>
+          </a:p>
+          <a:p>
+            <a:pPr lvl="1">
+              <a:lnSpc>
+                <a:spcPct val="100000"/>
+              </a:lnSpc>
+            </a:pPr>
+            <a:r>
+              <a:rPr lang="en-US" sz="2600"/>
+              <a:t>Possibly </a:t>
+            </a:r>
+            <a:r>
+              <a:rPr lang="en-US" sz="2600" b="1"/>
+              <a:t>shared layout </a:t>
+            </a:r>
+            <a:r>
+              <a:rPr lang="en-US" sz="2600"/>
+              <a:t>component.</a:t>
+            </a:r>
+          </a:p>
+          <a:p>
+            <a:pPr lvl="1">
+              <a:lnSpc>
+                <a:spcPct val="100000"/>
+              </a:lnSpc>
+            </a:pPr>
+            <a:r>
+              <a:rPr lang="en-US" sz="2600"/>
+              <a:t>Possibly with </a:t>
+            </a:r>
+            <a:r>
+              <a:rPr lang="en-US" sz="2600" b="1"/>
+              <a:t>shared context</a:t>
+            </a:r>
+            <a:r>
+              <a:rPr lang="en-US" sz="2600"/>
+              <a:t>?</a:t>
             </a:r>
           </a:p>
         </p:txBody>
@@ -8937,7 +8563,7 @@
     </p:spTree>
     <p:extLst>
       <p:ext uri="{BB962C8B-B14F-4D97-AF65-F5344CB8AC3E}">
-        <p14:creationId xmlns:p14="http://schemas.microsoft.com/office/powerpoint/2010/main" val="1452549001"/>
+        <p14:creationId xmlns:p14="http://schemas.microsoft.com/office/powerpoint/2010/main" val="2361742466"/>
       </p:ext>
     </p:extLst>
   </p:cSld>
@@ -8989,7 +8615,7 @@
           <a:p>
             <a:r>
               <a:rPr lang="en-US"/>
-              <a:t>12. Typical List component composition</a:t>
+              <a:t>+ Programmatic Routing</a:t>
             </a:r>
             <a:endParaRPr lang="fi-FI"/>
           </a:p>
@@ -9014,7 +8640,7 @@
         <p:spPr/>
         <p:txBody>
           <a:bodyPr vert="horz" lIns="0" tIns="0" rIns="0" bIns="36000" numCol="1" spcCol="360000" rtlCol="0" anchor="t">
-            <a:normAutofit fontScale="92500"/>
+            <a:normAutofit/>
           </a:bodyPr>
           <a:lstStyle/>
           <a:p>
@@ -9024,185 +8650,26 @@
               </a:lnSpc>
             </a:pPr>
             <a:r>
-              <a:rPr lang="en-US" sz="2800" dirty="0"/>
-              <a:t>(See random example on the next slide. Idea important, </a:t>
-            </a:r>
-            <a:r>
-              <a:rPr lang="en-US" sz="2800"/>
-              <a:t>not exact match)</a:t>
-            </a:r>
-            <a:endParaRPr lang="en-US" sz="2800" dirty="0">
-              <a:cs typeface="Arial"/>
-            </a:endParaRPr>
-          </a:p>
-          <a:p>
-            <a:pPr marL="215900" indent="-215900">
-              <a:lnSpc>
-                <a:spcPct val="100000"/>
-              </a:lnSpc>
-            </a:pPr>
-            <a:r>
-              <a:rPr lang="en-US" sz="2800" dirty="0"/>
-              <a:t>The example is about Buildings, e.g. three </a:t>
-            </a:r>
-            <a:r>
-              <a:rPr lang="en-US" sz="2800" dirty="0" err="1"/>
-              <a:t>buldings</a:t>
-            </a:r>
-            <a:r>
-              <a:rPr lang="en-US" sz="2800" dirty="0"/>
-              <a:t> on one campus, two on other.</a:t>
-            </a:r>
-            <a:endParaRPr lang="en-US" sz="2800" dirty="0">
-              <a:cs typeface="Arial"/>
-            </a:endParaRPr>
-          </a:p>
-          <a:p>
-            <a:pPr marL="215900" indent="-215900">
-              <a:lnSpc>
-                <a:spcPct val="100000"/>
-              </a:lnSpc>
-            </a:pPr>
-            <a:r>
-              <a:rPr lang="en-US" sz="2800" dirty="0"/>
-              <a:t>SRP = Single Responsibility Principle. Each component doing usually only one thing in the app:</a:t>
-            </a:r>
-            <a:endParaRPr lang="en-US" sz="2800" dirty="0">
-              <a:cs typeface="Arial"/>
-            </a:endParaRPr>
-          </a:p>
-          <a:p>
-            <a:pPr marL="719455" lvl="1" indent="-215900">
-              <a:lnSpc>
-                <a:spcPct val="100000"/>
-              </a:lnSpc>
-            </a:pPr>
-            <a:r>
-              <a:rPr lang="en-US" sz="2600" dirty="0"/>
-              <a:t>Providing navigable view:   </a:t>
-            </a:r>
-            <a:r>
-              <a:rPr lang="en-US" sz="2600" dirty="0" err="1"/>
-              <a:t>BuildingList</a:t>
-            </a:r>
-            <a:r>
-              <a:rPr lang="en-US" sz="2600" b="1" dirty="0" err="1"/>
-              <a:t>View</a:t>
-            </a:r>
-            <a:endParaRPr lang="en-US" sz="2600" b="1" dirty="0">
-              <a:cs typeface="Arial" panose="020B0604020202020204"/>
-            </a:endParaRPr>
-          </a:p>
-          <a:p>
-            <a:pPr marL="719455" lvl="1" indent="-215900">
-              <a:lnSpc>
-                <a:spcPct val="100000"/>
-              </a:lnSpc>
-            </a:pPr>
-            <a:r>
-              <a:rPr lang="en-US" sz="2600" dirty="0"/>
-              <a:t>Holding and refreshing data list state, maps w. </a:t>
-            </a:r>
-            <a:r>
-              <a:rPr lang="en-US" sz="2600" dirty="0" err="1"/>
-              <a:t>ListItems</a:t>
-            </a:r>
-            <a:r>
-              <a:rPr lang="en-US" sz="2600" dirty="0"/>
-              <a:t>:   </a:t>
-            </a:r>
-            <a:r>
-              <a:rPr lang="en-US" sz="2600" dirty="0" err="1"/>
-              <a:t>Building</a:t>
-            </a:r>
-            <a:r>
-              <a:rPr lang="en-US" sz="2600" b="1" dirty="0" err="1"/>
-              <a:t>List</a:t>
-            </a:r>
-            <a:r>
-              <a:rPr lang="en-US" sz="2600" dirty="0"/>
-              <a:t> </a:t>
-            </a:r>
-            <a:endParaRPr lang="en-US" sz="2600" dirty="0">
-              <a:cs typeface="Arial"/>
-            </a:endParaRPr>
-          </a:p>
-          <a:p>
-            <a:pPr marL="719455" lvl="1" indent="-215900">
-              <a:lnSpc>
-                <a:spcPct val="100000"/>
-              </a:lnSpc>
-            </a:pPr>
-            <a:r>
-              <a:rPr lang="en-US" sz="2600" dirty="0"/>
-              <a:t>Providing actions for one item:   </a:t>
-            </a:r>
-            <a:r>
-              <a:rPr lang="en-US" sz="2600" dirty="0" err="1"/>
-              <a:t>Building</a:t>
-            </a:r>
-            <a:r>
-              <a:rPr lang="en-US" sz="2600" b="1" dirty="0" err="1"/>
-              <a:t>ListItem</a:t>
-            </a:r>
-            <a:r>
-              <a:rPr lang="en-US" sz="2600" b="1" dirty="0"/>
-              <a:t> </a:t>
-            </a:r>
-            <a:r>
-              <a:rPr lang="en-US" sz="2600" dirty="0">
+              <a:rPr lang="en-US" sz="2800">
                 <a:ea typeface="+mn-lt"/>
                 <a:cs typeface="+mn-lt"/>
               </a:rPr>
-              <a:t>(clickable, x = delete)</a:t>
-            </a:r>
-            <a:endParaRPr lang="en-US" sz="2600" b="1" dirty="0">
-              <a:cs typeface="Arial" panose="020B0604020202020204"/>
-            </a:endParaRPr>
-          </a:p>
-          <a:p>
-            <a:pPr marL="719455" lvl="1" indent="-215900">
-              <a:lnSpc>
-                <a:spcPct val="100000"/>
-              </a:lnSpc>
-            </a:pPr>
-            <a:r>
-              <a:rPr lang="en-US" sz="2600" dirty="0"/>
-              <a:t>Just shows data for one item:   </a:t>
-            </a:r>
-            <a:r>
-              <a:rPr lang="en-US" sz="2600" dirty="0" err="1"/>
-              <a:t>Building</a:t>
-            </a:r>
-            <a:r>
-              <a:rPr lang="en-US" sz="2600" b="1" dirty="0" err="1"/>
-              <a:t>Display</a:t>
-            </a:r>
-            <a:r>
-              <a:rPr lang="en-US" sz="2600" dirty="0"/>
-              <a:t> / </a:t>
-            </a:r>
-            <a:r>
-              <a:rPr lang="en-US" sz="2600" dirty="0" err="1">
+              <a:t>You can also programmatically </a:t>
+            </a:r>
+            <a:r>
+              <a:rPr lang="en-US" sz="2800" b="1">
                 <a:ea typeface="+mn-lt"/>
                 <a:cs typeface="+mn-lt"/>
               </a:rPr>
-              <a:t>BuildingInfo</a:t>
-            </a:r>
-            <a:r>
-              <a:rPr lang="en-US" sz="2600" dirty="0">
+              <a:t>manipulate the Routing history stack: </a:t>
+            </a:r>
+            <a:r>
+              <a:rPr lang="en-US" sz="2800">
                 <a:ea typeface="+mn-lt"/>
                 <a:cs typeface="+mn-lt"/>
               </a:rPr>
-              <a:t> / </a:t>
-            </a:r>
-            <a:r>
-              <a:rPr lang="en-US" sz="2600" dirty="0"/>
-              <a:t>B…Details</a:t>
-            </a:r>
-            <a:endParaRPr lang="en-US" sz="2600" dirty="0">
-              <a:cs typeface="Arial"/>
-            </a:endParaRPr>
+              <a:t>pop, push, replace.</a:t>
+            </a:r>
           </a:p>
         </p:txBody>
       </p:sp>
@@ -9292,7 +8759,7 @@
     </p:spTree>
     <p:extLst>
       <p:ext uri="{BB962C8B-B14F-4D97-AF65-F5344CB8AC3E}">
-        <p14:creationId xmlns:p14="http://schemas.microsoft.com/office/powerpoint/2010/main" val="553651584"/>
+        <p14:creationId xmlns:p14="http://schemas.microsoft.com/office/powerpoint/2010/main" val="1452549001"/>
       </p:ext>
     </p:extLst>
   </p:cSld>
@@ -9321,6 +8788,361 @@
       </p:grpSpPr>
       <p:sp>
         <p:nvSpPr>
+          <p:cNvPr id="2" name="Title 1">
+            <a:extLst>
+              <a:ext uri="{FF2B5EF4-FFF2-40B4-BE49-F238E27FC236}">
+                <a16:creationId xmlns:a16="http://schemas.microsoft.com/office/drawing/2014/main" id="{F9662D29-990E-426E-BC0E-093CB48EE792}"/>
+              </a:ext>
+            </a:extLst>
+          </p:cNvPr>
+          <p:cNvSpPr>
+            <a:spLocks noGrp="1"/>
+          </p:cNvSpPr>
+          <p:nvPr>
+            <p:ph type="title"/>
+          </p:nvPr>
+        </p:nvSpPr>
+        <p:spPr/>
+        <p:txBody>
+          <a:bodyPr anchor="ctr">
+            <a:normAutofit/>
+          </a:bodyPr>
+          <a:lstStyle/>
+          <a:p>
+            <a:r>
+              <a:rPr lang="en-US"/>
+              <a:t>12. Typical List component composition</a:t>
+            </a:r>
+            <a:endParaRPr lang="fi-FI"/>
+          </a:p>
+        </p:txBody>
+      </p:sp>
+      <p:sp>
+        <p:nvSpPr>
+          <p:cNvPr id="3" name="Content Placeholder 2">
+            <a:extLst>
+              <a:ext uri="{FF2B5EF4-FFF2-40B4-BE49-F238E27FC236}">
+                <a16:creationId xmlns:a16="http://schemas.microsoft.com/office/drawing/2014/main" id="{001C1C76-B4E0-405B-8F87-AC2E22AA7225}"/>
+              </a:ext>
+            </a:extLst>
+          </p:cNvPr>
+          <p:cNvSpPr>
+            <a:spLocks noGrp="1"/>
+          </p:cNvSpPr>
+          <p:nvPr>
+            <p:ph sz="half" idx="2"/>
+          </p:nvPr>
+        </p:nvSpPr>
+        <p:spPr/>
+        <p:txBody>
+          <a:bodyPr vert="horz" lIns="0" tIns="0" rIns="0" bIns="36000" numCol="1" spcCol="360000" rtlCol="0" anchor="t">
+            <a:normAutofit fontScale="92500"/>
+          </a:bodyPr>
+          <a:lstStyle/>
+          <a:p>
+            <a:pPr marL="215900" indent="-215900">
+              <a:lnSpc>
+                <a:spcPct val="100000"/>
+              </a:lnSpc>
+            </a:pPr>
+            <a:r>
+              <a:rPr lang="en-US" sz="2800" dirty="0"/>
+              <a:t>(See random example on the next slide. Idea important, </a:t>
+            </a:r>
+            <a:r>
+              <a:rPr lang="en-US" sz="2800"/>
+              <a:t>not exact match)</a:t>
+            </a:r>
+            <a:endParaRPr lang="en-US" sz="2800" dirty="0">
+              <a:cs typeface="Arial"/>
+            </a:endParaRPr>
+          </a:p>
+          <a:p>
+            <a:pPr marL="215900" indent="-215900">
+              <a:lnSpc>
+                <a:spcPct val="100000"/>
+              </a:lnSpc>
+            </a:pPr>
+            <a:r>
+              <a:rPr lang="en-US" sz="2800" dirty="0"/>
+              <a:t>The example is about Buildings, e.g. three </a:t>
+            </a:r>
+            <a:r>
+              <a:rPr lang="en-US" sz="2800" dirty="0" err="1"/>
+              <a:t>buldings</a:t>
+            </a:r>
+            <a:r>
+              <a:rPr lang="en-US" sz="2800" dirty="0"/>
+              <a:t> on one campus, two on other.</a:t>
+            </a:r>
+            <a:endParaRPr lang="en-US" sz="2800" dirty="0">
+              <a:cs typeface="Arial"/>
+            </a:endParaRPr>
+          </a:p>
+          <a:p>
+            <a:pPr marL="215900" indent="-215900">
+              <a:lnSpc>
+                <a:spcPct val="100000"/>
+              </a:lnSpc>
+            </a:pPr>
+            <a:r>
+              <a:rPr lang="en-US" sz="2800" dirty="0"/>
+              <a:t>SRP = Single Responsibility Principle. Each component doing usually only one thing in the app:</a:t>
+            </a:r>
+            <a:endParaRPr lang="en-US" sz="2800" dirty="0">
+              <a:cs typeface="Arial"/>
+            </a:endParaRPr>
+          </a:p>
+          <a:p>
+            <a:pPr marL="719455" lvl="1" indent="-215900">
+              <a:lnSpc>
+                <a:spcPct val="100000"/>
+              </a:lnSpc>
+            </a:pPr>
+            <a:r>
+              <a:rPr lang="en-US" sz="2600" dirty="0"/>
+              <a:t>Providing navigable view:   </a:t>
+            </a:r>
+            <a:r>
+              <a:rPr lang="en-US" sz="2600" dirty="0" err="1"/>
+              <a:t>BuildingList</a:t>
+            </a:r>
+            <a:r>
+              <a:rPr lang="en-US" sz="2600" b="1" dirty="0" err="1"/>
+              <a:t>View</a:t>
+            </a:r>
+            <a:endParaRPr lang="en-US" sz="2600" b="1" dirty="0">
+              <a:cs typeface="Arial" panose="020B0604020202020204"/>
+            </a:endParaRPr>
+          </a:p>
+          <a:p>
+            <a:pPr marL="719455" lvl="1" indent="-215900">
+              <a:lnSpc>
+                <a:spcPct val="100000"/>
+              </a:lnSpc>
+            </a:pPr>
+            <a:r>
+              <a:rPr lang="en-US" sz="2600" dirty="0"/>
+              <a:t>Holding and refreshing data list state, maps w. </a:t>
+            </a:r>
+            <a:r>
+              <a:rPr lang="en-US" sz="2600" dirty="0" err="1"/>
+              <a:t>ListItems</a:t>
+            </a:r>
+            <a:r>
+              <a:rPr lang="en-US" sz="2600" dirty="0"/>
+              <a:t>:   </a:t>
+            </a:r>
+            <a:r>
+              <a:rPr lang="en-US" sz="2600" dirty="0" err="1"/>
+              <a:t>Building</a:t>
+            </a:r>
+            <a:r>
+              <a:rPr lang="en-US" sz="2600" b="1" dirty="0" err="1"/>
+              <a:t>List</a:t>
+            </a:r>
+            <a:r>
+              <a:rPr lang="en-US" sz="2600" dirty="0"/>
+              <a:t> </a:t>
+            </a:r>
+            <a:endParaRPr lang="en-US" sz="2600" dirty="0">
+              <a:cs typeface="Arial"/>
+            </a:endParaRPr>
+          </a:p>
+          <a:p>
+            <a:pPr marL="719455" lvl="1" indent="-215900">
+              <a:lnSpc>
+                <a:spcPct val="100000"/>
+              </a:lnSpc>
+            </a:pPr>
+            <a:r>
+              <a:rPr lang="en-US" sz="2600" dirty="0"/>
+              <a:t>Providing actions for one item:   </a:t>
+            </a:r>
+            <a:r>
+              <a:rPr lang="en-US" sz="2600" dirty="0" err="1"/>
+              <a:t>Building</a:t>
+            </a:r>
+            <a:r>
+              <a:rPr lang="en-US" sz="2600" b="1" dirty="0" err="1"/>
+              <a:t>ListItem</a:t>
+            </a:r>
+            <a:r>
+              <a:rPr lang="en-US" sz="2600" b="1" dirty="0"/>
+              <a:t> </a:t>
+            </a:r>
+            <a:r>
+              <a:rPr lang="en-US" sz="2600" dirty="0">
+                <a:ea typeface="+mn-lt"/>
+                <a:cs typeface="+mn-lt"/>
+              </a:rPr>
+              <a:t>(clickable, x = delete)</a:t>
+            </a:r>
+            <a:endParaRPr lang="en-US" sz="2600" b="1" dirty="0">
+              <a:cs typeface="Arial" panose="020B0604020202020204"/>
+            </a:endParaRPr>
+          </a:p>
+          <a:p>
+            <a:pPr marL="719455" lvl="1" indent="-215900">
+              <a:lnSpc>
+                <a:spcPct val="100000"/>
+              </a:lnSpc>
+            </a:pPr>
+            <a:r>
+              <a:rPr lang="en-US" sz="2600" dirty="0"/>
+              <a:t>Just shows data for one item:   </a:t>
+            </a:r>
+            <a:r>
+              <a:rPr lang="en-US" sz="2600" dirty="0" err="1"/>
+              <a:t>Building</a:t>
+            </a:r>
+            <a:r>
+              <a:rPr lang="en-US" sz="2600" b="1" dirty="0" err="1"/>
+              <a:t>Display</a:t>
+            </a:r>
+            <a:r>
+              <a:rPr lang="en-US" sz="2600" dirty="0"/>
+              <a:t> / </a:t>
+            </a:r>
+            <a:r>
+              <a:rPr lang="en-US" sz="2600" dirty="0" err="1">
+                <a:ea typeface="+mn-lt"/>
+                <a:cs typeface="+mn-lt"/>
+              </a:rPr>
+              <a:t>BuildingInfo</a:t>
+            </a:r>
+            <a:r>
+              <a:rPr lang="en-US" sz="2600" dirty="0">
+                <a:ea typeface="+mn-lt"/>
+                <a:cs typeface="+mn-lt"/>
+              </a:rPr>
+              <a:t> / </a:t>
+            </a:r>
+            <a:r>
+              <a:rPr lang="en-US" sz="2600" dirty="0"/>
+              <a:t>B…Details</a:t>
+            </a:r>
+            <a:endParaRPr lang="en-US" sz="2600" dirty="0">
+              <a:cs typeface="Arial"/>
+            </a:endParaRPr>
+          </a:p>
+        </p:txBody>
+      </p:sp>
+      <p:sp>
+        <p:nvSpPr>
+          <p:cNvPr id="4" name="Date Placeholder 3">
+            <a:extLst>
+              <a:ext uri="{FF2B5EF4-FFF2-40B4-BE49-F238E27FC236}">
+                <a16:creationId xmlns:a16="http://schemas.microsoft.com/office/drawing/2014/main" id="{FDEC7F5E-C1B0-42AC-950B-DE3029CAED1B}"/>
+              </a:ext>
+            </a:extLst>
+          </p:cNvPr>
+          <p:cNvSpPr>
+            <a:spLocks noGrp="1"/>
+          </p:cNvSpPr>
+          <p:nvPr>
+            <p:ph type="dt" sz="half" idx="10"/>
+          </p:nvPr>
+        </p:nvSpPr>
+        <p:spPr/>
+        <p:txBody>
+          <a:bodyPr/>
+          <a:lstStyle/>
+          <a:p>
+            <a:fld id="{11EDCD7B-6966-E249-89F2-D46BDFBF56BE}" type="datetime1">
+              <a:rPr lang="fi-FI" smtClean="0"/>
+              <a:t>11.3.2024</a:t>
+            </a:fld>
+            <a:endParaRPr lang="en-GB"/>
+          </a:p>
+        </p:txBody>
+      </p:sp>
+      <p:sp>
+        <p:nvSpPr>
+          <p:cNvPr id="5" name="Footer Placeholder 4">
+            <a:extLst>
+              <a:ext uri="{FF2B5EF4-FFF2-40B4-BE49-F238E27FC236}">
+                <a16:creationId xmlns:a16="http://schemas.microsoft.com/office/drawing/2014/main" id="{72FA43EE-B2B3-49D5-872B-4D987D842984}"/>
+              </a:ext>
+            </a:extLst>
+          </p:cNvPr>
+          <p:cNvSpPr>
+            <a:spLocks noGrp="1"/>
+          </p:cNvSpPr>
+          <p:nvPr>
+            <p:ph type="ftr" sz="quarter" idx="11"/>
+          </p:nvPr>
+        </p:nvSpPr>
+        <p:spPr/>
+        <p:txBody>
+          <a:bodyPr/>
+          <a:lstStyle/>
+          <a:p>
+            <a:endParaRPr lang="en-GB"/>
+          </a:p>
+        </p:txBody>
+      </p:sp>
+      <p:sp>
+        <p:nvSpPr>
+          <p:cNvPr id="6" name="Slide Number Placeholder 5">
+            <a:extLst>
+              <a:ext uri="{FF2B5EF4-FFF2-40B4-BE49-F238E27FC236}">
+                <a16:creationId xmlns:a16="http://schemas.microsoft.com/office/drawing/2014/main" id="{36A82290-8C98-42D6-A040-74AE3ECFEC15}"/>
+              </a:ext>
+            </a:extLst>
+          </p:cNvPr>
+          <p:cNvSpPr>
+            <a:spLocks noGrp="1"/>
+          </p:cNvSpPr>
+          <p:nvPr>
+            <p:ph type="sldNum" sz="quarter" idx="12"/>
+          </p:nvPr>
+        </p:nvSpPr>
+        <p:spPr/>
+        <p:txBody>
+          <a:bodyPr/>
+          <a:lstStyle/>
+          <a:p>
+            <a:fld id="{76BAB7ED-EDE9-4D4B-9A2D-30E18C47C16E}" type="slidenum">
+              <a:rPr lang="en-GB" smtClean="0"/>
+              <a:t>16</a:t>
+            </a:fld>
+            <a:endParaRPr lang="en-GB"/>
+          </a:p>
+        </p:txBody>
+      </p:sp>
+    </p:spTree>
+    <p:extLst>
+      <p:ext uri="{BB962C8B-B14F-4D97-AF65-F5344CB8AC3E}">
+        <p14:creationId xmlns:p14="http://schemas.microsoft.com/office/powerpoint/2010/main" val="553651584"/>
+      </p:ext>
+    </p:extLst>
+  </p:cSld>
+  <p:clrMapOvr>
+    <a:masterClrMapping/>
+  </p:clrMapOvr>
+</p:sld>
+</file>
+
+<file path=ppt/slides/slide17.xml><?xml version="1.0" encoding="utf-8"?>
+<p:sld xmlns:a="http://schemas.openxmlformats.org/drawingml/2006/main" xmlns:r="http://schemas.openxmlformats.org/officeDocument/2006/relationships" xmlns:p="http://schemas.openxmlformats.org/presentationml/2006/main">
+  <p:cSld>
+    <p:spTree>
+      <p:nvGrpSpPr>
+        <p:cNvPr id="1" name=""/>
+        <p:cNvGrpSpPr/>
+        <p:nvPr/>
+      </p:nvGrpSpPr>
+      <p:grpSpPr>
+        <a:xfrm>
+          <a:off x="0" y="0"/>
+          <a:ext cx="0" cy="0"/>
+          <a:chOff x="0" y="0"/>
+          <a:chExt cx="0" cy="0"/>
+        </a:xfrm>
+      </p:grpSpPr>
+      <p:sp>
+        <p:nvSpPr>
           <p:cNvPr id="5" name="Date Placeholder 4">
             <a:extLst>
               <a:ext uri="{FF2B5EF4-FFF2-40B4-BE49-F238E27FC236}">
@@ -9396,7 +9218,7 @@
           <a:p>
             <a:fld id="{76BAB7ED-EDE9-4D4B-9A2D-30E18C47C16E}" type="slidenum">
               <a:rPr lang="en-GB" smtClean="0"/>
-              <a:t>16</a:t>
+              <a:t>17</a:t>
             </a:fld>
             <a:endParaRPr lang="en-GB"/>
           </a:p>
@@ -10205,10 +10027,18 @@
           <a:lstStyle/>
           <a:p>
             <a:r>
-              <a:rPr lang="en-US"/>
-              <a:t>2. Single-page application, SPA</a:t>
-            </a:r>
-            <a:endParaRPr lang="en-US" sz="4800"/>
+              <a:rPr lang="en-US" sz="4800" dirty="0"/>
+              <a:t>1. React and JSX basic syntax - phase</a:t>
+            </a:r>
+            <a:br>
+              <a:rPr lang="en-US" sz="4800" dirty="0"/>
+            </a:br>
+            <a:endParaRPr lang="en-US" sz="1800" dirty="0">
+              <a:solidFill>
+                <a:srgbClr val="FF0000"/>
+              </a:solidFill>
+              <a:cs typeface="Arial"/>
+            </a:endParaRPr>
           </a:p>
         </p:txBody>
       </p:sp>
@@ -10228,44 +10058,459 @@
             <p:ph sz="half" idx="2"/>
           </p:nvPr>
         </p:nvSpPr>
-        <p:spPr/>
-        <p:txBody>
-          <a:bodyPr>
-            <a:normAutofit/>
+        <p:spPr>
+          <a:xfrm>
+            <a:off x="550864" y="1432429"/>
+            <a:ext cx="11125198" cy="4481009"/>
+          </a:xfrm>
+        </p:spPr>
+        <p:txBody>
+          <a:bodyPr vert="horz" lIns="0" tIns="0" rIns="0" bIns="36000" numCol="1" spcCol="360000" rtlCol="0" anchor="t">
+            <a:normAutofit lnSpcReduction="10000"/>
           </a:bodyPr>
           <a:lstStyle/>
           <a:p>
-            <a:pPr>
+            <a:pPr marL="215900" indent="-215900">
               <a:lnSpc>
                 <a:spcPct val="100000"/>
               </a:lnSpc>
             </a:pPr>
             <a:r>
               <a:rPr lang="en-US" sz="2800" dirty="0"/>
-              <a:t>Browser fetches/loads only one version of the page from the server, in the beginning. </a:t>
-            </a:r>
-          </a:p>
-          <a:p>
-            <a:pPr>
+              <a:t>Finally output to browser DOM will be </a:t>
+            </a:r>
+            <a:r>
+              <a:rPr lang="en-US" sz="2800" b="1" dirty="0"/>
+              <a:t>HTML with DOM JavaScript</a:t>
+            </a:r>
+            <a:endParaRPr lang="fi-FI" sz="2800" b="1" dirty="0"/>
+          </a:p>
+          <a:p>
+            <a:pPr marL="719455" lvl="1" indent="-215900">
               <a:lnSpc>
                 <a:spcPct val="100000"/>
               </a:lnSpc>
             </a:pPr>
             <a:r>
-              <a:rPr lang="en-US" sz="2800" dirty="0"/>
-              <a:t>After that, with the JavaScript code running on the browser, we just update that one page DOM, but to the user it looks like we are navigating through different pages.</a:t>
-            </a:r>
-          </a:p>
-          <a:p>
-            <a:pPr>
+              <a:rPr lang="fi-FI" sz="2000" dirty="0" err="1">
+                <a:cs typeface="Arial" panose="020B0604020202020204"/>
+              </a:rPr>
+              <a:t>e.g</a:t>
+            </a:r>
+            <a:r>
+              <a:rPr lang="fi-FI" sz="2000" dirty="0">
+                <a:cs typeface="Arial" panose="020B0604020202020204"/>
+              </a:rPr>
+              <a:t>.   &lt;</a:t>
+            </a:r>
+            <a:r>
+              <a:rPr lang="fi-FI" sz="2000" b="1" dirty="0">
+                <a:cs typeface="Arial" panose="020B0604020202020204"/>
+              </a:rPr>
+              <a:t>i</a:t>
+            </a:r>
+            <a:r>
+              <a:rPr lang="fi-FI" sz="2000" dirty="0">
+                <a:cs typeface="Arial" panose="020B0604020202020204"/>
+              </a:rPr>
+              <a:t>nput </a:t>
+            </a:r>
+            <a:r>
+              <a:rPr lang="fi-FI" sz="2000" dirty="0" err="1">
+                <a:cs typeface="Arial" panose="020B0604020202020204"/>
+              </a:rPr>
+              <a:t>type</a:t>
+            </a:r>
+            <a:r>
+              <a:rPr lang="fi-FI" sz="2000" dirty="0">
+                <a:cs typeface="Arial" panose="020B0604020202020204"/>
+              </a:rPr>
+              <a:t>="</a:t>
+            </a:r>
+            <a:r>
+              <a:rPr lang="fi-FI" sz="2000" dirty="0" err="1">
+                <a:cs typeface="Arial" panose="020B0604020202020204"/>
+              </a:rPr>
+              <a:t>submit</a:t>
+            </a:r>
+            <a:r>
+              <a:rPr lang="fi-FI" sz="2000" dirty="0">
+                <a:cs typeface="Arial" panose="020B0604020202020204"/>
+              </a:rPr>
+              <a:t>" </a:t>
+            </a:r>
+            <a:r>
+              <a:rPr lang="fi-FI" sz="2000" dirty="0" err="1">
+                <a:cs typeface="Arial" panose="020B0604020202020204"/>
+              </a:rPr>
+              <a:t>onclick</a:t>
+            </a:r>
+            <a:r>
+              <a:rPr lang="fi-FI" sz="2000" dirty="0">
+                <a:cs typeface="Arial" panose="020B0604020202020204"/>
+              </a:rPr>
+              <a:t>="</a:t>
+            </a:r>
+            <a:r>
+              <a:rPr lang="fi-FI" sz="2000" dirty="0" err="1">
+                <a:cs typeface="Arial" panose="020B0604020202020204"/>
+              </a:rPr>
+              <a:t>myFunc</a:t>
+            </a:r>
+            <a:r>
+              <a:rPr lang="fi-FI" sz="2000" dirty="0">
+                <a:cs typeface="Arial" panose="020B0604020202020204"/>
+              </a:rPr>
+              <a:t>()</a:t>
+            </a:r>
+            <a:r>
+              <a:rPr lang="fi-FI" sz="2000" b="1" dirty="0">
+                <a:cs typeface="Arial" panose="020B0604020202020204"/>
+              </a:rPr>
+              <a:t>;</a:t>
+            </a:r>
+            <a:r>
+              <a:rPr lang="fi-FI" sz="2000" dirty="0">
+                <a:cs typeface="Arial" panose="020B0604020202020204"/>
+              </a:rPr>
+              <a:t>" </a:t>
+            </a:r>
+            <a:r>
+              <a:rPr lang="fi-FI" sz="2000" dirty="0" err="1">
+                <a:cs typeface="Arial" panose="020B0604020202020204"/>
+              </a:rPr>
+              <a:t>class</a:t>
+            </a:r>
+            <a:r>
+              <a:rPr lang="fi-FI" sz="2000" dirty="0">
+                <a:cs typeface="Arial" panose="020B0604020202020204"/>
+              </a:rPr>
+              <a:t>="style1" &gt;</a:t>
+            </a:r>
+            <a:r>
+              <a:rPr lang="fi-FI" sz="2000" dirty="0" err="1">
+                <a:cs typeface="Arial" panose="020B0604020202020204"/>
+              </a:rPr>
+              <a:t>Delete</a:t>
+            </a:r>
+            <a:r>
+              <a:rPr lang="fi-FI" sz="2000" dirty="0">
+                <a:cs typeface="Arial" panose="020B0604020202020204"/>
+              </a:rPr>
+              <a:t> </a:t>
+            </a:r>
+            <a:r>
+              <a:rPr lang="fi-FI" sz="2000" dirty="0" err="1">
+                <a:cs typeface="Arial" panose="020B0604020202020204"/>
+              </a:rPr>
+              <a:t>item</a:t>
+            </a:r>
+            <a:r>
+              <a:rPr lang="fi-FI" sz="2000" dirty="0">
+                <a:cs typeface="Arial" panose="020B0604020202020204"/>
+              </a:rPr>
+              <a:t> 101&lt;/...</a:t>
+            </a:r>
+          </a:p>
+          <a:p>
+            <a:pPr marL="215900" indent="-215900">
               <a:lnSpc>
                 <a:spcPct val="100000"/>
               </a:lnSpc>
             </a:pPr>
             <a:r>
               <a:rPr lang="en-US" sz="2800" dirty="0"/>
-              <a:t>React routing is able to make it look like we are navigating. And also make the routing programming logical for the programmer.</a:t>
-            </a:r>
+              <a:t>Before that, </a:t>
+            </a:r>
+            <a:r>
+              <a:rPr lang="en-US" sz="2800" b="1" dirty="0"/>
+              <a:t>React components </a:t>
+            </a:r>
+            <a:r>
+              <a:rPr lang="en-US" sz="2800" dirty="0"/>
+              <a:t>(Possibly w. Mui-React components) to be rendered as HTML </a:t>
+            </a:r>
+            <a:r>
+              <a:rPr lang="en-US" sz="2800" dirty="0" err="1"/>
+              <a:t>etc</a:t>
+            </a:r>
+            <a:r>
+              <a:rPr lang="en-US" sz="2800" dirty="0"/>
+              <a:t> based on e.g. attribute values</a:t>
+            </a:r>
+            <a:endParaRPr lang="fi-FI" sz="2800" dirty="0">
+              <a:cs typeface="Arial" panose="020B0604020202020204"/>
+            </a:endParaRPr>
+          </a:p>
+          <a:p>
+            <a:pPr marL="719455" lvl="1" indent="-215900">
+              <a:lnSpc>
+                <a:spcPct val="100000"/>
+              </a:lnSpc>
+            </a:pPr>
+            <a:r>
+              <a:rPr lang="en-US" sz="1800" dirty="0">
+                <a:cs typeface="Arial"/>
+              </a:rPr>
+              <a:t>e.g.   &lt;</a:t>
+            </a:r>
+            <a:r>
+              <a:rPr lang="en-US" sz="1800" b="1" dirty="0">
+                <a:cs typeface="Arial"/>
+              </a:rPr>
+              <a:t>B</a:t>
+            </a:r>
+            <a:r>
+              <a:rPr lang="en-US" sz="1800" dirty="0">
+                <a:cs typeface="Arial"/>
+              </a:rPr>
+              <a:t>utton </a:t>
+            </a:r>
+            <a:r>
+              <a:rPr lang="en-US" sz="1800" dirty="0" err="1">
+                <a:cs typeface="Arial"/>
+              </a:rPr>
+              <a:t>on</a:t>
+            </a:r>
+            <a:r>
+              <a:rPr lang="en-US" sz="1800" b="1" dirty="0" err="1">
+                <a:cs typeface="Arial"/>
+              </a:rPr>
+              <a:t>C</a:t>
+            </a:r>
+            <a:r>
+              <a:rPr lang="en-US" sz="1800" dirty="0" err="1">
+                <a:cs typeface="Arial"/>
+              </a:rPr>
+              <a:t>lick</a:t>
+            </a:r>
+            <a:r>
+              <a:rPr lang="en-US" sz="1800" dirty="0">
+                <a:cs typeface="Arial"/>
+              </a:rPr>
+              <a:t>={()</a:t>
+            </a:r>
+            <a:r>
+              <a:rPr lang="en-US" sz="1800" b="1" dirty="0">
+                <a:cs typeface="Arial"/>
+              </a:rPr>
+              <a:t>=&gt;</a:t>
+            </a:r>
+            <a:r>
+              <a:rPr lang="en-US" sz="1800" dirty="0" err="1">
+                <a:cs typeface="Arial"/>
+              </a:rPr>
+              <a:t>myFunc</a:t>
+            </a:r>
+            <a:r>
+              <a:rPr lang="en-US" sz="1800" dirty="0">
+                <a:cs typeface="Arial"/>
+              </a:rPr>
+              <a:t>()} </a:t>
+            </a:r>
+            <a:r>
+              <a:rPr lang="en-US" sz="1800" dirty="0" err="1">
+                <a:cs typeface="Arial"/>
+              </a:rPr>
+              <a:t>classNames</a:t>
+            </a:r>
+            <a:r>
+              <a:rPr lang="en-US" sz="1800" dirty="0">
+                <a:cs typeface="Arial"/>
+              </a:rPr>
+              <a:t>={</a:t>
+            </a:r>
+            <a:r>
+              <a:rPr lang="en-US" sz="1800" dirty="0" err="1">
+                <a:cs typeface="Arial"/>
+              </a:rPr>
+              <a:t>z.x</a:t>
+            </a:r>
+            <a:r>
+              <a:rPr lang="en-US" sz="1800" dirty="0">
+                <a:cs typeface="Arial"/>
+              </a:rPr>
+              <a:t>}&gt;Delete item 101&lt;/...&gt;</a:t>
+            </a:r>
+          </a:p>
+          <a:p>
+            <a:pPr marL="215900" indent="-215900">
+              <a:lnSpc>
+                <a:spcPct val="100000"/>
+              </a:lnSpc>
+            </a:pPr>
+            <a:r>
+              <a:rPr lang="en-US" sz="2800" dirty="0"/>
+              <a:t>Before that we might have </a:t>
+            </a:r>
+            <a:r>
+              <a:rPr lang="en-US" sz="2800" b="1" dirty="0"/>
+              <a:t>JavaScript run </a:t>
+            </a:r>
+            <a:r>
+              <a:rPr lang="en-US" sz="2800" dirty="0"/>
+              <a:t>so that dynamic values are evaluated, e.g. {item.id}.</a:t>
+            </a:r>
+            <a:endParaRPr lang="fi-FI" sz="2800" dirty="0">
+              <a:cs typeface="Arial" panose="020B0604020202020204"/>
+            </a:endParaRPr>
+          </a:p>
+          <a:p>
+            <a:pPr marL="719455" lvl="1" indent="-215900">
+              <a:lnSpc>
+                <a:spcPct val="100000"/>
+              </a:lnSpc>
+            </a:pPr>
+            <a:r>
+              <a:rPr lang="en-US" sz="2600" dirty="0">
+                <a:ea typeface="+mn-lt"/>
+                <a:cs typeface="+mn-lt"/>
+              </a:rPr>
+              <a:t>e.g.   &lt;Button </a:t>
+            </a:r>
+            <a:r>
+              <a:rPr lang="en-US" sz="2600" dirty="0" err="1">
+                <a:ea typeface="+mn-lt"/>
+                <a:cs typeface="+mn-lt"/>
+              </a:rPr>
+              <a:t>onClick</a:t>
+            </a:r>
+            <a:r>
+              <a:rPr lang="en-US" sz="2600" dirty="0">
+                <a:ea typeface="+mn-lt"/>
+                <a:cs typeface="+mn-lt"/>
+              </a:rPr>
+              <a:t>=</a:t>
+            </a:r>
+            <a:r>
+              <a:rPr lang="en-US" sz="2600" b="1" dirty="0">
+                <a:ea typeface="+mn-lt"/>
+                <a:cs typeface="+mn-lt"/>
+              </a:rPr>
+              <a:t>{</a:t>
+            </a:r>
+            <a:r>
+              <a:rPr lang="en-US" sz="2600" dirty="0">
+                <a:ea typeface="+mn-lt"/>
+                <a:cs typeface="+mn-lt"/>
+              </a:rPr>
+              <a:t>()=&gt;</a:t>
+            </a:r>
+            <a:r>
+              <a:rPr lang="en-US" sz="2600" dirty="0" err="1">
+                <a:ea typeface="+mn-lt"/>
+                <a:cs typeface="+mn-lt"/>
+              </a:rPr>
+              <a:t>myFunc</a:t>
+            </a:r>
+            <a:r>
+              <a:rPr lang="en-US" sz="2600" dirty="0">
+                <a:ea typeface="+mn-lt"/>
+                <a:cs typeface="+mn-lt"/>
+              </a:rPr>
+              <a:t>()</a:t>
+            </a:r>
+            <a:r>
+              <a:rPr lang="en-US" sz="2600" b="1" dirty="0">
+                <a:ea typeface="+mn-lt"/>
+                <a:cs typeface="+mn-lt"/>
+              </a:rPr>
+              <a:t>}</a:t>
+            </a:r>
+            <a:r>
+              <a:rPr lang="en-US" sz="2600" dirty="0">
+                <a:ea typeface="+mn-lt"/>
+                <a:cs typeface="+mn-lt"/>
+              </a:rPr>
+              <a:t> &gt;Delete item </a:t>
+            </a:r>
+            <a:r>
+              <a:rPr lang="en-US" sz="2600" b="1" dirty="0">
+                <a:ea typeface="+mn-lt"/>
+                <a:cs typeface="+mn-lt"/>
+              </a:rPr>
+              <a:t>{</a:t>
+            </a:r>
+            <a:r>
+              <a:rPr lang="en-US" sz="2600" dirty="0">
+                <a:ea typeface="+mn-lt"/>
+                <a:cs typeface="+mn-lt"/>
+              </a:rPr>
+              <a:t>item.id</a:t>
+            </a:r>
+            <a:r>
+              <a:rPr lang="en-US" sz="2600" b="1" dirty="0">
+                <a:ea typeface="+mn-lt"/>
+                <a:cs typeface="+mn-lt"/>
+              </a:rPr>
+              <a:t>}</a:t>
+            </a:r>
+            <a:r>
+              <a:rPr lang="en-US" sz="2600" dirty="0">
+                <a:ea typeface="+mn-lt"/>
+                <a:cs typeface="+mn-lt"/>
+              </a:rPr>
+              <a:t>&lt;/...&gt;</a:t>
+            </a:r>
+          </a:p>
+          <a:p>
+            <a:pPr marL="215455" indent="-215900">
+              <a:lnSpc>
+                <a:spcPct val="100000"/>
+              </a:lnSpc>
+            </a:pPr>
+            <a:r>
+              <a:rPr lang="en-US" sz="2800" dirty="0">
+                <a:ea typeface="+mn-lt"/>
+                <a:cs typeface="+mn-lt"/>
+              </a:rPr>
+              <a:t>Before that we might </a:t>
+            </a:r>
+            <a:r>
+              <a:rPr lang="en-US" sz="2800" b="1" dirty="0">
+                <a:ea typeface="+mn-lt"/>
+                <a:cs typeface="+mn-lt"/>
+              </a:rPr>
+              <a:t>write</a:t>
+            </a:r>
+            <a:r>
+              <a:rPr lang="en-US" sz="2800" dirty="0">
+                <a:ea typeface="+mn-lt"/>
+                <a:cs typeface="+mn-lt"/>
+              </a:rPr>
+              <a:t> things in </a:t>
+            </a:r>
+            <a:r>
+              <a:rPr lang="en-US" sz="2800" b="1" dirty="0">
+                <a:ea typeface="+mn-lt"/>
+                <a:cs typeface="+mn-lt"/>
+              </a:rPr>
+              <a:t>TypeScript</a:t>
+            </a:r>
+            <a:r>
+              <a:rPr lang="en-US" sz="2800" dirty="0">
+                <a:ea typeface="+mn-lt"/>
+                <a:cs typeface="+mn-lt"/>
+              </a:rPr>
+              <a:t>, </a:t>
+            </a:r>
+            <a:r>
+              <a:rPr lang="en-US" sz="2800" dirty="0" err="1">
+                <a:ea typeface="+mn-lt"/>
+                <a:cs typeface="+mn-lt"/>
+              </a:rPr>
+              <a:t>tsc</a:t>
+            </a:r>
+            <a:r>
+              <a:rPr lang="en-US" sz="2800" dirty="0">
+                <a:ea typeface="+mn-lt"/>
+                <a:cs typeface="+mn-lt"/>
+              </a:rPr>
+              <a:t>-compiled to JS</a:t>
+            </a:r>
+            <a:endParaRPr lang="en-US" sz="2800" dirty="0">
+              <a:cs typeface="Arial"/>
+            </a:endParaRPr>
           </a:p>
           <a:p>
             <a:pPr marL="0" indent="0">
@@ -10274,7 +10519,9 @@
               </a:lnSpc>
               <a:buNone/>
             </a:pPr>
-            <a:endParaRPr lang="en-US" sz="2800" dirty="0"/>
+            <a:endParaRPr lang="en-US" sz="2800" dirty="0">
+              <a:cs typeface="Arial"/>
+            </a:endParaRPr>
           </a:p>
         </p:txBody>
       </p:sp>
@@ -10364,7 +10611,7 @@
     </p:spTree>
     <p:extLst>
       <p:ext uri="{BB962C8B-B14F-4D97-AF65-F5344CB8AC3E}">
-        <p14:creationId xmlns:p14="http://schemas.microsoft.com/office/powerpoint/2010/main" val="949652569"/>
+        <p14:creationId xmlns:p14="http://schemas.microsoft.com/office/powerpoint/2010/main" val="2889382427"/>
       </p:ext>
     </p:extLst>
   </p:cSld>
@@ -10414,12 +10661,11 @@
           </a:bodyPr>
           <a:lstStyle/>
           <a:p>
-            <a:pPr lvl="0"/>
-            <a:r>
-              <a:rPr lang="en-US" dirty="0"/>
-              <a:t>3. React component state and props</a:t>
-            </a:r>
-            <a:endParaRPr lang="fi-FI" dirty="0"/>
+            <a:r>
+              <a:rPr lang="en-US"/>
+              <a:t>2. Single-page application, SPA</a:t>
+            </a:r>
+            <a:endParaRPr lang="en-US" sz="4800"/>
           </a:p>
         </p:txBody>
       </p:sp>
@@ -10441,118 +10687,42 @@
         </p:nvSpPr>
         <p:spPr/>
         <p:txBody>
-          <a:bodyPr vert="horz" lIns="0" tIns="0" rIns="0" bIns="36000" numCol="1" spcCol="360000" rtlCol="0" anchor="t">
+          <a:bodyPr>
             <a:normAutofit/>
           </a:bodyPr>
           <a:lstStyle/>
           <a:p>
-            <a:pPr marL="215900" indent="-215900">
+            <a:pPr>
               <a:lnSpc>
                 <a:spcPct val="100000"/>
               </a:lnSpc>
             </a:pPr>
             <a:r>
               <a:rPr lang="en-US" sz="2800" dirty="0"/>
-              <a:t>State created with the </a:t>
-            </a:r>
-            <a:r>
-              <a:rPr lang="en-US" sz="2800" b="1" dirty="0" err="1"/>
-              <a:t>useState</a:t>
-            </a:r>
-            <a:r>
-              <a:rPr lang="en-US" sz="2800" dirty="0"/>
-              <a:t> hook(s).</a:t>
-            </a:r>
-            <a:endParaRPr lang="en-US" dirty="0"/>
-          </a:p>
-          <a:p>
-            <a:pPr marL="215900" indent="-215900">
+              <a:t>Browser fetches/loads only one version of the page from the server, in the beginning. </a:t>
+            </a:r>
+          </a:p>
+          <a:p>
+            <a:pPr>
               <a:lnSpc>
                 <a:spcPct val="100000"/>
               </a:lnSpc>
             </a:pPr>
             <a:r>
               <a:rPr lang="en-US" sz="2800" dirty="0"/>
-              <a:t>State fraction(s) updated with the set (setter) function(s).</a:t>
-            </a:r>
-            <a:endParaRPr lang="en-US" sz="2800" dirty="0">
-              <a:cs typeface="Arial" panose="020B0604020202020204"/>
-            </a:endParaRPr>
-          </a:p>
-          <a:p>
-            <a:pPr marL="0" indent="0">
-              <a:lnSpc>
-                <a:spcPct val="100000"/>
-              </a:lnSpc>
-              <a:buNone/>
-            </a:pPr>
-            <a:endParaRPr lang="en-US" sz="2800" dirty="0">
-              <a:cs typeface="Arial" panose="020B0604020202020204"/>
-            </a:endParaRPr>
-          </a:p>
-          <a:p>
-            <a:pPr marL="215900" indent="-215900">
+              <a:t>After that, with the JavaScript code running on the browser, we just update that one page DOM, but to the user it looks like we are navigating through different pages.</a:t>
+            </a:r>
+          </a:p>
+          <a:p>
+            <a:pPr>
               <a:lnSpc>
                 <a:spcPct val="100000"/>
               </a:lnSpc>
             </a:pPr>
             <a:r>
               <a:rPr lang="en-US" sz="2800" dirty="0"/>
-              <a:t>Props given in Parent component JSX to the Child component. </a:t>
-            </a:r>
-          </a:p>
-          <a:p>
-            <a:pPr marL="215900" indent="-215900">
-              <a:lnSpc>
-                <a:spcPct val="100000"/>
-              </a:lnSpc>
-            </a:pPr>
-            <a:r>
-              <a:rPr lang="en-US" sz="2800" dirty="0"/>
-              <a:t>Child component receiving the props …</a:t>
-            </a:r>
-          </a:p>
-          <a:p>
-            <a:pPr marL="215900" indent="-215900">
-              <a:lnSpc>
-                <a:spcPct val="100000"/>
-              </a:lnSpc>
-            </a:pPr>
-            <a:r>
-              <a:rPr lang="en-US" sz="2800" dirty="0"/>
-              <a:t>… and </a:t>
-            </a:r>
-            <a:r>
-              <a:rPr lang="en-US" sz="2800" dirty="0" err="1"/>
-              <a:t>destructuring</a:t>
-            </a:r>
-            <a:r>
-              <a:rPr lang="en-US" sz="2800" dirty="0"/>
-              <a:t> them into local </a:t>
-            </a:r>
-            <a:r>
-              <a:rPr lang="en-US" sz="2800" dirty="0" err="1"/>
-              <a:t>consts</a:t>
-            </a:r>
-            <a:r>
-              <a:rPr lang="en-US" sz="2800" dirty="0"/>
-              <a:t> (or straight in function parameter list) with the </a:t>
-            </a:r>
-            <a:r>
-              <a:rPr lang="en-US" sz="2800" b="1" dirty="0" err="1"/>
-              <a:t>destructuring</a:t>
-            </a:r>
-            <a:r>
-              <a:rPr lang="en-US" sz="2800" b="1" dirty="0"/>
-              <a:t> assignment</a:t>
-            </a:r>
-            <a:r>
-              <a:rPr lang="en-US" sz="2800" dirty="0"/>
-              <a:t>.</a:t>
-            </a:r>
-            <a:endParaRPr lang="en-US" sz="2800" dirty="0">
-              <a:cs typeface="Arial" panose="020B0604020202020204"/>
-            </a:endParaRPr>
+              <a:t>React routing is able to make it look like we are navigating. And, also make the routing programming logical for the programmer.</a:t>
+            </a:r>
           </a:p>
           <a:p>
             <a:pPr marL="0" indent="0">
@@ -10651,7 +10821,7 @@
     </p:spTree>
     <p:extLst>
       <p:ext uri="{BB962C8B-B14F-4D97-AF65-F5344CB8AC3E}">
-        <p14:creationId xmlns:p14="http://schemas.microsoft.com/office/powerpoint/2010/main" val="3879952900"/>
+        <p14:creationId xmlns:p14="http://schemas.microsoft.com/office/powerpoint/2010/main" val="949652569"/>
       </p:ext>
     </p:extLst>
   </p:cSld>
@@ -10701,9 +10871,10 @@
           </a:bodyPr>
           <a:lstStyle/>
           <a:p>
+            <a:pPr lvl="0"/>
             <a:r>
               <a:rPr lang="en-US" dirty="0"/>
-              <a:t>4. Rendering single and multiple components</a:t>
+              <a:t>3. React component state and props</a:t>
             </a:r>
             <a:endParaRPr lang="fi-FI" dirty="0"/>
           </a:p>
@@ -10739,7 +10910,15 @@
             </a:pPr>
             <a:r>
               <a:rPr lang="en-US" sz="2800" dirty="0"/>
-              <a:t>Mostly wrap your returned components inside parenthesis (   ) to avoid mistakes</a:t>
+              <a:t>State created with the </a:t>
+            </a:r>
+            <a:r>
+              <a:rPr lang="en-US" sz="2800" b="1" dirty="0" err="1"/>
+              <a:t>useState</a:t>
+            </a:r>
+            <a:r>
+              <a:rPr lang="en-US" sz="2800" dirty="0"/>
+              <a:t> hook(s).</a:t>
             </a:r>
             <a:endParaRPr lang="en-US" dirty="0"/>
           </a:p>
@@ -10751,8 +10930,19 @@
             </a:pPr>
             <a:r>
               <a:rPr lang="en-US" sz="2800" dirty="0"/>
-              <a:t>Return just single component, e.g. a list. If multiple components, wrap them into a React fragment: &lt;&gt; … &lt;/&gt;</a:t>
-            </a:r>
+              <a:t>State fraction(s) updated with the set (setter) function(s).</a:t>
+            </a:r>
+            <a:endParaRPr lang="en-US" sz="2800" dirty="0">
+              <a:cs typeface="Arial" panose="020B0604020202020204"/>
+            </a:endParaRPr>
+          </a:p>
+          <a:p>
+            <a:pPr marL="0" indent="0">
+              <a:lnSpc>
+                <a:spcPct val="100000"/>
+              </a:lnSpc>
+              <a:buNone/>
+            </a:pPr>
             <a:endParaRPr lang="en-US" sz="2800" dirty="0">
               <a:cs typeface="Arial" panose="020B0604020202020204"/>
             </a:endParaRPr>
@@ -10765,29 +10955,60 @@
             </a:pPr>
             <a:r>
               <a:rPr lang="en-US" sz="2800" dirty="0"/>
-              <a:t>With multiple components (map or other list creation) remember to give a truly unique and permanent </a:t>
-            </a:r>
-            <a:r>
-              <a:rPr lang="en-US" sz="2800" b="1" dirty="0"/>
-              <a:t>key</a:t>
-            </a:r>
-            <a:r>
-              <a:rPr lang="en-US" sz="2800" dirty="0"/>
-              <a:t> property, </a:t>
-            </a:r>
-          </a:p>
-          <a:p>
-            <a:pPr marL="719900" lvl="1" indent="-215900">
+              <a:t>Props given in Parent component JSX to the Child component. </a:t>
+            </a:r>
+          </a:p>
+          <a:p>
+            <a:pPr marL="215900" indent="-215900">
               <a:lnSpc>
                 <a:spcPct val="100000"/>
               </a:lnSpc>
             </a:pPr>
             <a:r>
-              <a:rPr lang="en-US" sz="2600" dirty="0"/>
-              <a:t>e.g. pick the id of the element as the value for the key</a:t>
-            </a:r>
-            <a:endParaRPr lang="en-US" sz="2600" dirty="0">
-              <a:cs typeface="Arial"/>
+              <a:rPr lang="en-US" sz="2800" dirty="0"/>
+              <a:t>Child component receiving the props …</a:t>
+            </a:r>
+          </a:p>
+          <a:p>
+            <a:pPr marL="215900" indent="-215900">
+              <a:lnSpc>
+                <a:spcPct val="100000"/>
+              </a:lnSpc>
+            </a:pPr>
+            <a:r>
+              <a:rPr lang="en-US" sz="2800" dirty="0"/>
+              <a:t>… and </a:t>
+            </a:r>
+            <a:r>
+              <a:rPr lang="en-US" sz="2800" dirty="0" err="1"/>
+              <a:t>destructuring</a:t>
+            </a:r>
+            <a:r>
+              <a:rPr lang="en-US" sz="2800" dirty="0"/>
+              <a:t> them into local </a:t>
+            </a:r>
+            <a:r>
+              <a:rPr lang="en-US" sz="2800" dirty="0" err="1"/>
+              <a:t>consts</a:t>
+            </a:r>
+            <a:r>
+              <a:rPr lang="en-US" sz="2800" dirty="0"/>
+              <a:t> (or, now often straight in the function parameter list) with the </a:t>
+            </a:r>
+            <a:r>
+              <a:rPr lang="en-US" sz="2800" b="1" dirty="0" err="1"/>
+              <a:t>destructuring</a:t>
+            </a:r>
+            <a:r>
+              <a:rPr lang="en-US" sz="2800" b="1" dirty="0"/>
+              <a:t> assignment</a:t>
+            </a:r>
+            <a:r>
+              <a:rPr lang="en-US" sz="2800" dirty="0"/>
+              <a:t>.</a:t>
+            </a:r>
+            <a:endParaRPr lang="en-US" sz="2800" dirty="0">
+              <a:cs typeface="Arial" panose="020B0604020202020204"/>
             </a:endParaRPr>
           </a:p>
           <a:p>
@@ -10887,7 +11108,7 @@
     </p:spTree>
     <p:extLst>
       <p:ext uri="{BB962C8B-B14F-4D97-AF65-F5344CB8AC3E}">
-        <p14:creationId xmlns:p14="http://schemas.microsoft.com/office/powerpoint/2010/main" val="2801146147"/>
+        <p14:creationId xmlns:p14="http://schemas.microsoft.com/office/powerpoint/2010/main" val="3879952900"/>
       </p:ext>
     </p:extLst>
   </p:cSld>
@@ -10938,10 +11159,10 @@
           <a:lstStyle/>
           <a:p>
             <a:r>
-              <a:rPr lang="en-US"/>
-              <a:t>5. Material UI components</a:t>
-            </a:r>
-            <a:endParaRPr lang="fi-FI"/>
+              <a:rPr lang="en-US" dirty="0"/>
+              <a:t>4. Rendering single and multiple components</a:t>
+            </a:r>
+            <a:endParaRPr lang="fi-FI" dirty="0"/>
           </a:p>
         </p:txBody>
       </p:sp>
@@ -10975,11 +11196,9 @@
             </a:pPr>
             <a:r>
               <a:rPr lang="en-US" sz="2800" dirty="0"/>
-              <a:t>use only Material UI components to get the styles defined in the Theme. (=&gt; no HTML elements, p, span, if possible, in your JSX)</a:t>
-            </a:r>
-            <a:endParaRPr lang="en-US" sz="2800" dirty="0">
-              <a:cs typeface="Arial"/>
-            </a:endParaRPr>
+              <a:t>Mostly wrap your returned components inside parentheses (   ) to avoid mistakes</a:t>
+            </a:r>
+            <a:endParaRPr lang="en-US" dirty="0"/>
           </a:p>
           <a:p>
             <a:pPr marL="215900" indent="-215900">
@@ -10989,24 +11208,11 @@
             </a:pPr>
             <a:r>
               <a:rPr lang="en-US" sz="2800" dirty="0"/>
-              <a:t>think what HTML elements they return. e.g. so we won't get &lt;p&gt; inside of a &lt;p&gt; which is against HTML standard. Or &lt;div&gt; as direct child of &lt;table&gt; or so on.</a:t>
+              <a:t>Return just single component, e.g. a list. If multiple components, wrap them into a React fragment: &lt;&gt; … &lt;/&gt;</a:t>
             </a:r>
             <a:endParaRPr lang="en-US" sz="2800" dirty="0">
               <a:cs typeface="Arial" panose="020B0604020202020204"/>
             </a:endParaRPr>
-          </a:p>
-          <a:p>
-            <a:pPr marL="719455" lvl="1" indent="-215900">
-              <a:lnSpc>
-                <a:spcPct val="100000"/>
-              </a:lnSpc>
-            </a:pPr>
-            <a:r>
-              <a:rPr lang="en-US" sz="2600" dirty="0">
-                <a:cs typeface="Arial"/>
-              </a:rPr>
-              <a:t>For some MUI-React components you can specify which HTML element will be rendered</a:t>
-            </a:r>
           </a:p>
           <a:p>
             <a:pPr marL="215900" indent="-215900">
@@ -11016,11 +11222,39 @@
             </a:pPr>
             <a:r>
               <a:rPr lang="en-US" sz="2800" dirty="0"/>
-              <a:t>(Start learning Mui React components from very simple examples of yours. Build gradually bigger structures.)</a:t>
-            </a:r>
-            <a:endParaRPr lang="en-US" sz="2800" dirty="0">
+              <a:t>With multiple components (map or other list creation) remember to give a truly unique and permanent </a:t>
+            </a:r>
+            <a:r>
+              <a:rPr lang="en-US" sz="2800" b="1" dirty="0"/>
+              <a:t>key</a:t>
+            </a:r>
+            <a:r>
+              <a:rPr lang="en-US" sz="2800" dirty="0"/>
+              <a:t> property, </a:t>
+            </a:r>
+          </a:p>
+          <a:p>
+            <a:pPr marL="719900" lvl="1" indent="-215900">
+              <a:lnSpc>
+                <a:spcPct val="100000"/>
+              </a:lnSpc>
+            </a:pPr>
+            <a:r>
+              <a:rPr lang="en-US" sz="2600" dirty="0"/>
+              <a:t>e.g. pick the id of the element as the value for the key</a:t>
+            </a:r>
+            <a:endParaRPr lang="en-US" sz="2600" dirty="0">
               <a:cs typeface="Arial"/>
             </a:endParaRPr>
+          </a:p>
+          <a:p>
+            <a:pPr marL="0" indent="0">
+              <a:lnSpc>
+                <a:spcPct val="100000"/>
+              </a:lnSpc>
+              <a:buNone/>
+            </a:pPr>
+            <a:endParaRPr lang="en-US" sz="2800" dirty="0"/>
           </a:p>
         </p:txBody>
       </p:sp>
@@ -11110,7 +11344,7 @@
     </p:spTree>
     <p:extLst>
       <p:ext uri="{BB962C8B-B14F-4D97-AF65-F5344CB8AC3E}">
-        <p14:creationId xmlns:p14="http://schemas.microsoft.com/office/powerpoint/2010/main" val="3305069273"/>
+        <p14:creationId xmlns:p14="http://schemas.microsoft.com/office/powerpoint/2010/main" val="2801146147"/>
       </p:ext>
     </p:extLst>
   </p:cSld>
@@ -11161,10 +11395,10 @@
           <a:lstStyle/>
           <a:p>
             <a:r>
-              <a:rPr lang="en-US" dirty="0"/>
-              <a:t>6. Using the Material UI Theme</a:t>
-            </a:r>
-            <a:endParaRPr lang="fi-FI" dirty="0"/>
+              <a:rPr lang="en-US"/>
+              <a:t>5. Material UI components</a:t>
+            </a:r>
+            <a:endParaRPr lang="fi-FI"/>
           </a:p>
         </p:txBody>
       </p:sp>
@@ -11184,12 +11418,7 @@
             <p:ph sz="half" idx="2"/>
           </p:nvPr>
         </p:nvSpPr>
-        <p:spPr>
-          <a:xfrm>
-            <a:off x="550864" y="1773238"/>
-            <a:ext cx="11125198" cy="4367810"/>
-          </a:xfrm>
-        </p:spPr>
+        <p:spPr/>
         <p:txBody>
           <a:bodyPr vert="horz" lIns="0" tIns="0" rIns="0" bIns="36000" numCol="1" spcCol="360000" rtlCol="0" anchor="t">
             <a:normAutofit/>
@@ -11203,17 +11432,11 @@
             </a:pPr>
             <a:r>
               <a:rPr lang="en-US" sz="2800" dirty="0"/>
-              <a:t>Define the Theme in a different file with the </a:t>
-            </a:r>
-            <a:r>
-              <a:rPr lang="en-US" sz="2800" b="1" dirty="0" err="1"/>
-              <a:t>createTheme</a:t>
-            </a:r>
-            <a:r>
-              <a:rPr lang="en-US" sz="2800" dirty="0"/>
-              <a:t> function. You can define Palettes, give components special custom styles.</a:t>
-            </a:r>
-            <a:endParaRPr lang="en-US" dirty="0"/>
+              <a:t>use only Material UI components to get the styles defined in the Theme. (=&gt; no HTML elements, p, span, if possible, in your JSX)</a:t>
+            </a:r>
+            <a:endParaRPr lang="en-US" sz="2800" dirty="0">
+              <a:cs typeface="Arial"/>
+            </a:endParaRPr>
           </a:p>
           <a:p>
             <a:pPr marL="215900" indent="-215900">
@@ -11223,19 +11446,24 @@
             </a:pPr>
             <a:r>
               <a:rPr lang="en-US" sz="2800" dirty="0"/>
-              <a:t>Wrap the whole application root inside </a:t>
-            </a:r>
-            <a:r>
-              <a:rPr lang="en-US" sz="2800" b="1" dirty="0" err="1"/>
-              <a:t>ThemeProvider</a:t>
-            </a:r>
-            <a:r>
-              <a:rPr lang="en-US" sz="2800" dirty="0"/>
-              <a:t>. That already gives Material UI components their default styles.</a:t>
+              <a:t>think what HTML elements they return. e.g. so we won't get &lt;p&gt; inside of a &lt;p&gt; which is against HTML standard. Or &lt;div&gt; as direct child of &lt;table&gt; or so on.</a:t>
             </a:r>
             <a:endParaRPr lang="en-US" sz="2800" dirty="0">
-              <a:cs typeface="Arial"/>
+              <a:cs typeface="Arial" panose="020B0604020202020204"/>
             </a:endParaRPr>
+          </a:p>
+          <a:p>
+            <a:pPr marL="719455" lvl="1" indent="-215900">
+              <a:lnSpc>
+                <a:spcPct val="100000"/>
+              </a:lnSpc>
+            </a:pPr>
+            <a:r>
+              <a:rPr lang="en-US" sz="2600" dirty="0">
+                <a:cs typeface="Arial"/>
+              </a:rPr>
+              <a:t>For some MUI-React components you can specify which HTML element will be rendered</a:t>
+            </a:r>
           </a:p>
           <a:p>
             <a:pPr marL="215900" indent="-215900">
@@ -11245,60 +11473,7 @@
             </a:pPr>
             <a:r>
               <a:rPr lang="en-US" sz="2800" dirty="0"/>
-              <a:t>If you </a:t>
-            </a:r>
-            <a:r>
-              <a:rPr lang="en-US" sz="2800" b="1" dirty="0"/>
-              <a:t>only</a:t>
-            </a:r>
-            <a:r>
-              <a:rPr lang="en-US" sz="2800" dirty="0"/>
-              <a:t> use Material UI components. Then you’ll get the theme styles automatically after theme defined.</a:t>
-            </a:r>
-            <a:endParaRPr lang="en-US" sz="2800" dirty="0">
-              <a:cs typeface="Arial" panose="020B0604020202020204"/>
-            </a:endParaRPr>
-          </a:p>
-          <a:p>
-            <a:pPr marL="0" indent="0">
-              <a:lnSpc>
-                <a:spcPct val="100000"/>
-              </a:lnSpc>
-              <a:buNone/>
-            </a:pPr>
-            <a:endParaRPr lang="en-US" sz="2800" dirty="0">
-              <a:cs typeface="Arial" panose="020B0604020202020204"/>
-            </a:endParaRPr>
-          </a:p>
-          <a:p>
-            <a:pPr marL="215900" indent="-215900">
-              <a:lnSpc>
-                <a:spcPct val="100000"/>
-              </a:lnSpc>
-            </a:pPr>
-            <a:r>
-              <a:rPr lang="en-US" sz="2800" dirty="0"/>
-              <a:t>In rare need to use </a:t>
-            </a:r>
-            <a:r>
-              <a:rPr lang="en-US" sz="2800" b="1" u="sng" dirty="0"/>
-              <a:t>specific</a:t>
-            </a:r>
-            <a:r>
-              <a:rPr lang="en-US" sz="2800" b="1" dirty="0"/>
-              <a:t> colors, sizes or styles</a:t>
-            </a:r>
-            <a:r>
-              <a:rPr lang="en-US" sz="2800" dirty="0"/>
-              <a:t> from the theme, use the </a:t>
-            </a:r>
-            <a:r>
-              <a:rPr lang="en-US" sz="2800" b="1" dirty="0" err="1"/>
-              <a:t>useTheme</a:t>
-            </a:r>
-            <a:r>
-              <a:rPr lang="en-US" sz="2800" dirty="0"/>
-              <a:t> hook to get the theme object to your component</a:t>
+              <a:t>(Start learning Mui React components from very simple examples of yours. Build gradually bigger structures.)</a:t>
             </a:r>
             <a:endParaRPr lang="en-US" sz="2800" dirty="0">
               <a:cs typeface="Arial"/>
@@ -11392,7 +11567,7 @@
     </p:spTree>
     <p:extLst>
       <p:ext uri="{BB962C8B-B14F-4D97-AF65-F5344CB8AC3E}">
-        <p14:creationId xmlns:p14="http://schemas.microsoft.com/office/powerpoint/2010/main" val="793119021"/>
+        <p14:creationId xmlns:p14="http://schemas.microsoft.com/office/powerpoint/2010/main" val="3305069273"/>
       </p:ext>
     </p:extLst>
   </p:cSld>
@@ -11444,23 +11619,7 @@
           <a:p>
             <a:r>
               <a:rPr lang="en-US" dirty="0"/>
-              <a:t>Use </a:t>
-            </a:r>
-            <a:r>
-              <a:rPr lang="en-US" dirty="0" err="1"/>
-              <a:t>redPalette</a:t>
-            </a:r>
-            <a:r>
-              <a:rPr lang="en-US" dirty="0"/>
-              <a:t> and </a:t>
-            </a:r>
-            <a:r>
-              <a:rPr lang="en-US" dirty="0" err="1"/>
-              <a:t>yellowPalette</a:t>
-            </a:r>
-            <a:r>
-              <a:rPr lang="en-US" dirty="0"/>
-              <a:t> to spot hardcoded styles, colors</a:t>
+              <a:t>6. Using the Material UI Theme</a:t>
             </a:r>
             <a:endParaRPr lang="fi-FI" dirty="0"/>
           </a:p>
@@ -11484,8 +11643,8 @@
         </p:nvSpPr>
         <p:spPr>
           <a:xfrm>
-            <a:off x="550864" y="1773238"/>
-            <a:ext cx="11125198" cy="4367810"/>
+            <a:off x="302079" y="1583871"/>
+            <a:ext cx="11373983" cy="4557177"/>
           </a:xfrm>
         </p:spPr>
         <p:txBody>
@@ -11500,11 +11659,18 @@
               </a:lnSpc>
             </a:pPr>
             <a:r>
-              <a:rPr lang="en-US" sz="2800" dirty="0">
-                <a:cs typeface="Arial"/>
-              </a:rPr>
-              <a:t>Make your whole project follow the theme styles.</a:t>
-            </a:r>
+              <a:rPr lang="en-US" sz="2800" dirty="0"/>
+              <a:t>Define the Theme in a different file with the </a:t>
+            </a:r>
+            <a:r>
+              <a:rPr lang="en-US" sz="2800" b="1" dirty="0" err="1"/>
+              <a:t>createTheme</a:t>
+            </a:r>
+            <a:r>
+              <a:rPr lang="en-US" sz="2800" dirty="0"/>
+              <a:t> function. You can define Palettes, give components special custom styles.</a:t>
+            </a:r>
+            <a:endParaRPr lang="en-US" dirty="0"/>
           </a:p>
           <a:p>
             <a:pPr marL="215900" indent="-215900">
@@ -11513,11 +11679,20 @@
               </a:lnSpc>
             </a:pPr>
             <a:r>
-              <a:rPr lang="en-US" sz="2800" dirty="0">
-                <a:cs typeface="Arial"/>
-              </a:rPr>
-              <a:t>Ensure that by flipping all colors to some all red tint palette, to all yellow tint palette, and back to your normal color palette. </a:t>
-            </a:r>
+              <a:rPr lang="en-US" sz="2800" dirty="0"/>
+              <a:t>Wrap the whole application root inside </a:t>
+            </a:r>
+            <a:r>
+              <a:rPr lang="en-US" sz="2800" b="1" dirty="0" err="1"/>
+              <a:t>ThemeProvider</a:t>
+            </a:r>
+            <a:r>
+              <a:rPr lang="en-US" sz="2800" dirty="0"/>
+              <a:t>. That already gives Material UI components their default styles.</a:t>
+            </a:r>
+            <a:endParaRPr lang="en-US" sz="2800" dirty="0">
+              <a:cs typeface="Arial"/>
+            </a:endParaRPr>
           </a:p>
           <a:p>
             <a:pPr marL="215900" indent="-215900">
@@ -11526,11 +11701,31 @@
               </a:lnSpc>
             </a:pPr>
             <a:r>
-              <a:rPr lang="en-US" sz="2800" dirty="0">
-                <a:cs typeface="Arial"/>
-              </a:rPr>
-              <a:t>If something did not go red (later yellow) you have hard-coded colors in your project!</a:t>
-            </a:r>
+              <a:rPr lang="en-US" sz="2800" dirty="0"/>
+              <a:t>If you </a:t>
+            </a:r>
+            <a:r>
+              <a:rPr lang="en-US" sz="2800" b="1" dirty="0"/>
+              <a:t>only</a:t>
+            </a:r>
+            <a:r>
+              <a:rPr lang="en-US" sz="2800" dirty="0"/>
+              <a:t> use Material UI components. Then you’ll get the theme styles automatically after theme defined.</a:t>
+            </a:r>
+            <a:endParaRPr lang="en-US" sz="2800" dirty="0">
+              <a:cs typeface="Arial" panose="020B0604020202020204"/>
+            </a:endParaRPr>
+          </a:p>
+          <a:p>
+            <a:pPr marL="0" indent="0">
+              <a:lnSpc>
+                <a:spcPct val="100000"/>
+              </a:lnSpc>
+              <a:buNone/>
+            </a:pPr>
+            <a:endParaRPr lang="en-US" sz="2800" dirty="0">
+              <a:cs typeface="Arial" panose="020B0604020202020204"/>
+            </a:endParaRPr>
           </a:p>
           <a:p>
             <a:pPr marL="215900" indent="-215900">
@@ -11538,22 +11733,33 @@
                 <a:spcPct val="100000"/>
               </a:lnSpc>
             </a:pPr>
+            <a:r>
+              <a:rPr lang="en-US" sz="2800" dirty="0"/>
+              <a:t>In rare need to use </a:t>
+            </a:r>
+            <a:r>
+              <a:rPr lang="en-US" sz="2800" b="1" u="sng" dirty="0"/>
+              <a:t>specific</a:t>
+            </a:r>
+            <a:r>
+              <a:rPr lang="en-US" sz="2800" b="1" dirty="0"/>
+              <a:t> colors, sizes or styles</a:t>
+            </a:r>
+            <a:r>
+              <a:rPr lang="en-US" sz="2800" dirty="0"/>
+              <a:t> from the theme, use the </a:t>
+            </a:r>
+            <a:r>
+              <a:rPr lang="en-US" sz="2800" b="1" dirty="0" err="1"/>
+              <a:t>useTheme</a:t>
+            </a:r>
+            <a:r>
+              <a:rPr lang="en-US" sz="2800" dirty="0"/>
+              <a:t> hook to use the theme object in component code.</a:t>
+            </a:r>
             <a:endParaRPr lang="en-US" sz="2800" dirty="0">
               <a:cs typeface="Arial"/>
             </a:endParaRPr>
-          </a:p>
-          <a:p>
-            <a:pPr marL="215900" indent="-215900">
-              <a:lnSpc>
-                <a:spcPct val="100000"/>
-              </a:lnSpc>
-            </a:pPr>
-            <a:r>
-              <a:rPr lang="en-US" sz="2800" dirty="0">
-                <a:cs typeface="Arial"/>
-              </a:rPr>
-              <a:t>Similarly, you can use some funny distinctive broken font from the theme and what is not looking funny, is hard-coded.</a:t>
-            </a:r>
           </a:p>
         </p:txBody>
       </p:sp>
@@ -11643,7 +11849,7 @@
     </p:spTree>
     <p:extLst>
       <p:ext uri="{BB962C8B-B14F-4D97-AF65-F5344CB8AC3E}">
-        <p14:creationId xmlns:p14="http://schemas.microsoft.com/office/powerpoint/2010/main" val="3093983733"/>
+        <p14:creationId xmlns:p14="http://schemas.microsoft.com/office/powerpoint/2010/main" val="793119021"/>
       </p:ext>
     </p:extLst>
   </p:cSld>
@@ -11695,19 +11901,25 @@
           <a:p>
             <a:r>
               <a:rPr lang="en-US" dirty="0"/>
-              <a:t>&lt;</a:t>
+              <a:t>Use </a:t>
             </a:r>
             <a:r>
               <a:rPr lang="en-US" dirty="0" err="1"/>
-              <a:t>CssBaseline</a:t>
+              <a:t>redPalette</a:t>
             </a:r>
             <a:r>
               <a:rPr lang="en-US" dirty="0"/>
-              <a:t> /&gt; - Browser styles reset to Mui’s own basic styles</a:t>
-            </a:r>
-            <a:endParaRPr lang="en-US" dirty="0">
-              <a:cs typeface="Arial"/>
-            </a:endParaRPr>
+              <a:t> and </a:t>
+            </a:r>
+            <a:r>
+              <a:rPr lang="en-US" dirty="0" err="1"/>
+              <a:t>yellowPalette</a:t>
+            </a:r>
+            <a:r>
+              <a:rPr lang="en-US" dirty="0"/>
+              <a:t> to spot hardcoded styles, colors</a:t>
+            </a:r>
+            <a:endParaRPr lang="fi-FI" dirty="0"/>
           </a:p>
         </p:txBody>
       </p:sp>
@@ -11727,7 +11939,12 @@
             <p:ph sz="half" idx="2"/>
           </p:nvPr>
         </p:nvSpPr>
-        <p:spPr/>
+        <p:spPr>
+          <a:xfrm>
+            <a:off x="550864" y="1773238"/>
+            <a:ext cx="11125198" cy="4367810"/>
+          </a:xfrm>
+        </p:spPr>
         <p:txBody>
           <a:bodyPr vert="horz" lIns="0" tIns="0" rIns="0" bIns="36000" numCol="1" spcCol="360000" rtlCol="0" anchor="t">
             <a:normAutofit/>
@@ -11743,7 +11960,7 @@
               <a:rPr lang="en-US" sz="2800" dirty="0">
                 <a:cs typeface="Arial"/>
               </a:rPr>
-              <a:t>This component is inserted to the root component of the React-Mui app as well</a:t>
+              <a:t>Make your whole project follow the theme styles.</a:t>
             </a:r>
           </a:p>
           <a:p>
@@ -11756,9 +11973,8 @@
               <a:rPr lang="en-US" sz="2800" dirty="0">
                 <a:cs typeface="Arial"/>
               </a:rPr>
-              <a:t>The idea is to reset all style differences between different browsers</a:t>
-            </a:r>
-            <a:endParaRPr lang="en-US" dirty="0"/>
+              <a:t>This can be checked by flipping all colors to some all-red tint palette, to all-yellow tint palette, and back to your normal color palette. </a:t>
+            </a:r>
           </a:p>
           <a:p>
             <a:pPr marL="215900" indent="-215900">
@@ -11770,36 +11986,30 @@
               <a:rPr lang="en-US" sz="2800" dirty="0">
                 <a:cs typeface="Arial"/>
               </a:rPr>
-              <a:t>Gives an explicit style setting for everything and thus </a:t>
-            </a:r>
-            <a:endParaRPr lang="en-US" dirty="0">
-              <a:cs typeface="Arial"/>
-            </a:endParaRPr>
-          </a:p>
-          <a:p>
-            <a:pPr marL="719455" lvl="1" indent="-215900">
+              <a:t>If something did not go red (later yellow) you have hard-coded colors in your project!</a:t>
+            </a:r>
+          </a:p>
+          <a:p>
+            <a:pPr marL="215900" indent="-215900">
               <a:lnSpc>
                 <a:spcPct val="100000"/>
               </a:lnSpc>
             </a:pPr>
-            <a:r>
-              <a:rPr lang="en-US" sz="2600" dirty="0">
-                <a:cs typeface="Arial"/>
-              </a:rPr>
-              <a:t>The browser differences would hopefully disappear</a:t>
-            </a:r>
-          </a:p>
-          <a:p>
-            <a:pPr marL="719455" lvl="1" indent="-215900">
+            <a:endParaRPr lang="en-US" sz="2800" dirty="0">
+              <a:cs typeface="Arial"/>
+            </a:endParaRPr>
+          </a:p>
+          <a:p>
+            <a:pPr marL="215900" indent="-215900">
               <a:lnSpc>
                 <a:spcPct val="100000"/>
               </a:lnSpc>
             </a:pPr>
             <a:r>
-              <a:rPr lang="en-US" sz="2600" dirty="0">
+              <a:rPr lang="en-US" sz="2800" dirty="0">
                 <a:cs typeface="Arial"/>
               </a:rPr>
-              <a:t>The Material UI styles would stay consistent also in the future</a:t>
+              <a:t>Similarly, you can use some funny distinctive broken font from the theme and what is not looking funny, is hard-coded.</a:t>
             </a:r>
           </a:p>
         </p:txBody>
@@ -11890,7 +12100,7 @@
     </p:spTree>
     <p:extLst>
       <p:ext uri="{BB962C8B-B14F-4D97-AF65-F5344CB8AC3E}">
-        <p14:creationId xmlns:p14="http://schemas.microsoft.com/office/powerpoint/2010/main" val="3757370853"/>
+        <p14:creationId xmlns:p14="http://schemas.microsoft.com/office/powerpoint/2010/main" val="3093983733"/>
       </p:ext>
     </p:extLst>
   </p:cSld>
@@ -11941,10 +12151,28 @@
           <a:lstStyle/>
           <a:p>
             <a:r>
-              <a:rPr lang="en-US"/>
-              <a:t>7. Child component updating parent’s state</a:t>
-            </a:r>
-            <a:endParaRPr lang="fi-FI"/>
+              <a:rPr lang="en-US" dirty="0"/>
+              <a:t>&lt;</a:t>
+            </a:r>
+            <a:r>
+              <a:rPr lang="en-US" dirty="0" err="1"/>
+              <a:t>CssBaseline</a:t>
+            </a:r>
+            <a:r>
+              <a:rPr lang="en-US" dirty="0"/>
+              <a:t> /&gt; - reset the Browser styles to Materia UI:s (</a:t>
+            </a:r>
+            <a:r>
+              <a:rPr lang="en-US" dirty="0" err="1"/>
+              <a:t>Mui:s</a:t>
+            </a:r>
+            <a:r>
+              <a:rPr lang="en-US" dirty="0"/>
+              <a:t>) own basic styles</a:t>
+            </a:r>
+            <a:endParaRPr lang="en-US" dirty="0">
+              <a:cs typeface="Arial"/>
+            </a:endParaRPr>
           </a:p>
         </p:txBody>
       </p:sp>
@@ -11966,55 +12194,77 @@
         </p:nvSpPr>
         <p:spPr/>
         <p:txBody>
-          <a:bodyPr>
+          <a:bodyPr vert="horz" lIns="0" tIns="0" rIns="0" bIns="36000" numCol="1" spcCol="360000" rtlCol="0" anchor="t">
             <a:normAutofit/>
           </a:bodyPr>
           <a:lstStyle/>
           <a:p>
-            <a:pPr>
+            <a:pPr marL="215900" indent="-215900">
               <a:lnSpc>
                 <a:spcPct val="100000"/>
               </a:lnSpc>
             </a:pPr>
             <a:r>
-              <a:rPr lang="en-US" sz="2800" dirty="0"/>
-              <a:t>(</a:t>
-            </a:r>
-            <a:r>
-              <a:rPr lang="en-US" sz="2800" u="sng" dirty="0"/>
-              <a:t>Normal case was</a:t>
-            </a:r>
-            <a:r>
-              <a:rPr lang="en-US" sz="2800" dirty="0"/>
-              <a:t>: Parent passes </a:t>
-            </a:r>
-            <a:r>
-              <a:rPr lang="en-US" sz="2800" b="1" dirty="0"/>
-              <a:t>data</a:t>
-            </a:r>
-            <a:r>
-              <a:rPr lang="en-US" sz="2800" dirty="0"/>
-              <a:t> to the children in props, and children only show it)</a:t>
-            </a:r>
-          </a:p>
-          <a:p>
-            <a:pPr marL="0" indent="0">
-              <a:lnSpc>
-                <a:spcPct val="100000"/>
-              </a:lnSpc>
-              <a:buNone/>
-            </a:pPr>
-            <a:endParaRPr lang="en-US" sz="2800" dirty="0"/>
-          </a:p>
-          <a:p>
-            <a:pPr>
+              <a:rPr lang="en-US" sz="2800" dirty="0">
+                <a:cs typeface="Arial"/>
+              </a:rPr>
+              <a:t>This component is inserted to the root component of the React-Mui app as well</a:t>
+            </a:r>
+          </a:p>
+          <a:p>
+            <a:pPr marL="215900" indent="-215900">
               <a:lnSpc>
                 <a:spcPct val="100000"/>
               </a:lnSpc>
             </a:pPr>
             <a:r>
-              <a:rPr lang="en-US" sz="2800" dirty="0"/>
-              <a:t>Special case: Parent will pass ‘event-handler function’ (parent state’s set function) to the child component(s) in props so that child/children can execute it and thus kind of ‘write’ to parent's state.</a:t>
+              <a:rPr lang="en-US" sz="2800" dirty="0">
+                <a:cs typeface="Arial"/>
+              </a:rPr>
+              <a:t>The idea is to reset all style differences between different browsers</a:t>
+            </a:r>
+            <a:endParaRPr lang="en-US" dirty="0"/>
+          </a:p>
+          <a:p>
+            <a:pPr marL="215900" indent="-215900">
+              <a:lnSpc>
+                <a:spcPct val="100000"/>
+              </a:lnSpc>
+            </a:pPr>
+            <a:r>
+              <a:rPr lang="en-US" sz="2800" dirty="0">
+                <a:cs typeface="Arial"/>
+              </a:rPr>
+              <a:t>Gives an explicit style setting for everything and thus </a:t>
+            </a:r>
+            <a:endParaRPr lang="en-US" dirty="0">
+              <a:cs typeface="Arial"/>
+            </a:endParaRPr>
+          </a:p>
+          <a:p>
+            <a:pPr marL="719455" lvl="1" indent="-215900">
+              <a:lnSpc>
+                <a:spcPct val="100000"/>
+              </a:lnSpc>
+            </a:pPr>
+            <a:r>
+              <a:rPr lang="en-US" sz="2600" dirty="0">
+                <a:cs typeface="Arial"/>
+              </a:rPr>
+              <a:t>The browser differences would hopefully disappear</a:t>
+            </a:r>
+          </a:p>
+          <a:p>
+            <a:pPr marL="719455" lvl="1" indent="-215900">
+              <a:lnSpc>
+                <a:spcPct val="100000"/>
+              </a:lnSpc>
+            </a:pPr>
+            <a:r>
+              <a:rPr lang="en-US" sz="2600" dirty="0">
+                <a:cs typeface="Arial"/>
+              </a:rPr>
+              <a:t>The Material UI styles would stay consistent also in the future</a:t>
             </a:r>
           </a:p>
         </p:txBody>
@@ -12105,7 +12355,7 @@
     </p:spTree>
     <p:extLst>
       <p:ext uri="{BB962C8B-B14F-4D97-AF65-F5344CB8AC3E}">
-        <p14:creationId xmlns:p14="http://schemas.microsoft.com/office/powerpoint/2010/main" val="198963962"/>
+        <p14:creationId xmlns:p14="http://schemas.microsoft.com/office/powerpoint/2010/main" val="3757370853"/>
       </p:ext>
     </p:extLst>
   </p:cSld>
@@ -12672,6 +12922,15 @@
 </file>
 
 <file path=customXml/item1.xml><?xml version="1.0" encoding="utf-8"?>
+<?mso-contentType ?>
+<FormTemplates xmlns="http://schemas.microsoft.com/sharepoint/v3/contenttype/forms">
+  <Display>DocumentLibraryForm</Display>
+  <Edit>DocumentLibraryForm</Edit>
+  <New>DocumentLibraryForm</New>
+</FormTemplates>
+</file>
+
+<file path=customXml/item2.xml><?xml version="1.0" encoding="utf-8"?>
 <ct:contentTypeSchema xmlns:ct="http://schemas.microsoft.com/office/2006/metadata/contentType" xmlns:ma="http://schemas.microsoft.com/office/2006/metadata/properties/metaAttributes" ct:_="" ma:_="" ma:contentTypeName="Asiakirja" ma:contentTypeID="0x0101000ADF884DD0861243B829456B91D71C32" ma:contentTypeVersion="13" ma:contentTypeDescription="Luo uusi asiakirja." ma:contentTypeScope="" ma:versionID="314522af3e545be07820a3e09ada0045">
   <xsd:schema xmlns:xsd="http://www.w3.org/2001/XMLSchema" xmlns:xs="http://www.w3.org/2001/XMLSchema" xmlns:p="http://schemas.microsoft.com/office/2006/metadata/properties" xmlns:ns2="8438dade-b61d-47d7-ab56-0bbf57e3795f" xmlns:ns3="0b3f8f6d-dc8d-4076-ae37-9bbd8f8c2dbf" targetNamespace="http://schemas.microsoft.com/office/2006/metadata/properties" ma:root="true" ma:fieldsID="1bc2462d560d8dfa6d4fd7061c558562" ns2:_="" ns3:_="">
     <xsd:import namespace="8438dade-b61d-47d7-ab56-0bbf57e3795f"/>
@@ -12894,15 +13153,6 @@
 </ct:contentTypeSchema>
 </file>
 
-<file path=customXml/item2.xml><?xml version="1.0" encoding="utf-8"?>
-<?mso-contentType ?>
-<FormTemplates xmlns="http://schemas.microsoft.com/sharepoint/v3/contenttype/forms">
-  <Display>DocumentLibraryForm</Display>
-  <Edit>DocumentLibraryForm</Edit>
-  <New>DocumentLibraryForm</New>
-</FormTemplates>
-</file>
-
 <file path=customXml/item3.xml><?xml version="1.0" encoding="utf-8"?>
 <p:properties xmlns:p="http://schemas.microsoft.com/office/2006/metadata/properties" xmlns:xsi="http://www.w3.org/2001/XMLSchema-instance" xmlns:pc="http://schemas.microsoft.com/office/infopath/2007/PartnerControls">
   <documentManagement>
@@ -12927,6 +13177,14 @@
 </file>
 
 <file path=customXml/itemProps1.xml><?xml version="1.0" encoding="utf-8"?>
+<ds:datastoreItem xmlns:ds="http://schemas.openxmlformats.org/officeDocument/2006/customXml" ds:itemID="{D546C03B-CD3A-4EA0-AAA4-0E00E896454E}">
+  <ds:schemaRefs>
+    <ds:schemaRef ds:uri="http://schemas.microsoft.com/sharepoint/v3/contenttype/forms"/>
+  </ds:schemaRefs>
+</ds:datastoreItem>
+</file>
+
+<file path=customXml/itemProps2.xml><?xml version="1.0" encoding="utf-8"?>
 <ds:datastoreItem xmlns:ds="http://schemas.openxmlformats.org/officeDocument/2006/customXml" ds:itemID="{3D8B6CA5-4463-44E3-A138-AB79431CCE9A}">
   <ds:schemaRefs>
     <ds:schemaRef ds:uri="http://schemas.microsoft.com/office/2006/metadata/contentType"/>
@@ -12941,14 +13199,6 @@
     <ds:schemaRef ds:uri="http://purl.org/dc/elements/1.1/"/>
     <ds:schemaRef ds:uri="http://purl.org/dc/terms/"/>
     <ds:schemaRef ds:uri="http://schemas.microsoft.com/internal/obd"/>
-  </ds:schemaRefs>
-</ds:datastoreItem>
-</file>
-
-<file path=customXml/itemProps2.xml><?xml version="1.0" encoding="utf-8"?>
-<ds:datastoreItem xmlns:ds="http://schemas.openxmlformats.org/officeDocument/2006/customXml" ds:itemID="{D546C03B-CD3A-4EA0-AAA4-0E00E896454E}">
-  <ds:schemaRefs>
-    <ds:schemaRef ds:uri="http://schemas.microsoft.com/sharepoint/v3/contenttype/forms"/>
   </ds:schemaRefs>
 </ds:datastoreItem>
 </file>

</xml_diff>

<commit_message>
upd frontend material more
</commit_message>
<xml_diff>
--- a/05_frontend/Frontend_VideoTopics.pptx
+++ b/05_frontend/Frontend_VideoTopics.pptx
@@ -18,13 +18,13 @@
     <p:sldId id="274" r:id="rId12"/>
     <p:sldId id="265" r:id="rId13"/>
     <p:sldId id="273" r:id="rId14"/>
-    <p:sldId id="267" r:id="rId15"/>
-    <p:sldId id="266" r:id="rId16"/>
-    <p:sldId id="268" r:id="rId17"/>
-    <p:sldId id="269" r:id="rId18"/>
-    <p:sldId id="272" r:id="rId19"/>
-    <p:sldId id="270" r:id="rId20"/>
-    <p:sldId id="258" r:id="rId21"/>
+    <p:sldId id="266" r:id="rId15"/>
+    <p:sldId id="270" r:id="rId16"/>
+    <p:sldId id="258" r:id="rId17"/>
+    <p:sldId id="267" r:id="rId18"/>
+    <p:sldId id="268" r:id="rId19"/>
+    <p:sldId id="269" r:id="rId20"/>
+    <p:sldId id="272" r:id="rId21"/>
   </p:sldIdLst>
   <p:sldSz cx="12192000" cy="6858000"/>
   <p:notesSz cx="6858000" cy="9144000"/>
@@ -1374,7 +1374,7 @@
           <a:p>
             <a:fld id="{5645C365-1C26-6946-87AF-75D6A7DF4277}" type="datetimeFigureOut">
               <a:rPr lang="en-GB" smtClean="0"/>
-              <a:t>11/03/2024</a:t>
+              <a:t>14/03/2024</a:t>
             </a:fld>
             <a:endParaRPr lang="en-GB"/>
           </a:p>
@@ -1873,7 +1873,7 @@
           <a:p>
             <a:fld id="{35B864B8-8D08-7B43-B4FB-B2FB41A5D9E3}" type="datetime1">
               <a:rPr lang="fi-FI" smtClean="0"/>
-              <a:t>11.3.2024</a:t>
+              <a:t>14.3.2024</a:t>
             </a:fld>
             <a:endParaRPr lang="en-GB"/>
           </a:p>
@@ -2199,7 +2199,7 @@
           <a:p>
             <a:fld id="{D5AEA85A-FC56-D34C-9AA6-ECC3D2586F37}" type="datetime1">
               <a:rPr lang="fi-FI" smtClean="0"/>
-              <a:t>11.3.2024</a:t>
+              <a:t>14.3.2024</a:t>
             </a:fld>
             <a:endParaRPr lang="en-GB"/>
           </a:p>
@@ -2409,7 +2409,7 @@
           <a:p>
             <a:fld id="{E6BC6EEF-E660-7844-8930-418AFF95EA40}" type="datetime1">
               <a:rPr lang="fi-FI" smtClean="0"/>
-              <a:t>11.3.2024</a:t>
+              <a:t>14.3.2024</a:t>
             </a:fld>
             <a:endParaRPr lang="en-GB"/>
           </a:p>
@@ -2718,7 +2718,7 @@
           <a:p>
             <a:fld id="{4E10C7EC-C1C1-9849-A573-7692478FCD52}" type="datetime1">
               <a:rPr lang="fi-FI" smtClean="0"/>
-              <a:t>11.3.2024</a:t>
+              <a:t>14.3.2024</a:t>
             </a:fld>
             <a:endParaRPr lang="en-GB"/>
           </a:p>
@@ -2991,7 +2991,7 @@
           <a:p>
             <a:fld id="{844FF3FE-30BE-2040-9151-6FBC4992BF4F}" type="datetime1">
               <a:rPr lang="fi-FI" smtClean="0"/>
-              <a:t>11.3.2024</a:t>
+              <a:t>14.3.2024</a:t>
             </a:fld>
             <a:endParaRPr lang="en-GB"/>
           </a:p>
@@ -3231,7 +3231,7 @@
           <a:p>
             <a:fld id="{11EDCD7B-6966-E249-89F2-D46BDFBF56BE}" type="datetime1">
               <a:rPr lang="fi-FI" smtClean="0"/>
-              <a:t>11.3.2024</a:t>
+              <a:t>14.3.2024</a:t>
             </a:fld>
             <a:endParaRPr lang="en-GB"/>
           </a:p>
@@ -3524,7 +3524,7 @@
           <a:p>
             <a:fld id="{11EDCD7B-6966-E249-89F2-D46BDFBF56BE}" type="datetime1">
               <a:rPr lang="fi-FI" smtClean="0"/>
-              <a:t>11.3.2024</a:t>
+              <a:t>14.3.2024</a:t>
             </a:fld>
             <a:endParaRPr lang="en-GB"/>
           </a:p>
@@ -3963,7 +3963,7 @@
           <a:p>
             <a:fld id="{844FF3FE-30BE-2040-9151-6FBC4992BF4F}" type="datetime1">
               <a:rPr lang="fi-FI" smtClean="0"/>
-              <a:t>11.3.2024</a:t>
+              <a:t>14.3.2024</a:t>
             </a:fld>
             <a:endParaRPr lang="en-GB"/>
           </a:p>
@@ -4191,7 +4191,7 @@
           <a:p>
             <a:fld id="{11EDCD7B-6966-E249-89F2-D46BDFBF56BE}" type="datetime1">
               <a:rPr lang="fi-FI" smtClean="0"/>
-              <a:t>11.3.2024</a:t>
+              <a:t>14.3.2024</a:t>
             </a:fld>
             <a:endParaRPr lang="en-GB"/>
           </a:p>
@@ -4606,7 +4606,7 @@
           <a:p>
             <a:fld id="{B62E192A-D52B-F541-B2AA-4AEB9388F1F7}" type="datetime1">
               <a:rPr lang="fi-FI" smtClean="0"/>
-              <a:t>11.3.2024</a:t>
+              <a:t>14.3.2024</a:t>
             </a:fld>
             <a:endParaRPr lang="en-GB"/>
           </a:p>
@@ -4906,7 +4906,7 @@
           <a:p>
             <a:fld id="{EEA4FAA2-2B3E-264C-A42F-2D6D3EF33A3C}" type="datetime1">
               <a:rPr lang="fi-FI" smtClean="0"/>
-              <a:t>11.3.2024</a:t>
+              <a:t>14.3.2024</a:t>
             </a:fld>
             <a:endParaRPr lang="en-GB"/>
           </a:p>
@@ -5805,7 +5805,7 @@
           <a:p>
             <a:fld id="{B3114A65-8017-1743-A85A-B2A4BB835AE9}" type="datetime1">
               <a:rPr lang="fi-FI" smtClean="0"/>
-              <a:t>11.3.2024</a:t>
+              <a:t>14.3.2024</a:t>
             </a:fld>
             <a:endParaRPr lang="en-GB"/>
           </a:p>
@@ -6033,7 +6033,7 @@
           <a:p>
             <a:fld id="{11EDCD7B-6966-E249-89F2-D46BDFBF56BE}" type="datetime1">
               <a:rPr lang="fi-FI" smtClean="0"/>
-              <a:t>11.3.2024</a:t>
+              <a:t>14.3.2024</a:t>
             </a:fld>
             <a:endParaRPr lang="en-GB"/>
           </a:p>
@@ -6325,7 +6325,7 @@
           <a:p>
             <a:fld id="{45F98643-D206-614D-B596-3C8548138211}" type="datetime1">
               <a:rPr lang="fi-FI" smtClean="0"/>
-              <a:t>11.3.2024</a:t>
+              <a:t>14.3.2024</a:t>
             </a:fld>
             <a:endParaRPr lang="en-GB"/>
           </a:p>
@@ -7025,7 +7025,7 @@
           <a:p>
             <a:fld id="{11EDCD7B-6966-E249-89F2-D46BDFBF56BE}" type="datetime1">
               <a:rPr lang="fi-FI" smtClean="0"/>
-              <a:t>11.3.2024</a:t>
+              <a:t>14.3.2024</a:t>
             </a:fld>
             <a:endParaRPr lang="en-GB"/>
           </a:p>
@@ -7240,7 +7240,7 @@
           <a:p>
             <a:fld id="{11EDCD7B-6966-E249-89F2-D46BDFBF56BE}" type="datetime1">
               <a:rPr lang="fi-FI" smtClean="0"/>
-              <a:t>11.3.2024</a:t>
+              <a:t>14.3.2024</a:t>
             </a:fld>
             <a:endParaRPr lang="en-GB"/>
           </a:p>
@@ -7354,10 +7354,18 @@
           <a:lstStyle/>
           <a:p>
             <a:r>
-              <a:rPr lang="en-US"/>
-              <a:t>8. App context</a:t>
-            </a:r>
-            <a:endParaRPr lang="fi-FI"/>
+              <a:rPr lang="en-US" dirty="0"/>
+              <a:t>8. The </a:t>
+            </a:r>
+            <a:r>
+              <a:rPr lang="en-US" dirty="0" err="1"/>
+              <a:t>useEffect</a:t>
+            </a:r>
+            <a:r>
+              <a:rPr lang="en-US" dirty="0"/>
+              <a:t> hook</a:t>
+            </a:r>
+            <a:endParaRPr lang="fi-FI" dirty="0"/>
           </a:p>
         </p:txBody>
       </p:sp>
@@ -7377,10 +7385,15 @@
             <p:ph sz="half" idx="2"/>
           </p:nvPr>
         </p:nvSpPr>
-        <p:spPr/>
-        <p:txBody>
-          <a:bodyPr>
-            <a:normAutofit/>
+        <p:spPr>
+          <a:xfrm>
+            <a:off x="253339" y="1773238"/>
+            <a:ext cx="11657611" cy="4140200"/>
+          </a:xfrm>
+        </p:spPr>
+        <p:txBody>
+          <a:bodyPr vert="horz" lIns="0" tIns="0" rIns="0" bIns="36000" numCol="1" spcCol="360000" rtlCol="0" anchor="t">
+            <a:normAutofit fontScale="77500" lnSpcReduction="20000"/>
           </a:bodyPr>
           <a:lstStyle/>
           <a:p>
@@ -7391,7 +7404,15 @@
             </a:pPr>
             <a:r>
               <a:rPr lang="en-US" sz="2800" dirty="0"/>
-              <a:t>Creating the context</a:t>
+              <a:t>For “</a:t>
+            </a:r>
+            <a:r>
+              <a:rPr lang="en-US" sz="2800" i="1" dirty="0"/>
+              <a:t>side effects</a:t>
+            </a:r>
+            <a:r>
+              <a:rPr lang="en-US" sz="2800" dirty="0"/>
+              <a:t>” which means something happening outside the normal “state/prop changes =&gt; render happens” -cycle.</a:t>
             </a:r>
           </a:p>
           <a:p>
@@ -7401,40 +7422,27 @@
               </a:lnSpc>
             </a:pPr>
             <a:r>
-              <a:rPr lang="en-US" sz="2600" dirty="0" err="1">
-                <a:latin typeface="Consolas" panose="020B0609020204030204" pitchFamily="49" charset="0"/>
-              </a:rPr>
-              <a:t>createContext</a:t>
-            </a:r>
-            <a:r>
-              <a:rPr lang="en-US" sz="2600" dirty="0">
-                <a:latin typeface="Consolas" panose="020B0609020204030204" pitchFamily="49" charset="0"/>
-              </a:rPr>
-              <a:t>({thing: 22, thang: “</a:t>
-            </a:r>
-            <a:r>
-              <a:rPr lang="en-US" sz="2600" dirty="0" err="1">
-                <a:latin typeface="Consolas" panose="020B0609020204030204" pitchFamily="49" charset="0"/>
-              </a:rPr>
-              <a:t>abc</a:t>
-            </a:r>
-            <a:r>
-              <a:rPr lang="en-US" sz="2600" dirty="0">
-                <a:latin typeface="Consolas" panose="020B0609020204030204" pitchFamily="49" charset="0"/>
-              </a:rPr>
-              <a:t>” …}) </a:t>
-            </a:r>
-          </a:p>
-          <a:p>
-            <a:pPr>
+              <a:rPr lang="en-US" sz="2600" dirty="0"/>
+              <a:t>Usually still essential activity for the app, like fetching data from DB</a:t>
+            </a:r>
+          </a:p>
+          <a:p>
+            <a:pPr marL="215900" indent="-215900">
               <a:lnSpc>
                 <a:spcPct val="100000"/>
               </a:lnSpc>
             </a:pPr>
             <a:r>
+              <a:rPr lang="en-US" sz="2800" dirty="0" err="1"/>
+              <a:t>useEffect</a:t>
+            </a:r>
+            <a:r>
               <a:rPr lang="en-US" sz="2800" dirty="0"/>
-              <a:t>Accessing/reading the context values</a:t>
-            </a:r>
+              <a:t> defines three parts: </a:t>
+            </a:r>
+            <a:endParaRPr lang="en-US" sz="2800" dirty="0">
+              <a:cs typeface="Arial" panose="020B0604020202020204"/>
+            </a:endParaRPr>
           </a:p>
           <a:p>
             <a:pPr lvl="1">
@@ -7443,20 +7451,12 @@
               </a:lnSpc>
             </a:pPr>
             <a:r>
-              <a:rPr lang="en-US" sz="2600" dirty="0" err="1">
-                <a:latin typeface="Consolas" panose="020B0609020204030204" pitchFamily="49" charset="0"/>
-              </a:rPr>
-              <a:t>useContext</a:t>
-            </a:r>
-            <a:r>
-              <a:rPr lang="en-US" sz="2600" dirty="0">
-                <a:latin typeface="Consolas" panose="020B0609020204030204" pitchFamily="49" charset="0"/>
-              </a:rPr>
-              <a:t>() </a:t>
-            </a:r>
-            <a:r>
-              <a:rPr lang="en-US" sz="2800" dirty="0"/>
-              <a:t>hook to create local reference to the context </a:t>
+              <a:rPr lang="en-US" sz="2600" b="1" dirty="0"/>
+              <a:t>Action</a:t>
+            </a:r>
+            <a:r>
+              <a:rPr lang="en-US" sz="2600" dirty="0"/>
+              <a:t>, function to be run (cannot be awaited, but you can call another function that will wait)</a:t>
             </a:r>
           </a:p>
           <a:p>
@@ -7466,39 +7466,104 @@
               </a:lnSpc>
             </a:pPr>
             <a:r>
-              <a:rPr lang="en-US" sz="2800" dirty="0">
-                <a:latin typeface="Consolas" panose="020B0609020204030204" pitchFamily="49" charset="0"/>
-              </a:rPr>
-              <a:t>+</a:t>
-            </a:r>
-            <a:r>
-              <a:rPr lang="en-US" sz="2600" dirty="0">
-                <a:latin typeface="Consolas" panose="020B0609020204030204" pitchFamily="49" charset="0"/>
-              </a:rPr>
-              <a:t>  {</a:t>
-            </a:r>
-            <a:r>
-              <a:rPr lang="en-US" sz="2600" dirty="0" err="1">
-                <a:latin typeface="Consolas" panose="020B0609020204030204" pitchFamily="49" charset="0"/>
-              </a:rPr>
-              <a:t>myContext.thing</a:t>
-            </a:r>
-            <a:r>
-              <a:rPr lang="en-US" sz="2600" dirty="0">
-                <a:latin typeface="Consolas" panose="020B0609020204030204" pitchFamily="49" charset="0"/>
-              </a:rPr>
-              <a:t>}</a:t>
-            </a:r>
-          </a:p>
-          <a:p>
-            <a:pPr>
+              <a:rPr lang="en-US" sz="2600" b="1" dirty="0"/>
+              <a:t>Dependency array</a:t>
+            </a:r>
+          </a:p>
+          <a:p>
+            <a:pPr lvl="2">
               <a:lnSpc>
                 <a:spcPct val="100000"/>
               </a:lnSpc>
             </a:pPr>
             <a:r>
-              <a:rPr lang="en-US" sz="2800" dirty="0"/>
-              <a:t>Updating/writing the values to the context</a:t>
+              <a:rPr lang="en-US" sz="2600" dirty="0"/>
+              <a:t>if </a:t>
+            </a:r>
+            <a:r>
+              <a:rPr lang="en-US" sz="2600" u="sng" dirty="0"/>
+              <a:t>items specified</a:t>
+            </a:r>
+            <a:r>
+              <a:rPr lang="en-US" sz="2600" dirty="0"/>
+              <a:t> in dependency array </a:t>
+            </a:r>
+            <a:r>
+              <a:rPr lang="en-US" sz="2600" b="1" dirty="0"/>
+              <a:t>[user.id, </a:t>
+            </a:r>
+            <a:r>
+              <a:rPr lang="en-US" sz="2600" b="1" dirty="0" err="1"/>
+              <a:t>project.count</a:t>
+            </a:r>
+            <a:r>
+              <a:rPr lang="en-US" sz="2600" b="1" dirty="0"/>
+              <a:t>]</a:t>
+            </a:r>
+            <a:r>
+              <a:rPr lang="en-US" sz="2600" dirty="0"/>
+              <a:t>, then action runs at mount + if changes in these.</a:t>
+            </a:r>
+          </a:p>
+          <a:p>
+            <a:pPr lvl="3">
+              <a:lnSpc>
+                <a:spcPct val="100000"/>
+              </a:lnSpc>
+            </a:pPr>
+            <a:r>
+              <a:rPr lang="en-US" sz="2600" dirty="0"/>
+              <a:t>By far the most used and most useful. Should be your thinking starting point. </a:t>
+            </a:r>
+          </a:p>
+          <a:p>
+            <a:pPr lvl="2">
+              <a:lnSpc>
+                <a:spcPct val="100000"/>
+              </a:lnSpc>
+            </a:pPr>
+            <a:r>
+              <a:rPr lang="en-US" sz="2600" u="sng" dirty="0"/>
+              <a:t>empty</a:t>
+            </a:r>
+            <a:r>
+              <a:rPr lang="en-US" sz="2600" dirty="0"/>
+              <a:t> </a:t>
+            </a:r>
+            <a:r>
+              <a:rPr lang="en-US" sz="2600" b="1" dirty="0"/>
+              <a:t>[ ]</a:t>
+            </a:r>
+            <a:r>
+              <a:rPr lang="en-US" sz="2600" dirty="0"/>
+              <a:t>, dependency array =&gt; runs only once.   You sometimes need this. </a:t>
+            </a:r>
+          </a:p>
+          <a:p>
+            <a:pPr lvl="2">
+              <a:lnSpc>
+                <a:spcPct val="100000"/>
+              </a:lnSpc>
+            </a:pPr>
+            <a:r>
+              <a:rPr lang="en-US" sz="2600" dirty="0"/>
+              <a:t>If </a:t>
+            </a:r>
+            <a:r>
+              <a:rPr lang="en-US" sz="2600" u="sng" dirty="0"/>
+              <a:t>missing</a:t>
+            </a:r>
+            <a:r>
+              <a:rPr lang="en-US" sz="2600" dirty="0"/>
+              <a:t> dependency array: </a:t>
+            </a:r>
+            <a:r>
+              <a:rPr lang="en-US" sz="2600" b="1" dirty="0"/>
+              <a:t>, }</a:t>
+            </a:r>
+            <a:r>
+              <a:rPr lang="en-US" sz="2600" dirty="0"/>
+              <a:t> =&gt; runs at mount/first render + for any update/re-render.</a:t>
             </a:r>
           </a:p>
           <a:p>
@@ -7508,43 +7573,12 @@
               </a:lnSpc>
             </a:pPr>
             <a:r>
-              <a:rPr lang="en-US" sz="2600" dirty="0" err="1">
-                <a:latin typeface="Consolas" panose="020B0609020204030204" pitchFamily="49" charset="0"/>
-              </a:rPr>
-              <a:t>useContext</a:t>
-            </a:r>
-            <a:r>
-              <a:rPr lang="en-US" sz="2600" dirty="0">
-                <a:latin typeface="Consolas" panose="020B0609020204030204" pitchFamily="49" charset="0"/>
-              </a:rPr>
-              <a:t>() </a:t>
-            </a:r>
-            <a:r>
-              <a:rPr lang="en-US" sz="2800" dirty="0"/>
-              <a:t>hook to create local reference to the context </a:t>
-            </a:r>
-          </a:p>
-          <a:p>
-            <a:pPr lvl="1">
-              <a:lnSpc>
-                <a:spcPct val="100000"/>
-              </a:lnSpc>
-            </a:pPr>
-            <a:r>
               <a:rPr lang="en-US" sz="2600" dirty="0"/>
-              <a:t>+    </a:t>
-            </a:r>
-            <a:r>
-              <a:rPr lang="en-US" sz="2600" dirty="0" err="1">
-                <a:latin typeface="Consolas" panose="020B0609020204030204" pitchFamily="49" charset="0"/>
-              </a:rPr>
-              <a:t>myContext.thing</a:t>
-            </a:r>
-            <a:r>
-              <a:rPr lang="en-US" sz="2600" dirty="0">
-                <a:latin typeface="Consolas" panose="020B0609020204030204" pitchFamily="49" charset="0"/>
-              </a:rPr>
-              <a:t> = 33;</a:t>
+              <a:t>(Action function is possibly returning) the </a:t>
+            </a:r>
+            <a:r>
+              <a:rPr lang="en-US" sz="2600" b="1" dirty="0"/>
+              <a:t>Cleanup function</a:t>
             </a:r>
           </a:p>
           <a:p>
@@ -7581,7 +7615,7 @@
           <a:p>
             <a:fld id="{11EDCD7B-6966-E249-89F2-D46BDFBF56BE}" type="datetime1">
               <a:rPr lang="fi-FI" smtClean="0"/>
-              <a:t>11.3.2024</a:t>
+              <a:t>14.3.2024</a:t>
             </a:fld>
             <a:endParaRPr lang="en-GB"/>
           </a:p>
@@ -7644,7 +7678,7 @@
     </p:spTree>
     <p:extLst>
       <p:ext uri="{BB962C8B-B14F-4D97-AF65-F5344CB8AC3E}">
-        <p14:creationId xmlns:p14="http://schemas.microsoft.com/office/powerpoint/2010/main" val="986459541"/>
+        <p14:creationId xmlns:p14="http://schemas.microsoft.com/office/powerpoint/2010/main" val="2228967696"/>
       </p:ext>
     </p:extLst>
   </p:cSld>
@@ -7696,15 +7730,7 @@
           <a:p>
             <a:r>
               <a:rPr lang="en-US" dirty="0"/>
-              <a:t>9. The </a:t>
-            </a:r>
-            <a:r>
-              <a:rPr lang="en-US" dirty="0" err="1"/>
-              <a:t>useEffect</a:t>
-            </a:r>
-            <a:r>
-              <a:rPr lang="en-US" dirty="0"/>
-              <a:t> hook</a:t>
+              <a:t>9. Typical List component composition</a:t>
             </a:r>
             <a:endParaRPr lang="fi-FI" dirty="0"/>
           </a:p>
@@ -7729,39 +7755,9 @@
         <p:spPr/>
         <p:txBody>
           <a:bodyPr vert="horz" lIns="0" tIns="0" rIns="0" bIns="36000" numCol="1" spcCol="360000" rtlCol="0" anchor="t">
-            <a:normAutofit fontScale="77500" lnSpcReduction="20000"/>
+            <a:normAutofit fontScale="92500"/>
           </a:bodyPr>
           <a:lstStyle/>
-          <a:p>
-            <a:pPr>
-              <a:lnSpc>
-                <a:spcPct val="100000"/>
-              </a:lnSpc>
-            </a:pPr>
-            <a:r>
-              <a:rPr lang="en-US" sz="2800" dirty="0"/>
-              <a:t>For “</a:t>
-            </a:r>
-            <a:r>
-              <a:rPr lang="en-US" sz="2800" i="1" dirty="0"/>
-              <a:t>side effects</a:t>
-            </a:r>
-            <a:r>
-              <a:rPr lang="en-US" sz="2800" dirty="0"/>
-              <a:t>” which means something happening outside the normal “state/prop changes =&gt; render happens” -cycle.</a:t>
-            </a:r>
-          </a:p>
-          <a:p>
-            <a:pPr lvl="1">
-              <a:lnSpc>
-                <a:spcPct val="100000"/>
-              </a:lnSpc>
-            </a:pPr>
-            <a:r>
-              <a:rPr lang="en-US" sz="2600" dirty="0"/>
-              <a:t>Usually still essential activity for the app, like fetching data from DB</a:t>
-            </a:r>
-          </a:p>
           <a:p>
             <a:pPr marL="215900" indent="-215900">
               <a:lnSpc>
@@ -7769,142 +7765,185 @@
               </a:lnSpc>
             </a:pPr>
             <a:r>
-              <a:rPr lang="en-US" sz="2800" dirty="0" err="1"/>
-              <a:t>useEffect</a:t>
-            </a:r>
-            <a:r>
               <a:rPr lang="en-US" sz="2800" dirty="0"/>
-              <a:t> defines three parts: </a:t>
+              <a:t>(See random example on the next slide. Idea important, </a:t>
+            </a:r>
+            <a:r>
+              <a:rPr lang="en-US" sz="2800"/>
+              <a:t>not exact match)</a:t>
             </a:r>
             <a:endParaRPr lang="en-US" sz="2800" dirty="0">
-              <a:cs typeface="Arial" panose="020B0604020202020204"/>
+              <a:cs typeface="Arial"/>
             </a:endParaRPr>
           </a:p>
           <a:p>
-            <a:pPr lvl="1">
+            <a:pPr marL="215900" indent="-215900">
               <a:lnSpc>
                 <a:spcPct val="100000"/>
               </a:lnSpc>
             </a:pPr>
             <a:r>
-              <a:rPr lang="en-US" sz="2600" b="1" dirty="0"/>
-              <a:t>Action</a:t>
-            </a:r>
-            <a:r>
-              <a:rPr lang="en-US" sz="2600" dirty="0"/>
-              <a:t>, function to be run (cannot be awaited, but you can call another function that will wait)</a:t>
-            </a:r>
-          </a:p>
-          <a:p>
-            <a:pPr lvl="1">
+              <a:rPr lang="en-US" sz="2800" dirty="0"/>
+              <a:t>The example is about Buildings, e.g. three </a:t>
+            </a:r>
+            <a:r>
+              <a:rPr lang="en-US" sz="2800" dirty="0" err="1"/>
+              <a:t>buldings</a:t>
+            </a:r>
+            <a:r>
+              <a:rPr lang="en-US" sz="2800" dirty="0"/>
+              <a:t> on one campus, two on other.</a:t>
+            </a:r>
+            <a:endParaRPr lang="en-US" sz="2800" dirty="0">
+              <a:cs typeface="Arial"/>
+            </a:endParaRPr>
+          </a:p>
+          <a:p>
+            <a:pPr marL="215900" indent="-215900">
               <a:lnSpc>
                 <a:spcPct val="100000"/>
               </a:lnSpc>
             </a:pPr>
             <a:r>
-              <a:rPr lang="en-US" sz="2600" b="1" dirty="0"/>
-              <a:t>Dependency array</a:t>
-            </a:r>
-          </a:p>
-          <a:p>
-            <a:pPr lvl="2">
+              <a:rPr lang="en-US" sz="2800" dirty="0"/>
+              <a:t>SRP = Single Responsibility Principle. Each component doing usually only one thing in the app:</a:t>
+            </a:r>
+            <a:endParaRPr lang="en-US" sz="2800" dirty="0">
+              <a:cs typeface="Arial"/>
+            </a:endParaRPr>
+          </a:p>
+          <a:p>
+            <a:pPr marL="719455" lvl="1" indent="-215900">
               <a:lnSpc>
                 <a:spcPct val="100000"/>
               </a:lnSpc>
             </a:pPr>
             <a:r>
               <a:rPr lang="en-US" sz="2600" dirty="0"/>
-              <a:t>if items given </a:t>
-            </a:r>
-            <a:r>
-              <a:rPr lang="en-US" sz="2600" b="1" dirty="0"/>
-              <a:t>[user.id, </a:t>
+              <a:t>Providing navigable view:   </a:t>
+            </a:r>
+            <a:r>
+              <a:rPr lang="en-US" sz="2600" dirty="0" err="1"/>
+              <a:t>BuildingList</a:t>
             </a:r>
             <a:r>
               <a:rPr lang="en-US" sz="2600" b="1" dirty="0" err="1"/>
-              <a:t>project.count</a:t>
-            </a:r>
-            <a:r>
-              <a:rPr lang="en-US" sz="2600" b="1" dirty="0"/>
-              <a:t>]</a:t>
-            </a:r>
-            <a:r>
-              <a:rPr lang="en-US" sz="2600" dirty="0"/>
-              <a:t>, then action runs at mount + if changes in these.</a:t>
-            </a:r>
-          </a:p>
-          <a:p>
-            <a:pPr lvl="3">
+              <a:t>View</a:t>
+            </a:r>
+            <a:endParaRPr lang="en-US" sz="2600" b="1" dirty="0">
+              <a:cs typeface="Arial" panose="020B0604020202020204"/>
+            </a:endParaRPr>
+          </a:p>
+          <a:p>
+            <a:pPr marL="719455" lvl="1" indent="-215900">
               <a:lnSpc>
                 <a:spcPct val="100000"/>
               </a:lnSpc>
             </a:pPr>
             <a:r>
               <a:rPr lang="en-US" sz="2600" dirty="0"/>
-              <a:t>By far the most used and most useful. Should be your thinking starting point. </a:t>
-            </a:r>
-          </a:p>
-          <a:p>
-            <a:pPr lvl="2">
+              <a:t>Holding and refreshing data list state, maps w. </a:t>
+            </a:r>
+            <a:r>
+              <a:rPr lang="en-US" sz="2600" dirty="0" err="1"/>
+              <a:t>ListItems</a:t>
+            </a:r>
+            <a:r>
+              <a:rPr lang="en-US" sz="2600" dirty="0"/>
+              <a:t>:   </a:t>
+            </a:r>
+            <a:r>
+              <a:rPr lang="en-US" sz="2600" dirty="0" err="1"/>
+              <a:t>Building</a:t>
+            </a:r>
+            <a:r>
+              <a:rPr lang="en-US" sz="2600" b="1" dirty="0" err="1"/>
+              <a:t>List</a:t>
+            </a:r>
+            <a:r>
+              <a:rPr lang="en-US" sz="2600" dirty="0"/>
+              <a:t> </a:t>
+            </a:r>
+            <a:endParaRPr lang="en-US" sz="2600" dirty="0">
+              <a:cs typeface="Arial"/>
+            </a:endParaRPr>
+          </a:p>
+          <a:p>
+            <a:pPr marL="719455" lvl="1" indent="-215900">
               <a:lnSpc>
                 <a:spcPct val="100000"/>
               </a:lnSpc>
             </a:pPr>
             <a:r>
               <a:rPr lang="en-US" sz="2600" dirty="0"/>
-              <a:t>Empty </a:t>
+              <a:t>Providing actions for one item:   </a:t>
+            </a:r>
+            <a:r>
+              <a:rPr lang="en-US" sz="2600" dirty="0" err="1"/>
+              <a:t>Building</a:t>
+            </a:r>
+            <a:r>
+              <a:rPr lang="en-US" sz="2600" b="1" dirty="0" err="1"/>
+              <a:t>ListItem</a:t>
             </a:r>
             <a:r>
               <a:rPr lang="en-US" sz="2600" b="1" dirty="0"/>
-              <a:t>[ ]</a:t>
-            </a:r>
-            <a:r>
-              <a:rPr lang="en-US" sz="2600" dirty="0"/>
-              <a:t>, dependency array =&gt; runs only once.   You sometimes need this. </a:t>
-            </a:r>
-          </a:p>
-          <a:p>
-            <a:pPr lvl="2">
+              <a:t> </a:t>
+            </a:r>
+            <a:r>
+              <a:rPr lang="en-US" sz="2600" dirty="0">
+                <a:ea typeface="+mn-lt"/>
+                <a:cs typeface="+mn-lt"/>
+              </a:rPr>
+              <a:t>(clickable, x = delete)</a:t>
+            </a:r>
+            <a:endParaRPr lang="en-US" sz="2600" b="1" dirty="0">
+              <a:cs typeface="Arial" panose="020B0604020202020204"/>
+            </a:endParaRPr>
+          </a:p>
+          <a:p>
+            <a:pPr marL="719455" lvl="1" indent="-215900">
               <a:lnSpc>
                 <a:spcPct val="100000"/>
               </a:lnSpc>
             </a:pPr>
             <a:r>
               <a:rPr lang="en-US" sz="2600" dirty="0"/>
-              <a:t>If missing dependency array: </a:t>
-            </a:r>
-            <a:r>
-              <a:rPr lang="en-US" sz="2600" b="1" dirty="0"/>
-              <a:t>, }</a:t>
+              <a:t>Just shows data for one item:   </a:t>
+            </a:r>
+            <a:r>
+              <a:rPr lang="en-US" sz="2600" dirty="0" err="1"/>
+              <a:t>Building</a:t>
+            </a:r>
+            <a:r>
+              <a:rPr lang="en-US" sz="2600" b="1" dirty="0" err="1"/>
+              <a:t>Display</a:t>
             </a:r>
             <a:r>
               <a:rPr lang="en-US" sz="2600" dirty="0"/>
-              <a:t> =&gt; runs at mount/first render + for any update/re-render.</a:t>
-            </a:r>
-          </a:p>
-          <a:p>
-            <a:pPr lvl="1">
-              <a:lnSpc>
-                <a:spcPct val="100000"/>
-              </a:lnSpc>
-            </a:pPr>
+              <a:t> / </a:t>
+            </a:r>
+            <a:r>
+              <a:rPr lang="en-US" sz="2600" dirty="0" err="1">
+                <a:ea typeface="+mn-lt"/>
+                <a:cs typeface="+mn-lt"/>
+              </a:rPr>
+              <a:t>BuildingInfo</a:t>
+            </a:r>
+            <a:r>
+              <a:rPr lang="en-US" sz="2600" dirty="0">
+                <a:ea typeface="+mn-lt"/>
+                <a:cs typeface="+mn-lt"/>
+              </a:rPr>
+              <a:t> / </a:t>
+            </a:r>
             <a:r>
               <a:rPr lang="en-US" sz="2600" dirty="0"/>
-              <a:t>(Action function is possibly returning) the </a:t>
-            </a:r>
-            <a:r>
-              <a:rPr lang="en-US" sz="2600" b="1" dirty="0"/>
-              <a:t>Cleanup function</a:t>
-            </a:r>
-          </a:p>
-          <a:p>
-            <a:pPr marL="0" indent="0">
-              <a:lnSpc>
-                <a:spcPct val="100000"/>
-              </a:lnSpc>
-              <a:buNone/>
-            </a:pPr>
-            <a:endParaRPr lang="en-US" sz="2800" dirty="0"/>
+              <a:t>B…Details</a:t>
+            </a:r>
+            <a:endParaRPr lang="en-US" sz="2600" dirty="0">
+              <a:cs typeface="Arial"/>
+            </a:endParaRPr>
           </a:p>
         </p:txBody>
       </p:sp>
@@ -7931,7 +7970,7 @@
           <a:p>
             <a:fld id="{11EDCD7B-6966-E249-89F2-D46BDFBF56BE}" type="datetime1">
               <a:rPr lang="fi-FI" smtClean="0"/>
-              <a:t>11.3.2024</a:t>
+              <a:t>14.3.2024</a:t>
             </a:fld>
             <a:endParaRPr lang="en-GB"/>
           </a:p>
@@ -7994,7 +8033,7 @@
     </p:spTree>
     <p:extLst>
       <p:ext uri="{BB962C8B-B14F-4D97-AF65-F5344CB8AC3E}">
-        <p14:creationId xmlns:p14="http://schemas.microsoft.com/office/powerpoint/2010/main" val="2228967696"/>
+        <p14:creationId xmlns:p14="http://schemas.microsoft.com/office/powerpoint/2010/main" val="553651584"/>
       </p:ext>
     </p:extLst>
   </p:cSld>
@@ -8023,233 +8062,28 @@
       </p:grpSpPr>
       <p:sp>
         <p:nvSpPr>
-          <p:cNvPr id="2" name="Title 1">
-            <a:extLst>
-              <a:ext uri="{FF2B5EF4-FFF2-40B4-BE49-F238E27FC236}">
-                <a16:creationId xmlns:a16="http://schemas.microsoft.com/office/drawing/2014/main" id="{F9662D29-990E-426E-BC0E-093CB48EE792}"/>
-              </a:ext>
-            </a:extLst>
-          </p:cNvPr>
-          <p:cNvSpPr>
-            <a:spLocks noGrp="1"/>
-          </p:cNvSpPr>
-          <p:nvPr>
-            <p:ph type="title"/>
+          <p:cNvPr id="5" name="Date Placeholder 4">
+            <a:extLst>
+              <a:ext uri="{FF2B5EF4-FFF2-40B4-BE49-F238E27FC236}">
+                <a16:creationId xmlns:a16="http://schemas.microsoft.com/office/drawing/2014/main" id="{976244E2-AA76-2742-B2EC-FEC79276155C}"/>
+              </a:ext>
+            </a:extLst>
+          </p:cNvPr>
+          <p:cNvSpPr>
+            <a:spLocks noGrp="1"/>
+          </p:cNvSpPr>
+          <p:nvPr>
+            <p:ph type="dt" sz="half" idx="10"/>
           </p:nvPr>
         </p:nvSpPr>
         <p:spPr/>
         <p:txBody>
-          <a:bodyPr anchor="ctr">
-            <a:normAutofit/>
-          </a:bodyPr>
-          <a:lstStyle/>
-          <a:p>
-            <a:r>
-              <a:rPr lang="en-US"/>
-              <a:t>10. Routing</a:t>
-            </a:r>
-            <a:endParaRPr lang="fi-FI"/>
-          </a:p>
-        </p:txBody>
-      </p:sp>
-      <p:sp>
-        <p:nvSpPr>
-          <p:cNvPr id="3" name="Content Placeholder 2">
-            <a:extLst>
-              <a:ext uri="{FF2B5EF4-FFF2-40B4-BE49-F238E27FC236}">
-                <a16:creationId xmlns:a16="http://schemas.microsoft.com/office/drawing/2014/main" id="{001C1C76-B4E0-405B-8F87-AC2E22AA7225}"/>
-              </a:ext>
-            </a:extLst>
-          </p:cNvPr>
-          <p:cNvSpPr>
-            <a:spLocks noGrp="1"/>
-          </p:cNvSpPr>
-          <p:nvPr>
-            <p:ph sz="half" idx="2"/>
-          </p:nvPr>
-        </p:nvSpPr>
-        <p:spPr/>
-        <p:txBody>
-          <a:bodyPr vert="horz" lIns="0" tIns="0" rIns="0" bIns="36000" numCol="1" spcCol="360000" rtlCol="0" anchor="t">
-            <a:normAutofit/>
-          </a:bodyPr>
-          <a:lstStyle/>
-          <a:p>
-            <a:pPr>
-              <a:lnSpc>
-                <a:spcPct val="100000"/>
-              </a:lnSpc>
-            </a:pPr>
-            <a:r>
-              <a:rPr lang="en-US" sz="2800" dirty="0"/>
-              <a:t>Look at the given pictures for routing. </a:t>
-            </a:r>
-            <a:r>
-              <a:rPr lang="en-US" sz="2800" b="1" dirty="0"/>
-              <a:t>Basic routing </a:t>
-            </a:r>
-            <a:r>
-              <a:rPr lang="en-US" sz="2800" dirty="0"/>
-              <a:t>includes:</a:t>
-            </a:r>
-          </a:p>
-          <a:p>
-            <a:pPr lvl="1">
-              <a:lnSpc>
-                <a:spcPct val="100000"/>
-              </a:lnSpc>
-            </a:pPr>
-            <a:r>
-              <a:rPr lang="en-US" sz="2600" dirty="0"/>
-              <a:t>The </a:t>
-            </a:r>
-            <a:r>
-              <a:rPr lang="en-US" sz="2600" b="1" dirty="0"/>
-              <a:t>Route definitions</a:t>
-            </a:r>
-            <a:r>
-              <a:rPr lang="en-US" sz="2600" dirty="0"/>
-              <a:t>. They are our mappings between a </a:t>
-            </a:r>
-            <a:r>
-              <a:rPr lang="en-US" sz="2600" b="1" dirty="0"/>
-              <a:t>Path</a:t>
-            </a:r>
-            <a:r>
-              <a:rPr lang="en-US" sz="2600" dirty="0"/>
-              <a:t> and a View </a:t>
-            </a:r>
-            <a:r>
-              <a:rPr lang="en-US" sz="2600" b="1" dirty="0"/>
-              <a:t>React component </a:t>
-            </a:r>
-            <a:r>
-              <a:rPr lang="en-US" sz="2600" dirty="0"/>
-              <a:t>that renders that path.</a:t>
-            </a:r>
-          </a:p>
-          <a:p>
-            <a:pPr lvl="1">
-              <a:lnSpc>
-                <a:spcPct val="100000"/>
-              </a:lnSpc>
-            </a:pPr>
-            <a:r>
-              <a:rPr lang="en-US" sz="2800" dirty="0"/>
-              <a:t>Defining </a:t>
-            </a:r>
-            <a:r>
-              <a:rPr lang="en-US" sz="2800" b="1" dirty="0"/>
-              <a:t>Links</a:t>
-            </a:r>
-            <a:r>
-              <a:rPr lang="en-US" sz="2800" dirty="0"/>
-              <a:t> or </a:t>
-            </a:r>
-            <a:r>
-              <a:rPr lang="en-US" sz="2800" b="1" dirty="0"/>
-              <a:t>Buttons</a:t>
-            </a:r>
-            <a:r>
-              <a:rPr lang="en-US" sz="2800" dirty="0"/>
-              <a:t> that trigger navigation to the Routes</a:t>
-            </a:r>
-          </a:p>
-          <a:p>
-            <a:pPr lvl="1">
-              <a:lnSpc>
-                <a:spcPct val="100000"/>
-              </a:lnSpc>
-            </a:pPr>
-            <a:r>
-              <a:rPr lang="en-US" sz="2800" b="1" dirty="0"/>
-              <a:t>Route</a:t>
-            </a:r>
-            <a:r>
-              <a:rPr lang="en-US" sz="2800" b="1" u="sng" dirty="0"/>
-              <a:t>s</a:t>
-            </a:r>
-            <a:r>
-              <a:rPr lang="en-US" sz="2800" b="1" dirty="0"/>
-              <a:t> component </a:t>
-            </a:r>
-            <a:r>
-              <a:rPr lang="en-US" sz="2800" dirty="0"/>
-              <a:t>(older component was called</a:t>
-            </a:r>
-            <a:r>
-              <a:rPr lang="en-US" sz="2800" b="1" dirty="0"/>
-              <a:t> Switch</a:t>
-            </a:r>
-            <a:r>
-              <a:rPr lang="en-US" sz="2800" dirty="0"/>
-              <a:t>) that marks the place (div) on the page that will be replaced/filled with the “current page”. It also lists many </a:t>
-            </a:r>
-            <a:r>
-              <a:rPr lang="en-US" sz="2800" b="1" dirty="0"/>
-              <a:t>Route</a:t>
-            </a:r>
-            <a:r>
-              <a:rPr lang="en-US" sz="2800" dirty="0"/>
-              <a:t> </a:t>
-            </a:r>
-            <a:r>
-              <a:rPr lang="en-US" sz="2800" b="1" dirty="0"/>
-              <a:t>components</a:t>
-            </a:r>
-            <a:r>
-              <a:rPr lang="en-US" sz="2800" dirty="0"/>
-              <a:t> as content/children, but only one Route’s View switched each time to be rendered there.</a:t>
-            </a:r>
-          </a:p>
-          <a:p>
-            <a:pPr marL="0" indent="0">
-              <a:lnSpc>
-                <a:spcPct val="100000"/>
-              </a:lnSpc>
-              <a:buNone/>
-            </a:pPr>
-            <a:endParaRPr lang="en-US" sz="2800" dirty="0">
-              <a:cs typeface="Arial" panose="020B0604020202020204"/>
-            </a:endParaRPr>
-          </a:p>
-          <a:p>
-            <a:pPr marL="0" indent="0">
-              <a:lnSpc>
-                <a:spcPct val="100000"/>
-              </a:lnSpc>
-              <a:buNone/>
-            </a:pPr>
-            <a:endParaRPr lang="en-US" sz="2800" dirty="0">
-              <a:cs typeface="Arial" panose="020B0604020202020204"/>
-            </a:endParaRPr>
-          </a:p>
-        </p:txBody>
-      </p:sp>
-      <p:sp>
-        <p:nvSpPr>
-          <p:cNvPr id="4" name="Date Placeholder 3">
-            <a:extLst>
-              <a:ext uri="{FF2B5EF4-FFF2-40B4-BE49-F238E27FC236}">
-                <a16:creationId xmlns:a16="http://schemas.microsoft.com/office/drawing/2014/main" id="{FDEC7F5E-C1B0-42AC-950B-DE3029CAED1B}"/>
-              </a:ext>
-            </a:extLst>
-          </p:cNvPr>
-          <p:cNvSpPr>
-            <a:spLocks noGrp="1"/>
-          </p:cNvSpPr>
-          <p:nvPr>
-            <p:ph type="dt" sz="half" idx="10"/>
-          </p:nvPr>
-        </p:nvSpPr>
-        <p:spPr/>
-        <p:txBody>
           <a:bodyPr/>
           <a:lstStyle/>
           <a:p>
-            <a:fld id="{11EDCD7B-6966-E249-89F2-D46BDFBF56BE}" type="datetime1">
+            <a:fld id="{202E1EC2-47B8-044B-A09E-6A63B4D80C87}" type="datetime1">
               <a:rPr lang="fi-FI" smtClean="0"/>
-              <a:t>11.3.2024</a:t>
+              <a:t>14.3.2024</a:t>
             </a:fld>
             <a:endParaRPr lang="en-GB"/>
           </a:p>
@@ -8257,10 +8091,10 @@
       </p:sp>
       <p:sp>
         <p:nvSpPr>
-          <p:cNvPr id="5" name="Footer Placeholder 4">
-            <a:extLst>
-              <a:ext uri="{FF2B5EF4-FFF2-40B4-BE49-F238E27FC236}">
-                <a16:creationId xmlns:a16="http://schemas.microsoft.com/office/drawing/2014/main" id="{72FA43EE-B2B3-49D5-872B-4D987D842984}"/>
+          <p:cNvPr id="6" name="Footer Placeholder 5">
+            <a:extLst>
+              <a:ext uri="{FF2B5EF4-FFF2-40B4-BE49-F238E27FC236}">
+                <a16:creationId xmlns:a16="http://schemas.microsoft.com/office/drawing/2014/main" id="{588CE607-4137-8840-8FEA-42EAC857E3A3}"/>
               </a:ext>
             </a:extLst>
           </p:cNvPr>
@@ -8282,10 +8116,10 @@
       </p:sp>
       <p:sp>
         <p:nvSpPr>
-          <p:cNvPr id="6" name="Slide Number Placeholder 5">
-            <a:extLst>
-              <a:ext uri="{FF2B5EF4-FFF2-40B4-BE49-F238E27FC236}">
-                <a16:creationId xmlns:a16="http://schemas.microsoft.com/office/drawing/2014/main" id="{36A82290-8C98-42D6-A040-74AE3ECFEC15}"/>
+          <p:cNvPr id="7" name="Slide Number Placeholder 6">
+            <a:extLst>
+              <a:ext uri="{FF2B5EF4-FFF2-40B4-BE49-F238E27FC236}">
+                <a16:creationId xmlns:a16="http://schemas.microsoft.com/office/drawing/2014/main" id="{2E133A96-6C73-0844-B8CB-27C2B5F4CFB1}"/>
               </a:ext>
             </a:extLst>
           </p:cNvPr>
@@ -8309,10 +8143,759 @@
           </a:p>
         </p:txBody>
       </p:sp>
+      <p:sp>
+        <p:nvSpPr>
+          <p:cNvPr id="11" name="Rectangle 10">
+            <a:extLst>
+              <a:ext uri="{FF2B5EF4-FFF2-40B4-BE49-F238E27FC236}">
+                <a16:creationId xmlns:a16="http://schemas.microsoft.com/office/drawing/2014/main" id="{00475031-561C-4754-B82D-151950B18D1E}"/>
+              </a:ext>
+            </a:extLst>
+          </p:cNvPr>
+          <p:cNvSpPr/>
+          <p:nvPr/>
+        </p:nvSpPr>
+        <p:spPr>
+          <a:xfrm>
+            <a:off x="1027611" y="461554"/>
+            <a:ext cx="9953898" cy="5329646"/>
+          </a:xfrm>
+          <a:prstGeom prst="rect">
+            <a:avLst/>
+          </a:prstGeom>
+          <a:noFill/>
+        </p:spPr>
+        <p:style>
+          <a:lnRef idx="2">
+            <a:schemeClr val="accent1">
+              <a:shade val="50000"/>
+            </a:schemeClr>
+          </a:lnRef>
+          <a:fillRef idx="1">
+            <a:schemeClr val="accent1"/>
+          </a:fillRef>
+          <a:effectRef idx="0">
+            <a:schemeClr val="accent1"/>
+          </a:effectRef>
+          <a:fontRef idx="minor">
+            <a:schemeClr val="lt1"/>
+          </a:fontRef>
+        </p:style>
+        <p:txBody>
+          <a:bodyPr rtlCol="0" anchor="ctr"/>
+          <a:lstStyle/>
+          <a:p>
+            <a:pPr algn="ctr"/>
+            <a:endParaRPr lang="en-US"/>
+          </a:p>
+        </p:txBody>
+      </p:sp>
+      <p:sp>
+        <p:nvSpPr>
+          <p:cNvPr id="12" name="Rectangle 11">
+            <a:extLst>
+              <a:ext uri="{FF2B5EF4-FFF2-40B4-BE49-F238E27FC236}">
+                <a16:creationId xmlns:a16="http://schemas.microsoft.com/office/drawing/2014/main" id="{21E580B1-C062-4B40-AADE-267C291C929A}"/>
+              </a:ext>
+            </a:extLst>
+          </p:cNvPr>
+          <p:cNvSpPr/>
+          <p:nvPr/>
+        </p:nvSpPr>
+        <p:spPr>
+          <a:xfrm>
+            <a:off x="1479479" y="955497"/>
+            <a:ext cx="8486454" cy="4119938"/>
+          </a:xfrm>
+          <a:prstGeom prst="rect">
+            <a:avLst/>
+          </a:prstGeom>
+          <a:noFill/>
+        </p:spPr>
+        <p:style>
+          <a:lnRef idx="2">
+            <a:schemeClr val="accent1">
+              <a:shade val="50000"/>
+            </a:schemeClr>
+          </a:lnRef>
+          <a:fillRef idx="1">
+            <a:schemeClr val="accent1"/>
+          </a:fillRef>
+          <a:effectRef idx="0">
+            <a:schemeClr val="accent1"/>
+          </a:effectRef>
+          <a:fontRef idx="minor">
+            <a:schemeClr val="lt1"/>
+          </a:fontRef>
+        </p:style>
+        <p:txBody>
+          <a:bodyPr rtlCol="0" anchor="ctr"/>
+          <a:lstStyle/>
+          <a:p>
+            <a:pPr algn="ctr"/>
+            <a:endParaRPr lang="en-US"/>
+          </a:p>
+        </p:txBody>
+      </p:sp>
+      <p:sp>
+        <p:nvSpPr>
+          <p:cNvPr id="13" name="Rectangle 12">
+            <a:extLst>
+              <a:ext uri="{FF2B5EF4-FFF2-40B4-BE49-F238E27FC236}">
+                <a16:creationId xmlns:a16="http://schemas.microsoft.com/office/drawing/2014/main" id="{3BCD6776-4753-46C8-9838-446B5A5A11C3}"/>
+              </a:ext>
+            </a:extLst>
+          </p:cNvPr>
+          <p:cNvSpPr/>
+          <p:nvPr/>
+        </p:nvSpPr>
+        <p:spPr>
+          <a:xfrm>
+            <a:off x="1767155" y="1263721"/>
+            <a:ext cx="7880279" cy="1099335"/>
+          </a:xfrm>
+          <a:prstGeom prst="rect">
+            <a:avLst/>
+          </a:prstGeom>
+          <a:noFill/>
+        </p:spPr>
+        <p:style>
+          <a:lnRef idx="2">
+            <a:schemeClr val="accent1">
+              <a:shade val="50000"/>
+            </a:schemeClr>
+          </a:lnRef>
+          <a:fillRef idx="1">
+            <a:schemeClr val="accent1"/>
+          </a:fillRef>
+          <a:effectRef idx="0">
+            <a:schemeClr val="accent1"/>
+          </a:effectRef>
+          <a:fontRef idx="minor">
+            <a:schemeClr val="lt1"/>
+          </a:fontRef>
+        </p:style>
+        <p:txBody>
+          <a:bodyPr rtlCol="0" anchor="ctr"/>
+          <a:lstStyle/>
+          <a:p>
+            <a:pPr algn="ctr"/>
+            <a:r>
+              <a:rPr lang="en-US"/>
+              <a:t>BuildingList</a:t>
+            </a:r>
+          </a:p>
+        </p:txBody>
+      </p:sp>
+      <p:sp>
+        <p:nvSpPr>
+          <p:cNvPr id="17" name="Rectangle 16">
+            <a:extLst>
+              <a:ext uri="{FF2B5EF4-FFF2-40B4-BE49-F238E27FC236}">
+                <a16:creationId xmlns:a16="http://schemas.microsoft.com/office/drawing/2014/main" id="{98DF4436-F14E-4FF4-A1EA-420811AE78D2}"/>
+              </a:ext>
+            </a:extLst>
+          </p:cNvPr>
+          <p:cNvSpPr/>
+          <p:nvPr/>
+        </p:nvSpPr>
+        <p:spPr>
+          <a:xfrm>
+            <a:off x="1919555" y="1510300"/>
+            <a:ext cx="7594316" cy="706879"/>
+          </a:xfrm>
+          <a:prstGeom prst="rect">
+            <a:avLst/>
+          </a:prstGeom>
+          <a:noFill/>
+        </p:spPr>
+        <p:style>
+          <a:lnRef idx="2">
+            <a:schemeClr val="accent1">
+              <a:shade val="50000"/>
+            </a:schemeClr>
+          </a:lnRef>
+          <a:fillRef idx="1">
+            <a:schemeClr val="accent1"/>
+          </a:fillRef>
+          <a:effectRef idx="0">
+            <a:schemeClr val="accent1"/>
+          </a:effectRef>
+          <a:fontRef idx="minor">
+            <a:schemeClr val="lt1"/>
+          </a:fontRef>
+        </p:style>
+        <p:txBody>
+          <a:bodyPr rtlCol="0" anchor="ctr"/>
+          <a:lstStyle/>
+          <a:p>
+            <a:pPr algn="ctr"/>
+            <a:endParaRPr lang="en-US">
+              <a:solidFill>
+                <a:schemeClr val="tx1"/>
+              </a:solidFill>
+            </a:endParaRPr>
+          </a:p>
+        </p:txBody>
+      </p:sp>
+      <p:sp>
+        <p:nvSpPr>
+          <p:cNvPr id="19" name="Rectangle 18">
+            <a:extLst>
+              <a:ext uri="{FF2B5EF4-FFF2-40B4-BE49-F238E27FC236}">
+                <a16:creationId xmlns:a16="http://schemas.microsoft.com/office/drawing/2014/main" id="{5341E306-05B8-489B-8BF0-CD89A5F3A152}"/>
+              </a:ext>
+            </a:extLst>
+          </p:cNvPr>
+          <p:cNvSpPr/>
+          <p:nvPr/>
+        </p:nvSpPr>
+        <p:spPr>
+          <a:xfrm>
+            <a:off x="1210491" y="529813"/>
+            <a:ext cx="5724292" cy="369332"/>
+          </a:xfrm>
+          <a:prstGeom prst="rect">
+            <a:avLst/>
+          </a:prstGeom>
+        </p:spPr>
+        <p:txBody>
+          <a:bodyPr wrap="square">
+            <a:spAutoFit/>
+          </a:bodyPr>
+          <a:lstStyle/>
+          <a:p>
+            <a:r>
+              <a:rPr lang="en-US" err="1"/>
+              <a:t>BuildingListView</a:t>
+            </a:r>
+            <a:endParaRPr lang="en-US"/>
+          </a:p>
+        </p:txBody>
+      </p:sp>
+      <p:sp>
+        <p:nvSpPr>
+          <p:cNvPr id="20" name="Rectangle 19">
+            <a:extLst>
+              <a:ext uri="{FF2B5EF4-FFF2-40B4-BE49-F238E27FC236}">
+                <a16:creationId xmlns:a16="http://schemas.microsoft.com/office/drawing/2014/main" id="{8F27A09B-CDF1-45C9-9E69-ADDAB166877F}"/>
+              </a:ext>
+            </a:extLst>
+          </p:cNvPr>
+          <p:cNvSpPr/>
+          <p:nvPr/>
+        </p:nvSpPr>
+        <p:spPr>
+          <a:xfrm>
+            <a:off x="1654139" y="909141"/>
+            <a:ext cx="8093272" cy="369332"/>
+          </a:xfrm>
+          <a:prstGeom prst="rect">
+            <a:avLst/>
+          </a:prstGeom>
+        </p:spPr>
+        <p:txBody>
+          <a:bodyPr wrap="square">
+            <a:spAutoFit/>
+          </a:bodyPr>
+          <a:lstStyle/>
+          <a:p>
+            <a:r>
+              <a:rPr lang="en-US" dirty="0" err="1"/>
+              <a:t>BuildingList</a:t>
+            </a:r>
+            <a:r>
+              <a:rPr lang="en-US" dirty="0"/>
+              <a:t> (this could fetch and hold the data list in its state)</a:t>
+            </a:r>
+          </a:p>
+        </p:txBody>
+      </p:sp>
+      <p:sp>
+        <p:nvSpPr>
+          <p:cNvPr id="21" name="Rectangle 20">
+            <a:extLst>
+              <a:ext uri="{FF2B5EF4-FFF2-40B4-BE49-F238E27FC236}">
+                <a16:creationId xmlns:a16="http://schemas.microsoft.com/office/drawing/2014/main" id="{D3E284C1-EC4D-40EE-BD32-512F6D98C393}"/>
+              </a:ext>
+            </a:extLst>
+          </p:cNvPr>
+          <p:cNvSpPr/>
+          <p:nvPr/>
+        </p:nvSpPr>
+        <p:spPr>
+          <a:xfrm>
+            <a:off x="1919556" y="1217365"/>
+            <a:ext cx="7853504" cy="369332"/>
+          </a:xfrm>
+          <a:prstGeom prst="rect">
+            <a:avLst/>
+          </a:prstGeom>
+        </p:spPr>
+        <p:txBody>
+          <a:bodyPr wrap="square">
+            <a:spAutoFit/>
+          </a:bodyPr>
+          <a:lstStyle/>
+          <a:p>
+            <a:r>
+              <a:rPr lang="en-US" dirty="0" err="1"/>
+              <a:t>BuildingListItem</a:t>
+            </a:r>
+            <a:r>
+              <a:rPr lang="en-US" dirty="0"/>
+              <a:t> (is passed one Building object in props, by the parent)</a:t>
+            </a:r>
+          </a:p>
+        </p:txBody>
+      </p:sp>
+      <p:sp>
+        <p:nvSpPr>
+          <p:cNvPr id="22" name="Rectangle 21">
+            <a:extLst>
+              <a:ext uri="{FF2B5EF4-FFF2-40B4-BE49-F238E27FC236}">
+                <a16:creationId xmlns:a16="http://schemas.microsoft.com/office/drawing/2014/main" id="{872E0160-1E28-4484-B7E7-9C7A248B3BF3}"/>
+              </a:ext>
+            </a:extLst>
+          </p:cNvPr>
+          <p:cNvSpPr/>
+          <p:nvPr/>
+        </p:nvSpPr>
+        <p:spPr>
+          <a:xfrm>
+            <a:off x="2226067" y="1525589"/>
+            <a:ext cx="7400820" cy="369332"/>
+          </a:xfrm>
+          <a:prstGeom prst="rect">
+            <a:avLst/>
+          </a:prstGeom>
+        </p:spPr>
+        <p:txBody>
+          <a:bodyPr wrap="square">
+            <a:spAutoFit/>
+          </a:bodyPr>
+          <a:lstStyle/>
+          <a:p>
+            <a:r>
+              <a:rPr lang="en-US" err="1"/>
+              <a:t>BuildingDisplay</a:t>
+            </a:r>
+            <a:r>
+              <a:rPr lang="en-US"/>
+              <a:t> (is passed the Building object in props, by the parent)</a:t>
+            </a:r>
+          </a:p>
+        </p:txBody>
+      </p:sp>
+      <p:sp>
+        <p:nvSpPr>
+          <p:cNvPr id="31" name="Rectangle 30">
+            <a:extLst>
+              <a:ext uri="{FF2B5EF4-FFF2-40B4-BE49-F238E27FC236}">
+                <a16:creationId xmlns:a16="http://schemas.microsoft.com/office/drawing/2014/main" id="{B05BD3DB-900E-46DB-A7E9-CBE4C87B8AE1}"/>
+              </a:ext>
+            </a:extLst>
+          </p:cNvPr>
+          <p:cNvSpPr/>
+          <p:nvPr/>
+        </p:nvSpPr>
+        <p:spPr>
+          <a:xfrm>
+            <a:off x="1773382" y="2560099"/>
+            <a:ext cx="7880279" cy="1099335"/>
+          </a:xfrm>
+          <a:prstGeom prst="rect">
+            <a:avLst/>
+          </a:prstGeom>
+          <a:noFill/>
+        </p:spPr>
+        <p:style>
+          <a:lnRef idx="2">
+            <a:schemeClr val="accent1">
+              <a:shade val="50000"/>
+            </a:schemeClr>
+          </a:lnRef>
+          <a:fillRef idx="1">
+            <a:schemeClr val="accent1"/>
+          </a:fillRef>
+          <a:effectRef idx="0">
+            <a:schemeClr val="accent1"/>
+          </a:effectRef>
+          <a:fontRef idx="minor">
+            <a:schemeClr val="lt1"/>
+          </a:fontRef>
+        </p:style>
+        <p:txBody>
+          <a:bodyPr rtlCol="0" anchor="ctr"/>
+          <a:lstStyle/>
+          <a:p>
+            <a:pPr algn="ctr"/>
+            <a:r>
+              <a:rPr lang="en-US"/>
+              <a:t>BuildingList</a:t>
+            </a:r>
+          </a:p>
+        </p:txBody>
+      </p:sp>
+      <p:sp>
+        <p:nvSpPr>
+          <p:cNvPr id="32" name="Rectangle 31">
+            <a:extLst>
+              <a:ext uri="{FF2B5EF4-FFF2-40B4-BE49-F238E27FC236}">
+                <a16:creationId xmlns:a16="http://schemas.microsoft.com/office/drawing/2014/main" id="{24D64EB1-30CF-4AA3-A5E8-9C0D3506212C}"/>
+              </a:ext>
+            </a:extLst>
+          </p:cNvPr>
+          <p:cNvSpPr/>
+          <p:nvPr/>
+        </p:nvSpPr>
+        <p:spPr>
+          <a:xfrm>
+            <a:off x="1925782" y="2806678"/>
+            <a:ext cx="7594316" cy="706879"/>
+          </a:xfrm>
+          <a:prstGeom prst="rect">
+            <a:avLst/>
+          </a:prstGeom>
+          <a:noFill/>
+        </p:spPr>
+        <p:style>
+          <a:lnRef idx="2">
+            <a:schemeClr val="accent1">
+              <a:shade val="50000"/>
+            </a:schemeClr>
+          </a:lnRef>
+          <a:fillRef idx="1">
+            <a:schemeClr val="accent1"/>
+          </a:fillRef>
+          <a:effectRef idx="0">
+            <a:schemeClr val="accent1"/>
+          </a:effectRef>
+          <a:fontRef idx="minor">
+            <a:schemeClr val="lt1"/>
+          </a:fontRef>
+        </p:style>
+        <p:txBody>
+          <a:bodyPr rtlCol="0" anchor="ctr"/>
+          <a:lstStyle/>
+          <a:p>
+            <a:pPr algn="ctr"/>
+            <a:endParaRPr lang="en-US">
+              <a:solidFill>
+                <a:schemeClr val="tx1"/>
+              </a:solidFill>
+            </a:endParaRPr>
+          </a:p>
+        </p:txBody>
+      </p:sp>
+      <p:sp>
+        <p:nvSpPr>
+          <p:cNvPr id="33" name="Rectangle 32">
+            <a:extLst>
+              <a:ext uri="{FF2B5EF4-FFF2-40B4-BE49-F238E27FC236}">
+                <a16:creationId xmlns:a16="http://schemas.microsoft.com/office/drawing/2014/main" id="{A48C747A-1BA6-4592-A290-5E00BADE9A17}"/>
+              </a:ext>
+            </a:extLst>
+          </p:cNvPr>
+          <p:cNvSpPr/>
+          <p:nvPr/>
+        </p:nvSpPr>
+        <p:spPr>
+          <a:xfrm>
+            <a:off x="1925783" y="2513743"/>
+            <a:ext cx="7853504" cy="369332"/>
+          </a:xfrm>
+          <a:prstGeom prst="rect">
+            <a:avLst/>
+          </a:prstGeom>
+        </p:spPr>
+        <p:txBody>
+          <a:bodyPr wrap="square">
+            <a:spAutoFit/>
+          </a:bodyPr>
+          <a:lstStyle/>
+          <a:p>
+            <a:r>
+              <a:rPr lang="en-US" dirty="0" err="1"/>
+              <a:t>BuildingListItem</a:t>
+            </a:r>
+            <a:r>
+              <a:rPr lang="en-US" dirty="0"/>
+              <a:t> (is passed one Building object in props, by the parent)</a:t>
+            </a:r>
+          </a:p>
+        </p:txBody>
+      </p:sp>
+      <p:sp>
+        <p:nvSpPr>
+          <p:cNvPr id="34" name="Rectangle 33">
+            <a:extLst>
+              <a:ext uri="{FF2B5EF4-FFF2-40B4-BE49-F238E27FC236}">
+                <a16:creationId xmlns:a16="http://schemas.microsoft.com/office/drawing/2014/main" id="{CBF02A83-8B41-4686-83AD-C47D10FE8CEE}"/>
+              </a:ext>
+            </a:extLst>
+          </p:cNvPr>
+          <p:cNvSpPr/>
+          <p:nvPr/>
+        </p:nvSpPr>
+        <p:spPr>
+          <a:xfrm>
+            <a:off x="2232294" y="2821967"/>
+            <a:ext cx="7400820" cy="369332"/>
+          </a:xfrm>
+          <a:prstGeom prst="rect">
+            <a:avLst/>
+          </a:prstGeom>
+        </p:spPr>
+        <p:txBody>
+          <a:bodyPr wrap="square">
+            <a:spAutoFit/>
+          </a:bodyPr>
+          <a:lstStyle/>
+          <a:p>
+            <a:r>
+              <a:rPr lang="en-US" err="1"/>
+              <a:t>BuildingDisplay</a:t>
+            </a:r>
+            <a:r>
+              <a:rPr lang="en-US"/>
+              <a:t> (is passed the Building object in props, by the parent)</a:t>
+            </a:r>
+          </a:p>
+        </p:txBody>
+      </p:sp>
+      <p:sp>
+        <p:nvSpPr>
+          <p:cNvPr id="35" name="Rectangle 34">
+            <a:extLst>
+              <a:ext uri="{FF2B5EF4-FFF2-40B4-BE49-F238E27FC236}">
+                <a16:creationId xmlns:a16="http://schemas.microsoft.com/office/drawing/2014/main" id="{0E510CE1-2DE6-44A6-9E04-B6314D39B509}"/>
+              </a:ext>
+            </a:extLst>
+          </p:cNvPr>
+          <p:cNvSpPr/>
+          <p:nvPr/>
+        </p:nvSpPr>
+        <p:spPr>
+          <a:xfrm>
+            <a:off x="1752835" y="3810121"/>
+            <a:ext cx="7880279" cy="1099335"/>
+          </a:xfrm>
+          <a:prstGeom prst="rect">
+            <a:avLst/>
+          </a:prstGeom>
+          <a:noFill/>
+        </p:spPr>
+        <p:style>
+          <a:lnRef idx="2">
+            <a:schemeClr val="accent1">
+              <a:shade val="50000"/>
+            </a:schemeClr>
+          </a:lnRef>
+          <a:fillRef idx="1">
+            <a:schemeClr val="accent1"/>
+          </a:fillRef>
+          <a:effectRef idx="0">
+            <a:schemeClr val="accent1"/>
+          </a:effectRef>
+          <a:fontRef idx="minor">
+            <a:schemeClr val="lt1"/>
+          </a:fontRef>
+        </p:style>
+        <p:txBody>
+          <a:bodyPr rtlCol="0" anchor="ctr"/>
+          <a:lstStyle/>
+          <a:p>
+            <a:pPr algn="ctr"/>
+            <a:r>
+              <a:rPr lang="en-US"/>
+              <a:t>BuildingList</a:t>
+            </a:r>
+          </a:p>
+        </p:txBody>
+      </p:sp>
+      <p:sp>
+        <p:nvSpPr>
+          <p:cNvPr id="36" name="Rectangle 35">
+            <a:extLst>
+              <a:ext uri="{FF2B5EF4-FFF2-40B4-BE49-F238E27FC236}">
+                <a16:creationId xmlns:a16="http://schemas.microsoft.com/office/drawing/2014/main" id="{CE0714E2-0FEC-4721-B6B5-4AC64C4C1AF6}"/>
+              </a:ext>
+            </a:extLst>
+          </p:cNvPr>
+          <p:cNvSpPr/>
+          <p:nvPr/>
+        </p:nvSpPr>
+        <p:spPr>
+          <a:xfrm>
+            <a:off x="1905235" y="4056700"/>
+            <a:ext cx="7594316" cy="706879"/>
+          </a:xfrm>
+          <a:prstGeom prst="rect">
+            <a:avLst/>
+          </a:prstGeom>
+          <a:noFill/>
+        </p:spPr>
+        <p:style>
+          <a:lnRef idx="2">
+            <a:schemeClr val="accent1">
+              <a:shade val="50000"/>
+            </a:schemeClr>
+          </a:lnRef>
+          <a:fillRef idx="1">
+            <a:schemeClr val="accent1"/>
+          </a:fillRef>
+          <a:effectRef idx="0">
+            <a:schemeClr val="accent1"/>
+          </a:effectRef>
+          <a:fontRef idx="minor">
+            <a:schemeClr val="lt1"/>
+          </a:fontRef>
+        </p:style>
+        <p:txBody>
+          <a:bodyPr rtlCol="0" anchor="ctr"/>
+          <a:lstStyle/>
+          <a:p>
+            <a:pPr algn="ctr"/>
+            <a:endParaRPr lang="en-US">
+              <a:solidFill>
+                <a:schemeClr val="tx1"/>
+              </a:solidFill>
+            </a:endParaRPr>
+          </a:p>
+        </p:txBody>
+      </p:sp>
+      <p:sp>
+        <p:nvSpPr>
+          <p:cNvPr id="37" name="Rectangle 36">
+            <a:extLst>
+              <a:ext uri="{FF2B5EF4-FFF2-40B4-BE49-F238E27FC236}">
+                <a16:creationId xmlns:a16="http://schemas.microsoft.com/office/drawing/2014/main" id="{89FFA58D-660C-4E39-A05A-E20E6FF8E1AC}"/>
+              </a:ext>
+            </a:extLst>
+          </p:cNvPr>
+          <p:cNvSpPr/>
+          <p:nvPr/>
+        </p:nvSpPr>
+        <p:spPr>
+          <a:xfrm>
+            <a:off x="1905236" y="3763765"/>
+            <a:ext cx="7853504" cy="369332"/>
+          </a:xfrm>
+          <a:prstGeom prst="rect">
+            <a:avLst/>
+          </a:prstGeom>
+        </p:spPr>
+        <p:txBody>
+          <a:bodyPr wrap="square">
+            <a:spAutoFit/>
+          </a:bodyPr>
+          <a:lstStyle/>
+          <a:p>
+            <a:r>
+              <a:rPr lang="en-US" dirty="0" err="1"/>
+              <a:t>BuildingListItem</a:t>
+            </a:r>
+            <a:r>
+              <a:rPr lang="en-US" dirty="0"/>
+              <a:t> (is passed one Building object in props, by the parent)</a:t>
+            </a:r>
+          </a:p>
+        </p:txBody>
+      </p:sp>
+      <p:sp>
+        <p:nvSpPr>
+          <p:cNvPr id="38" name="Rectangle 37">
+            <a:extLst>
+              <a:ext uri="{FF2B5EF4-FFF2-40B4-BE49-F238E27FC236}">
+                <a16:creationId xmlns:a16="http://schemas.microsoft.com/office/drawing/2014/main" id="{3A853F5A-B838-410B-ADCE-305E5317C912}"/>
+              </a:ext>
+            </a:extLst>
+          </p:cNvPr>
+          <p:cNvSpPr/>
+          <p:nvPr/>
+        </p:nvSpPr>
+        <p:spPr>
+          <a:xfrm>
+            <a:off x="2211747" y="4071989"/>
+            <a:ext cx="7400820" cy="369332"/>
+          </a:xfrm>
+          <a:prstGeom prst="rect">
+            <a:avLst/>
+          </a:prstGeom>
+        </p:spPr>
+        <p:txBody>
+          <a:bodyPr wrap="square">
+            <a:spAutoFit/>
+          </a:bodyPr>
+          <a:lstStyle/>
+          <a:p>
+            <a:r>
+              <a:rPr lang="en-US" dirty="0" err="1"/>
+              <a:t>BuildingDisplay</a:t>
+            </a:r>
+            <a:r>
+              <a:rPr lang="en-US" dirty="0"/>
+              <a:t> (is passed the Building object in props, by the parent)</a:t>
+            </a:r>
+          </a:p>
+        </p:txBody>
+      </p:sp>
+      <p:sp>
+        <p:nvSpPr>
+          <p:cNvPr id="2" name="Rectangle 1">
+            <a:extLst>
+              <a:ext uri="{FF2B5EF4-FFF2-40B4-BE49-F238E27FC236}">
+                <a16:creationId xmlns:a16="http://schemas.microsoft.com/office/drawing/2014/main" id="{75ADBC89-AD0C-4B5B-B5E8-D5205A9C02A8}"/>
+              </a:ext>
+            </a:extLst>
+          </p:cNvPr>
+          <p:cNvSpPr/>
+          <p:nvPr/>
+        </p:nvSpPr>
+        <p:spPr>
+          <a:xfrm>
+            <a:off x="2415066" y="5157490"/>
+            <a:ext cx="8486455" cy="646331"/>
+          </a:xfrm>
+          <a:prstGeom prst="rect">
+            <a:avLst/>
+          </a:prstGeom>
+        </p:spPr>
+        <p:txBody>
+          <a:bodyPr wrap="square" lIns="91440" tIns="45720" rIns="91440" bIns="45720" anchor="t">
+            <a:spAutoFit/>
+          </a:bodyPr>
+          <a:lstStyle/>
+          <a:p>
+            <a:r>
+              <a:rPr lang="en-US"/>
+              <a:t>(</a:t>
+            </a:r>
+            <a:r>
+              <a:rPr lang="en-US" err="1"/>
+              <a:t>BuildingListItem</a:t>
+            </a:r>
+            <a:r>
+              <a:rPr lang="en-US"/>
+              <a:t> could handle clicks and actions per each item.</a:t>
+            </a:r>
+          </a:p>
+          <a:p>
+            <a:r>
+              <a:rPr lang="en-US"/>
+              <a:t>And BuildingDisplay/Info/(Details) could be just presentational/display component)</a:t>
+            </a:r>
+            <a:endParaRPr lang="en-US">
+              <a:cs typeface="Arial"/>
+            </a:endParaRPr>
+          </a:p>
+        </p:txBody>
+      </p:sp>
     </p:spTree>
     <p:extLst>
       <p:ext uri="{BB962C8B-B14F-4D97-AF65-F5344CB8AC3E}">
-        <p14:creationId xmlns:p14="http://schemas.microsoft.com/office/powerpoint/2010/main" val="1359571161"/>
+        <p14:creationId xmlns:p14="http://schemas.microsoft.com/office/powerpoint/2010/main" val="111015751"/>
       </p:ext>
     </p:extLst>
   </p:cSld>
@@ -8355,7 +8938,12 @@
             <p:ph type="title"/>
           </p:nvPr>
         </p:nvSpPr>
-        <p:spPr/>
+        <p:spPr>
+          <a:xfrm>
+            <a:off x="463138" y="549275"/>
+            <a:ext cx="11305309" cy="1223963"/>
+          </a:xfrm>
+        </p:spPr>
         <p:txBody>
           <a:bodyPr anchor="ctr">
             <a:normAutofit/>
@@ -8363,10 +8951,10 @@
           <a:lstStyle/>
           <a:p>
             <a:r>
-              <a:rPr lang="en-US"/>
-              <a:t>11. Nested Routing</a:t>
-            </a:r>
-            <a:endParaRPr lang="fi-FI"/>
+              <a:rPr lang="en-US" dirty="0"/>
+              <a:t>10. App context – access something across the app</a:t>
+            </a:r>
+            <a:endParaRPr lang="fi-FI" dirty="0"/>
           </a:p>
         </p:txBody>
       </p:sp>
@@ -8399,8 +8987,8 @@
               </a:lnSpc>
             </a:pPr>
             <a:r>
-              <a:rPr lang="en-US" sz="2800"/>
-              <a:t>Look at the given pictures for routing. Nested Routing includes:</a:t>
+              <a:rPr lang="en-US" sz="2800" dirty="0"/>
+              <a:t>Creating/defining the context object(s) in one common file</a:t>
             </a:r>
           </a:p>
           <a:p>
@@ -8410,12 +8998,39 @@
               </a:lnSpc>
             </a:pPr>
             <a:r>
-              <a:rPr lang="en-US" sz="2600" b="1"/>
-              <a:t>Relative paths </a:t>
-            </a:r>
-            <a:r>
-              <a:rPr lang="en-US" sz="2600"/>
-              <a:t>for children</a:t>
+              <a:rPr lang="en-US" sz="2600" dirty="0" err="1">
+                <a:latin typeface="Consolas" panose="020B0609020204030204" pitchFamily="49" charset="0"/>
+              </a:rPr>
+              <a:t>createContext</a:t>
+            </a:r>
+            <a:r>
+              <a:rPr lang="en-US" sz="2600" dirty="0">
+                <a:latin typeface="Consolas" panose="020B0609020204030204" pitchFamily="49" charset="0"/>
+              </a:rPr>
+              <a:t>({thing: 22, thang: “</a:t>
+            </a:r>
+            <a:r>
+              <a:rPr lang="en-US" sz="2600" dirty="0" err="1">
+                <a:latin typeface="Consolas" panose="020B0609020204030204" pitchFamily="49" charset="0"/>
+              </a:rPr>
+              <a:t>abc</a:t>
+            </a:r>
+            <a:r>
+              <a:rPr lang="en-US" sz="2600" dirty="0">
+                <a:latin typeface="Consolas" panose="020B0609020204030204" pitchFamily="49" charset="0"/>
+              </a:rPr>
+              <a:t>” …}) </a:t>
+            </a:r>
+          </a:p>
+          <a:p>
+            <a:pPr>
+              <a:lnSpc>
+                <a:spcPct val="100000"/>
+              </a:lnSpc>
+            </a:pPr>
+            <a:r>
+              <a:rPr lang="en-US" sz="2800" dirty="0"/>
+              <a:t>Accessing/reading the context values</a:t>
             </a:r>
           </a:p>
           <a:p>
@@ -8425,16 +9040,20 @@
               </a:lnSpc>
             </a:pPr>
             <a:r>
-              <a:rPr lang="en-US" sz="2600"/>
-              <a:t>Possible </a:t>
-            </a:r>
-            <a:r>
-              <a:rPr lang="en-US" sz="2600" b="1"/>
-              <a:t>index route</a:t>
-            </a:r>
-            <a:r>
-              <a:rPr lang="en-US" sz="2600"/>
-              <a:t>, rendering the index path.</a:t>
+              <a:rPr lang="en-US" sz="2600" dirty="0" err="1">
+                <a:latin typeface="Consolas" panose="020B0609020204030204" pitchFamily="49" charset="0"/>
+              </a:rPr>
+              <a:t>useContext</a:t>
+            </a:r>
+            <a:r>
+              <a:rPr lang="en-US" sz="2600" dirty="0">
+                <a:latin typeface="Consolas" panose="020B0609020204030204" pitchFamily="49" charset="0"/>
+              </a:rPr>
+              <a:t>() </a:t>
+            </a:r>
+            <a:r>
+              <a:rPr lang="en-US" sz="2800" dirty="0"/>
+              <a:t>hook to create local reference to the context </a:t>
             </a:r>
           </a:p>
           <a:p>
@@ -8444,16 +9063,39 @@
               </a:lnSpc>
             </a:pPr>
             <a:r>
-              <a:rPr lang="en-US" sz="2600"/>
-              <a:t>Possibly </a:t>
-            </a:r>
-            <a:r>
-              <a:rPr lang="en-US" sz="2600" b="1"/>
-              <a:t>shared layout </a:t>
-            </a:r>
-            <a:r>
-              <a:rPr lang="en-US" sz="2600"/>
-              <a:t>component.</a:t>
+              <a:rPr lang="en-US" sz="2800" dirty="0">
+                <a:latin typeface="Consolas" panose="020B0609020204030204" pitchFamily="49" charset="0"/>
+              </a:rPr>
+              <a:t>+</a:t>
+            </a:r>
+            <a:r>
+              <a:rPr lang="en-US" sz="2600" dirty="0">
+                <a:latin typeface="Consolas" panose="020B0609020204030204" pitchFamily="49" charset="0"/>
+              </a:rPr>
+              <a:t>  {</a:t>
+            </a:r>
+            <a:r>
+              <a:rPr lang="en-US" sz="2600" dirty="0" err="1">
+                <a:latin typeface="Consolas" panose="020B0609020204030204" pitchFamily="49" charset="0"/>
+              </a:rPr>
+              <a:t>myContext.thing</a:t>
+            </a:r>
+            <a:r>
+              <a:rPr lang="en-US" sz="2600" dirty="0">
+                <a:latin typeface="Consolas" panose="020B0609020204030204" pitchFamily="49" charset="0"/>
+              </a:rPr>
+              <a:t>}</a:t>
+            </a:r>
+          </a:p>
+          <a:p>
+            <a:pPr>
+              <a:lnSpc>
+                <a:spcPct val="100000"/>
+              </a:lnSpc>
+            </a:pPr>
+            <a:r>
+              <a:rPr lang="en-US" sz="2800" dirty="0"/>
+              <a:t>Updating/writing the values to the context</a:t>
             </a:r>
           </a:p>
           <a:p>
@@ -8463,17 +9105,53 @@
               </a:lnSpc>
             </a:pPr>
             <a:r>
-              <a:rPr lang="en-US" sz="2600"/>
-              <a:t>Possibly with </a:t>
-            </a:r>
-            <a:r>
-              <a:rPr lang="en-US" sz="2600" b="1"/>
-              <a:t>shared context</a:t>
-            </a:r>
-            <a:r>
-              <a:rPr lang="en-US" sz="2600"/>
-              <a:t>?</a:t>
-            </a:r>
+              <a:rPr lang="en-US" sz="2600" dirty="0" err="1">
+                <a:latin typeface="Consolas" panose="020B0609020204030204" pitchFamily="49" charset="0"/>
+              </a:rPr>
+              <a:t>useContext</a:t>
+            </a:r>
+            <a:r>
+              <a:rPr lang="en-US" sz="2600" dirty="0">
+                <a:latin typeface="Consolas" panose="020B0609020204030204" pitchFamily="49" charset="0"/>
+              </a:rPr>
+              <a:t>() </a:t>
+            </a:r>
+            <a:r>
+              <a:rPr lang="en-US" sz="2800" dirty="0"/>
+              <a:t>hook to create local reference to the context </a:t>
+            </a:r>
+          </a:p>
+          <a:p>
+            <a:pPr lvl="1">
+              <a:lnSpc>
+                <a:spcPct val="100000"/>
+              </a:lnSpc>
+            </a:pPr>
+            <a:r>
+              <a:rPr lang="en-US" sz="2600" dirty="0"/>
+              <a:t>+    </a:t>
+            </a:r>
+            <a:r>
+              <a:rPr lang="en-US" sz="2600" dirty="0" err="1">
+                <a:latin typeface="Consolas" panose="020B0609020204030204" pitchFamily="49" charset="0"/>
+              </a:rPr>
+              <a:t>myContext.thing</a:t>
+            </a:r>
+            <a:r>
+              <a:rPr lang="en-US" sz="2600" dirty="0">
+                <a:latin typeface="Consolas" panose="020B0609020204030204" pitchFamily="49" charset="0"/>
+              </a:rPr>
+              <a:t> = 33;</a:t>
+            </a:r>
+          </a:p>
+          <a:p>
+            <a:pPr marL="0" indent="0">
+              <a:lnSpc>
+                <a:spcPct val="100000"/>
+              </a:lnSpc>
+              <a:buNone/>
+            </a:pPr>
+            <a:endParaRPr lang="en-US" sz="2800" dirty="0"/>
           </a:p>
         </p:txBody>
       </p:sp>
@@ -8500,7 +9178,7 @@
           <a:p>
             <a:fld id="{11EDCD7B-6966-E249-89F2-D46BDFBF56BE}" type="datetime1">
               <a:rPr lang="fi-FI" smtClean="0"/>
-              <a:t>11.3.2024</a:t>
+              <a:t>14.3.2024</a:t>
             </a:fld>
             <a:endParaRPr lang="en-GB"/>
           </a:p>
@@ -8563,7 +9241,7 @@
     </p:spTree>
     <p:extLst>
       <p:ext uri="{BB962C8B-B14F-4D97-AF65-F5344CB8AC3E}">
-        <p14:creationId xmlns:p14="http://schemas.microsoft.com/office/powerpoint/2010/main" val="2361742466"/>
+        <p14:creationId xmlns:p14="http://schemas.microsoft.com/office/powerpoint/2010/main" val="986459541"/>
       </p:ext>
     </p:extLst>
   </p:cSld>
@@ -8614,10 +9292,10 @@
           <a:lstStyle/>
           <a:p>
             <a:r>
-              <a:rPr lang="en-US"/>
-              <a:t>+ Programmatic Routing</a:t>
-            </a:r>
-            <a:endParaRPr lang="fi-FI"/>
+              <a:rPr lang="en-US" dirty="0"/>
+              <a:t>11. Routing</a:t>
+            </a:r>
+            <a:endParaRPr lang="fi-FI" dirty="0"/>
           </a:p>
         </p:txBody>
       </p:sp>
@@ -8644,32 +9322,154 @@
           </a:bodyPr>
           <a:lstStyle/>
           <a:p>
-            <a:pPr marL="215900" indent="-215900">
+            <a:pPr>
               <a:lnSpc>
                 <a:spcPct val="100000"/>
               </a:lnSpc>
             </a:pPr>
             <a:r>
-              <a:rPr lang="en-US" sz="2800">
-                <a:ea typeface="+mn-lt"/>
-                <a:cs typeface="+mn-lt"/>
-              </a:rPr>
-              <a:t>You can also programmatically </a:t>
-            </a:r>
-            <a:r>
-              <a:rPr lang="en-US" sz="2800" b="1">
-                <a:ea typeface="+mn-lt"/>
-                <a:cs typeface="+mn-lt"/>
-              </a:rPr>
-              <a:t>manipulate the Routing history stack: </a:t>
-            </a:r>
-            <a:r>
-              <a:rPr lang="en-US" sz="2800">
-                <a:ea typeface="+mn-lt"/>
-                <a:cs typeface="+mn-lt"/>
-              </a:rPr>
-              <a:t>pop, push, replace.</a:t>
-            </a:r>
+              <a:rPr lang="en-US" sz="2800" dirty="0"/>
+              <a:t>Look at the given pictures for routing. </a:t>
+            </a:r>
+            <a:r>
+              <a:rPr lang="en-US" sz="2800" b="1" dirty="0"/>
+              <a:t>Basic routing </a:t>
+            </a:r>
+            <a:r>
+              <a:rPr lang="en-US" sz="2800" dirty="0"/>
+              <a:t>includes:</a:t>
+            </a:r>
+          </a:p>
+          <a:p>
+            <a:pPr lvl="1">
+              <a:lnSpc>
+                <a:spcPct val="100000"/>
+              </a:lnSpc>
+            </a:pPr>
+            <a:r>
+              <a:rPr lang="en-US" sz="2600" dirty="0"/>
+              <a:t>The </a:t>
+            </a:r>
+            <a:r>
+              <a:rPr lang="en-US" sz="2600" b="1" dirty="0"/>
+              <a:t>Route definitions</a:t>
+            </a:r>
+            <a:r>
+              <a:rPr lang="en-US" sz="2600" dirty="0"/>
+              <a:t>. They are our mappings between a </a:t>
+            </a:r>
+            <a:r>
+              <a:rPr lang="en-US" sz="2600" b="1" dirty="0"/>
+              <a:t>Path</a:t>
+            </a:r>
+            <a:r>
+              <a:rPr lang="en-US" sz="2600" dirty="0"/>
+              <a:t> and a View </a:t>
+            </a:r>
+            <a:r>
+              <a:rPr lang="en-US" sz="2600" b="1" dirty="0"/>
+              <a:t>React component </a:t>
+            </a:r>
+            <a:r>
+              <a:rPr lang="en-US" sz="2600" dirty="0"/>
+              <a:t>that renders that path.</a:t>
+            </a:r>
+          </a:p>
+          <a:p>
+            <a:pPr lvl="1">
+              <a:lnSpc>
+                <a:spcPct val="100000"/>
+              </a:lnSpc>
+            </a:pPr>
+            <a:r>
+              <a:rPr lang="en-US" sz="2800" dirty="0"/>
+              <a:t>Defining </a:t>
+            </a:r>
+            <a:r>
+              <a:rPr lang="en-US" sz="2800" b="1" dirty="0"/>
+              <a:t>Links</a:t>
+            </a:r>
+            <a:r>
+              <a:rPr lang="en-US" sz="2800" dirty="0"/>
+              <a:t> or </a:t>
+            </a:r>
+            <a:r>
+              <a:rPr lang="en-US" sz="2800" b="1" dirty="0"/>
+              <a:t>Buttons</a:t>
+            </a:r>
+            <a:r>
+              <a:rPr lang="en-US" sz="2800" dirty="0"/>
+              <a:t> that trigger navigation to the Routes</a:t>
+            </a:r>
+          </a:p>
+          <a:p>
+            <a:pPr lvl="1">
+              <a:lnSpc>
+                <a:spcPct val="100000"/>
+              </a:lnSpc>
+            </a:pPr>
+            <a:r>
+              <a:rPr lang="en-US" sz="2800" b="1" dirty="0"/>
+              <a:t>Route</a:t>
+            </a:r>
+            <a:r>
+              <a:rPr lang="en-US" sz="2800" b="1" u="sng" dirty="0"/>
+              <a:t>s</a:t>
+            </a:r>
+            <a:r>
+              <a:rPr lang="en-US" sz="2800" b="1" dirty="0"/>
+              <a:t> component </a:t>
+            </a:r>
+            <a:r>
+              <a:rPr lang="en-US" sz="2800" dirty="0"/>
+              <a:t>(older component was called</a:t>
+            </a:r>
+            <a:r>
+              <a:rPr lang="en-US" sz="2800" b="1" dirty="0"/>
+              <a:t> Switch</a:t>
+            </a:r>
+            <a:r>
+              <a:rPr lang="en-US" sz="2800" dirty="0"/>
+              <a:t>) that marks the place (div) on the page that will be replaced/filled with the “current page”. It also lists many </a:t>
+            </a:r>
+            <a:r>
+              <a:rPr lang="en-US" sz="2800" b="1" dirty="0"/>
+              <a:t>Route</a:t>
+            </a:r>
+            <a:r>
+              <a:rPr lang="en-US" sz="2800" dirty="0"/>
+              <a:t> </a:t>
+            </a:r>
+            <a:r>
+              <a:rPr lang="en-US" sz="2800" b="1" dirty="0"/>
+              <a:t>components</a:t>
+            </a:r>
+            <a:r>
+              <a:rPr lang="en-US" sz="2800" dirty="0"/>
+              <a:t> as content/children, but only one Route’s View switched each time to be rendered there.</a:t>
+            </a:r>
+          </a:p>
+          <a:p>
+            <a:pPr marL="0" indent="0">
+              <a:lnSpc>
+                <a:spcPct val="100000"/>
+              </a:lnSpc>
+              <a:buNone/>
+            </a:pPr>
+            <a:endParaRPr lang="en-US" sz="2800" dirty="0">
+              <a:cs typeface="Arial" panose="020B0604020202020204"/>
+            </a:endParaRPr>
+          </a:p>
+          <a:p>
+            <a:pPr marL="0" indent="0">
+              <a:lnSpc>
+                <a:spcPct val="100000"/>
+              </a:lnSpc>
+              <a:buNone/>
+            </a:pPr>
+            <a:endParaRPr lang="en-US" sz="2800" dirty="0">
+              <a:cs typeface="Arial" panose="020B0604020202020204"/>
+            </a:endParaRPr>
           </a:p>
         </p:txBody>
       </p:sp>
@@ -8696,7 +9496,7 @@
           <a:p>
             <a:fld id="{11EDCD7B-6966-E249-89F2-D46BDFBF56BE}" type="datetime1">
               <a:rPr lang="fi-FI" smtClean="0"/>
-              <a:t>11.3.2024</a:t>
+              <a:t>14.3.2024</a:t>
             </a:fld>
             <a:endParaRPr lang="en-GB"/>
           </a:p>
@@ -8759,7 +9559,7 @@
     </p:spTree>
     <p:extLst>
       <p:ext uri="{BB962C8B-B14F-4D97-AF65-F5344CB8AC3E}">
-        <p14:creationId xmlns:p14="http://schemas.microsoft.com/office/powerpoint/2010/main" val="1452549001"/>
+        <p14:creationId xmlns:p14="http://schemas.microsoft.com/office/powerpoint/2010/main" val="1359571161"/>
       </p:ext>
     </p:extLst>
   </p:cSld>
@@ -8810,10 +9610,10 @@
           <a:lstStyle/>
           <a:p>
             <a:r>
-              <a:rPr lang="en-US"/>
-              <a:t>12. Typical List component composition</a:t>
-            </a:r>
-            <a:endParaRPr lang="fi-FI"/>
+              <a:rPr lang="en-US" dirty="0"/>
+              <a:t>+12. Nested Routing</a:t>
+            </a:r>
+            <a:endParaRPr lang="fi-FI" dirty="0"/>
           </a:p>
         </p:txBody>
       </p:sp>
@@ -8835,196 +9635,92 @@
         </p:nvSpPr>
         <p:spPr/>
         <p:txBody>
-          <a:bodyPr vert="horz" lIns="0" tIns="0" rIns="0" bIns="36000" numCol="1" spcCol="360000" rtlCol="0" anchor="t">
-            <a:normAutofit fontScale="92500"/>
+          <a:bodyPr>
+            <a:normAutofit/>
           </a:bodyPr>
           <a:lstStyle/>
           <a:p>
-            <a:pPr marL="215900" indent="-215900">
+            <a:pPr>
               <a:lnSpc>
                 <a:spcPct val="100000"/>
               </a:lnSpc>
             </a:pPr>
             <a:r>
-              <a:rPr lang="en-US" sz="2800" dirty="0"/>
-              <a:t>(See random example on the next slide. Idea important, </a:t>
-            </a:r>
-            <a:r>
               <a:rPr lang="en-US" sz="2800"/>
-              <a:t>not exact match)</a:t>
-            </a:r>
-            <a:endParaRPr lang="en-US" sz="2800" dirty="0">
-              <a:cs typeface="Arial"/>
-            </a:endParaRPr>
-          </a:p>
-          <a:p>
-            <a:pPr marL="215900" indent="-215900">
+              <a:t>Look at the given pictures for routing. Nested Routing includes:</a:t>
+            </a:r>
+          </a:p>
+          <a:p>
+            <a:pPr lvl="1">
               <a:lnSpc>
                 <a:spcPct val="100000"/>
               </a:lnSpc>
             </a:pPr>
             <a:r>
-              <a:rPr lang="en-US" sz="2800" dirty="0"/>
-              <a:t>The example is about Buildings, e.g. three </a:t>
-            </a:r>
-            <a:r>
-              <a:rPr lang="en-US" sz="2800" dirty="0" err="1"/>
-              <a:t>buldings</a:t>
-            </a:r>
-            <a:r>
-              <a:rPr lang="en-US" sz="2800" dirty="0"/>
-              <a:t> on one campus, two on other.</a:t>
-            </a:r>
-            <a:endParaRPr lang="en-US" sz="2800" dirty="0">
-              <a:cs typeface="Arial"/>
-            </a:endParaRPr>
-          </a:p>
-          <a:p>
-            <a:pPr marL="215900" indent="-215900">
+              <a:rPr lang="en-US" sz="2600" b="1"/>
+              <a:t>Relative paths </a:t>
+            </a:r>
+            <a:r>
+              <a:rPr lang="en-US" sz="2600"/>
+              <a:t>for children</a:t>
+            </a:r>
+          </a:p>
+          <a:p>
+            <a:pPr lvl="1">
               <a:lnSpc>
                 <a:spcPct val="100000"/>
               </a:lnSpc>
             </a:pPr>
             <a:r>
-              <a:rPr lang="en-US" sz="2800" dirty="0"/>
-              <a:t>SRP = Single Responsibility Principle. Each component doing usually only one thing in the app:</a:t>
-            </a:r>
-            <a:endParaRPr lang="en-US" sz="2800" dirty="0">
-              <a:cs typeface="Arial"/>
-            </a:endParaRPr>
-          </a:p>
-          <a:p>
-            <a:pPr marL="719455" lvl="1" indent="-215900">
+              <a:rPr lang="en-US" sz="2600"/>
+              <a:t>Possible </a:t>
+            </a:r>
+            <a:r>
+              <a:rPr lang="en-US" sz="2600" b="1"/>
+              <a:t>index route</a:t>
+            </a:r>
+            <a:r>
+              <a:rPr lang="en-US" sz="2600"/>
+              <a:t>, rendering the index path.</a:t>
+            </a:r>
+          </a:p>
+          <a:p>
+            <a:pPr lvl="1">
               <a:lnSpc>
                 <a:spcPct val="100000"/>
               </a:lnSpc>
             </a:pPr>
             <a:r>
-              <a:rPr lang="en-US" sz="2600" dirty="0"/>
-              <a:t>Providing navigable view:   </a:t>
-            </a:r>
-            <a:r>
-              <a:rPr lang="en-US" sz="2600" dirty="0" err="1"/>
-              <a:t>BuildingList</a:t>
-            </a:r>
-            <a:r>
-              <a:rPr lang="en-US" sz="2600" b="1" dirty="0" err="1"/>
-              <a:t>View</a:t>
-            </a:r>
-            <a:endParaRPr lang="en-US" sz="2600" b="1" dirty="0">
-              <a:cs typeface="Arial" panose="020B0604020202020204"/>
-            </a:endParaRPr>
-          </a:p>
-          <a:p>
-            <a:pPr marL="719455" lvl="1" indent="-215900">
+              <a:rPr lang="en-US" sz="2600"/>
+              <a:t>Possibly </a:t>
+            </a:r>
+            <a:r>
+              <a:rPr lang="en-US" sz="2600" b="1"/>
+              <a:t>shared layout </a:t>
+            </a:r>
+            <a:r>
+              <a:rPr lang="en-US" sz="2600"/>
+              <a:t>component.</a:t>
+            </a:r>
+          </a:p>
+          <a:p>
+            <a:pPr lvl="1">
               <a:lnSpc>
                 <a:spcPct val="100000"/>
               </a:lnSpc>
             </a:pPr>
             <a:r>
-              <a:rPr lang="en-US" sz="2600" dirty="0"/>
-              <a:t>Holding and refreshing data list state, maps w. </a:t>
-            </a:r>
-            <a:r>
-              <a:rPr lang="en-US" sz="2600" dirty="0" err="1"/>
-              <a:t>ListItems</a:t>
-            </a:r>
-            <a:r>
-              <a:rPr lang="en-US" sz="2600" dirty="0"/>
-              <a:t>:   </a:t>
-            </a:r>
-            <a:r>
-              <a:rPr lang="en-US" sz="2600" dirty="0" err="1"/>
-              <a:t>Building</a:t>
-            </a:r>
-            <a:r>
-              <a:rPr lang="en-US" sz="2600" b="1" dirty="0" err="1"/>
-              <a:t>List</a:t>
-            </a:r>
-            <a:r>
-              <a:rPr lang="en-US" sz="2600" dirty="0"/>
-              <a:t> </a:t>
-            </a:r>
-            <a:endParaRPr lang="en-US" sz="2600" dirty="0">
-              <a:cs typeface="Arial"/>
-            </a:endParaRPr>
-          </a:p>
-          <a:p>
-            <a:pPr marL="719455" lvl="1" indent="-215900">
-              <a:lnSpc>
-                <a:spcPct val="100000"/>
-              </a:lnSpc>
-            </a:pPr>
-            <a:r>
-              <a:rPr lang="en-US" sz="2600" dirty="0"/>
-              <a:t>Providing actions for one item:   </a:t>
-            </a:r>
-            <a:r>
-              <a:rPr lang="en-US" sz="2600" dirty="0" err="1"/>
-              <a:t>Building</a:t>
-            </a:r>
-            <a:r>
-              <a:rPr lang="en-US" sz="2600" b="1" dirty="0" err="1"/>
-              <a:t>ListItem</a:t>
-            </a:r>
-            <a:r>
-              <a:rPr lang="en-US" sz="2600" b="1" dirty="0"/>
-              <a:t> </a:t>
-            </a:r>
-            <a:r>
-              <a:rPr lang="en-US" sz="2600" dirty="0">
-                <a:ea typeface="+mn-lt"/>
-                <a:cs typeface="+mn-lt"/>
-              </a:rPr>
-              <a:t>(clickable, x = delete)</a:t>
-            </a:r>
-            <a:endParaRPr lang="en-US" sz="2600" b="1" dirty="0">
-              <a:cs typeface="Arial" panose="020B0604020202020204"/>
-            </a:endParaRPr>
-          </a:p>
-          <a:p>
-            <a:pPr marL="719455" lvl="1" indent="-215900">
-              <a:lnSpc>
-                <a:spcPct val="100000"/>
-              </a:lnSpc>
-            </a:pPr>
-            <a:r>
-              <a:rPr lang="en-US" sz="2600" dirty="0"/>
-              <a:t>Just shows data for one item:   </a:t>
-            </a:r>
-            <a:r>
-              <a:rPr lang="en-US" sz="2600" dirty="0" err="1"/>
-              <a:t>Building</a:t>
-            </a:r>
-            <a:r>
-              <a:rPr lang="en-US" sz="2600" b="1" dirty="0" err="1"/>
-              <a:t>Display</a:t>
-            </a:r>
-            <a:r>
-              <a:rPr lang="en-US" sz="2600" dirty="0"/>
-              <a:t> / </a:t>
-            </a:r>
-            <a:r>
-              <a:rPr lang="en-US" sz="2600" dirty="0" err="1">
-                <a:ea typeface="+mn-lt"/>
-                <a:cs typeface="+mn-lt"/>
-              </a:rPr>
-              <a:t>BuildingInfo</a:t>
-            </a:r>
-            <a:r>
-              <a:rPr lang="en-US" sz="2600" dirty="0">
-                <a:ea typeface="+mn-lt"/>
-                <a:cs typeface="+mn-lt"/>
-              </a:rPr>
-              <a:t> / </a:t>
-            </a:r>
-            <a:r>
-              <a:rPr lang="en-US" sz="2600" dirty="0"/>
-              <a:t>B…Details</a:t>
-            </a:r>
-            <a:endParaRPr lang="en-US" sz="2600" dirty="0">
-              <a:cs typeface="Arial"/>
-            </a:endParaRPr>
+              <a:rPr lang="en-US" sz="2600"/>
+              <a:t>Possibly with </a:t>
+            </a:r>
+            <a:r>
+              <a:rPr lang="en-US" sz="2600" b="1"/>
+              <a:t>shared context</a:t>
+            </a:r>
+            <a:r>
+              <a:rPr lang="en-US" sz="2600"/>
+              <a:t>?</a:t>
+            </a:r>
           </a:p>
         </p:txBody>
       </p:sp>
@@ -9051,7 +9747,7 @@
           <a:p>
             <a:fld id="{11EDCD7B-6966-E249-89F2-D46BDFBF56BE}" type="datetime1">
               <a:rPr lang="fi-FI" smtClean="0"/>
-              <a:t>11.3.2024</a:t>
+              <a:t>14.3.2024</a:t>
             </a:fld>
             <a:endParaRPr lang="en-GB"/>
           </a:p>
@@ -9114,7 +9810,7 @@
     </p:spTree>
     <p:extLst>
       <p:ext uri="{BB962C8B-B14F-4D97-AF65-F5344CB8AC3E}">
-        <p14:creationId xmlns:p14="http://schemas.microsoft.com/office/powerpoint/2010/main" val="553651584"/>
+        <p14:creationId xmlns:p14="http://schemas.microsoft.com/office/powerpoint/2010/main" val="2361742466"/>
       </p:ext>
     </p:extLst>
   </p:cSld>
@@ -9143,10 +9839,93 @@
       </p:grpSpPr>
       <p:sp>
         <p:nvSpPr>
-          <p:cNvPr id="5" name="Date Placeholder 4">
-            <a:extLst>
-              <a:ext uri="{FF2B5EF4-FFF2-40B4-BE49-F238E27FC236}">
-                <a16:creationId xmlns:a16="http://schemas.microsoft.com/office/drawing/2014/main" id="{976244E2-AA76-2742-B2EC-FEC79276155C}"/>
+          <p:cNvPr id="2" name="Title 1">
+            <a:extLst>
+              <a:ext uri="{FF2B5EF4-FFF2-40B4-BE49-F238E27FC236}">
+                <a16:creationId xmlns:a16="http://schemas.microsoft.com/office/drawing/2014/main" id="{F9662D29-990E-426E-BC0E-093CB48EE792}"/>
+              </a:ext>
+            </a:extLst>
+          </p:cNvPr>
+          <p:cNvSpPr>
+            <a:spLocks noGrp="1"/>
+          </p:cNvSpPr>
+          <p:nvPr>
+            <p:ph type="title"/>
+          </p:nvPr>
+        </p:nvSpPr>
+        <p:spPr/>
+        <p:txBody>
+          <a:bodyPr anchor="ctr">
+            <a:normAutofit/>
+          </a:bodyPr>
+          <a:lstStyle/>
+          <a:p>
+            <a:r>
+              <a:rPr lang="en-US" dirty="0"/>
+              <a:t>+13. Programmatic Routing</a:t>
+            </a:r>
+            <a:endParaRPr lang="fi-FI" dirty="0"/>
+          </a:p>
+        </p:txBody>
+      </p:sp>
+      <p:sp>
+        <p:nvSpPr>
+          <p:cNvPr id="3" name="Content Placeholder 2">
+            <a:extLst>
+              <a:ext uri="{FF2B5EF4-FFF2-40B4-BE49-F238E27FC236}">
+                <a16:creationId xmlns:a16="http://schemas.microsoft.com/office/drawing/2014/main" id="{001C1C76-B4E0-405B-8F87-AC2E22AA7225}"/>
+              </a:ext>
+            </a:extLst>
+          </p:cNvPr>
+          <p:cNvSpPr>
+            <a:spLocks noGrp="1"/>
+          </p:cNvSpPr>
+          <p:nvPr>
+            <p:ph sz="half" idx="2"/>
+          </p:nvPr>
+        </p:nvSpPr>
+        <p:spPr/>
+        <p:txBody>
+          <a:bodyPr vert="horz" lIns="0" tIns="0" rIns="0" bIns="36000" numCol="1" spcCol="360000" rtlCol="0" anchor="t">
+            <a:normAutofit/>
+          </a:bodyPr>
+          <a:lstStyle/>
+          <a:p>
+            <a:pPr marL="215900" indent="-215900">
+              <a:lnSpc>
+                <a:spcPct val="100000"/>
+              </a:lnSpc>
+            </a:pPr>
+            <a:r>
+              <a:rPr lang="en-US" sz="2800">
+                <a:ea typeface="+mn-lt"/>
+                <a:cs typeface="+mn-lt"/>
+              </a:rPr>
+              <a:t>You can also programmatically </a:t>
+            </a:r>
+            <a:r>
+              <a:rPr lang="en-US" sz="2800" b="1">
+                <a:ea typeface="+mn-lt"/>
+                <a:cs typeface="+mn-lt"/>
+              </a:rPr>
+              <a:t>manipulate the Routing history stack: </a:t>
+            </a:r>
+            <a:r>
+              <a:rPr lang="en-US" sz="2800">
+                <a:ea typeface="+mn-lt"/>
+                <a:cs typeface="+mn-lt"/>
+              </a:rPr>
+              <a:t>pop, push, replace.</a:t>
+            </a:r>
+          </a:p>
+        </p:txBody>
+      </p:sp>
+      <p:sp>
+        <p:nvSpPr>
+          <p:cNvPr id="4" name="Date Placeholder 3">
+            <a:extLst>
+              <a:ext uri="{FF2B5EF4-FFF2-40B4-BE49-F238E27FC236}">
+                <a16:creationId xmlns:a16="http://schemas.microsoft.com/office/drawing/2014/main" id="{FDEC7F5E-C1B0-42AC-950B-DE3029CAED1B}"/>
               </a:ext>
             </a:extLst>
           </p:cNvPr>
@@ -9162,9 +9941,9 @@
           <a:bodyPr/>
           <a:lstStyle/>
           <a:p>
-            <a:fld id="{202E1EC2-47B8-044B-A09E-6A63B4D80C87}" type="datetime1">
+            <a:fld id="{11EDCD7B-6966-E249-89F2-D46BDFBF56BE}" type="datetime1">
               <a:rPr lang="fi-FI" smtClean="0"/>
-              <a:t>11.3.2024</a:t>
+              <a:t>14.3.2024</a:t>
             </a:fld>
             <a:endParaRPr lang="en-GB"/>
           </a:p>
@@ -9172,10 +9951,10 @@
       </p:sp>
       <p:sp>
         <p:nvSpPr>
-          <p:cNvPr id="6" name="Footer Placeholder 5">
-            <a:extLst>
-              <a:ext uri="{FF2B5EF4-FFF2-40B4-BE49-F238E27FC236}">
-                <a16:creationId xmlns:a16="http://schemas.microsoft.com/office/drawing/2014/main" id="{588CE607-4137-8840-8FEA-42EAC857E3A3}"/>
+          <p:cNvPr id="5" name="Footer Placeholder 4">
+            <a:extLst>
+              <a:ext uri="{FF2B5EF4-FFF2-40B4-BE49-F238E27FC236}">
+                <a16:creationId xmlns:a16="http://schemas.microsoft.com/office/drawing/2014/main" id="{72FA43EE-B2B3-49D5-872B-4D987D842984}"/>
               </a:ext>
             </a:extLst>
           </p:cNvPr>
@@ -9197,10 +9976,10 @@
       </p:sp>
       <p:sp>
         <p:nvSpPr>
-          <p:cNvPr id="7" name="Slide Number Placeholder 6">
-            <a:extLst>
-              <a:ext uri="{FF2B5EF4-FFF2-40B4-BE49-F238E27FC236}">
-                <a16:creationId xmlns:a16="http://schemas.microsoft.com/office/drawing/2014/main" id="{2E133A96-6C73-0844-B8CB-27C2B5F4CFB1}"/>
+          <p:cNvPr id="6" name="Slide Number Placeholder 5">
+            <a:extLst>
+              <a:ext uri="{FF2B5EF4-FFF2-40B4-BE49-F238E27FC236}">
+                <a16:creationId xmlns:a16="http://schemas.microsoft.com/office/drawing/2014/main" id="{36A82290-8C98-42D6-A040-74AE3ECFEC15}"/>
               </a:ext>
             </a:extLst>
           </p:cNvPr>
@@ -9224,759 +10003,10 @@
           </a:p>
         </p:txBody>
       </p:sp>
-      <p:sp>
-        <p:nvSpPr>
-          <p:cNvPr id="11" name="Rectangle 10">
-            <a:extLst>
-              <a:ext uri="{FF2B5EF4-FFF2-40B4-BE49-F238E27FC236}">
-                <a16:creationId xmlns:a16="http://schemas.microsoft.com/office/drawing/2014/main" id="{00475031-561C-4754-B82D-151950B18D1E}"/>
-              </a:ext>
-            </a:extLst>
-          </p:cNvPr>
-          <p:cNvSpPr/>
-          <p:nvPr/>
-        </p:nvSpPr>
-        <p:spPr>
-          <a:xfrm>
-            <a:off x="1027611" y="461554"/>
-            <a:ext cx="9953898" cy="5329646"/>
-          </a:xfrm>
-          <a:prstGeom prst="rect">
-            <a:avLst/>
-          </a:prstGeom>
-          <a:noFill/>
-        </p:spPr>
-        <p:style>
-          <a:lnRef idx="2">
-            <a:schemeClr val="accent1">
-              <a:shade val="50000"/>
-            </a:schemeClr>
-          </a:lnRef>
-          <a:fillRef idx="1">
-            <a:schemeClr val="accent1"/>
-          </a:fillRef>
-          <a:effectRef idx="0">
-            <a:schemeClr val="accent1"/>
-          </a:effectRef>
-          <a:fontRef idx="minor">
-            <a:schemeClr val="lt1"/>
-          </a:fontRef>
-        </p:style>
-        <p:txBody>
-          <a:bodyPr rtlCol="0" anchor="ctr"/>
-          <a:lstStyle/>
-          <a:p>
-            <a:pPr algn="ctr"/>
-            <a:endParaRPr lang="en-US"/>
-          </a:p>
-        </p:txBody>
-      </p:sp>
-      <p:sp>
-        <p:nvSpPr>
-          <p:cNvPr id="12" name="Rectangle 11">
-            <a:extLst>
-              <a:ext uri="{FF2B5EF4-FFF2-40B4-BE49-F238E27FC236}">
-                <a16:creationId xmlns:a16="http://schemas.microsoft.com/office/drawing/2014/main" id="{21E580B1-C062-4B40-AADE-267C291C929A}"/>
-              </a:ext>
-            </a:extLst>
-          </p:cNvPr>
-          <p:cNvSpPr/>
-          <p:nvPr/>
-        </p:nvSpPr>
-        <p:spPr>
-          <a:xfrm>
-            <a:off x="1479479" y="955497"/>
-            <a:ext cx="8486454" cy="4119938"/>
-          </a:xfrm>
-          <a:prstGeom prst="rect">
-            <a:avLst/>
-          </a:prstGeom>
-          <a:noFill/>
-        </p:spPr>
-        <p:style>
-          <a:lnRef idx="2">
-            <a:schemeClr val="accent1">
-              <a:shade val="50000"/>
-            </a:schemeClr>
-          </a:lnRef>
-          <a:fillRef idx="1">
-            <a:schemeClr val="accent1"/>
-          </a:fillRef>
-          <a:effectRef idx="0">
-            <a:schemeClr val="accent1"/>
-          </a:effectRef>
-          <a:fontRef idx="minor">
-            <a:schemeClr val="lt1"/>
-          </a:fontRef>
-        </p:style>
-        <p:txBody>
-          <a:bodyPr rtlCol="0" anchor="ctr"/>
-          <a:lstStyle/>
-          <a:p>
-            <a:pPr algn="ctr"/>
-            <a:endParaRPr lang="en-US"/>
-          </a:p>
-        </p:txBody>
-      </p:sp>
-      <p:sp>
-        <p:nvSpPr>
-          <p:cNvPr id="13" name="Rectangle 12">
-            <a:extLst>
-              <a:ext uri="{FF2B5EF4-FFF2-40B4-BE49-F238E27FC236}">
-                <a16:creationId xmlns:a16="http://schemas.microsoft.com/office/drawing/2014/main" id="{3BCD6776-4753-46C8-9838-446B5A5A11C3}"/>
-              </a:ext>
-            </a:extLst>
-          </p:cNvPr>
-          <p:cNvSpPr/>
-          <p:nvPr/>
-        </p:nvSpPr>
-        <p:spPr>
-          <a:xfrm>
-            <a:off x="1767155" y="1263721"/>
-            <a:ext cx="7880279" cy="1099335"/>
-          </a:xfrm>
-          <a:prstGeom prst="rect">
-            <a:avLst/>
-          </a:prstGeom>
-          <a:noFill/>
-        </p:spPr>
-        <p:style>
-          <a:lnRef idx="2">
-            <a:schemeClr val="accent1">
-              <a:shade val="50000"/>
-            </a:schemeClr>
-          </a:lnRef>
-          <a:fillRef idx="1">
-            <a:schemeClr val="accent1"/>
-          </a:fillRef>
-          <a:effectRef idx="0">
-            <a:schemeClr val="accent1"/>
-          </a:effectRef>
-          <a:fontRef idx="minor">
-            <a:schemeClr val="lt1"/>
-          </a:fontRef>
-        </p:style>
-        <p:txBody>
-          <a:bodyPr rtlCol="0" anchor="ctr"/>
-          <a:lstStyle/>
-          <a:p>
-            <a:pPr algn="ctr"/>
-            <a:r>
-              <a:rPr lang="en-US"/>
-              <a:t>BuildingList</a:t>
-            </a:r>
-          </a:p>
-        </p:txBody>
-      </p:sp>
-      <p:sp>
-        <p:nvSpPr>
-          <p:cNvPr id="17" name="Rectangle 16">
-            <a:extLst>
-              <a:ext uri="{FF2B5EF4-FFF2-40B4-BE49-F238E27FC236}">
-                <a16:creationId xmlns:a16="http://schemas.microsoft.com/office/drawing/2014/main" id="{98DF4436-F14E-4FF4-A1EA-420811AE78D2}"/>
-              </a:ext>
-            </a:extLst>
-          </p:cNvPr>
-          <p:cNvSpPr/>
-          <p:nvPr/>
-        </p:nvSpPr>
-        <p:spPr>
-          <a:xfrm>
-            <a:off x="1919555" y="1510300"/>
-            <a:ext cx="7594316" cy="706879"/>
-          </a:xfrm>
-          <a:prstGeom prst="rect">
-            <a:avLst/>
-          </a:prstGeom>
-          <a:noFill/>
-        </p:spPr>
-        <p:style>
-          <a:lnRef idx="2">
-            <a:schemeClr val="accent1">
-              <a:shade val="50000"/>
-            </a:schemeClr>
-          </a:lnRef>
-          <a:fillRef idx="1">
-            <a:schemeClr val="accent1"/>
-          </a:fillRef>
-          <a:effectRef idx="0">
-            <a:schemeClr val="accent1"/>
-          </a:effectRef>
-          <a:fontRef idx="minor">
-            <a:schemeClr val="lt1"/>
-          </a:fontRef>
-        </p:style>
-        <p:txBody>
-          <a:bodyPr rtlCol="0" anchor="ctr"/>
-          <a:lstStyle/>
-          <a:p>
-            <a:pPr algn="ctr"/>
-            <a:endParaRPr lang="en-US">
-              <a:solidFill>
-                <a:schemeClr val="tx1"/>
-              </a:solidFill>
-            </a:endParaRPr>
-          </a:p>
-        </p:txBody>
-      </p:sp>
-      <p:sp>
-        <p:nvSpPr>
-          <p:cNvPr id="19" name="Rectangle 18">
-            <a:extLst>
-              <a:ext uri="{FF2B5EF4-FFF2-40B4-BE49-F238E27FC236}">
-                <a16:creationId xmlns:a16="http://schemas.microsoft.com/office/drawing/2014/main" id="{5341E306-05B8-489B-8BF0-CD89A5F3A152}"/>
-              </a:ext>
-            </a:extLst>
-          </p:cNvPr>
-          <p:cNvSpPr/>
-          <p:nvPr/>
-        </p:nvSpPr>
-        <p:spPr>
-          <a:xfrm>
-            <a:off x="1210491" y="529813"/>
-            <a:ext cx="5724292" cy="369332"/>
-          </a:xfrm>
-          <a:prstGeom prst="rect">
-            <a:avLst/>
-          </a:prstGeom>
-        </p:spPr>
-        <p:txBody>
-          <a:bodyPr wrap="square">
-            <a:spAutoFit/>
-          </a:bodyPr>
-          <a:lstStyle/>
-          <a:p>
-            <a:r>
-              <a:rPr lang="en-US" err="1"/>
-              <a:t>BuildingListView</a:t>
-            </a:r>
-            <a:endParaRPr lang="en-US"/>
-          </a:p>
-        </p:txBody>
-      </p:sp>
-      <p:sp>
-        <p:nvSpPr>
-          <p:cNvPr id="20" name="Rectangle 19">
-            <a:extLst>
-              <a:ext uri="{FF2B5EF4-FFF2-40B4-BE49-F238E27FC236}">
-                <a16:creationId xmlns:a16="http://schemas.microsoft.com/office/drawing/2014/main" id="{8F27A09B-CDF1-45C9-9E69-ADDAB166877F}"/>
-              </a:ext>
-            </a:extLst>
-          </p:cNvPr>
-          <p:cNvSpPr/>
-          <p:nvPr/>
-        </p:nvSpPr>
-        <p:spPr>
-          <a:xfrm>
-            <a:off x="1654139" y="909141"/>
-            <a:ext cx="8093272" cy="369332"/>
-          </a:xfrm>
-          <a:prstGeom prst="rect">
-            <a:avLst/>
-          </a:prstGeom>
-        </p:spPr>
-        <p:txBody>
-          <a:bodyPr wrap="square">
-            <a:spAutoFit/>
-          </a:bodyPr>
-          <a:lstStyle/>
-          <a:p>
-            <a:r>
-              <a:rPr lang="en-US" dirty="0" err="1"/>
-              <a:t>BuildingList</a:t>
-            </a:r>
-            <a:r>
-              <a:rPr lang="en-US" dirty="0"/>
-              <a:t> (this could fetch and hold the data list in its state)</a:t>
-            </a:r>
-          </a:p>
-        </p:txBody>
-      </p:sp>
-      <p:sp>
-        <p:nvSpPr>
-          <p:cNvPr id="21" name="Rectangle 20">
-            <a:extLst>
-              <a:ext uri="{FF2B5EF4-FFF2-40B4-BE49-F238E27FC236}">
-                <a16:creationId xmlns:a16="http://schemas.microsoft.com/office/drawing/2014/main" id="{D3E284C1-EC4D-40EE-BD32-512F6D98C393}"/>
-              </a:ext>
-            </a:extLst>
-          </p:cNvPr>
-          <p:cNvSpPr/>
-          <p:nvPr/>
-        </p:nvSpPr>
-        <p:spPr>
-          <a:xfrm>
-            <a:off x="1919556" y="1217365"/>
-            <a:ext cx="7853504" cy="369332"/>
-          </a:xfrm>
-          <a:prstGeom prst="rect">
-            <a:avLst/>
-          </a:prstGeom>
-        </p:spPr>
-        <p:txBody>
-          <a:bodyPr wrap="square">
-            <a:spAutoFit/>
-          </a:bodyPr>
-          <a:lstStyle/>
-          <a:p>
-            <a:r>
-              <a:rPr lang="en-US" dirty="0" err="1"/>
-              <a:t>BuildingListItem</a:t>
-            </a:r>
-            <a:r>
-              <a:rPr lang="en-US" dirty="0"/>
-              <a:t> (is passed one Building object in props, by the parent)</a:t>
-            </a:r>
-          </a:p>
-        </p:txBody>
-      </p:sp>
-      <p:sp>
-        <p:nvSpPr>
-          <p:cNvPr id="22" name="Rectangle 21">
-            <a:extLst>
-              <a:ext uri="{FF2B5EF4-FFF2-40B4-BE49-F238E27FC236}">
-                <a16:creationId xmlns:a16="http://schemas.microsoft.com/office/drawing/2014/main" id="{872E0160-1E28-4484-B7E7-9C7A248B3BF3}"/>
-              </a:ext>
-            </a:extLst>
-          </p:cNvPr>
-          <p:cNvSpPr/>
-          <p:nvPr/>
-        </p:nvSpPr>
-        <p:spPr>
-          <a:xfrm>
-            <a:off x="2226067" y="1525589"/>
-            <a:ext cx="7400820" cy="369332"/>
-          </a:xfrm>
-          <a:prstGeom prst="rect">
-            <a:avLst/>
-          </a:prstGeom>
-        </p:spPr>
-        <p:txBody>
-          <a:bodyPr wrap="square">
-            <a:spAutoFit/>
-          </a:bodyPr>
-          <a:lstStyle/>
-          <a:p>
-            <a:r>
-              <a:rPr lang="en-US" err="1"/>
-              <a:t>BuildingDisplay</a:t>
-            </a:r>
-            <a:r>
-              <a:rPr lang="en-US"/>
-              <a:t> (is passed the Building object in props, by the parent)</a:t>
-            </a:r>
-          </a:p>
-        </p:txBody>
-      </p:sp>
-      <p:sp>
-        <p:nvSpPr>
-          <p:cNvPr id="31" name="Rectangle 30">
-            <a:extLst>
-              <a:ext uri="{FF2B5EF4-FFF2-40B4-BE49-F238E27FC236}">
-                <a16:creationId xmlns:a16="http://schemas.microsoft.com/office/drawing/2014/main" id="{B05BD3DB-900E-46DB-A7E9-CBE4C87B8AE1}"/>
-              </a:ext>
-            </a:extLst>
-          </p:cNvPr>
-          <p:cNvSpPr/>
-          <p:nvPr/>
-        </p:nvSpPr>
-        <p:spPr>
-          <a:xfrm>
-            <a:off x="1773382" y="2560099"/>
-            <a:ext cx="7880279" cy="1099335"/>
-          </a:xfrm>
-          <a:prstGeom prst="rect">
-            <a:avLst/>
-          </a:prstGeom>
-          <a:noFill/>
-        </p:spPr>
-        <p:style>
-          <a:lnRef idx="2">
-            <a:schemeClr val="accent1">
-              <a:shade val="50000"/>
-            </a:schemeClr>
-          </a:lnRef>
-          <a:fillRef idx="1">
-            <a:schemeClr val="accent1"/>
-          </a:fillRef>
-          <a:effectRef idx="0">
-            <a:schemeClr val="accent1"/>
-          </a:effectRef>
-          <a:fontRef idx="minor">
-            <a:schemeClr val="lt1"/>
-          </a:fontRef>
-        </p:style>
-        <p:txBody>
-          <a:bodyPr rtlCol="0" anchor="ctr"/>
-          <a:lstStyle/>
-          <a:p>
-            <a:pPr algn="ctr"/>
-            <a:r>
-              <a:rPr lang="en-US"/>
-              <a:t>BuildingList</a:t>
-            </a:r>
-          </a:p>
-        </p:txBody>
-      </p:sp>
-      <p:sp>
-        <p:nvSpPr>
-          <p:cNvPr id="32" name="Rectangle 31">
-            <a:extLst>
-              <a:ext uri="{FF2B5EF4-FFF2-40B4-BE49-F238E27FC236}">
-                <a16:creationId xmlns:a16="http://schemas.microsoft.com/office/drawing/2014/main" id="{24D64EB1-30CF-4AA3-A5E8-9C0D3506212C}"/>
-              </a:ext>
-            </a:extLst>
-          </p:cNvPr>
-          <p:cNvSpPr/>
-          <p:nvPr/>
-        </p:nvSpPr>
-        <p:spPr>
-          <a:xfrm>
-            <a:off x="1925782" y="2806678"/>
-            <a:ext cx="7594316" cy="706879"/>
-          </a:xfrm>
-          <a:prstGeom prst="rect">
-            <a:avLst/>
-          </a:prstGeom>
-          <a:noFill/>
-        </p:spPr>
-        <p:style>
-          <a:lnRef idx="2">
-            <a:schemeClr val="accent1">
-              <a:shade val="50000"/>
-            </a:schemeClr>
-          </a:lnRef>
-          <a:fillRef idx="1">
-            <a:schemeClr val="accent1"/>
-          </a:fillRef>
-          <a:effectRef idx="0">
-            <a:schemeClr val="accent1"/>
-          </a:effectRef>
-          <a:fontRef idx="minor">
-            <a:schemeClr val="lt1"/>
-          </a:fontRef>
-        </p:style>
-        <p:txBody>
-          <a:bodyPr rtlCol="0" anchor="ctr"/>
-          <a:lstStyle/>
-          <a:p>
-            <a:pPr algn="ctr"/>
-            <a:endParaRPr lang="en-US">
-              <a:solidFill>
-                <a:schemeClr val="tx1"/>
-              </a:solidFill>
-            </a:endParaRPr>
-          </a:p>
-        </p:txBody>
-      </p:sp>
-      <p:sp>
-        <p:nvSpPr>
-          <p:cNvPr id="33" name="Rectangle 32">
-            <a:extLst>
-              <a:ext uri="{FF2B5EF4-FFF2-40B4-BE49-F238E27FC236}">
-                <a16:creationId xmlns:a16="http://schemas.microsoft.com/office/drawing/2014/main" id="{A48C747A-1BA6-4592-A290-5E00BADE9A17}"/>
-              </a:ext>
-            </a:extLst>
-          </p:cNvPr>
-          <p:cNvSpPr/>
-          <p:nvPr/>
-        </p:nvSpPr>
-        <p:spPr>
-          <a:xfrm>
-            <a:off x="1925783" y="2513743"/>
-            <a:ext cx="7853504" cy="369332"/>
-          </a:xfrm>
-          <a:prstGeom prst="rect">
-            <a:avLst/>
-          </a:prstGeom>
-        </p:spPr>
-        <p:txBody>
-          <a:bodyPr wrap="square">
-            <a:spAutoFit/>
-          </a:bodyPr>
-          <a:lstStyle/>
-          <a:p>
-            <a:r>
-              <a:rPr lang="en-US" dirty="0" err="1"/>
-              <a:t>BuildingListItem</a:t>
-            </a:r>
-            <a:r>
-              <a:rPr lang="en-US" dirty="0"/>
-              <a:t> (is passed one Building object in props, by the parent)</a:t>
-            </a:r>
-          </a:p>
-        </p:txBody>
-      </p:sp>
-      <p:sp>
-        <p:nvSpPr>
-          <p:cNvPr id="34" name="Rectangle 33">
-            <a:extLst>
-              <a:ext uri="{FF2B5EF4-FFF2-40B4-BE49-F238E27FC236}">
-                <a16:creationId xmlns:a16="http://schemas.microsoft.com/office/drawing/2014/main" id="{CBF02A83-8B41-4686-83AD-C47D10FE8CEE}"/>
-              </a:ext>
-            </a:extLst>
-          </p:cNvPr>
-          <p:cNvSpPr/>
-          <p:nvPr/>
-        </p:nvSpPr>
-        <p:spPr>
-          <a:xfrm>
-            <a:off x="2232294" y="2821967"/>
-            <a:ext cx="7400820" cy="369332"/>
-          </a:xfrm>
-          <a:prstGeom prst="rect">
-            <a:avLst/>
-          </a:prstGeom>
-        </p:spPr>
-        <p:txBody>
-          <a:bodyPr wrap="square">
-            <a:spAutoFit/>
-          </a:bodyPr>
-          <a:lstStyle/>
-          <a:p>
-            <a:r>
-              <a:rPr lang="en-US" err="1"/>
-              <a:t>BuildingDisplay</a:t>
-            </a:r>
-            <a:r>
-              <a:rPr lang="en-US"/>
-              <a:t> (is passed the Building object in props, by the parent)</a:t>
-            </a:r>
-          </a:p>
-        </p:txBody>
-      </p:sp>
-      <p:sp>
-        <p:nvSpPr>
-          <p:cNvPr id="35" name="Rectangle 34">
-            <a:extLst>
-              <a:ext uri="{FF2B5EF4-FFF2-40B4-BE49-F238E27FC236}">
-                <a16:creationId xmlns:a16="http://schemas.microsoft.com/office/drawing/2014/main" id="{0E510CE1-2DE6-44A6-9E04-B6314D39B509}"/>
-              </a:ext>
-            </a:extLst>
-          </p:cNvPr>
-          <p:cNvSpPr/>
-          <p:nvPr/>
-        </p:nvSpPr>
-        <p:spPr>
-          <a:xfrm>
-            <a:off x="1752835" y="3810121"/>
-            <a:ext cx="7880279" cy="1099335"/>
-          </a:xfrm>
-          <a:prstGeom prst="rect">
-            <a:avLst/>
-          </a:prstGeom>
-          <a:noFill/>
-        </p:spPr>
-        <p:style>
-          <a:lnRef idx="2">
-            <a:schemeClr val="accent1">
-              <a:shade val="50000"/>
-            </a:schemeClr>
-          </a:lnRef>
-          <a:fillRef idx="1">
-            <a:schemeClr val="accent1"/>
-          </a:fillRef>
-          <a:effectRef idx="0">
-            <a:schemeClr val="accent1"/>
-          </a:effectRef>
-          <a:fontRef idx="minor">
-            <a:schemeClr val="lt1"/>
-          </a:fontRef>
-        </p:style>
-        <p:txBody>
-          <a:bodyPr rtlCol="0" anchor="ctr"/>
-          <a:lstStyle/>
-          <a:p>
-            <a:pPr algn="ctr"/>
-            <a:r>
-              <a:rPr lang="en-US"/>
-              <a:t>BuildingList</a:t>
-            </a:r>
-          </a:p>
-        </p:txBody>
-      </p:sp>
-      <p:sp>
-        <p:nvSpPr>
-          <p:cNvPr id="36" name="Rectangle 35">
-            <a:extLst>
-              <a:ext uri="{FF2B5EF4-FFF2-40B4-BE49-F238E27FC236}">
-                <a16:creationId xmlns:a16="http://schemas.microsoft.com/office/drawing/2014/main" id="{CE0714E2-0FEC-4721-B6B5-4AC64C4C1AF6}"/>
-              </a:ext>
-            </a:extLst>
-          </p:cNvPr>
-          <p:cNvSpPr/>
-          <p:nvPr/>
-        </p:nvSpPr>
-        <p:spPr>
-          <a:xfrm>
-            <a:off x="1905235" y="4056700"/>
-            <a:ext cx="7594316" cy="706879"/>
-          </a:xfrm>
-          <a:prstGeom prst="rect">
-            <a:avLst/>
-          </a:prstGeom>
-          <a:noFill/>
-        </p:spPr>
-        <p:style>
-          <a:lnRef idx="2">
-            <a:schemeClr val="accent1">
-              <a:shade val="50000"/>
-            </a:schemeClr>
-          </a:lnRef>
-          <a:fillRef idx="1">
-            <a:schemeClr val="accent1"/>
-          </a:fillRef>
-          <a:effectRef idx="0">
-            <a:schemeClr val="accent1"/>
-          </a:effectRef>
-          <a:fontRef idx="minor">
-            <a:schemeClr val="lt1"/>
-          </a:fontRef>
-        </p:style>
-        <p:txBody>
-          <a:bodyPr rtlCol="0" anchor="ctr"/>
-          <a:lstStyle/>
-          <a:p>
-            <a:pPr algn="ctr"/>
-            <a:endParaRPr lang="en-US">
-              <a:solidFill>
-                <a:schemeClr val="tx1"/>
-              </a:solidFill>
-            </a:endParaRPr>
-          </a:p>
-        </p:txBody>
-      </p:sp>
-      <p:sp>
-        <p:nvSpPr>
-          <p:cNvPr id="37" name="Rectangle 36">
-            <a:extLst>
-              <a:ext uri="{FF2B5EF4-FFF2-40B4-BE49-F238E27FC236}">
-                <a16:creationId xmlns:a16="http://schemas.microsoft.com/office/drawing/2014/main" id="{89FFA58D-660C-4E39-A05A-E20E6FF8E1AC}"/>
-              </a:ext>
-            </a:extLst>
-          </p:cNvPr>
-          <p:cNvSpPr/>
-          <p:nvPr/>
-        </p:nvSpPr>
-        <p:spPr>
-          <a:xfrm>
-            <a:off x="1905236" y="3763765"/>
-            <a:ext cx="7853504" cy="369332"/>
-          </a:xfrm>
-          <a:prstGeom prst="rect">
-            <a:avLst/>
-          </a:prstGeom>
-        </p:spPr>
-        <p:txBody>
-          <a:bodyPr wrap="square">
-            <a:spAutoFit/>
-          </a:bodyPr>
-          <a:lstStyle/>
-          <a:p>
-            <a:r>
-              <a:rPr lang="en-US" dirty="0" err="1"/>
-              <a:t>BuildingListItem</a:t>
-            </a:r>
-            <a:r>
-              <a:rPr lang="en-US" dirty="0"/>
-              <a:t> (is passed one Building object in props, by the parent)</a:t>
-            </a:r>
-          </a:p>
-        </p:txBody>
-      </p:sp>
-      <p:sp>
-        <p:nvSpPr>
-          <p:cNvPr id="38" name="Rectangle 37">
-            <a:extLst>
-              <a:ext uri="{FF2B5EF4-FFF2-40B4-BE49-F238E27FC236}">
-                <a16:creationId xmlns:a16="http://schemas.microsoft.com/office/drawing/2014/main" id="{3A853F5A-B838-410B-ADCE-305E5317C912}"/>
-              </a:ext>
-            </a:extLst>
-          </p:cNvPr>
-          <p:cNvSpPr/>
-          <p:nvPr/>
-        </p:nvSpPr>
-        <p:spPr>
-          <a:xfrm>
-            <a:off x="2211747" y="4071989"/>
-            <a:ext cx="7400820" cy="369332"/>
-          </a:xfrm>
-          <a:prstGeom prst="rect">
-            <a:avLst/>
-          </a:prstGeom>
-        </p:spPr>
-        <p:txBody>
-          <a:bodyPr wrap="square">
-            <a:spAutoFit/>
-          </a:bodyPr>
-          <a:lstStyle/>
-          <a:p>
-            <a:r>
-              <a:rPr lang="en-US" dirty="0" err="1"/>
-              <a:t>BuildingDisplay</a:t>
-            </a:r>
-            <a:r>
-              <a:rPr lang="en-US" dirty="0"/>
-              <a:t> (is passed the Building object in props, by the parent)</a:t>
-            </a:r>
-          </a:p>
-        </p:txBody>
-      </p:sp>
-      <p:sp>
-        <p:nvSpPr>
-          <p:cNvPr id="2" name="Rectangle 1">
-            <a:extLst>
-              <a:ext uri="{FF2B5EF4-FFF2-40B4-BE49-F238E27FC236}">
-                <a16:creationId xmlns:a16="http://schemas.microsoft.com/office/drawing/2014/main" id="{75ADBC89-AD0C-4B5B-B5E8-D5205A9C02A8}"/>
-              </a:ext>
-            </a:extLst>
-          </p:cNvPr>
-          <p:cNvSpPr/>
-          <p:nvPr/>
-        </p:nvSpPr>
-        <p:spPr>
-          <a:xfrm>
-            <a:off x="2415066" y="5157490"/>
-            <a:ext cx="8486455" cy="646331"/>
-          </a:xfrm>
-          <a:prstGeom prst="rect">
-            <a:avLst/>
-          </a:prstGeom>
-        </p:spPr>
-        <p:txBody>
-          <a:bodyPr wrap="square" lIns="91440" tIns="45720" rIns="91440" bIns="45720" anchor="t">
-            <a:spAutoFit/>
-          </a:bodyPr>
-          <a:lstStyle/>
-          <a:p>
-            <a:r>
-              <a:rPr lang="en-US"/>
-              <a:t>(</a:t>
-            </a:r>
-            <a:r>
-              <a:rPr lang="en-US" err="1"/>
-              <a:t>BuildingListItem</a:t>
-            </a:r>
-            <a:r>
-              <a:rPr lang="en-US"/>
-              <a:t> could handle clicks and actions per each item.</a:t>
-            </a:r>
-          </a:p>
-          <a:p>
-            <a:r>
-              <a:rPr lang="en-US"/>
-              <a:t>And BuildingDisplay/Info/(Details) could be just presentational/display component)</a:t>
-            </a:r>
-            <a:endParaRPr lang="en-US">
-              <a:cs typeface="Arial"/>
-            </a:endParaRPr>
-          </a:p>
-        </p:txBody>
-      </p:sp>
     </p:spTree>
     <p:extLst>
       <p:ext uri="{BB962C8B-B14F-4D97-AF65-F5344CB8AC3E}">
-        <p14:creationId xmlns:p14="http://schemas.microsoft.com/office/powerpoint/2010/main" val="111015751"/>
+        <p14:creationId xmlns:p14="http://schemas.microsoft.com/office/powerpoint/2010/main" val="1452549001"/>
       </p:ext>
     </p:extLst>
   </p:cSld>
@@ -10548,7 +10578,7 @@
           <a:p>
             <a:fld id="{11EDCD7B-6966-E249-89F2-D46BDFBF56BE}" type="datetime1">
               <a:rPr lang="fi-FI" smtClean="0"/>
-              <a:t>11.3.2024</a:t>
+              <a:t>14.3.2024</a:t>
             </a:fld>
             <a:endParaRPr lang="en-GB"/>
           </a:p>
@@ -10758,7 +10788,7 @@
           <a:p>
             <a:fld id="{11EDCD7B-6966-E249-89F2-D46BDFBF56BE}" type="datetime1">
               <a:rPr lang="fi-FI" smtClean="0"/>
-              <a:t>11.3.2024</a:t>
+              <a:t>14.3.2024</a:t>
             </a:fld>
             <a:endParaRPr lang="en-GB"/>
           </a:p>
@@ -11045,7 +11075,7 @@
           <a:p>
             <a:fld id="{11EDCD7B-6966-E249-89F2-D46BDFBF56BE}" type="datetime1">
               <a:rPr lang="fi-FI" smtClean="0"/>
-              <a:t>11.3.2024</a:t>
+              <a:t>14.3.2024</a:t>
             </a:fld>
             <a:endParaRPr lang="en-GB"/>
           </a:p>
@@ -11281,7 +11311,7 @@
           <a:p>
             <a:fld id="{11EDCD7B-6966-E249-89F2-D46BDFBF56BE}" type="datetime1">
               <a:rPr lang="fi-FI" smtClean="0"/>
-              <a:t>11.3.2024</a:t>
+              <a:t>14.3.2024</a:t>
             </a:fld>
             <a:endParaRPr lang="en-GB"/>
           </a:p>
@@ -11504,7 +11534,7 @@
           <a:p>
             <a:fld id="{11EDCD7B-6966-E249-89F2-D46BDFBF56BE}" type="datetime1">
               <a:rPr lang="fi-FI" smtClean="0"/>
-              <a:t>11.3.2024</a:t>
+              <a:t>14.3.2024</a:t>
             </a:fld>
             <a:endParaRPr lang="en-GB"/>
           </a:p>
@@ -11786,7 +11816,7 @@
           <a:p>
             <a:fld id="{11EDCD7B-6966-E249-89F2-D46BDFBF56BE}" type="datetime1">
               <a:rPr lang="fi-FI" smtClean="0"/>
-              <a:t>11.3.2024</a:t>
+              <a:t>14.3.2024</a:t>
             </a:fld>
             <a:endParaRPr lang="en-GB"/>
           </a:p>
@@ -12037,7 +12067,7 @@
           <a:p>
             <a:fld id="{11EDCD7B-6966-E249-89F2-D46BDFBF56BE}" type="datetime1">
               <a:rPr lang="fi-FI" smtClean="0"/>
-              <a:t>11.3.2024</a:t>
+              <a:t>14.3.2024</a:t>
             </a:fld>
             <a:endParaRPr lang="en-GB"/>
           </a:p>
@@ -12292,7 +12322,7 @@
           <a:p>
             <a:fld id="{11EDCD7B-6966-E249-89F2-D46BDFBF56BE}" type="datetime1">
               <a:rPr lang="fi-FI" smtClean="0"/>
-              <a:t>11.3.2024</a:t>
+              <a:t>14.3.2024</a:t>
             </a:fld>
             <a:endParaRPr lang="en-GB"/>
           </a:p>
@@ -12922,15 +12952,6 @@
 </file>
 
 <file path=customXml/item1.xml><?xml version="1.0" encoding="utf-8"?>
-<?mso-contentType ?>
-<FormTemplates xmlns="http://schemas.microsoft.com/sharepoint/v3/contenttype/forms">
-  <Display>DocumentLibraryForm</Display>
-  <Edit>DocumentLibraryForm</Edit>
-  <New>DocumentLibraryForm</New>
-</FormTemplates>
-</file>
-
-<file path=customXml/item2.xml><?xml version="1.0" encoding="utf-8"?>
 <ct:contentTypeSchema xmlns:ct="http://schemas.microsoft.com/office/2006/metadata/contentType" xmlns:ma="http://schemas.microsoft.com/office/2006/metadata/properties/metaAttributes" ct:_="" ma:_="" ma:contentTypeName="Asiakirja" ma:contentTypeID="0x0101000ADF884DD0861243B829456B91D71C32" ma:contentTypeVersion="13" ma:contentTypeDescription="Luo uusi asiakirja." ma:contentTypeScope="" ma:versionID="314522af3e545be07820a3e09ada0045">
   <xsd:schema xmlns:xsd="http://www.w3.org/2001/XMLSchema" xmlns:xs="http://www.w3.org/2001/XMLSchema" xmlns:p="http://schemas.microsoft.com/office/2006/metadata/properties" xmlns:ns2="8438dade-b61d-47d7-ab56-0bbf57e3795f" xmlns:ns3="0b3f8f6d-dc8d-4076-ae37-9bbd8f8c2dbf" targetNamespace="http://schemas.microsoft.com/office/2006/metadata/properties" ma:root="true" ma:fieldsID="1bc2462d560d8dfa6d4fd7061c558562" ns2:_="" ns3:_="">
     <xsd:import namespace="8438dade-b61d-47d7-ab56-0bbf57e3795f"/>
@@ -13153,6 +13174,15 @@
 </ct:contentTypeSchema>
 </file>
 
+<file path=customXml/item2.xml><?xml version="1.0" encoding="utf-8"?>
+<?mso-contentType ?>
+<FormTemplates xmlns="http://schemas.microsoft.com/sharepoint/v3/contenttype/forms">
+  <Display>DocumentLibraryForm</Display>
+  <Edit>DocumentLibraryForm</Edit>
+  <New>DocumentLibraryForm</New>
+</FormTemplates>
+</file>
+
 <file path=customXml/item3.xml><?xml version="1.0" encoding="utf-8"?>
 <p:properties xmlns:p="http://schemas.microsoft.com/office/2006/metadata/properties" xmlns:xsi="http://www.w3.org/2001/XMLSchema-instance" xmlns:pc="http://schemas.microsoft.com/office/infopath/2007/PartnerControls">
   <documentManagement>
@@ -13177,14 +13207,6 @@
 </file>
 
 <file path=customXml/itemProps1.xml><?xml version="1.0" encoding="utf-8"?>
-<ds:datastoreItem xmlns:ds="http://schemas.openxmlformats.org/officeDocument/2006/customXml" ds:itemID="{D546C03B-CD3A-4EA0-AAA4-0E00E896454E}">
-  <ds:schemaRefs>
-    <ds:schemaRef ds:uri="http://schemas.microsoft.com/sharepoint/v3/contenttype/forms"/>
-  </ds:schemaRefs>
-</ds:datastoreItem>
-</file>
-
-<file path=customXml/itemProps2.xml><?xml version="1.0" encoding="utf-8"?>
 <ds:datastoreItem xmlns:ds="http://schemas.openxmlformats.org/officeDocument/2006/customXml" ds:itemID="{3D8B6CA5-4463-44E3-A138-AB79431CCE9A}">
   <ds:schemaRefs>
     <ds:schemaRef ds:uri="http://schemas.microsoft.com/office/2006/metadata/contentType"/>
@@ -13199,6 +13221,14 @@
     <ds:schemaRef ds:uri="http://purl.org/dc/elements/1.1/"/>
     <ds:schemaRef ds:uri="http://purl.org/dc/terms/"/>
     <ds:schemaRef ds:uri="http://schemas.microsoft.com/internal/obd"/>
+  </ds:schemaRefs>
+</ds:datastoreItem>
+</file>
+
+<file path=customXml/itemProps2.xml><?xml version="1.0" encoding="utf-8"?>
+<ds:datastoreItem xmlns:ds="http://schemas.openxmlformats.org/officeDocument/2006/customXml" ds:itemID="{D546C03B-CD3A-4EA0-AAA4-0E00E896454E}">
+  <ds:schemaRefs>
+    <ds:schemaRef ds:uri="http://schemas.microsoft.com/sharepoint/v3/contenttype/forms"/>
   </ds:schemaRefs>
 </ds:datastoreItem>
 </file>

</xml_diff>